<commit_message>
added to proposed approach slides
</commit_message>
<xml_diff>
--- a/PaperPresentation/Paper_Presentation_Fasburg_Reiff_Thomas.pptx
+++ b/PaperPresentation/Paper_Presentation_Fasburg_Reiff_Thomas.pptx
@@ -5,18 +5,19 @@
     <p:sldMasterId id="2147483749" r:id="rId1"/>
   </p:sldMasterIdLst>
   <p:notesMasterIdLst>
-    <p:notesMasterId r:id="rId11"/>
+    <p:notesMasterId r:id="rId12"/>
   </p:notesMasterIdLst>
   <p:sldIdLst>
     <p:sldId id="256" r:id="rId2"/>
     <p:sldId id="257" r:id="rId3"/>
     <p:sldId id="258" r:id="rId4"/>
     <p:sldId id="259" r:id="rId5"/>
-    <p:sldId id="260" r:id="rId6"/>
-    <p:sldId id="261" r:id="rId7"/>
-    <p:sldId id="262" r:id="rId8"/>
-    <p:sldId id="263" r:id="rId9"/>
-    <p:sldId id="264" r:id="rId10"/>
+    <p:sldId id="265" r:id="rId6"/>
+    <p:sldId id="260" r:id="rId7"/>
+    <p:sldId id="261" r:id="rId8"/>
+    <p:sldId id="262" r:id="rId9"/>
+    <p:sldId id="263" r:id="rId10"/>
+    <p:sldId id="264" r:id="rId11"/>
   </p:sldIdLst>
   <p:sldSz cx="9144000" cy="6858000" type="screen4x3"/>
   <p:notesSz cx="6858000" cy="9144000"/>
@@ -200,7 +201,7 @@
           <a:p>
             <a:fld id="{A63B8CFC-D614-4432-A7DB-A65856E85B43}" type="datetimeFigureOut">
               <a:rPr lang="en-US" smtClean="0"/>
-              <a:t>2/15/2015</a:t>
+              <a:t>2/18/2015</a:t>
             </a:fld>
             <a:endParaRPr lang="en-US"/>
           </a:p>
@@ -554,6 +555,114 @@
             <a:fld id="{B8B3BC3C-0900-4ACD-9030-5BE6C2442A68}" type="slidenum">
               <a:rPr lang="en-US" smtClean="0"/>
               <a:t>4</a:t>
+            </a:fld>
+            <a:endParaRPr lang="en-US"/>
+          </a:p>
+        </p:txBody>
+      </p:sp>
+    </p:spTree>
+    <p:extLst>
+      <p:ext uri="{BB962C8B-B14F-4D97-AF65-F5344CB8AC3E}">
+        <p14:creationId xmlns:p14="http://schemas.microsoft.com/office/powerpoint/2010/main" val="2053636732"/>
+      </p:ext>
+    </p:extLst>
+  </p:cSld>
+  <p:clrMapOvr>
+    <a:masterClrMapping/>
+  </p:clrMapOvr>
+</p:notes>
+</file>
+
+<file path=ppt/notesSlides/notesSlide2.xml><?xml version="1.0" encoding="utf-8"?>
+<p:notes xmlns:a="http://schemas.openxmlformats.org/drawingml/2006/main" xmlns:r="http://schemas.openxmlformats.org/officeDocument/2006/relationships" xmlns:p="http://schemas.openxmlformats.org/presentationml/2006/main">
+  <p:cSld>
+    <p:spTree>
+      <p:nvGrpSpPr>
+        <p:cNvPr id="1" name=""/>
+        <p:cNvGrpSpPr/>
+        <p:nvPr/>
+      </p:nvGrpSpPr>
+      <p:grpSpPr>
+        <a:xfrm>
+          <a:off x="0" y="0"/>
+          <a:ext cx="0" cy="0"/>
+          <a:chOff x="0" y="0"/>
+          <a:chExt cx="0" cy="0"/>
+        </a:xfrm>
+      </p:grpSpPr>
+      <p:sp>
+        <p:nvSpPr>
+          <p:cNvPr id="2" name="Slide Image Placeholder 1"/>
+          <p:cNvSpPr>
+            <a:spLocks noGrp="1" noRot="1" noChangeAspect="1"/>
+          </p:cNvSpPr>
+          <p:nvPr>
+            <p:ph type="sldImg"/>
+          </p:nvPr>
+        </p:nvSpPr>
+        <p:spPr/>
+      </p:sp>
+      <p:sp>
+        <p:nvSpPr>
+          <p:cNvPr id="3" name="Notes Placeholder 2"/>
+          <p:cNvSpPr>
+            <a:spLocks noGrp="1"/>
+          </p:cNvSpPr>
+          <p:nvPr>
+            <p:ph type="body" idx="1"/>
+          </p:nvPr>
+        </p:nvSpPr>
+        <p:spPr/>
+        <p:txBody>
+          <a:bodyPr/>
+          <a:lstStyle/>
+          <a:p>
+            <a:r>
+              <a:rPr lang="en-US" dirty="0" smtClean="0"/>
+              <a:t>“Allow” principles</a:t>
+            </a:r>
+            <a:r>
+              <a:rPr lang="en-US" baseline="0" dirty="0" smtClean="0"/>
+              <a:t> relate to apps overreaching their location authority</a:t>
+            </a:r>
+          </a:p>
+          <a:p>
+            <a:r>
+              <a:rPr lang="en-US" baseline="0" dirty="0" smtClean="0"/>
+              <a:t>“Prevent” principles relate to the 3 location privacy threats from before</a:t>
+            </a:r>
+          </a:p>
+          <a:p>
+            <a:r>
+              <a:rPr lang="en-US" baseline="0" dirty="0" smtClean="0"/>
+              <a:t>Last 2 principles are practical concerns to ensure such a tool would be practical and likely to </a:t>
+            </a:r>
+            <a:r>
+              <a:rPr lang="en-US" baseline="0" smtClean="0"/>
+              <a:t>become widely used.</a:t>
+            </a:r>
+            <a:endParaRPr lang="en-US" dirty="0"/>
+          </a:p>
+        </p:txBody>
+      </p:sp>
+      <p:sp>
+        <p:nvSpPr>
+          <p:cNvPr id="4" name="Slide Number Placeholder 3"/>
+          <p:cNvSpPr>
+            <a:spLocks noGrp="1"/>
+          </p:cNvSpPr>
+          <p:nvPr>
+            <p:ph type="sldNum" sz="quarter" idx="10"/>
+          </p:nvPr>
+        </p:nvSpPr>
+        <p:spPr/>
+        <p:txBody>
+          <a:bodyPr/>
+          <a:lstStyle/>
+          <a:p>
+            <a:fld id="{B8B3BC3C-0900-4ACD-9030-5BE6C2442A68}" type="slidenum">
+              <a:rPr lang="en-US" smtClean="0"/>
+              <a:t>5</a:t>
             </a:fld>
             <a:endParaRPr lang="en-US"/>
           </a:p>
@@ -2110,7 +2219,7 @@
           <a:p>
             <a:fld id="{ADE5661A-BDAA-4579-B2F5-AA9011776D83}" type="datetimeFigureOut">
               <a:rPr lang="en-US" smtClean="0"/>
-              <a:t>2/15/2015</a:t>
+              <a:t>2/18/2015</a:t>
             </a:fld>
             <a:endParaRPr lang="en-US"/>
           </a:p>
@@ -3217,7 +3326,7 @@
             <a:fld id="{1D8BD707-D9CF-40AE-B4C6-C98DA3205C09}" type="datetimeFigureOut">
               <a:rPr lang="en-US" smtClean="0"/>
               <a:pPr/>
-              <a:t>2/15/2015</a:t>
+              <a:t>2/18/2015</a:t>
             </a:fld>
             <a:endParaRPr lang="en-US"/>
           </a:p>
@@ -4332,7 +4441,7 @@
             <a:fld id="{1D8BD707-D9CF-40AE-B4C6-C98DA3205C09}" type="datetimeFigureOut">
               <a:rPr lang="en-US" smtClean="0"/>
               <a:pPr/>
-              <a:t>2/15/2015</a:t>
+              <a:t>2/18/2015</a:t>
             </a:fld>
             <a:endParaRPr lang="en-US"/>
           </a:p>
@@ -5442,7 +5551,7 @@
             <a:fld id="{1D8BD707-D9CF-40AE-B4C6-C98DA3205C09}" type="datetimeFigureOut">
               <a:rPr lang="en-US" smtClean="0"/>
               <a:pPr/>
-              <a:t>2/15/2015</a:t>
+              <a:t>2/18/2015</a:t>
             </a:fld>
             <a:endParaRPr lang="en-US"/>
           </a:p>
@@ -7036,7 +7145,7 @@
           <a:p>
             <a:fld id="{7D698992-9F5B-4E9D-871D-4517B2EC8643}" type="datetimeFigureOut">
               <a:rPr lang="en-US" smtClean="0"/>
-              <a:t>2/15/2015</a:t>
+              <a:t>2/18/2015</a:t>
             </a:fld>
             <a:endParaRPr lang="en-US"/>
           </a:p>
@@ -8095,7 +8204,7 @@
             <a:fld id="{1D8BD707-D9CF-40AE-B4C6-C98DA3205C09}" type="datetimeFigureOut">
               <a:rPr lang="en-US" smtClean="0"/>
               <a:pPr/>
-              <a:t>2/15/2015</a:t>
+              <a:t>2/18/2015</a:t>
             </a:fld>
             <a:endParaRPr lang="en-US"/>
           </a:p>
@@ -9424,7 +9533,7 @@
             <a:fld id="{1D8BD707-D9CF-40AE-B4C6-C98DA3205C09}" type="datetimeFigureOut">
               <a:rPr lang="en-US" smtClean="0"/>
               <a:pPr/>
-              <a:t>2/15/2015</a:t>
+              <a:t>2/18/2015</a:t>
             </a:fld>
             <a:endParaRPr lang="en-US"/>
           </a:p>
@@ -10563,7 +10672,7 @@
             <a:fld id="{1D8BD707-D9CF-40AE-B4C6-C98DA3205C09}" type="datetimeFigureOut">
               <a:rPr lang="en-US" smtClean="0"/>
               <a:pPr/>
-              <a:t>2/15/2015</a:t>
+              <a:t>2/18/2015</a:t>
             </a:fld>
             <a:endParaRPr lang="en-US"/>
           </a:p>
@@ -11621,7 +11730,7 @@
             <a:fld id="{1D8BD707-D9CF-40AE-B4C6-C98DA3205C09}" type="datetimeFigureOut">
               <a:rPr lang="en-US" smtClean="0"/>
               <a:pPr/>
-              <a:t>2/15/2015</a:t>
+              <a:t>2/18/2015</a:t>
             </a:fld>
             <a:endParaRPr lang="en-US"/>
           </a:p>
@@ -12661,7 +12770,7 @@
             <a:fld id="{1D8BD707-D9CF-40AE-B4C6-C98DA3205C09}" type="datetimeFigureOut">
               <a:rPr lang="en-US" smtClean="0"/>
               <a:pPr/>
-              <a:t>2/15/2015</a:t>
+              <a:t>2/18/2015</a:t>
             </a:fld>
             <a:endParaRPr lang="en-US"/>
           </a:p>
@@ -13898,7 +14007,7 @@
             <a:fld id="{1D8BD707-D9CF-40AE-B4C6-C98DA3205C09}" type="datetimeFigureOut">
               <a:rPr lang="en-US" smtClean="0"/>
               <a:pPr/>
-              <a:t>2/15/2015</a:t>
+              <a:t>2/18/2015</a:t>
             </a:fld>
             <a:endParaRPr lang="en-US"/>
           </a:p>
@@ -14253,7 +14362,7 @@
             <a:fld id="{1D8BD707-D9CF-40AE-B4C6-C98DA3205C09}" type="datetimeFigureOut">
               <a:rPr lang="en-US" smtClean="0"/>
               <a:pPr/>
-              <a:t>2/15/2015</a:t>
+              <a:t>2/18/2015</a:t>
             </a:fld>
             <a:endParaRPr lang="en-US"/>
           </a:p>
@@ -14838,6 +14947,86 @@
 </p:sld>
 </file>
 
+<file path=ppt/slides/slide10.xml><?xml version="1.0" encoding="utf-8"?>
+<p:sld xmlns:a="http://schemas.openxmlformats.org/drawingml/2006/main" xmlns:r="http://schemas.openxmlformats.org/officeDocument/2006/relationships" xmlns:p="http://schemas.openxmlformats.org/presentationml/2006/main">
+  <p:cSld>
+    <p:spTree>
+      <p:nvGrpSpPr>
+        <p:cNvPr id="1" name=""/>
+        <p:cNvGrpSpPr/>
+        <p:nvPr/>
+      </p:nvGrpSpPr>
+      <p:grpSpPr>
+        <a:xfrm>
+          <a:off x="0" y="0"/>
+          <a:ext cx="0" cy="0"/>
+          <a:chOff x="0" y="0"/>
+          <a:chExt cx="0" cy="0"/>
+        </a:xfrm>
+      </p:grpSpPr>
+      <p:sp>
+        <p:nvSpPr>
+          <p:cNvPr id="2" name="Title 1"/>
+          <p:cNvSpPr>
+            <a:spLocks noGrp="1"/>
+          </p:cNvSpPr>
+          <p:nvPr>
+            <p:ph type="title"/>
+          </p:nvPr>
+        </p:nvSpPr>
+        <p:spPr/>
+        <p:txBody>
+          <a:bodyPr/>
+          <a:lstStyle/>
+          <a:p>
+            <a:r>
+              <a:rPr lang="en-US" dirty="0" smtClean="0"/>
+              <a:t>Potential Future Work</a:t>
+            </a:r>
+            <a:endParaRPr lang="en-US" dirty="0"/>
+          </a:p>
+        </p:txBody>
+      </p:sp>
+      <p:sp>
+        <p:nvSpPr>
+          <p:cNvPr id="3" name="Content Placeholder 2"/>
+          <p:cNvSpPr>
+            <a:spLocks noGrp="1"/>
+          </p:cNvSpPr>
+          <p:nvPr>
+            <p:ph idx="1"/>
+          </p:nvPr>
+        </p:nvSpPr>
+        <p:spPr/>
+        <p:txBody>
+          <a:bodyPr/>
+          <a:lstStyle/>
+          <a:p>
+            <a:r>
+              <a:rPr lang="en-US" dirty="0" smtClean="0"/>
+              <a:t>Navigation Apps – Allow app to collect accurate location data, but prevent it from transmitting </a:t>
+            </a:r>
+            <a:r>
+              <a:rPr lang="en-US" smtClean="0"/>
+              <a:t>the data??</a:t>
+            </a:r>
+            <a:endParaRPr lang="en-US" dirty="0"/>
+          </a:p>
+        </p:txBody>
+      </p:sp>
+    </p:spTree>
+    <p:extLst>
+      <p:ext uri="{BB962C8B-B14F-4D97-AF65-F5344CB8AC3E}">
+        <p14:creationId xmlns:p14="http://schemas.microsoft.com/office/powerpoint/2010/main" val="3270781441"/>
+      </p:ext>
+    </p:extLst>
+  </p:cSld>
+  <p:clrMapOvr>
+    <a:masterClrMapping/>
+  </p:clrMapOvr>
+</p:sld>
+</file>
+
 <file path=ppt/slides/slide2.xml><?xml version="1.0" encoding="utf-8"?>
 <p:sld xmlns:a="http://schemas.openxmlformats.org/drawingml/2006/main" xmlns:r="http://schemas.openxmlformats.org/officeDocument/2006/relationships" xmlns:p="http://schemas.openxmlformats.org/presentationml/2006/main">
   <p:cSld>
@@ -15121,14 +15310,23 @@
             <p:ph type="title"/>
           </p:nvPr>
         </p:nvSpPr>
-        <p:spPr/>
+        <p:spPr>
+          <a:xfrm>
+            <a:off x="685800" y="152400"/>
+            <a:ext cx="7772400" cy="1143000"/>
+          </a:xfrm>
+        </p:spPr>
         <p:txBody>
           <a:bodyPr/>
           <a:lstStyle/>
           <a:p>
             <a:r>
               <a:rPr lang="en-US" dirty="0" smtClean="0"/>
-              <a:t>Proposed Approach</a:t>
+              <a:t>Proposed </a:t>
+            </a:r>
+            <a:r>
+              <a:rPr lang="en-US" dirty="0" smtClean="0"/>
+              <a:t>Approach (1 of 2)</a:t>
             </a:r>
             <a:endParaRPr lang="en-US" dirty="0"/>
           </a:p>
@@ -15250,6 +15448,42 @@
       </p:grpSpPr>
       <p:sp>
         <p:nvSpPr>
+          <p:cNvPr id="8" name="Rectangle 7"/>
+          <p:cNvSpPr/>
+          <p:nvPr/>
+        </p:nvSpPr>
+        <p:spPr>
+          <a:xfrm>
+            <a:off x="685800" y="1110735"/>
+            <a:ext cx="7086600" cy="400110"/>
+          </a:xfrm>
+          <a:prstGeom prst="rect">
+            <a:avLst/>
+          </a:prstGeom>
+        </p:spPr>
+        <p:txBody>
+          <a:bodyPr wrap="square">
+            <a:spAutoFit/>
+          </a:bodyPr>
+          <a:lstStyle/>
+          <a:p>
+            <a:pPr marL="68580" indent="0">
+              <a:buNone/>
+            </a:pPr>
+            <a:r>
+              <a:rPr lang="en-US" sz="2000" dirty="0"/>
+              <a:t>Design Principles:  A Location Privacy Protection Tool </a:t>
+            </a:r>
+            <a:r>
+              <a:rPr lang="en-US" sz="2000" dirty="0" smtClean="0"/>
+              <a:t>should…</a:t>
+            </a:r>
+            <a:endParaRPr lang="en-US" sz="2000" dirty="0"/>
+          </a:p>
+        </p:txBody>
+      </p:sp>
+      <p:sp>
+        <p:nvSpPr>
           <p:cNvPr id="2" name="Title 1"/>
           <p:cNvSpPr>
             <a:spLocks noGrp="1"/>
@@ -15258,14 +15492,25 @@
             <p:ph type="title"/>
           </p:nvPr>
         </p:nvSpPr>
-        <p:spPr/>
+        <p:spPr>
+          <a:xfrm>
+            <a:off x="685800" y="394773"/>
+            <a:ext cx="7772400" cy="715962"/>
+          </a:xfrm>
+        </p:spPr>
         <p:txBody>
-          <a:bodyPr/>
+          <a:bodyPr>
+            <a:normAutofit/>
+          </a:bodyPr>
           <a:lstStyle/>
           <a:p>
             <a:r>
               <a:rPr lang="en-US" dirty="0" smtClean="0"/>
-              <a:t>Advantages over Prior Art</a:t>
+              <a:t>Proposed </a:t>
+            </a:r>
+            <a:r>
+              <a:rPr lang="en-US" dirty="0" smtClean="0"/>
+              <a:t>Approach (2 of 2)</a:t>
             </a:r>
             <a:endParaRPr lang="en-US" dirty="0"/>
           </a:p>
@@ -15273,7 +15518,7 @@
       </p:sp>
       <p:sp>
         <p:nvSpPr>
-          <p:cNvPr id="3" name="Content Placeholder 2"/>
+          <p:cNvPr id="9" name="Content Placeholder 8"/>
           <p:cNvSpPr>
             <a:spLocks noGrp="1"/>
           </p:cNvSpPr>
@@ -15281,26 +15526,66 @@
             <p:ph idx="1"/>
           </p:nvPr>
         </p:nvSpPr>
-        <p:spPr/>
+        <p:spPr>
+          <a:xfrm>
+            <a:off x="685800" y="1600200"/>
+            <a:ext cx="7772400" cy="4038600"/>
+          </a:xfrm>
+        </p:spPr>
         <p:txBody>
-          <a:bodyPr/>
+          <a:bodyPr>
+            <a:normAutofit/>
+          </a:bodyPr>
           <a:lstStyle/>
           <a:p>
             <a:r>
               <a:rPr lang="en-US" dirty="0" smtClean="0"/>
-              <a:t>Protection of all 3 threat types (tracking, identification, profiling)</a:t>
+              <a:t>Allow access to user location only when the user expects location to be used</a:t>
             </a:r>
           </a:p>
           <a:p>
             <a:r>
               <a:rPr lang="en-US" dirty="0" smtClean="0"/>
-              <a:t>Minimal interference with functionality</a:t>
+              <a:t>Allow access to user location no more granularity than is required for the location-based functionality</a:t>
             </a:r>
           </a:p>
           <a:p>
-            <a:endParaRPr lang="en-US" dirty="0" smtClean="0"/>
-          </a:p>
-          <a:p>
+            <a:r>
+              <a:rPr lang="en-US" dirty="0" smtClean="0"/>
+              <a:t>Prevent an anonymous app from identifying the user based on frequently visited locations</a:t>
+            </a:r>
+          </a:p>
+          <a:p>
+            <a:r>
+              <a:rPr lang="en-US" dirty="0" smtClean="0"/>
+              <a:t>Prevent an app from profiling the user with collected location data</a:t>
+            </a:r>
+          </a:p>
+          <a:p>
+            <a:r>
+              <a:rPr lang="en-US" dirty="0" smtClean="0"/>
+              <a:t>Prevent an app tracking the user continuously even when tracking is required for the functionality</a:t>
+            </a:r>
+          </a:p>
+          <a:p>
+            <a:r>
+              <a:rPr lang="en-US" dirty="0" smtClean="0"/>
+              <a:t>Fit well into the existing mobile ecosystem</a:t>
+            </a:r>
+          </a:p>
+          <a:p>
+            <a:r>
+              <a:rPr lang="en-US" dirty="0" smtClean="0"/>
+              <a:t>Function with </a:t>
+            </a:r>
+            <a:r>
+              <a:rPr lang="en-US" dirty="0" err="1" smtClean="0"/>
+              <a:t>mimimal</a:t>
+            </a:r>
+            <a:r>
+              <a:rPr lang="en-US" dirty="0" smtClean="0"/>
+              <a:t> cost in usability and app functionality</a:t>
+            </a:r>
             <a:endParaRPr lang="en-US" dirty="0"/>
           </a:p>
         </p:txBody>
@@ -15308,7 +15593,7 @@
     </p:spTree>
     <p:extLst>
       <p:ext uri="{BB962C8B-B14F-4D97-AF65-F5344CB8AC3E}">
-        <p14:creationId xmlns:p14="http://schemas.microsoft.com/office/powerpoint/2010/main" val="1075420864"/>
+        <p14:creationId xmlns:p14="http://schemas.microsoft.com/office/powerpoint/2010/main" val="2403925547"/>
       </p:ext>
     </p:extLst>
   </p:cSld>
@@ -15352,7 +15637,7 @@
           <a:p>
             <a:r>
               <a:rPr lang="en-US" dirty="0" smtClean="0"/>
-              <a:t>Technical Details</a:t>
+              <a:t>Advantages over Prior Art</a:t>
             </a:r>
             <a:endParaRPr lang="en-US" dirty="0"/>
           </a:p>
@@ -15373,7 +15658,22 @@
           <a:bodyPr/>
           <a:lstStyle/>
           <a:p>
-            <a:endParaRPr lang="en-US"/>
+            <a:r>
+              <a:rPr lang="en-US" dirty="0" smtClean="0"/>
+              <a:t>Protection of all 3 threat types (tracking, identification, profiling)</a:t>
+            </a:r>
+          </a:p>
+          <a:p>
+            <a:r>
+              <a:rPr lang="en-US" dirty="0" smtClean="0"/>
+              <a:t>Minimal interference with functionality</a:t>
+            </a:r>
+          </a:p>
+          <a:p>
+            <a:endParaRPr lang="en-US" dirty="0" smtClean="0"/>
+          </a:p>
+          <a:p>
+            <a:endParaRPr lang="en-US" dirty="0"/>
           </a:p>
         </p:txBody>
       </p:sp>
@@ -15424,7 +15724,7 @@
           <a:p>
             <a:r>
               <a:rPr lang="en-US" dirty="0" smtClean="0"/>
-              <a:t>Experimental Results</a:t>
+              <a:t>Technical Details</a:t>
             </a:r>
             <a:endParaRPr lang="en-US" dirty="0"/>
           </a:p>
@@ -15445,11 +15745,7 @@
           <a:bodyPr/>
           <a:lstStyle/>
           <a:p>
-            <a:r>
-              <a:rPr lang="en-US" dirty="0" smtClean="0"/>
-              <a:t>Section 7.3 &amp; motivation section @ beginning</a:t>
-            </a:r>
-            <a:endParaRPr lang="en-US" dirty="0"/>
+            <a:endParaRPr lang="en-US"/>
           </a:p>
         </p:txBody>
       </p:sp>
@@ -15500,7 +15796,7 @@
           <a:p>
             <a:r>
               <a:rPr lang="en-US" dirty="0" smtClean="0"/>
-              <a:t>Technical Weaknesses of Paper</a:t>
+              <a:t>Experimental Results</a:t>
             </a:r>
             <a:endParaRPr lang="en-US" dirty="0"/>
           </a:p>
@@ -15523,7 +15819,7 @@
           <a:p>
             <a:r>
               <a:rPr lang="en-US" dirty="0" smtClean="0"/>
-              <a:t>Navigation Apps</a:t>
+              <a:t>Section 7.3 &amp; motivation section @ beginning</a:t>
             </a:r>
             <a:endParaRPr lang="en-US" dirty="0"/>
           </a:p>
@@ -15576,7 +15872,7 @@
           <a:p>
             <a:r>
               <a:rPr lang="en-US" dirty="0" smtClean="0"/>
-              <a:t>Potential Future Work</a:t>
+              <a:t>Technical Weaknesses of Paper</a:t>
             </a:r>
             <a:endParaRPr lang="en-US" dirty="0"/>
           </a:p>
@@ -15599,11 +15895,7 @@
           <a:p>
             <a:r>
               <a:rPr lang="en-US" dirty="0" smtClean="0"/>
-              <a:t>Navigation Apps – Allow app to collect accurate location data, but prevent it from transmitting </a:t>
-            </a:r>
-            <a:r>
-              <a:rPr lang="en-US" smtClean="0"/>
-              <a:t>the data??</a:t>
+              <a:t>Navigation Apps</a:t>
             </a:r>
             <a:endParaRPr lang="en-US" dirty="0"/>
           </a:p>
@@ -15612,7 +15904,7 @@
     </p:spTree>
     <p:extLst>
       <p:ext uri="{BB962C8B-B14F-4D97-AF65-F5344CB8AC3E}">
-        <p14:creationId xmlns:p14="http://schemas.microsoft.com/office/powerpoint/2010/main" val="3270781441"/>
+        <p14:creationId xmlns:p14="http://schemas.microsoft.com/office/powerpoint/2010/main" val="1075420864"/>
       </p:ext>
     </p:extLst>
   </p:cSld>

</xml_diff>

<commit_message>
added advantage over prior art
</commit_message>
<xml_diff>
--- a/PaperPresentation/Paper_Presentation_Fasburg_Reiff_Thomas.pptx
+++ b/PaperPresentation/Paper_Presentation_Fasburg_Reiff_Thomas.pptx
@@ -635,11 +635,7 @@
           <a:p>
             <a:r>
               <a:rPr lang="en-US" baseline="0" dirty="0" smtClean="0"/>
-              <a:t>Last 2 principles are practical concerns to ensure such a tool would be practical and likely to </a:t>
-            </a:r>
-            <a:r>
-              <a:rPr lang="en-US" baseline="0" smtClean="0"/>
-              <a:t>become widely used.</a:t>
+              <a:t>Last 2 principles are practical concerns to ensure such a tool would be practical and likely to become widely used.</a:t>
             </a:r>
             <a:endParaRPr lang="en-US" dirty="0"/>
           </a:p>
@@ -15576,15 +15572,7 @@
           <a:p>
             <a:r>
               <a:rPr lang="en-US" dirty="0" smtClean="0"/>
-              <a:t>Function with </a:t>
-            </a:r>
-            <a:r>
-              <a:rPr lang="en-US" dirty="0" err="1" smtClean="0"/>
-              <a:t>mimimal</a:t>
-            </a:r>
-            <a:r>
-              <a:rPr lang="en-US" dirty="0" smtClean="0"/>
-              <a:t> cost in usability and app functionality</a:t>
+              <a:t>Function with minimal cost in usability and app functionality</a:t>
             </a:r>
             <a:endParaRPr lang="en-US" dirty="0"/>
           </a:p>
@@ -15655,22 +15643,99 @@
         </p:nvSpPr>
         <p:spPr/>
         <p:txBody>
-          <a:bodyPr/>
+          <a:bodyPr>
+            <a:normAutofit/>
+          </a:bodyPr>
           <a:lstStyle/>
           <a:p>
             <a:r>
               <a:rPr lang="en-US" dirty="0" smtClean="0"/>
-              <a:t>Protection of all 3 threat types (tracking, identification, profiling)</a:t>
+              <a:t>Protection from all 3 types of threats, and most types of app </a:t>
             </a:r>
           </a:p>
           <a:p>
+            <a:r>
+              <a:rPr lang="en-US" dirty="0"/>
+              <a:t>Avoids various unrealistic assumptions 	</a:t>
+            </a:r>
+          </a:p>
+          <a:p>
+            <a:pPr lvl="1"/>
+            <a:r>
+              <a:rPr lang="en-US" dirty="0"/>
+              <a:t>Require trusted </a:t>
+            </a:r>
             <a:r>
               <a:rPr lang="en-US" dirty="0" smtClean="0"/>
-              <a:t>Minimal interference with functionality</a:t>
+              <a:t>infrastructure</a:t>
             </a:r>
           </a:p>
           <a:p>
+            <a:pPr lvl="1"/>
+            <a:r>
+              <a:rPr lang="en-US" dirty="0" smtClean="0"/>
+              <a:t>Requires apps to conform to specific location API</a:t>
+            </a:r>
+            <a:endParaRPr lang="en-US" dirty="0"/>
+          </a:p>
+          <a:p>
+            <a:pPr lvl="1"/>
+            <a:r>
+              <a:rPr lang="en-US" dirty="0"/>
+              <a:t>Require other users at the same time and in the same place as </a:t>
+            </a:r>
+            <a:r>
+              <a:rPr lang="en-US" dirty="0" smtClean="0"/>
+              <a:t>user</a:t>
+            </a:r>
             <a:endParaRPr lang="en-US" dirty="0" smtClean="0"/>
+          </a:p>
+          <a:p>
+            <a:r>
+              <a:rPr lang="en-US" dirty="0" smtClean="0"/>
+              <a:t>Minimal </a:t>
+            </a:r>
+            <a:r>
+              <a:rPr lang="en-US" dirty="0"/>
+              <a:t>interference with </a:t>
+            </a:r>
+            <a:r>
+              <a:rPr lang="en-US" dirty="0" smtClean="0"/>
+              <a:t>functionality</a:t>
+            </a:r>
+          </a:p>
+          <a:p>
+            <a:pPr lvl="1"/>
+            <a:r>
+              <a:rPr lang="en-US" dirty="0" smtClean="0"/>
+              <a:t>Allows most apps to provide full or only slightly reduced functionality</a:t>
+            </a:r>
+          </a:p>
+          <a:p>
+            <a:pPr lvl="1"/>
+            <a:r>
+              <a:rPr lang="en-US" dirty="0" smtClean="0"/>
+              <a:t>Applies different privacy rules to different apps</a:t>
+            </a:r>
+          </a:p>
+          <a:p>
+            <a:pPr lvl="1"/>
+            <a:r>
+              <a:rPr lang="en-US" dirty="0" smtClean="0"/>
+              <a:t>Balances need for functionality and privacy</a:t>
+            </a:r>
+          </a:p>
+          <a:p>
+            <a:pPr lvl="1"/>
+            <a:r>
+              <a:rPr lang="en-US" dirty="0" smtClean="0"/>
+              <a:t>Less than 10% </a:t>
+            </a:r>
+            <a:r>
+              <a:rPr lang="en-US" smtClean="0"/>
+              <a:t>energy overhead</a:t>
+            </a:r>
+            <a:endParaRPr lang="en-US" dirty="0"/>
           </a:p>
           <a:p>
             <a:endParaRPr lang="en-US" dirty="0"/>

</xml_diff>

<commit_message>
add some to my slides
</commit_message>
<xml_diff>
--- a/PaperPresentation/Paper_Presentation_Fasburg_Reiff_Thomas.pptx
+++ b/PaperPresentation/Paper_Presentation_Fasburg_Reiff_Thomas.pptx
@@ -201,7 +201,7 @@
           <a:p>
             <a:fld id="{A63B8CFC-D614-4432-A7DB-A65856E85B43}" type="datetimeFigureOut">
               <a:rPr lang="en-US" smtClean="0"/>
-              <a:t>2/18/2015</a:t>
+              <a:t>2/19/2015</a:t>
             </a:fld>
             <a:endParaRPr lang="en-US"/>
           </a:p>
@@ -668,6 +668,124 @@
     <p:extLst>
       <p:ext uri="{BB962C8B-B14F-4D97-AF65-F5344CB8AC3E}">
         <p14:creationId xmlns:p14="http://schemas.microsoft.com/office/powerpoint/2010/main" val="2053636732"/>
+      </p:ext>
+    </p:extLst>
+  </p:cSld>
+  <p:clrMapOvr>
+    <a:masterClrMapping/>
+  </p:clrMapOvr>
+</p:notes>
+</file>
+
+<file path=ppt/notesSlides/notesSlide3.xml><?xml version="1.0" encoding="utf-8"?>
+<p:notes xmlns:a="http://schemas.openxmlformats.org/drawingml/2006/main" xmlns:r="http://schemas.openxmlformats.org/officeDocument/2006/relationships" xmlns:p="http://schemas.openxmlformats.org/presentationml/2006/main">
+  <p:cSld>
+    <p:spTree>
+      <p:nvGrpSpPr>
+        <p:cNvPr id="1" name=""/>
+        <p:cNvGrpSpPr/>
+        <p:nvPr/>
+      </p:nvGrpSpPr>
+      <p:grpSpPr>
+        <a:xfrm>
+          <a:off x="0" y="0"/>
+          <a:ext cx="0" cy="0"/>
+          <a:chOff x="0" y="0"/>
+          <a:chExt cx="0" cy="0"/>
+        </a:xfrm>
+      </p:grpSpPr>
+      <p:sp>
+        <p:nvSpPr>
+          <p:cNvPr id="2" name="Slide Image Placeholder 1"/>
+          <p:cNvSpPr>
+            <a:spLocks noGrp="1" noRot="1" noChangeAspect="1"/>
+          </p:cNvSpPr>
+          <p:nvPr>
+            <p:ph type="sldImg"/>
+          </p:nvPr>
+        </p:nvSpPr>
+        <p:spPr/>
+      </p:sp>
+      <p:sp>
+        <p:nvSpPr>
+          <p:cNvPr id="3" name="Notes Placeholder 2"/>
+          <p:cNvSpPr>
+            <a:spLocks noGrp="1"/>
+          </p:cNvSpPr>
+          <p:nvPr>
+            <p:ph type="body" idx="1"/>
+          </p:nvPr>
+        </p:nvSpPr>
+        <p:spPr/>
+        <p:txBody>
+          <a:bodyPr/>
+          <a:lstStyle/>
+          <a:p>
+            <a:r>
+              <a:rPr lang="en-US" dirty="0" smtClean="0"/>
+              <a:t>Synthetic routes: (S Health</a:t>
+            </a:r>
+            <a:r>
+              <a:rPr lang="en-US" baseline="0" dirty="0" smtClean="0"/>
+              <a:t> as an example</a:t>
+            </a:r>
+            <a:r>
+              <a:rPr lang="en-US" dirty="0" smtClean="0"/>
+              <a:t>)</a:t>
+            </a:r>
+          </a:p>
+          <a:p>
+            <a:r>
+              <a:rPr lang="en-US" dirty="0" err="1" smtClean="0"/>
+              <a:t>Nav</a:t>
+            </a:r>
+            <a:r>
+              <a:rPr lang="en-US" dirty="0" smtClean="0"/>
+              <a:t> Apps: Offline navigation is a possibility (load map before leaving).</a:t>
+            </a:r>
+            <a:r>
+              <a:rPr lang="en-US" baseline="0" dirty="0" smtClean="0"/>
+              <a:t> H</a:t>
+            </a:r>
+            <a:r>
+              <a:rPr lang="en-US" dirty="0" smtClean="0"/>
+              <a:t>owever, this does not allow for real-time traffic</a:t>
+            </a:r>
+            <a:r>
+              <a:rPr lang="en-US" baseline="0" dirty="0" smtClean="0"/>
+              <a:t> updates.</a:t>
+            </a:r>
+            <a:endParaRPr lang="en-US" dirty="0"/>
+          </a:p>
+        </p:txBody>
+      </p:sp>
+      <p:sp>
+        <p:nvSpPr>
+          <p:cNvPr id="4" name="Slide Number Placeholder 3"/>
+          <p:cNvSpPr>
+            <a:spLocks noGrp="1"/>
+          </p:cNvSpPr>
+          <p:nvPr>
+            <p:ph type="sldNum" sz="quarter" idx="10"/>
+          </p:nvPr>
+        </p:nvSpPr>
+        <p:spPr/>
+        <p:txBody>
+          <a:bodyPr/>
+          <a:lstStyle/>
+          <a:p>
+            <a:fld id="{B8B3BC3C-0900-4ACD-9030-5BE6C2442A68}" type="slidenum">
+              <a:rPr lang="en-US" smtClean="0"/>
+              <a:t>9</a:t>
+            </a:fld>
+            <a:endParaRPr lang="en-US"/>
+          </a:p>
+        </p:txBody>
+      </p:sp>
+    </p:spTree>
+    <p:extLst>
+      <p:ext uri="{BB962C8B-B14F-4D97-AF65-F5344CB8AC3E}">
+        <p14:creationId xmlns:p14="http://schemas.microsoft.com/office/powerpoint/2010/main" val="961247870"/>
       </p:ext>
     </p:extLst>
   </p:cSld>
@@ -2215,7 +2333,7 @@
           <a:p>
             <a:fld id="{ADE5661A-BDAA-4579-B2F5-AA9011776D83}" type="datetimeFigureOut">
               <a:rPr lang="en-US" smtClean="0"/>
-              <a:t>2/18/2015</a:t>
+              <a:t>2/19/2015</a:t>
             </a:fld>
             <a:endParaRPr lang="en-US"/>
           </a:p>
@@ -3322,7 +3440,7 @@
             <a:fld id="{1D8BD707-D9CF-40AE-B4C6-C98DA3205C09}" type="datetimeFigureOut">
               <a:rPr lang="en-US" smtClean="0"/>
               <a:pPr/>
-              <a:t>2/18/2015</a:t>
+              <a:t>2/19/2015</a:t>
             </a:fld>
             <a:endParaRPr lang="en-US"/>
           </a:p>
@@ -4437,7 +4555,7 @@
             <a:fld id="{1D8BD707-D9CF-40AE-B4C6-C98DA3205C09}" type="datetimeFigureOut">
               <a:rPr lang="en-US" smtClean="0"/>
               <a:pPr/>
-              <a:t>2/18/2015</a:t>
+              <a:t>2/19/2015</a:t>
             </a:fld>
             <a:endParaRPr lang="en-US"/>
           </a:p>
@@ -5547,7 +5665,7 @@
             <a:fld id="{1D8BD707-D9CF-40AE-B4C6-C98DA3205C09}" type="datetimeFigureOut">
               <a:rPr lang="en-US" smtClean="0"/>
               <a:pPr/>
-              <a:t>2/18/2015</a:t>
+              <a:t>2/19/2015</a:t>
             </a:fld>
             <a:endParaRPr lang="en-US"/>
           </a:p>
@@ -7141,7 +7259,7 @@
           <a:p>
             <a:fld id="{7D698992-9F5B-4E9D-871D-4517B2EC8643}" type="datetimeFigureOut">
               <a:rPr lang="en-US" smtClean="0"/>
-              <a:t>2/18/2015</a:t>
+              <a:t>2/19/2015</a:t>
             </a:fld>
             <a:endParaRPr lang="en-US"/>
           </a:p>
@@ -8200,7 +8318,7 @@
             <a:fld id="{1D8BD707-D9CF-40AE-B4C6-C98DA3205C09}" type="datetimeFigureOut">
               <a:rPr lang="en-US" smtClean="0"/>
               <a:pPr/>
-              <a:t>2/18/2015</a:t>
+              <a:t>2/19/2015</a:t>
             </a:fld>
             <a:endParaRPr lang="en-US"/>
           </a:p>
@@ -9529,7 +9647,7 @@
             <a:fld id="{1D8BD707-D9CF-40AE-B4C6-C98DA3205C09}" type="datetimeFigureOut">
               <a:rPr lang="en-US" smtClean="0"/>
               <a:pPr/>
-              <a:t>2/18/2015</a:t>
+              <a:t>2/19/2015</a:t>
             </a:fld>
             <a:endParaRPr lang="en-US"/>
           </a:p>
@@ -10668,7 +10786,7 @@
             <a:fld id="{1D8BD707-D9CF-40AE-B4C6-C98DA3205C09}" type="datetimeFigureOut">
               <a:rPr lang="en-US" smtClean="0"/>
               <a:pPr/>
-              <a:t>2/18/2015</a:t>
+              <a:t>2/19/2015</a:t>
             </a:fld>
             <a:endParaRPr lang="en-US"/>
           </a:p>
@@ -11726,7 +11844,7 @@
             <a:fld id="{1D8BD707-D9CF-40AE-B4C6-C98DA3205C09}" type="datetimeFigureOut">
               <a:rPr lang="en-US" smtClean="0"/>
               <a:pPr/>
-              <a:t>2/18/2015</a:t>
+              <a:t>2/19/2015</a:t>
             </a:fld>
             <a:endParaRPr lang="en-US"/>
           </a:p>
@@ -12766,7 +12884,7 @@
             <a:fld id="{1D8BD707-D9CF-40AE-B4C6-C98DA3205C09}" type="datetimeFigureOut">
               <a:rPr lang="en-US" smtClean="0"/>
               <a:pPr/>
-              <a:t>2/18/2015</a:t>
+              <a:t>2/19/2015</a:t>
             </a:fld>
             <a:endParaRPr lang="en-US"/>
           </a:p>
@@ -14003,7 +14121,7 @@
             <a:fld id="{1D8BD707-D9CF-40AE-B4C6-C98DA3205C09}" type="datetimeFigureOut">
               <a:rPr lang="en-US" smtClean="0"/>
               <a:pPr/>
-              <a:t>2/18/2015</a:t>
+              <a:t>2/19/2015</a:t>
             </a:fld>
             <a:endParaRPr lang="en-US"/>
           </a:p>
@@ -14358,7 +14476,7 @@
             <a:fld id="{1D8BD707-D9CF-40AE-B4C6-C98DA3205C09}" type="datetimeFigureOut">
               <a:rPr lang="en-US" smtClean="0"/>
               <a:pPr/>
-              <a:t>2/18/2015</a:t>
+              <a:t>2/19/2015</a:t>
             </a:fld>
             <a:endParaRPr lang="en-US"/>
           </a:p>
@@ -15000,11 +15118,42 @@
           <a:p>
             <a:r>
               <a:rPr lang="en-US" dirty="0" smtClean="0"/>
-              <a:t>Navigation Apps – Allow app to collect accurate location data, but prevent it from transmitting </a:t>
+              <a:t>Deploy LP-Guardian to more diverse participants with limited technical background for 6 months</a:t>
+            </a:r>
+          </a:p>
+          <a:p>
+            <a:pPr lvl="1"/>
+            <a:r>
+              <a:rPr lang="en-US" dirty="0" smtClean="0"/>
+              <a:t>Analyze privacy to usability tradeoffs</a:t>
+            </a:r>
+          </a:p>
+          <a:p>
+            <a:r>
+              <a:rPr lang="en-US" dirty="0" smtClean="0"/>
+              <a:t>Make a similar app for </a:t>
             </a:r>
             <a:r>
-              <a:rPr lang="en-US" smtClean="0"/>
-              <a:t>the data??</a:t>
+              <a:rPr lang="en-US" dirty="0" err="1" smtClean="0"/>
+              <a:t>ios</a:t>
+            </a:r>
+            <a:r>
+              <a:rPr lang="en-US" dirty="0" smtClean="0"/>
+              <a:t> devices</a:t>
+            </a:r>
+          </a:p>
+          <a:p>
+            <a:r>
+              <a:rPr lang="en-US" dirty="0" smtClean="0"/>
+              <a:t>Navigation </a:t>
+            </a:r>
+            <a:r>
+              <a:rPr lang="en-US" dirty="0" smtClean="0"/>
+              <a:t>Apps – Allow app to collect accurate location data, but prevent it from transmitting the </a:t>
+            </a:r>
+            <a:r>
+              <a:rPr lang="en-US" dirty="0" smtClean="0"/>
+              <a:t>data</a:t>
             </a:r>
             <a:endParaRPr lang="en-US" dirty="0"/>
           </a:p>
@@ -15318,11 +15467,7 @@
           <a:p>
             <a:r>
               <a:rPr lang="en-US" dirty="0" smtClean="0"/>
-              <a:t>Proposed </a:t>
-            </a:r>
-            <a:r>
-              <a:rPr lang="en-US" dirty="0" smtClean="0"/>
-              <a:t>Approach (1 of 2)</a:t>
+              <a:t>Proposed Approach (1 of 2)</a:t>
             </a:r>
             <a:endParaRPr lang="en-US" dirty="0"/>
           </a:p>
@@ -15502,11 +15647,7 @@
           <a:p>
             <a:r>
               <a:rPr lang="en-US" dirty="0" smtClean="0"/>
-              <a:t>Proposed </a:t>
-            </a:r>
-            <a:r>
-              <a:rPr lang="en-US" dirty="0" smtClean="0"/>
-              <a:t>Approach (2 of 2)</a:t>
+              <a:t>Proposed Approach (2 of 2)</a:t>
             </a:r>
             <a:endParaRPr lang="en-US" dirty="0"/>
           </a:p>
@@ -15688,7 +15829,6 @@
               <a:rPr lang="en-US" dirty="0" smtClean="0"/>
               <a:t>user</a:t>
             </a:r>
-            <a:endParaRPr lang="en-US" dirty="0" smtClean="0"/>
           </a:p>
           <a:p>
             <a:r>
@@ -15959,8 +16099,39 @@
           <a:lstStyle/>
           <a:p>
             <a:r>
+              <a:rPr lang="en-US" dirty="0"/>
+              <a:t>S</a:t>
+            </a:r>
+            <a:r>
               <a:rPr lang="en-US" dirty="0" smtClean="0"/>
-              <a:t>Navigation Apps</a:t>
+              <a:t>ynthetic routes, used for fitness related apps, could potentially create an unrealistic path such as through buildings, water, steep elevation changes, etc.</a:t>
+            </a:r>
+          </a:p>
+          <a:p>
+            <a:r>
+              <a:rPr lang="en-US" dirty="0" smtClean="0"/>
+              <a:t>Some apps also track elevation changes which would not be accurate with synthetic routes</a:t>
+            </a:r>
+            <a:endParaRPr lang="en-US" dirty="0" smtClean="0"/>
+          </a:p>
+          <a:p>
+            <a:r>
+              <a:rPr lang="en-US" dirty="0" smtClean="0"/>
+              <a:t>Navigational apps are not handled by the current version of LP-Guardian.</a:t>
+            </a:r>
+          </a:p>
+          <a:p>
+            <a:r>
+              <a:rPr lang="en-US" dirty="0" smtClean="0"/>
+              <a:t>City-Level Location would work for an app such as weather, but would be limited if used by a location specific search app where a user might be looking for the closest gas station, restaurant, store, </a:t>
+            </a:r>
+            <a:r>
+              <a:rPr lang="en-US" dirty="0" err="1" smtClean="0"/>
+              <a:t>etc</a:t>
+            </a:r>
+            <a:r>
+              <a:rPr lang="en-US" dirty="0" smtClean="0"/>
+              <a:t> to their location.</a:t>
             </a:r>
             <a:endParaRPr lang="en-US" dirty="0"/>
           </a:p>

</xml_diff>

<commit_message>
Added most of experimental results.
</commit_message>
<xml_diff>
--- a/PaperPresentation/Paper_Presentation_Fasburg_Reiff_Thomas.pptx
+++ b/PaperPresentation/Paper_Presentation_Fasburg_Reiff_Thomas.pptx
@@ -5,7 +5,7 @@
     <p:sldMasterId id="2147483749" r:id="rId1"/>
   </p:sldMasterIdLst>
   <p:notesMasterIdLst>
-    <p:notesMasterId r:id="rId12"/>
+    <p:notesMasterId r:id="rId18"/>
   </p:notesMasterIdLst>
   <p:sldIdLst>
     <p:sldId id="256" r:id="rId2"/>
@@ -16,8 +16,14 @@
     <p:sldId id="260" r:id="rId7"/>
     <p:sldId id="261" r:id="rId8"/>
     <p:sldId id="262" r:id="rId9"/>
-    <p:sldId id="263" r:id="rId10"/>
-    <p:sldId id="264" r:id="rId11"/>
+    <p:sldId id="269" r:id="rId10"/>
+    <p:sldId id="270" r:id="rId11"/>
+    <p:sldId id="271" r:id="rId12"/>
+    <p:sldId id="268" r:id="rId13"/>
+    <p:sldId id="266" r:id="rId14"/>
+    <p:sldId id="272" r:id="rId15"/>
+    <p:sldId id="263" r:id="rId16"/>
+    <p:sldId id="264" r:id="rId17"/>
   </p:sldIdLst>
   <p:sldSz cx="9144000" cy="6858000" type="screen4x3"/>
   <p:notesSz cx="6858000" cy="9144000"/>
@@ -117,6 +123,556 @@
     </a:lvl9pPr>
   </p:defaultTextStyle>
 </p:presentation>
+</file>
+
+<file path=ppt/charts/chart1.xml><?xml version="1.0" encoding="utf-8"?>
+<c:chartSpace xmlns:c="http://schemas.openxmlformats.org/drawingml/2006/chart" xmlns:a="http://schemas.openxmlformats.org/drawingml/2006/main" xmlns:r="http://schemas.openxmlformats.org/officeDocument/2006/relationships">
+  <c:date1904 val="0"/>
+  <c:lang val="en-US"/>
+  <c:roundedCorners val="0"/>
+  <mc:AlternateContent xmlns:mc="http://schemas.openxmlformats.org/markup-compatibility/2006">
+    <mc:Choice xmlns:c14="http://schemas.microsoft.com/office/drawing/2007/8/2/chart" Requires="c14">
+      <c14:style val="102"/>
+    </mc:Choice>
+    <mc:Fallback>
+      <c:style val="2"/>
+    </mc:Fallback>
+  </mc:AlternateContent>
+  <c:chart>
+    <c:autoTitleDeleted val="1"/>
+    <c:plotArea>
+      <c:layout/>
+      <c:pieChart>
+        <c:varyColors val="1"/>
+        <c:ser>
+          <c:idx val="0"/>
+          <c:order val="0"/>
+          <c:tx>
+            <c:strRef>
+              <c:f>Sheet1!$B$1</c:f>
+              <c:strCache>
+                <c:ptCount val="1"/>
+                <c:pt idx="0">
+                  <c:v>Sales</c:v>
+                </c:pt>
+              </c:strCache>
+            </c:strRef>
+          </c:tx>
+          <c:cat>
+            <c:strRef>
+              <c:f>Sheet1!$A$2:$A$3</c:f>
+              <c:strCache>
+                <c:ptCount val="2"/>
+                <c:pt idx="0">
+                  <c:v>Comfortable with inaccurate results at or near work/home - 57%</c:v>
+                </c:pt>
+                <c:pt idx="1">
+                  <c:v>2nd Qtr</c:v>
+                </c:pt>
+              </c:strCache>
+            </c:strRef>
+          </c:cat>
+          <c:val>
+            <c:numRef>
+              <c:f>Sheet1!$B$2:$B$3</c:f>
+              <c:numCache>
+                <c:formatCode>General</c:formatCode>
+                <c:ptCount val="2"/>
+                <c:pt idx="0">
+                  <c:v>57</c:v>
+                </c:pt>
+                <c:pt idx="1">
+                  <c:v>43</c:v>
+                </c:pt>
+              </c:numCache>
+            </c:numRef>
+          </c:val>
+        </c:ser>
+        <c:dLbls>
+          <c:showLegendKey val="0"/>
+          <c:showVal val="0"/>
+          <c:showCatName val="0"/>
+          <c:showSerName val="0"/>
+          <c:showPercent val="0"/>
+          <c:showBubbleSize val="0"/>
+          <c:showLeaderLines val="1"/>
+        </c:dLbls>
+        <c:firstSliceAng val="0"/>
+      </c:pieChart>
+    </c:plotArea>
+    <c:legend>
+      <c:legendPos val="r"/>
+      <c:legendEntry>
+        <c:idx val="1"/>
+        <c:delete val="1"/>
+      </c:legendEntry>
+      <c:layout>
+        <c:manualLayout>
+          <c:xMode val="edge"/>
+          <c:yMode val="edge"/>
+          <c:x val="0.47510990813648296"/>
+          <c:y val="0.14248031496062993"/>
+          <c:w val="0.51239009186351714"/>
+          <c:h val="0.71503937007874019"/>
+        </c:manualLayout>
+      </c:layout>
+      <c:overlay val="0"/>
+    </c:legend>
+    <c:plotVisOnly val="1"/>
+    <c:dispBlanksAs val="gap"/>
+    <c:showDLblsOverMax val="0"/>
+  </c:chart>
+  <c:txPr>
+    <a:bodyPr/>
+    <a:lstStyle/>
+    <a:p>
+      <a:pPr>
+        <a:defRPr sz="1800"/>
+      </a:pPr>
+      <a:endParaRPr lang="en-US"/>
+    </a:p>
+  </c:txPr>
+  <c:externalData r:id="rId1">
+    <c:autoUpdate val="0"/>
+  </c:externalData>
+</c:chartSpace>
+</file>
+
+<file path=ppt/charts/chart2.xml><?xml version="1.0" encoding="utf-8"?>
+<c:chartSpace xmlns:c="http://schemas.openxmlformats.org/drawingml/2006/chart" xmlns:a="http://schemas.openxmlformats.org/drawingml/2006/main" xmlns:r="http://schemas.openxmlformats.org/officeDocument/2006/relationships">
+  <c:date1904 val="0"/>
+  <c:lang val="en-US"/>
+  <c:roundedCorners val="0"/>
+  <mc:AlternateContent xmlns:mc="http://schemas.openxmlformats.org/markup-compatibility/2006">
+    <mc:Choice xmlns:c14="http://schemas.microsoft.com/office/drawing/2007/8/2/chart" Requires="c14">
+      <c14:style val="102"/>
+    </mc:Choice>
+    <mc:Fallback>
+      <c:style val="2"/>
+    </mc:Fallback>
+  </mc:AlternateContent>
+  <c:chart>
+    <c:autoTitleDeleted val="1"/>
+    <c:plotArea>
+      <c:layout/>
+      <c:pieChart>
+        <c:varyColors val="1"/>
+        <c:ser>
+          <c:idx val="0"/>
+          <c:order val="0"/>
+          <c:tx>
+            <c:strRef>
+              <c:f>Sheet1!$B$1</c:f>
+              <c:strCache>
+                <c:ptCount val="1"/>
+                <c:pt idx="0">
+                  <c:v>Sales</c:v>
+                </c:pt>
+              </c:strCache>
+            </c:strRef>
+          </c:tx>
+          <c:cat>
+            <c:strRef>
+              <c:f>Sheet1!$A$2:$A$4</c:f>
+              <c:strCache>
+                <c:ptCount val="3"/>
+                <c:pt idx="0">
+                  <c:v>No - 62%</c:v>
+                </c:pt>
+                <c:pt idx="1">
+                  <c:v>Sometimes - 29%</c:v>
+                </c:pt>
+                <c:pt idx="2">
+                  <c:v>Yes - 9%</c:v>
+                </c:pt>
+              </c:strCache>
+            </c:strRef>
+          </c:cat>
+          <c:val>
+            <c:numRef>
+              <c:f>Sheet1!$B$2:$B$4</c:f>
+              <c:numCache>
+                <c:formatCode>General</c:formatCode>
+                <c:ptCount val="3"/>
+                <c:pt idx="0">
+                  <c:v>62</c:v>
+                </c:pt>
+                <c:pt idx="1">
+                  <c:v>29</c:v>
+                </c:pt>
+                <c:pt idx="2">
+                  <c:v>9</c:v>
+                </c:pt>
+              </c:numCache>
+            </c:numRef>
+          </c:val>
+        </c:ser>
+        <c:dLbls>
+          <c:showLegendKey val="0"/>
+          <c:showVal val="0"/>
+          <c:showCatName val="0"/>
+          <c:showSerName val="0"/>
+          <c:showPercent val="0"/>
+          <c:showBubbleSize val="0"/>
+          <c:showLeaderLines val="1"/>
+        </c:dLbls>
+        <c:firstSliceAng val="0"/>
+      </c:pieChart>
+    </c:plotArea>
+    <c:legend>
+      <c:legendPos val="r"/>
+      <c:layout/>
+      <c:overlay val="0"/>
+    </c:legend>
+    <c:plotVisOnly val="1"/>
+    <c:dispBlanksAs val="gap"/>
+    <c:showDLblsOverMax val="0"/>
+  </c:chart>
+  <c:txPr>
+    <a:bodyPr/>
+    <a:lstStyle/>
+    <a:p>
+      <a:pPr>
+        <a:defRPr sz="1800"/>
+      </a:pPr>
+      <a:endParaRPr lang="en-US"/>
+    </a:p>
+  </c:txPr>
+  <c:externalData r:id="rId1">
+    <c:autoUpdate val="0"/>
+  </c:externalData>
+</c:chartSpace>
+</file>
+
+<file path=ppt/charts/chart3.xml><?xml version="1.0" encoding="utf-8"?>
+<c:chartSpace xmlns:c="http://schemas.openxmlformats.org/drawingml/2006/chart" xmlns:a="http://schemas.openxmlformats.org/drawingml/2006/main" xmlns:r="http://schemas.openxmlformats.org/officeDocument/2006/relationships">
+  <c:date1904 val="0"/>
+  <c:lang val="en-US"/>
+  <c:roundedCorners val="0"/>
+  <mc:AlternateContent xmlns:mc="http://schemas.openxmlformats.org/markup-compatibility/2006">
+    <mc:Choice xmlns:c14="http://schemas.microsoft.com/office/drawing/2007/8/2/chart" Requires="c14">
+      <c14:style val="102"/>
+    </mc:Choice>
+    <mc:Fallback>
+      <c:style val="2"/>
+    </mc:Fallback>
+  </mc:AlternateContent>
+  <c:chart>
+    <c:autoTitleDeleted val="1"/>
+    <c:plotArea>
+      <c:layout/>
+      <c:pieChart>
+        <c:varyColors val="1"/>
+        <c:ser>
+          <c:idx val="0"/>
+          <c:order val="0"/>
+          <c:tx>
+            <c:strRef>
+              <c:f>Sheet1!$B$1</c:f>
+              <c:strCache>
+                <c:ptCount val="1"/>
+                <c:pt idx="0">
+                  <c:v>Sales</c:v>
+                </c:pt>
+              </c:strCache>
+            </c:strRef>
+          </c:tx>
+          <c:cat>
+            <c:strRef>
+              <c:f>Sheet1!$A$2:$A$4</c:f>
+              <c:strCache>
+                <c:ptCount val="3"/>
+                <c:pt idx="0">
+                  <c:v>No - 80%</c:v>
+                </c:pt>
+                <c:pt idx="1">
+                  <c:v>Sometimes - 14%</c:v>
+                </c:pt>
+                <c:pt idx="2">
+                  <c:v>Yes - 6%</c:v>
+                </c:pt>
+              </c:strCache>
+            </c:strRef>
+          </c:cat>
+          <c:val>
+            <c:numRef>
+              <c:f>Sheet1!$B$2:$B$4</c:f>
+              <c:numCache>
+                <c:formatCode>General</c:formatCode>
+                <c:ptCount val="3"/>
+                <c:pt idx="0">
+                  <c:v>80</c:v>
+                </c:pt>
+                <c:pt idx="1">
+                  <c:v>14</c:v>
+                </c:pt>
+                <c:pt idx="2">
+                  <c:v>6</c:v>
+                </c:pt>
+              </c:numCache>
+            </c:numRef>
+          </c:val>
+        </c:ser>
+        <c:dLbls>
+          <c:showLegendKey val="0"/>
+          <c:showVal val="0"/>
+          <c:showCatName val="0"/>
+          <c:showSerName val="0"/>
+          <c:showPercent val="0"/>
+          <c:showBubbleSize val="0"/>
+          <c:showLeaderLines val="1"/>
+        </c:dLbls>
+        <c:firstSliceAng val="0"/>
+      </c:pieChart>
+    </c:plotArea>
+    <c:legend>
+      <c:legendPos val="r"/>
+      <c:layout>
+        <c:manualLayout>
+          <c:xMode val="edge"/>
+          <c:yMode val="edge"/>
+          <c:x val="0.57539025590551185"/>
+          <c:y val="0.23377032416402496"/>
+          <c:w val="0.31419307742782154"/>
+          <c:h val="0.51947182738521325"/>
+        </c:manualLayout>
+      </c:layout>
+      <c:overlay val="0"/>
+    </c:legend>
+    <c:plotVisOnly val="1"/>
+    <c:dispBlanksAs val="gap"/>
+    <c:showDLblsOverMax val="0"/>
+  </c:chart>
+  <c:txPr>
+    <a:bodyPr/>
+    <a:lstStyle/>
+    <a:p>
+      <a:pPr>
+        <a:defRPr sz="1800"/>
+      </a:pPr>
+      <a:endParaRPr lang="en-US"/>
+    </a:p>
+  </c:txPr>
+  <c:externalData r:id="rId1">
+    <c:autoUpdate val="0"/>
+  </c:externalData>
+</c:chartSpace>
+</file>
+
+<file path=ppt/charts/chart4.xml><?xml version="1.0" encoding="utf-8"?>
+<c:chartSpace xmlns:c="http://schemas.openxmlformats.org/drawingml/2006/chart" xmlns:a="http://schemas.openxmlformats.org/drawingml/2006/main" xmlns:r="http://schemas.openxmlformats.org/officeDocument/2006/relationships">
+  <c:date1904 val="0"/>
+  <c:lang val="en-US"/>
+  <c:roundedCorners val="0"/>
+  <mc:AlternateContent xmlns:mc="http://schemas.openxmlformats.org/markup-compatibility/2006">
+    <mc:Choice xmlns:c14="http://schemas.microsoft.com/office/drawing/2007/8/2/chart" Requires="c14">
+      <c14:style val="102"/>
+    </mc:Choice>
+    <mc:Fallback>
+      <c:style val="2"/>
+    </mc:Fallback>
+  </mc:AlternateContent>
+  <c:chart>
+    <c:autoTitleDeleted val="1"/>
+    <c:plotArea>
+      <c:layout/>
+      <c:pieChart>
+        <c:varyColors val="1"/>
+        <c:ser>
+          <c:idx val="0"/>
+          <c:order val="0"/>
+          <c:tx>
+            <c:strRef>
+              <c:f>Sheet1!$B$1</c:f>
+              <c:strCache>
+                <c:ptCount val="1"/>
+                <c:pt idx="0">
+                  <c:v>Sales</c:v>
+                </c:pt>
+              </c:strCache>
+            </c:strRef>
+          </c:tx>
+          <c:explosion val="4"/>
+          <c:cat>
+            <c:strRef>
+              <c:f>Sheet1!$A$2:$A$4</c:f>
+              <c:strCache>
+                <c:ptCount val="3"/>
+                <c:pt idx="0">
+                  <c:v>Care about only distance - 36%</c:v>
+                </c:pt>
+                <c:pt idx="1">
+                  <c:v>Care about distance and tracks - 58%</c:v>
+                </c:pt>
+                <c:pt idx="2">
+                  <c:v>Care about tracks - 6%</c:v>
+                </c:pt>
+              </c:strCache>
+            </c:strRef>
+          </c:cat>
+          <c:val>
+            <c:numRef>
+              <c:f>Sheet1!$B$2:$B$4</c:f>
+              <c:numCache>
+                <c:formatCode>General</c:formatCode>
+                <c:ptCount val="3"/>
+                <c:pt idx="0">
+                  <c:v>36</c:v>
+                </c:pt>
+                <c:pt idx="1">
+                  <c:v>58</c:v>
+                </c:pt>
+                <c:pt idx="2">
+                  <c:v>6</c:v>
+                </c:pt>
+              </c:numCache>
+            </c:numRef>
+          </c:val>
+        </c:ser>
+        <c:dLbls>
+          <c:showLegendKey val="0"/>
+          <c:showVal val="0"/>
+          <c:showCatName val="0"/>
+          <c:showSerName val="0"/>
+          <c:showPercent val="0"/>
+          <c:showBubbleSize val="0"/>
+          <c:showLeaderLines val="1"/>
+        </c:dLbls>
+        <c:firstSliceAng val="0"/>
+      </c:pieChart>
+    </c:plotArea>
+    <c:legend>
+      <c:legendPos val="r"/>
+      <c:layout>
+        <c:manualLayout>
+          <c:xMode val="edge"/>
+          <c:yMode val="edge"/>
+          <c:x val="0.50596124558504263"/>
+          <c:y val="7.5008366141732286E-2"/>
+          <c:w val="0.49403875441495737"/>
+          <c:h val="0.84998326771653543"/>
+        </c:manualLayout>
+      </c:layout>
+      <c:overlay val="0"/>
+    </c:legend>
+    <c:plotVisOnly val="1"/>
+    <c:dispBlanksAs val="gap"/>
+    <c:showDLblsOverMax val="0"/>
+  </c:chart>
+  <c:txPr>
+    <a:bodyPr/>
+    <a:lstStyle/>
+    <a:p>
+      <a:pPr>
+        <a:defRPr sz="1800"/>
+      </a:pPr>
+      <a:endParaRPr lang="en-US"/>
+    </a:p>
+  </c:txPr>
+  <c:externalData r:id="rId1">
+    <c:autoUpdate val="0"/>
+  </c:externalData>
+</c:chartSpace>
+</file>
+
+<file path=ppt/charts/chart5.xml><?xml version="1.0" encoding="utf-8"?>
+<c:chartSpace xmlns:c="http://schemas.openxmlformats.org/drawingml/2006/chart" xmlns:a="http://schemas.openxmlformats.org/drawingml/2006/main" xmlns:r="http://schemas.openxmlformats.org/officeDocument/2006/relationships">
+  <c:date1904 val="0"/>
+  <c:lang val="en-US"/>
+  <c:roundedCorners val="0"/>
+  <mc:AlternateContent xmlns:mc="http://schemas.openxmlformats.org/markup-compatibility/2006">
+    <mc:Choice xmlns:c14="http://schemas.microsoft.com/office/drawing/2007/8/2/chart" Requires="c14">
+      <c14:style val="102"/>
+    </mc:Choice>
+    <mc:Fallback>
+      <c:style val="2"/>
+    </mc:Fallback>
+  </mc:AlternateContent>
+  <c:chart>
+    <c:autoTitleDeleted val="1"/>
+    <c:plotArea>
+      <c:layout/>
+      <c:pieChart>
+        <c:varyColors val="1"/>
+        <c:ser>
+          <c:idx val="0"/>
+          <c:order val="0"/>
+          <c:tx>
+            <c:strRef>
+              <c:f>Sheet1!$B$1</c:f>
+              <c:strCache>
+                <c:ptCount val="1"/>
+                <c:pt idx="0">
+                  <c:v>Sales</c:v>
+                </c:pt>
+              </c:strCache>
+            </c:strRef>
+          </c:tx>
+          <c:cat>
+            <c:strRef>
+              <c:f>Sheet1!$A$2:$A$3</c:f>
+              <c:strCache>
+                <c:ptCount val="2"/>
+                <c:pt idx="0">
+                  <c:v>Yes - 12%</c:v>
+                </c:pt>
+                <c:pt idx="1">
+                  <c:v>No - 88%</c:v>
+                </c:pt>
+              </c:strCache>
+            </c:strRef>
+          </c:cat>
+          <c:val>
+            <c:numRef>
+              <c:f>Sheet1!$B$2:$B$3</c:f>
+              <c:numCache>
+                <c:formatCode>General</c:formatCode>
+                <c:ptCount val="2"/>
+                <c:pt idx="0">
+                  <c:v>12</c:v>
+                </c:pt>
+                <c:pt idx="1">
+                  <c:v>88</c:v>
+                </c:pt>
+              </c:numCache>
+            </c:numRef>
+          </c:val>
+        </c:ser>
+        <c:dLbls>
+          <c:showLegendKey val="0"/>
+          <c:showVal val="0"/>
+          <c:showCatName val="0"/>
+          <c:showSerName val="0"/>
+          <c:showPercent val="0"/>
+          <c:showBubbleSize val="0"/>
+          <c:showLeaderLines val="1"/>
+        </c:dLbls>
+        <c:firstSliceAng val="0"/>
+      </c:pieChart>
+    </c:plotArea>
+    <c:legend>
+      <c:legendPos val="r"/>
+      <c:layout/>
+      <c:overlay val="0"/>
+    </c:legend>
+    <c:plotVisOnly val="1"/>
+    <c:dispBlanksAs val="gap"/>
+    <c:showDLblsOverMax val="0"/>
+  </c:chart>
+  <c:txPr>
+    <a:bodyPr/>
+    <a:lstStyle/>
+    <a:p>
+      <a:pPr>
+        <a:defRPr sz="1800"/>
+      </a:pPr>
+      <a:endParaRPr lang="en-US"/>
+    </a:p>
+  </c:txPr>
+  <c:externalData r:id="rId1">
+    <c:autoUpdate val="0"/>
+  </c:externalData>
+</c:chartSpace>
 </file>
 
 <file path=ppt/notesMasters/notesMaster1.xml><?xml version="1.0" encoding="utf-8"?>
@@ -573,6 +1129,124 @@
 </p:notes>
 </file>
 
+<file path=ppt/notesSlides/notesSlide10.xml><?xml version="1.0" encoding="utf-8"?>
+<p:notes xmlns:a="http://schemas.openxmlformats.org/drawingml/2006/main" xmlns:r="http://schemas.openxmlformats.org/officeDocument/2006/relationships" xmlns:p="http://schemas.openxmlformats.org/presentationml/2006/main">
+  <p:cSld>
+    <p:spTree>
+      <p:nvGrpSpPr>
+        <p:cNvPr id="1" name=""/>
+        <p:cNvGrpSpPr/>
+        <p:nvPr/>
+      </p:nvGrpSpPr>
+      <p:grpSpPr>
+        <a:xfrm>
+          <a:off x="0" y="0"/>
+          <a:ext cx="0" cy="0"/>
+          <a:chOff x="0" y="0"/>
+          <a:chExt cx="0" cy="0"/>
+        </a:xfrm>
+      </p:grpSpPr>
+      <p:sp>
+        <p:nvSpPr>
+          <p:cNvPr id="2" name="Slide Image Placeholder 1"/>
+          <p:cNvSpPr>
+            <a:spLocks noGrp="1" noRot="1" noChangeAspect="1"/>
+          </p:cNvSpPr>
+          <p:nvPr>
+            <p:ph type="sldImg"/>
+          </p:nvPr>
+        </p:nvSpPr>
+        <p:spPr/>
+      </p:sp>
+      <p:sp>
+        <p:nvSpPr>
+          <p:cNvPr id="3" name="Notes Placeholder 2"/>
+          <p:cNvSpPr>
+            <a:spLocks noGrp="1"/>
+          </p:cNvSpPr>
+          <p:nvPr>
+            <p:ph type="body" idx="1"/>
+          </p:nvPr>
+        </p:nvSpPr>
+        <p:spPr/>
+        <p:txBody>
+          <a:bodyPr/>
+          <a:lstStyle/>
+          <a:p>
+            <a:r>
+              <a:rPr lang="en-US" dirty="0" smtClean="0"/>
+              <a:t>Synthetic routes: (S Health</a:t>
+            </a:r>
+            <a:r>
+              <a:rPr lang="en-US" baseline="0" dirty="0" smtClean="0"/>
+              <a:t> as an example</a:t>
+            </a:r>
+            <a:r>
+              <a:rPr lang="en-US" dirty="0" smtClean="0"/>
+              <a:t>)</a:t>
+            </a:r>
+          </a:p>
+          <a:p>
+            <a:r>
+              <a:rPr lang="en-US" dirty="0" err="1" smtClean="0"/>
+              <a:t>Nav</a:t>
+            </a:r>
+            <a:r>
+              <a:rPr lang="en-US" dirty="0" smtClean="0"/>
+              <a:t> Apps: Offline navigation is a possibility (load map before leaving).</a:t>
+            </a:r>
+            <a:r>
+              <a:rPr lang="en-US" baseline="0" dirty="0" smtClean="0"/>
+              <a:t> H</a:t>
+            </a:r>
+            <a:r>
+              <a:rPr lang="en-US" dirty="0" smtClean="0"/>
+              <a:t>owever, this does not allow for real-time traffic</a:t>
+            </a:r>
+            <a:r>
+              <a:rPr lang="en-US" baseline="0" dirty="0" smtClean="0"/>
+              <a:t> updates.</a:t>
+            </a:r>
+            <a:endParaRPr lang="en-US" dirty="0"/>
+          </a:p>
+        </p:txBody>
+      </p:sp>
+      <p:sp>
+        <p:nvSpPr>
+          <p:cNvPr id="4" name="Slide Number Placeholder 3"/>
+          <p:cNvSpPr>
+            <a:spLocks noGrp="1"/>
+          </p:cNvSpPr>
+          <p:nvPr>
+            <p:ph type="sldNum" sz="quarter" idx="10"/>
+          </p:nvPr>
+        </p:nvSpPr>
+        <p:spPr/>
+        <p:txBody>
+          <a:bodyPr/>
+          <a:lstStyle/>
+          <a:p>
+            <a:fld id="{B8B3BC3C-0900-4ACD-9030-5BE6C2442A68}" type="slidenum">
+              <a:rPr lang="en-US" smtClean="0"/>
+              <a:t>15</a:t>
+            </a:fld>
+            <a:endParaRPr lang="en-US"/>
+          </a:p>
+        </p:txBody>
+      </p:sp>
+    </p:spTree>
+    <p:extLst>
+      <p:ext uri="{BB962C8B-B14F-4D97-AF65-F5344CB8AC3E}">
+        <p14:creationId xmlns:p14="http://schemas.microsoft.com/office/powerpoint/2010/main" val="961247870"/>
+      </p:ext>
+    </p:extLst>
+  </p:cSld>
+  <p:clrMapOvr>
+    <a:masterClrMapping/>
+  </p:clrMapOvr>
+</p:notes>
+</file>
+
 <file path=ppt/notesSlides/notesSlide2.xml><?xml version="1.0" encoding="utf-8"?>
 <p:notes xmlns:a="http://schemas.openxmlformats.org/drawingml/2006/main" xmlns:r="http://schemas.openxmlformats.org/officeDocument/2006/relationships" xmlns:p="http://schemas.openxmlformats.org/presentationml/2006/main">
   <p:cSld>
@@ -723,37 +1397,21 @@
           <a:p>
             <a:r>
               <a:rPr lang="en-US" dirty="0" smtClean="0"/>
-              <a:t>Synthetic routes: (S Health</a:t>
+              <a:t>Looking to see if there is a  market for an app like LP-Guardian</a:t>
+            </a:r>
+          </a:p>
+          <a:p>
+            <a:r>
+              <a:rPr lang="en-US" dirty="0" smtClean="0"/>
+              <a:t>70 from social network announcements, 110 from amazon</a:t>
             </a:r>
             <a:r>
               <a:rPr lang="en-US" baseline="0" dirty="0" smtClean="0"/>
-              <a:t> as an example</a:t>
-            </a:r>
-            <a:r>
-              <a:rPr lang="en-US" dirty="0" smtClean="0"/>
-              <a:t>)</a:t>
-            </a:r>
-          </a:p>
-          <a:p>
-            <a:r>
-              <a:rPr lang="en-US" dirty="0" err="1" smtClean="0"/>
-              <a:t>Nav</a:t>
-            </a:r>
-            <a:r>
-              <a:rPr lang="en-US" dirty="0" smtClean="0"/>
-              <a:t> Apps: Offline navigation is a possibility (load map before leaving).</a:t>
-            </a:r>
-            <a:r>
-              <a:rPr lang="en-US" baseline="0" dirty="0" smtClean="0"/>
-              <a:t> H</a:t>
-            </a:r>
-            <a:r>
-              <a:rPr lang="en-US" dirty="0" smtClean="0"/>
-              <a:t>owever, this does not allow for real-time traffic</a:t>
-            </a:r>
-            <a:r>
-              <a:rPr lang="en-US" baseline="0" dirty="0" smtClean="0"/>
-              <a:t> updates.</a:t>
+              <a:t> mechanical </a:t>
+            </a:r>
+            <a:r>
+              <a:rPr lang="en-US" baseline="0" dirty="0" err="1" smtClean="0"/>
+              <a:t>turk</a:t>
             </a:r>
             <a:endParaRPr lang="en-US" dirty="0"/>
           </a:p>
@@ -776,7 +1434,7 @@
           <a:p>
             <a:fld id="{B8B3BC3C-0900-4ACD-9030-5BE6C2442A68}" type="slidenum">
               <a:rPr lang="en-US" smtClean="0"/>
-              <a:t>9</a:t>
+              <a:t>8</a:t>
             </a:fld>
             <a:endParaRPr lang="en-US"/>
           </a:p>
@@ -785,7 +1443,561 @@
     </p:spTree>
     <p:extLst>
       <p:ext uri="{BB962C8B-B14F-4D97-AF65-F5344CB8AC3E}">
-        <p14:creationId xmlns:p14="http://schemas.microsoft.com/office/powerpoint/2010/main" val="961247870"/>
+        <p14:creationId xmlns:p14="http://schemas.microsoft.com/office/powerpoint/2010/main" val="3574496599"/>
+      </p:ext>
+    </p:extLst>
+  </p:cSld>
+  <p:clrMapOvr>
+    <a:masterClrMapping/>
+  </p:clrMapOvr>
+</p:notes>
+</file>
+
+<file path=ppt/notesSlides/notesSlide4.xml><?xml version="1.0" encoding="utf-8"?>
+<p:notes xmlns:a="http://schemas.openxmlformats.org/drawingml/2006/main" xmlns:r="http://schemas.openxmlformats.org/officeDocument/2006/relationships" xmlns:p="http://schemas.openxmlformats.org/presentationml/2006/main">
+  <p:cSld>
+    <p:spTree>
+      <p:nvGrpSpPr>
+        <p:cNvPr id="1" name=""/>
+        <p:cNvGrpSpPr/>
+        <p:nvPr/>
+      </p:nvGrpSpPr>
+      <p:grpSpPr>
+        <a:xfrm>
+          <a:off x="0" y="0"/>
+          <a:ext cx="0" cy="0"/>
+          <a:chOff x="0" y="0"/>
+          <a:chExt cx="0" cy="0"/>
+        </a:xfrm>
+      </p:grpSpPr>
+      <p:sp>
+        <p:nvSpPr>
+          <p:cNvPr id="2" name="Slide Image Placeholder 1"/>
+          <p:cNvSpPr>
+            <a:spLocks noGrp="1" noRot="1" noChangeAspect="1"/>
+          </p:cNvSpPr>
+          <p:nvPr>
+            <p:ph type="sldImg"/>
+          </p:nvPr>
+        </p:nvSpPr>
+        <p:spPr/>
+      </p:sp>
+      <p:sp>
+        <p:nvSpPr>
+          <p:cNvPr id="3" name="Notes Placeholder 2"/>
+          <p:cNvSpPr>
+            <a:spLocks noGrp="1"/>
+          </p:cNvSpPr>
+          <p:nvPr>
+            <p:ph type="body" idx="1"/>
+          </p:nvPr>
+        </p:nvSpPr>
+        <p:spPr/>
+        <p:txBody>
+          <a:bodyPr/>
+          <a:lstStyle/>
+          <a:p>
+            <a:r>
+              <a:rPr lang="en-US" dirty="0" smtClean="0"/>
+              <a:t>82% indicate no problem</a:t>
+            </a:r>
+            <a:r>
+              <a:rPr lang="en-US" baseline="0" dirty="0" smtClean="0"/>
+              <a:t> sharing city level location for social networking</a:t>
+            </a:r>
+            <a:endParaRPr lang="en-US" dirty="0"/>
+          </a:p>
+        </p:txBody>
+      </p:sp>
+      <p:sp>
+        <p:nvSpPr>
+          <p:cNvPr id="4" name="Slide Number Placeholder 3"/>
+          <p:cNvSpPr>
+            <a:spLocks noGrp="1"/>
+          </p:cNvSpPr>
+          <p:nvPr>
+            <p:ph type="sldNum" sz="quarter" idx="10"/>
+          </p:nvPr>
+        </p:nvSpPr>
+        <p:spPr/>
+        <p:txBody>
+          <a:bodyPr/>
+          <a:lstStyle/>
+          <a:p>
+            <a:fld id="{B8B3BC3C-0900-4ACD-9030-5BE6C2442A68}" type="slidenum">
+              <a:rPr lang="en-US" smtClean="0"/>
+              <a:t>9</a:t>
+            </a:fld>
+            <a:endParaRPr lang="en-US"/>
+          </a:p>
+        </p:txBody>
+      </p:sp>
+    </p:spTree>
+    <p:extLst>
+      <p:ext uri="{BB962C8B-B14F-4D97-AF65-F5344CB8AC3E}">
+        <p14:creationId xmlns:p14="http://schemas.microsoft.com/office/powerpoint/2010/main" val="3574496599"/>
+      </p:ext>
+    </p:extLst>
+  </p:cSld>
+  <p:clrMapOvr>
+    <a:masterClrMapping/>
+  </p:clrMapOvr>
+</p:notes>
+</file>
+
+<file path=ppt/notesSlides/notesSlide5.xml><?xml version="1.0" encoding="utf-8"?>
+<p:notes xmlns:a="http://schemas.openxmlformats.org/drawingml/2006/main" xmlns:r="http://schemas.openxmlformats.org/officeDocument/2006/relationships" xmlns:p="http://schemas.openxmlformats.org/presentationml/2006/main">
+  <p:cSld>
+    <p:spTree>
+      <p:nvGrpSpPr>
+        <p:cNvPr id="1" name=""/>
+        <p:cNvGrpSpPr/>
+        <p:nvPr/>
+      </p:nvGrpSpPr>
+      <p:grpSpPr>
+        <a:xfrm>
+          <a:off x="0" y="0"/>
+          <a:ext cx="0" cy="0"/>
+          <a:chOff x="0" y="0"/>
+          <a:chExt cx="0" cy="0"/>
+        </a:xfrm>
+      </p:grpSpPr>
+      <p:sp>
+        <p:nvSpPr>
+          <p:cNvPr id="2" name="Slide Image Placeholder 1"/>
+          <p:cNvSpPr>
+            <a:spLocks noGrp="1" noRot="1" noChangeAspect="1"/>
+          </p:cNvSpPr>
+          <p:nvPr>
+            <p:ph type="sldImg"/>
+          </p:nvPr>
+        </p:nvSpPr>
+        <p:spPr/>
+      </p:sp>
+      <p:sp>
+        <p:nvSpPr>
+          <p:cNvPr id="3" name="Notes Placeholder 2"/>
+          <p:cNvSpPr>
+            <a:spLocks noGrp="1"/>
+          </p:cNvSpPr>
+          <p:nvPr>
+            <p:ph type="body" idx="1"/>
+          </p:nvPr>
+        </p:nvSpPr>
+        <p:spPr/>
+        <p:txBody>
+          <a:bodyPr/>
+          <a:lstStyle/>
+          <a:p>
+            <a:r>
+              <a:rPr lang="en-US" dirty="0" smtClean="0"/>
+              <a:t>78% indicate no problem</a:t>
+            </a:r>
+            <a:r>
+              <a:rPr lang="en-US" baseline="0" dirty="0" smtClean="0"/>
+              <a:t> sharing city level location for messaging.</a:t>
+            </a:r>
+            <a:endParaRPr lang="en-US" dirty="0"/>
+          </a:p>
+        </p:txBody>
+      </p:sp>
+      <p:sp>
+        <p:nvSpPr>
+          <p:cNvPr id="4" name="Slide Number Placeholder 3"/>
+          <p:cNvSpPr>
+            <a:spLocks noGrp="1"/>
+          </p:cNvSpPr>
+          <p:nvPr>
+            <p:ph type="sldNum" sz="quarter" idx="10"/>
+          </p:nvPr>
+        </p:nvSpPr>
+        <p:spPr/>
+        <p:txBody>
+          <a:bodyPr/>
+          <a:lstStyle/>
+          <a:p>
+            <a:fld id="{B8B3BC3C-0900-4ACD-9030-5BE6C2442A68}" type="slidenum">
+              <a:rPr lang="en-US" smtClean="0"/>
+              <a:t>10</a:t>
+            </a:fld>
+            <a:endParaRPr lang="en-US"/>
+          </a:p>
+        </p:txBody>
+      </p:sp>
+    </p:spTree>
+    <p:extLst>
+      <p:ext uri="{BB962C8B-B14F-4D97-AF65-F5344CB8AC3E}">
+        <p14:creationId xmlns:p14="http://schemas.microsoft.com/office/powerpoint/2010/main" val="3574496599"/>
+      </p:ext>
+    </p:extLst>
+  </p:cSld>
+  <p:clrMapOvr>
+    <a:masterClrMapping/>
+  </p:clrMapOvr>
+</p:notes>
+</file>
+
+<file path=ppt/notesSlides/notesSlide6.xml><?xml version="1.0" encoding="utf-8"?>
+<p:notes xmlns:a="http://schemas.openxmlformats.org/drawingml/2006/main" xmlns:r="http://schemas.openxmlformats.org/officeDocument/2006/relationships" xmlns:p="http://schemas.openxmlformats.org/presentationml/2006/main">
+  <p:cSld>
+    <p:spTree>
+      <p:nvGrpSpPr>
+        <p:cNvPr id="1" name=""/>
+        <p:cNvGrpSpPr/>
+        <p:nvPr/>
+      </p:nvGrpSpPr>
+      <p:grpSpPr>
+        <a:xfrm>
+          <a:off x="0" y="0"/>
+          <a:ext cx="0" cy="0"/>
+          <a:chOff x="0" y="0"/>
+          <a:chExt cx="0" cy="0"/>
+        </a:xfrm>
+      </p:grpSpPr>
+      <p:sp>
+        <p:nvSpPr>
+          <p:cNvPr id="2" name="Slide Image Placeholder 1"/>
+          <p:cNvSpPr>
+            <a:spLocks noGrp="1" noRot="1" noChangeAspect="1"/>
+          </p:cNvSpPr>
+          <p:nvPr>
+            <p:ph type="sldImg"/>
+          </p:nvPr>
+        </p:nvSpPr>
+        <p:spPr/>
+      </p:sp>
+      <p:sp>
+        <p:nvSpPr>
+          <p:cNvPr id="3" name="Notes Placeholder 2"/>
+          <p:cNvSpPr>
+            <a:spLocks noGrp="1"/>
+          </p:cNvSpPr>
+          <p:nvPr>
+            <p:ph type="body" idx="1"/>
+          </p:nvPr>
+        </p:nvSpPr>
+        <p:spPr/>
+        <p:txBody>
+          <a:bodyPr/>
+          <a:lstStyle/>
+          <a:p>
+            <a:r>
+              <a:rPr lang="en-US" dirty="0" smtClean="0"/>
+              <a:t>Conclusion is that users generally won’t mind some loss in app location functionality at home/work</a:t>
+            </a:r>
+            <a:endParaRPr lang="en-US" dirty="0"/>
+          </a:p>
+        </p:txBody>
+      </p:sp>
+      <p:sp>
+        <p:nvSpPr>
+          <p:cNvPr id="4" name="Slide Number Placeholder 3"/>
+          <p:cNvSpPr>
+            <a:spLocks noGrp="1"/>
+          </p:cNvSpPr>
+          <p:nvPr>
+            <p:ph type="sldNum" sz="quarter" idx="10"/>
+          </p:nvPr>
+        </p:nvSpPr>
+        <p:spPr/>
+        <p:txBody>
+          <a:bodyPr/>
+          <a:lstStyle/>
+          <a:p>
+            <a:fld id="{B8B3BC3C-0900-4ACD-9030-5BE6C2442A68}" type="slidenum">
+              <a:rPr lang="en-US" smtClean="0"/>
+              <a:t>11</a:t>
+            </a:fld>
+            <a:endParaRPr lang="en-US"/>
+          </a:p>
+        </p:txBody>
+      </p:sp>
+    </p:spTree>
+    <p:extLst>
+      <p:ext uri="{BB962C8B-B14F-4D97-AF65-F5344CB8AC3E}">
+        <p14:creationId xmlns:p14="http://schemas.microsoft.com/office/powerpoint/2010/main" val="3574496599"/>
+      </p:ext>
+    </p:extLst>
+  </p:cSld>
+  <p:clrMapOvr>
+    <a:masterClrMapping/>
+  </p:clrMapOvr>
+</p:notes>
+</file>
+
+<file path=ppt/notesSlides/notesSlide7.xml><?xml version="1.0" encoding="utf-8"?>
+<p:notes xmlns:a="http://schemas.openxmlformats.org/drawingml/2006/main" xmlns:r="http://schemas.openxmlformats.org/officeDocument/2006/relationships" xmlns:p="http://schemas.openxmlformats.org/presentationml/2006/main">
+  <p:cSld>
+    <p:spTree>
+      <p:nvGrpSpPr>
+        <p:cNvPr id="1" name=""/>
+        <p:cNvGrpSpPr/>
+        <p:nvPr/>
+      </p:nvGrpSpPr>
+      <p:grpSpPr>
+        <a:xfrm>
+          <a:off x="0" y="0"/>
+          <a:ext cx="0" cy="0"/>
+          <a:chOff x="0" y="0"/>
+          <a:chExt cx="0" cy="0"/>
+        </a:xfrm>
+      </p:grpSpPr>
+      <p:sp>
+        <p:nvSpPr>
+          <p:cNvPr id="2" name="Slide Image Placeholder 1"/>
+          <p:cNvSpPr>
+            <a:spLocks noGrp="1" noRot="1" noChangeAspect="1"/>
+          </p:cNvSpPr>
+          <p:nvPr>
+            <p:ph type="sldImg"/>
+          </p:nvPr>
+        </p:nvSpPr>
+        <p:spPr/>
+      </p:sp>
+      <p:sp>
+        <p:nvSpPr>
+          <p:cNvPr id="3" name="Notes Placeholder 2"/>
+          <p:cNvSpPr>
+            <a:spLocks noGrp="1"/>
+          </p:cNvSpPr>
+          <p:nvPr>
+            <p:ph type="body" idx="1"/>
+          </p:nvPr>
+        </p:nvSpPr>
+        <p:spPr/>
+        <p:txBody>
+          <a:bodyPr/>
+          <a:lstStyle/>
+          <a:p>
+            <a:r>
+              <a:rPr lang="en-US" dirty="0" smtClean="0"/>
+              <a:t>Looked</a:t>
+            </a:r>
+            <a:r>
+              <a:rPr lang="en-US" baseline="0" dirty="0" smtClean="0"/>
+              <a:t> at 40 location accessing apps and took average</a:t>
+            </a:r>
+          </a:p>
+          <a:p>
+            <a:r>
+              <a:rPr lang="en-US" baseline="0" dirty="0" smtClean="0"/>
+              <a:t>Inside: </a:t>
+            </a:r>
+            <a:r>
+              <a:rPr lang="en-US" baseline="0" dirty="0" err="1" smtClean="0"/>
+              <a:t>anonymization</a:t>
+            </a:r>
+            <a:r>
+              <a:rPr lang="en-US" baseline="0" dirty="0" smtClean="0"/>
+              <a:t> delay for worst-case scenario</a:t>
+            </a:r>
+            <a:endParaRPr lang="en-US" dirty="0"/>
+          </a:p>
+        </p:txBody>
+      </p:sp>
+      <p:sp>
+        <p:nvSpPr>
+          <p:cNvPr id="4" name="Slide Number Placeholder 3"/>
+          <p:cNvSpPr>
+            <a:spLocks noGrp="1"/>
+          </p:cNvSpPr>
+          <p:nvPr>
+            <p:ph type="sldNum" sz="quarter" idx="10"/>
+          </p:nvPr>
+        </p:nvSpPr>
+        <p:spPr/>
+        <p:txBody>
+          <a:bodyPr/>
+          <a:lstStyle/>
+          <a:p>
+            <a:fld id="{B8B3BC3C-0900-4ACD-9030-5BE6C2442A68}" type="slidenum">
+              <a:rPr lang="en-US" smtClean="0"/>
+              <a:t>12</a:t>
+            </a:fld>
+            <a:endParaRPr lang="en-US"/>
+          </a:p>
+        </p:txBody>
+      </p:sp>
+    </p:spTree>
+    <p:extLst>
+      <p:ext uri="{BB962C8B-B14F-4D97-AF65-F5344CB8AC3E}">
+        <p14:creationId xmlns:p14="http://schemas.microsoft.com/office/powerpoint/2010/main" val="3574496599"/>
+      </p:ext>
+    </p:extLst>
+  </p:cSld>
+  <p:clrMapOvr>
+    <a:masterClrMapping/>
+  </p:clrMapOvr>
+</p:notes>
+</file>
+
+<file path=ppt/notesSlides/notesSlide8.xml><?xml version="1.0" encoding="utf-8"?>
+<p:notes xmlns:a="http://schemas.openxmlformats.org/drawingml/2006/main" xmlns:r="http://schemas.openxmlformats.org/officeDocument/2006/relationships" xmlns:p="http://schemas.openxmlformats.org/presentationml/2006/main">
+  <p:cSld>
+    <p:spTree>
+      <p:nvGrpSpPr>
+        <p:cNvPr id="1" name=""/>
+        <p:cNvGrpSpPr/>
+        <p:nvPr/>
+      </p:nvGrpSpPr>
+      <p:grpSpPr>
+        <a:xfrm>
+          <a:off x="0" y="0"/>
+          <a:ext cx="0" cy="0"/>
+          <a:chOff x="0" y="0"/>
+          <a:chExt cx="0" cy="0"/>
+        </a:xfrm>
+      </p:grpSpPr>
+      <p:sp>
+        <p:nvSpPr>
+          <p:cNvPr id="2" name="Slide Image Placeholder 1"/>
+          <p:cNvSpPr>
+            <a:spLocks noGrp="1" noRot="1" noChangeAspect="1"/>
+          </p:cNvSpPr>
+          <p:nvPr>
+            <p:ph type="sldImg"/>
+          </p:nvPr>
+        </p:nvSpPr>
+        <p:spPr/>
+      </p:sp>
+      <p:sp>
+        <p:nvSpPr>
+          <p:cNvPr id="3" name="Notes Placeholder 2"/>
+          <p:cNvSpPr>
+            <a:spLocks noGrp="1"/>
+          </p:cNvSpPr>
+          <p:nvPr>
+            <p:ph type="body" idx="1"/>
+          </p:nvPr>
+        </p:nvSpPr>
+        <p:spPr/>
+        <p:txBody>
+          <a:bodyPr/>
+          <a:lstStyle/>
+          <a:p>
+            <a:r>
+              <a:rPr lang="en-US" dirty="0" smtClean="0"/>
+              <a:t>Looked</a:t>
+            </a:r>
+            <a:r>
+              <a:rPr lang="en-US" baseline="0" dirty="0" smtClean="0"/>
+              <a:t> at 40 location accessing apps and took average</a:t>
+            </a:r>
+            <a:endParaRPr lang="en-US" dirty="0"/>
+          </a:p>
+        </p:txBody>
+      </p:sp>
+      <p:sp>
+        <p:nvSpPr>
+          <p:cNvPr id="4" name="Slide Number Placeholder 3"/>
+          <p:cNvSpPr>
+            <a:spLocks noGrp="1"/>
+          </p:cNvSpPr>
+          <p:nvPr>
+            <p:ph type="sldNum" sz="quarter" idx="10"/>
+          </p:nvPr>
+        </p:nvSpPr>
+        <p:spPr/>
+        <p:txBody>
+          <a:bodyPr/>
+          <a:lstStyle/>
+          <a:p>
+            <a:fld id="{B8B3BC3C-0900-4ACD-9030-5BE6C2442A68}" type="slidenum">
+              <a:rPr lang="en-US" smtClean="0"/>
+              <a:t>13</a:t>
+            </a:fld>
+            <a:endParaRPr lang="en-US"/>
+          </a:p>
+        </p:txBody>
+      </p:sp>
+    </p:spTree>
+    <p:extLst>
+      <p:ext uri="{BB962C8B-B14F-4D97-AF65-F5344CB8AC3E}">
+        <p14:creationId xmlns:p14="http://schemas.microsoft.com/office/powerpoint/2010/main" val="3574496599"/>
+      </p:ext>
+    </p:extLst>
+  </p:cSld>
+  <p:clrMapOvr>
+    <a:masterClrMapping/>
+  </p:clrMapOvr>
+</p:notes>
+</file>
+
+<file path=ppt/notesSlides/notesSlide9.xml><?xml version="1.0" encoding="utf-8"?>
+<p:notes xmlns:a="http://schemas.openxmlformats.org/drawingml/2006/main" xmlns:r="http://schemas.openxmlformats.org/officeDocument/2006/relationships" xmlns:p="http://schemas.openxmlformats.org/presentationml/2006/main">
+  <p:cSld>
+    <p:spTree>
+      <p:nvGrpSpPr>
+        <p:cNvPr id="1" name=""/>
+        <p:cNvGrpSpPr/>
+        <p:nvPr/>
+      </p:nvGrpSpPr>
+      <p:grpSpPr>
+        <a:xfrm>
+          <a:off x="0" y="0"/>
+          <a:ext cx="0" cy="0"/>
+          <a:chOff x="0" y="0"/>
+          <a:chExt cx="0" cy="0"/>
+        </a:xfrm>
+      </p:grpSpPr>
+      <p:sp>
+        <p:nvSpPr>
+          <p:cNvPr id="2" name="Slide Image Placeholder 1"/>
+          <p:cNvSpPr>
+            <a:spLocks noGrp="1" noRot="1" noChangeAspect="1"/>
+          </p:cNvSpPr>
+          <p:nvPr>
+            <p:ph type="sldImg"/>
+          </p:nvPr>
+        </p:nvSpPr>
+        <p:spPr/>
+      </p:sp>
+      <p:sp>
+        <p:nvSpPr>
+          <p:cNvPr id="3" name="Notes Placeholder 2"/>
+          <p:cNvSpPr>
+            <a:spLocks noGrp="1"/>
+          </p:cNvSpPr>
+          <p:nvPr>
+            <p:ph type="body" idx="1"/>
+          </p:nvPr>
+        </p:nvSpPr>
+        <p:spPr/>
+        <p:txBody>
+          <a:bodyPr/>
+          <a:lstStyle/>
+          <a:p>
+            <a:endParaRPr lang="en-US" dirty="0"/>
+          </a:p>
+        </p:txBody>
+      </p:sp>
+      <p:sp>
+        <p:nvSpPr>
+          <p:cNvPr id="4" name="Slide Number Placeholder 3"/>
+          <p:cNvSpPr>
+            <a:spLocks noGrp="1"/>
+          </p:cNvSpPr>
+          <p:nvPr>
+            <p:ph type="sldNum" sz="quarter" idx="10"/>
+          </p:nvPr>
+        </p:nvSpPr>
+        <p:spPr/>
+        <p:txBody>
+          <a:bodyPr/>
+          <a:lstStyle/>
+          <a:p>
+            <a:fld id="{B8B3BC3C-0900-4ACD-9030-5BE6C2442A68}" type="slidenum">
+              <a:rPr lang="en-US" smtClean="0"/>
+              <a:t>14</a:t>
+            </a:fld>
+            <a:endParaRPr lang="en-US"/>
+          </a:p>
+        </p:txBody>
+      </p:sp>
+    </p:spTree>
+    <p:extLst>
+      <p:ext uri="{BB962C8B-B14F-4D97-AF65-F5344CB8AC3E}">
+        <p14:creationId xmlns:p14="http://schemas.microsoft.com/office/powerpoint/2010/main" val="3574496599"/>
       </p:ext>
     </p:extLst>
   </p:cSld>
@@ -15095,7 +16307,1170 @@
           <a:p>
             <a:r>
               <a:rPr lang="en-US" dirty="0" smtClean="0"/>
-              <a:t>Potential Future Work</a:t>
+              <a:t>Experimental Results</a:t>
+            </a:r>
+            <a:endParaRPr lang="en-US" dirty="0"/>
+          </a:p>
+        </p:txBody>
+      </p:sp>
+      <p:sp>
+        <p:nvSpPr>
+          <p:cNvPr id="3" name="Content Placeholder 2"/>
+          <p:cNvSpPr>
+            <a:spLocks noGrp="1"/>
+          </p:cNvSpPr>
+          <p:nvPr>
+            <p:ph idx="1"/>
+          </p:nvPr>
+        </p:nvSpPr>
+        <p:spPr>
+          <a:xfrm>
+            <a:off x="685800" y="1447800"/>
+            <a:ext cx="7772400" cy="3733800"/>
+          </a:xfrm>
+        </p:spPr>
+        <p:txBody>
+          <a:bodyPr>
+            <a:normAutofit/>
+          </a:bodyPr>
+          <a:lstStyle/>
+          <a:p>
+            <a:pPr marL="68580" indent="0">
+              <a:buNone/>
+            </a:pPr>
+            <a:r>
+              <a:rPr lang="en-US" dirty="0" smtClean="0"/>
+              <a:t>Messaging (</a:t>
+            </a:r>
+            <a:r>
+              <a:rPr lang="en-US" dirty="0" err="1" smtClean="0"/>
+              <a:t>WhatsAp</a:t>
+            </a:r>
+            <a:r>
+              <a:rPr lang="en-US" dirty="0" smtClean="0"/>
+              <a:t>):  Do they share location at or near home/work?</a:t>
+            </a:r>
+          </a:p>
+          <a:p>
+            <a:pPr marL="68580" indent="0">
+              <a:buNone/>
+            </a:pPr>
+            <a:endParaRPr lang="en-US" dirty="0"/>
+          </a:p>
+          <a:p>
+            <a:pPr marL="68580" indent="0">
+              <a:buNone/>
+            </a:pPr>
+            <a:endParaRPr lang="en-US" dirty="0" smtClean="0"/>
+          </a:p>
+          <a:p>
+            <a:pPr marL="68580" indent="0">
+              <a:buNone/>
+            </a:pPr>
+            <a:endParaRPr lang="en-US" dirty="0"/>
+          </a:p>
+          <a:p>
+            <a:pPr marL="68580" indent="0">
+              <a:buNone/>
+            </a:pPr>
+            <a:endParaRPr lang="en-US" dirty="0" smtClean="0"/>
+          </a:p>
+          <a:p>
+            <a:pPr marL="68580" indent="0">
+              <a:buNone/>
+            </a:pPr>
+            <a:endParaRPr lang="en-US" dirty="0"/>
+          </a:p>
+          <a:p>
+            <a:pPr marL="68580" indent="0">
+              <a:buNone/>
+            </a:pPr>
+            <a:r>
+              <a:rPr lang="en-US" dirty="0" smtClean="0"/>
+              <a:t>Sports/Fitness: 	</a:t>
+            </a:r>
+            <a:endParaRPr lang="en-US" dirty="0" smtClean="0"/>
+          </a:p>
+        </p:txBody>
+      </p:sp>
+      <p:graphicFrame>
+        <p:nvGraphicFramePr>
+          <p:cNvPr id="4" name="Chart 3"/>
+          <p:cNvGraphicFramePr/>
+          <p:nvPr>
+            <p:extLst>
+              <p:ext uri="{D42A27DB-BD31-4B8C-83A1-F6EECF244321}">
+                <p14:modId xmlns:p14="http://schemas.microsoft.com/office/powerpoint/2010/main" val="1752859790"/>
+              </p:ext>
+            </p:extLst>
+          </p:nvPr>
+        </p:nvGraphicFramePr>
+        <p:xfrm>
+          <a:off x="2667000" y="1828800"/>
+          <a:ext cx="6096000" cy="1955800"/>
+        </p:xfrm>
+        <a:graphic>
+          <a:graphicData uri="http://schemas.openxmlformats.org/drawingml/2006/chart">
+            <c:chart xmlns:c="http://schemas.openxmlformats.org/drawingml/2006/chart" xmlns:r="http://schemas.openxmlformats.org/officeDocument/2006/relationships" r:id="rId3"/>
+          </a:graphicData>
+        </a:graphic>
+      </p:graphicFrame>
+      <p:graphicFrame>
+        <p:nvGraphicFramePr>
+          <p:cNvPr id="7" name="Chart 6"/>
+          <p:cNvGraphicFramePr/>
+          <p:nvPr>
+            <p:extLst>
+              <p:ext uri="{D42A27DB-BD31-4B8C-83A1-F6EECF244321}">
+                <p14:modId xmlns:p14="http://schemas.microsoft.com/office/powerpoint/2010/main" val="1258966106"/>
+              </p:ext>
+            </p:extLst>
+          </p:nvPr>
+        </p:nvGraphicFramePr>
+        <p:xfrm>
+          <a:off x="961571" y="3962400"/>
+          <a:ext cx="8153400" cy="2032000"/>
+        </p:xfrm>
+        <a:graphic>
+          <a:graphicData uri="http://schemas.openxmlformats.org/drawingml/2006/chart">
+            <c:chart xmlns:c="http://schemas.openxmlformats.org/drawingml/2006/chart" xmlns:r="http://schemas.openxmlformats.org/officeDocument/2006/relationships" r:id="rId4"/>
+          </a:graphicData>
+        </a:graphic>
+      </p:graphicFrame>
+    </p:spTree>
+    <p:extLst>
+      <p:ext uri="{BB962C8B-B14F-4D97-AF65-F5344CB8AC3E}">
+        <p14:creationId xmlns:p14="http://schemas.microsoft.com/office/powerpoint/2010/main" val="3549979478"/>
+      </p:ext>
+    </p:extLst>
+  </p:cSld>
+  <p:clrMapOvr>
+    <a:masterClrMapping/>
+  </p:clrMapOvr>
+</p:sld>
+</file>
+
+<file path=ppt/slides/slide11.xml><?xml version="1.0" encoding="utf-8"?>
+<p:sld xmlns:a="http://schemas.openxmlformats.org/drawingml/2006/main" xmlns:r="http://schemas.openxmlformats.org/officeDocument/2006/relationships" xmlns:p="http://schemas.openxmlformats.org/presentationml/2006/main">
+  <p:cSld>
+    <p:spTree>
+      <p:nvGrpSpPr>
+        <p:cNvPr id="1" name=""/>
+        <p:cNvGrpSpPr/>
+        <p:nvPr/>
+      </p:nvGrpSpPr>
+      <p:grpSpPr>
+        <a:xfrm>
+          <a:off x="0" y="0"/>
+          <a:ext cx="0" cy="0"/>
+          <a:chOff x="0" y="0"/>
+          <a:chExt cx="0" cy="0"/>
+        </a:xfrm>
+      </p:grpSpPr>
+      <p:sp>
+        <p:nvSpPr>
+          <p:cNvPr id="2" name="Title 1"/>
+          <p:cNvSpPr>
+            <a:spLocks noGrp="1"/>
+          </p:cNvSpPr>
+          <p:nvPr>
+            <p:ph type="title"/>
+          </p:nvPr>
+        </p:nvSpPr>
+        <p:spPr/>
+        <p:txBody>
+          <a:bodyPr/>
+          <a:lstStyle/>
+          <a:p>
+            <a:r>
+              <a:rPr lang="en-US" dirty="0" smtClean="0"/>
+              <a:t>Experimental Results</a:t>
+            </a:r>
+            <a:endParaRPr lang="en-US" dirty="0"/>
+          </a:p>
+        </p:txBody>
+      </p:sp>
+      <p:sp>
+        <p:nvSpPr>
+          <p:cNvPr id="3" name="Content Placeholder 2"/>
+          <p:cNvSpPr>
+            <a:spLocks noGrp="1"/>
+          </p:cNvSpPr>
+          <p:nvPr>
+            <p:ph idx="1"/>
+          </p:nvPr>
+        </p:nvSpPr>
+        <p:spPr>
+          <a:xfrm>
+            <a:off x="685800" y="1447800"/>
+            <a:ext cx="7772400" cy="3733800"/>
+          </a:xfrm>
+        </p:spPr>
+        <p:txBody>
+          <a:bodyPr>
+            <a:normAutofit/>
+          </a:bodyPr>
+          <a:lstStyle/>
+          <a:p>
+            <a:pPr marL="68580" indent="0">
+              <a:buNone/>
+            </a:pPr>
+            <a:r>
+              <a:rPr lang="en-US" dirty="0" smtClean="0"/>
+              <a:t>Gaming: Will the game experience change with location </a:t>
+            </a:r>
+            <a:r>
+              <a:rPr lang="en-US" dirty="0" err="1" smtClean="0"/>
+              <a:t>anonymization</a:t>
+            </a:r>
+            <a:endParaRPr lang="en-US" dirty="0"/>
+          </a:p>
+          <a:p>
+            <a:pPr marL="68580" indent="0">
+              <a:buNone/>
+            </a:pPr>
+            <a:endParaRPr lang="en-US" dirty="0" smtClean="0"/>
+          </a:p>
+          <a:p>
+            <a:pPr marL="68580" indent="0">
+              <a:buNone/>
+            </a:pPr>
+            <a:endParaRPr lang="en-US" dirty="0"/>
+          </a:p>
+          <a:p>
+            <a:pPr marL="68580" indent="0">
+              <a:buNone/>
+            </a:pPr>
+            <a:endParaRPr lang="en-US" dirty="0" smtClean="0"/>
+          </a:p>
+          <a:p>
+            <a:pPr marL="68580" indent="0">
+              <a:buNone/>
+            </a:pPr>
+            <a:endParaRPr lang="en-US" dirty="0"/>
+          </a:p>
+          <a:p>
+            <a:pPr marL="68580" indent="0">
+              <a:buNone/>
+            </a:pPr>
+            <a:endParaRPr lang="en-US" dirty="0" smtClean="0"/>
+          </a:p>
+          <a:p>
+            <a:pPr marL="68580" indent="0">
+              <a:buNone/>
+            </a:pPr>
+            <a:r>
+              <a:rPr lang="en-US" dirty="0" smtClean="0"/>
+              <a:t>Weather:  Over half indicated weather information would not change at city level	</a:t>
+            </a:r>
+            <a:endParaRPr lang="en-US" dirty="0" smtClean="0"/>
+          </a:p>
+        </p:txBody>
+      </p:sp>
+      <p:graphicFrame>
+        <p:nvGraphicFramePr>
+          <p:cNvPr id="5" name="Chart 4"/>
+          <p:cNvGraphicFramePr/>
+          <p:nvPr>
+            <p:extLst>
+              <p:ext uri="{D42A27DB-BD31-4B8C-83A1-F6EECF244321}">
+                <p14:modId xmlns:p14="http://schemas.microsoft.com/office/powerpoint/2010/main" val="1140040108"/>
+              </p:ext>
+            </p:extLst>
+          </p:nvPr>
+        </p:nvGraphicFramePr>
+        <p:xfrm>
+          <a:off x="2590800" y="1752600"/>
+          <a:ext cx="6096000" cy="2108200"/>
+        </p:xfrm>
+        <a:graphic>
+          <a:graphicData uri="http://schemas.openxmlformats.org/drawingml/2006/chart">
+            <c:chart xmlns:c="http://schemas.openxmlformats.org/drawingml/2006/chart" xmlns:r="http://schemas.openxmlformats.org/officeDocument/2006/relationships" r:id="rId3"/>
+          </a:graphicData>
+        </a:graphic>
+      </p:graphicFrame>
+    </p:spTree>
+    <p:extLst>
+      <p:ext uri="{BB962C8B-B14F-4D97-AF65-F5344CB8AC3E}">
+        <p14:creationId xmlns:p14="http://schemas.microsoft.com/office/powerpoint/2010/main" val="2060373583"/>
+      </p:ext>
+    </p:extLst>
+  </p:cSld>
+  <p:clrMapOvr>
+    <a:masterClrMapping/>
+  </p:clrMapOvr>
+</p:sld>
+</file>
+
+<file path=ppt/slides/slide12.xml><?xml version="1.0" encoding="utf-8"?>
+<p:sld xmlns:a="http://schemas.openxmlformats.org/drawingml/2006/main" xmlns:r="http://schemas.openxmlformats.org/officeDocument/2006/relationships" xmlns:p="http://schemas.openxmlformats.org/presentationml/2006/main">
+  <p:cSld>
+    <p:spTree>
+      <p:nvGrpSpPr>
+        <p:cNvPr id="1" name=""/>
+        <p:cNvGrpSpPr/>
+        <p:nvPr/>
+      </p:nvGrpSpPr>
+      <p:grpSpPr>
+        <a:xfrm>
+          <a:off x="0" y="0"/>
+          <a:ext cx="0" cy="0"/>
+          <a:chOff x="0" y="0"/>
+          <a:chExt cx="0" cy="0"/>
+        </a:xfrm>
+      </p:grpSpPr>
+      <p:sp>
+        <p:nvSpPr>
+          <p:cNvPr id="2" name="Title 1"/>
+          <p:cNvSpPr>
+            <a:spLocks noGrp="1"/>
+          </p:cNvSpPr>
+          <p:nvPr>
+            <p:ph type="title"/>
+          </p:nvPr>
+        </p:nvSpPr>
+        <p:spPr/>
+        <p:txBody>
+          <a:bodyPr/>
+          <a:lstStyle/>
+          <a:p>
+            <a:r>
+              <a:rPr lang="en-US" dirty="0" smtClean="0"/>
+              <a:t>Experimental Results</a:t>
+            </a:r>
+            <a:endParaRPr lang="en-US" dirty="0"/>
+          </a:p>
+        </p:txBody>
+      </p:sp>
+      <p:sp>
+        <p:nvSpPr>
+          <p:cNvPr id="3" name="Content Placeholder 2"/>
+          <p:cNvSpPr>
+            <a:spLocks noGrp="1"/>
+          </p:cNvSpPr>
+          <p:nvPr>
+            <p:ph idx="1"/>
+          </p:nvPr>
+        </p:nvSpPr>
+        <p:spPr>
+          <a:xfrm>
+            <a:off x="685800" y="1447800"/>
+            <a:ext cx="7772400" cy="3733800"/>
+          </a:xfrm>
+        </p:spPr>
+        <p:txBody>
+          <a:bodyPr/>
+          <a:lstStyle/>
+          <a:p>
+            <a:pPr marL="68580" indent="0">
+              <a:buNone/>
+            </a:pPr>
+            <a:r>
+              <a:rPr lang="en-US" dirty="0" smtClean="0"/>
+              <a:t>Delay Overhead</a:t>
+            </a:r>
+          </a:p>
+          <a:p>
+            <a:r>
+              <a:rPr lang="en-US" dirty="0" smtClean="0"/>
+              <a:t>Delay between time the location is created and the time the modified location is delivered to the app.</a:t>
+            </a:r>
+            <a:endParaRPr lang="en-US" dirty="0"/>
+          </a:p>
+        </p:txBody>
+      </p:sp>
+      <p:pic>
+        <p:nvPicPr>
+          <p:cNvPr id="2050" name="Picture 2"/>
+          <p:cNvPicPr>
+            <a:picLocks noChangeArrowheads="1"/>
+          </p:cNvPicPr>
+          <p:nvPr/>
+        </p:nvPicPr>
+        <p:blipFill>
+          <a:blip r:embed="rId3">
+            <a:extLst>
+              <a:ext uri="{28A0092B-C50C-407E-A947-70E740481C1C}">
+                <a14:useLocalDpi xmlns:a14="http://schemas.microsoft.com/office/drawing/2010/main" val="0"/>
+              </a:ext>
+            </a:extLst>
+          </a:blip>
+          <a:srcRect/>
+          <a:stretch>
+            <a:fillRect/>
+          </a:stretch>
+        </p:blipFill>
+        <p:spPr bwMode="auto">
+          <a:xfrm>
+            <a:off x="502920" y="2590800"/>
+            <a:ext cx="2468880" cy="2926080"/>
+          </a:xfrm>
+          <a:prstGeom prst="rect">
+            <a:avLst/>
+          </a:prstGeom>
+          <a:noFill/>
+          <a:ln>
+            <a:noFill/>
+          </a:ln>
+          <a:extLst>
+            <a:ext uri="{909E8E84-426E-40DD-AFC4-6F175D3DCCD1}">
+              <a14:hiddenFill xmlns:a14="http://schemas.microsoft.com/office/drawing/2010/main">
+                <a:solidFill>
+                  <a:schemeClr val="accent1"/>
+                </a:solidFill>
+              </a14:hiddenFill>
+            </a:ext>
+            <a:ext uri="{91240B29-F687-4F45-9708-019B960494DF}">
+              <a14:hiddenLine xmlns:a14="http://schemas.microsoft.com/office/drawing/2010/main" w="9525">
+                <a:solidFill>
+                  <a:schemeClr val="tx1"/>
+                </a:solidFill>
+                <a:miter lim="800000"/>
+                <a:headEnd/>
+                <a:tailEnd/>
+              </a14:hiddenLine>
+            </a:ext>
+          </a:extLst>
+        </p:spPr>
+      </p:pic>
+      <p:pic>
+        <p:nvPicPr>
+          <p:cNvPr id="2051" name="Picture 3"/>
+          <p:cNvPicPr>
+            <a:picLocks noChangeArrowheads="1"/>
+          </p:cNvPicPr>
+          <p:nvPr/>
+        </p:nvPicPr>
+        <p:blipFill>
+          <a:blip r:embed="rId4">
+            <a:extLst>
+              <a:ext uri="{28A0092B-C50C-407E-A947-70E740481C1C}">
+                <a14:useLocalDpi xmlns:a14="http://schemas.microsoft.com/office/drawing/2010/main" val="0"/>
+              </a:ext>
+            </a:extLst>
+          </a:blip>
+          <a:srcRect/>
+          <a:stretch>
+            <a:fillRect/>
+          </a:stretch>
+        </p:blipFill>
+        <p:spPr bwMode="auto">
+          <a:xfrm>
+            <a:off x="3398520" y="2590799"/>
+            <a:ext cx="2468880" cy="2926080"/>
+          </a:xfrm>
+          <a:prstGeom prst="rect">
+            <a:avLst/>
+          </a:prstGeom>
+          <a:noFill/>
+          <a:ln>
+            <a:noFill/>
+          </a:ln>
+          <a:extLst>
+            <a:ext uri="{909E8E84-426E-40DD-AFC4-6F175D3DCCD1}">
+              <a14:hiddenFill xmlns:a14="http://schemas.microsoft.com/office/drawing/2010/main">
+                <a:solidFill>
+                  <a:schemeClr val="accent1"/>
+                </a:solidFill>
+              </a14:hiddenFill>
+            </a:ext>
+            <a:ext uri="{91240B29-F687-4F45-9708-019B960494DF}">
+              <a14:hiddenLine xmlns:a14="http://schemas.microsoft.com/office/drawing/2010/main" w="9525">
+                <a:solidFill>
+                  <a:schemeClr val="tx1"/>
+                </a:solidFill>
+                <a:miter lim="800000"/>
+                <a:headEnd/>
+                <a:tailEnd/>
+              </a14:hiddenLine>
+            </a:ext>
+          </a:extLst>
+        </p:spPr>
+      </p:pic>
+      <p:pic>
+        <p:nvPicPr>
+          <p:cNvPr id="2052" name="Picture 4"/>
+          <p:cNvPicPr>
+            <a:picLocks noChangeArrowheads="1"/>
+          </p:cNvPicPr>
+          <p:nvPr/>
+        </p:nvPicPr>
+        <p:blipFill>
+          <a:blip r:embed="rId5">
+            <a:extLst>
+              <a:ext uri="{28A0092B-C50C-407E-A947-70E740481C1C}">
+                <a14:useLocalDpi xmlns:a14="http://schemas.microsoft.com/office/drawing/2010/main" val="0"/>
+              </a:ext>
+            </a:extLst>
+          </a:blip>
+          <a:srcRect/>
+          <a:stretch>
+            <a:fillRect/>
+          </a:stretch>
+        </p:blipFill>
+        <p:spPr bwMode="auto">
+          <a:xfrm>
+            <a:off x="6248399" y="2600325"/>
+            <a:ext cx="2468880" cy="2926080"/>
+          </a:xfrm>
+          <a:prstGeom prst="rect">
+            <a:avLst/>
+          </a:prstGeom>
+          <a:noFill/>
+          <a:ln>
+            <a:noFill/>
+          </a:ln>
+          <a:extLst>
+            <a:ext uri="{909E8E84-426E-40DD-AFC4-6F175D3DCCD1}">
+              <a14:hiddenFill xmlns:a14="http://schemas.microsoft.com/office/drawing/2010/main">
+                <a:solidFill>
+                  <a:schemeClr val="accent1"/>
+                </a:solidFill>
+              </a14:hiddenFill>
+            </a:ext>
+            <a:ext uri="{91240B29-F687-4F45-9708-019B960494DF}">
+              <a14:hiddenLine xmlns:a14="http://schemas.microsoft.com/office/drawing/2010/main" w="9525">
+                <a:solidFill>
+                  <a:schemeClr val="tx1"/>
+                </a:solidFill>
+                <a:miter lim="800000"/>
+                <a:headEnd/>
+                <a:tailEnd/>
+              </a14:hiddenLine>
+            </a:ext>
+          </a:extLst>
+        </p:spPr>
+      </p:pic>
+      <p:sp>
+        <p:nvSpPr>
+          <p:cNvPr id="13" name="TextBox 12"/>
+          <p:cNvSpPr txBox="1"/>
+          <p:nvPr/>
+        </p:nvSpPr>
+        <p:spPr>
+          <a:xfrm>
+            <a:off x="746760" y="5638800"/>
+            <a:ext cx="1981200" cy="381000"/>
+          </a:xfrm>
+          <a:prstGeom prst="rect">
+            <a:avLst/>
+          </a:prstGeom>
+          <a:solidFill>
+            <a:schemeClr val="tx1"/>
+          </a:solidFill>
+        </p:spPr>
+        <p:txBody>
+          <a:bodyPr wrap="square" rtlCol="0">
+            <a:spAutoFit/>
+          </a:bodyPr>
+          <a:lstStyle/>
+          <a:p>
+            <a:pPr algn="ctr"/>
+            <a:r>
+              <a:rPr lang="en-US" dirty="0" smtClean="0">
+                <a:solidFill>
+                  <a:schemeClr val="bg1"/>
+                </a:solidFill>
+              </a:rPr>
+              <a:t>Galaxy Nexus</a:t>
+            </a:r>
+            <a:endParaRPr lang="en-US" dirty="0">
+              <a:solidFill>
+                <a:schemeClr val="bg1"/>
+              </a:solidFill>
+            </a:endParaRPr>
+          </a:p>
+        </p:txBody>
+      </p:sp>
+      <p:sp>
+        <p:nvSpPr>
+          <p:cNvPr id="14" name="TextBox 13"/>
+          <p:cNvSpPr txBox="1"/>
+          <p:nvPr/>
+        </p:nvSpPr>
+        <p:spPr>
+          <a:xfrm>
+            <a:off x="3642360" y="5638800"/>
+            <a:ext cx="1981200" cy="381000"/>
+          </a:xfrm>
+          <a:prstGeom prst="rect">
+            <a:avLst/>
+          </a:prstGeom>
+          <a:solidFill>
+            <a:schemeClr val="tx1"/>
+          </a:solidFill>
+        </p:spPr>
+        <p:txBody>
+          <a:bodyPr wrap="square" rtlCol="0">
+            <a:spAutoFit/>
+          </a:bodyPr>
+          <a:lstStyle/>
+          <a:p>
+            <a:pPr algn="ctr"/>
+            <a:r>
+              <a:rPr lang="en-US" dirty="0" smtClean="0">
+                <a:solidFill>
+                  <a:schemeClr val="bg1"/>
+                </a:solidFill>
+              </a:rPr>
+              <a:t>Galaxy S3</a:t>
+            </a:r>
+            <a:endParaRPr lang="en-US" dirty="0">
+              <a:solidFill>
+                <a:schemeClr val="bg1"/>
+              </a:solidFill>
+            </a:endParaRPr>
+          </a:p>
+        </p:txBody>
+      </p:sp>
+      <p:sp>
+        <p:nvSpPr>
+          <p:cNvPr id="15" name="TextBox 14"/>
+          <p:cNvSpPr txBox="1"/>
+          <p:nvPr/>
+        </p:nvSpPr>
+        <p:spPr>
+          <a:xfrm>
+            <a:off x="6492239" y="5638800"/>
+            <a:ext cx="1981200" cy="381000"/>
+          </a:xfrm>
+          <a:prstGeom prst="rect">
+            <a:avLst/>
+          </a:prstGeom>
+          <a:solidFill>
+            <a:schemeClr val="tx1"/>
+          </a:solidFill>
+        </p:spPr>
+        <p:txBody>
+          <a:bodyPr wrap="square" rtlCol="0">
+            <a:spAutoFit/>
+          </a:bodyPr>
+          <a:lstStyle/>
+          <a:p>
+            <a:pPr algn="ctr"/>
+            <a:r>
+              <a:rPr lang="en-US" dirty="0" smtClean="0">
+                <a:solidFill>
+                  <a:schemeClr val="bg1"/>
+                </a:solidFill>
+              </a:rPr>
+              <a:t>Galaxy S4</a:t>
+            </a:r>
+            <a:endParaRPr lang="en-US" dirty="0">
+              <a:solidFill>
+                <a:schemeClr val="bg1"/>
+              </a:solidFill>
+            </a:endParaRPr>
+          </a:p>
+        </p:txBody>
+      </p:sp>
+    </p:spTree>
+    <p:extLst>
+      <p:ext uri="{BB962C8B-B14F-4D97-AF65-F5344CB8AC3E}">
+        <p14:creationId xmlns:p14="http://schemas.microsoft.com/office/powerpoint/2010/main" val="4162862579"/>
+      </p:ext>
+    </p:extLst>
+  </p:cSld>
+  <p:clrMapOvr>
+    <a:masterClrMapping/>
+  </p:clrMapOvr>
+</p:sld>
+</file>
+
+<file path=ppt/slides/slide13.xml><?xml version="1.0" encoding="utf-8"?>
+<p:sld xmlns:a="http://schemas.openxmlformats.org/drawingml/2006/main" xmlns:r="http://schemas.openxmlformats.org/officeDocument/2006/relationships" xmlns:p="http://schemas.openxmlformats.org/presentationml/2006/main">
+  <p:cSld>
+    <p:spTree>
+      <p:nvGrpSpPr>
+        <p:cNvPr id="1" name=""/>
+        <p:cNvGrpSpPr/>
+        <p:nvPr/>
+      </p:nvGrpSpPr>
+      <p:grpSpPr>
+        <a:xfrm>
+          <a:off x="0" y="0"/>
+          <a:ext cx="0" cy="0"/>
+          <a:chOff x="0" y="0"/>
+          <a:chExt cx="0" cy="0"/>
+        </a:xfrm>
+      </p:grpSpPr>
+      <p:sp>
+        <p:nvSpPr>
+          <p:cNvPr id="2" name="Title 1"/>
+          <p:cNvSpPr>
+            <a:spLocks noGrp="1"/>
+          </p:cNvSpPr>
+          <p:nvPr>
+            <p:ph type="title"/>
+          </p:nvPr>
+        </p:nvSpPr>
+        <p:spPr/>
+        <p:txBody>
+          <a:bodyPr/>
+          <a:lstStyle/>
+          <a:p>
+            <a:r>
+              <a:rPr lang="en-US" dirty="0" smtClean="0"/>
+              <a:t>Experimental Results</a:t>
+            </a:r>
+            <a:endParaRPr lang="en-US" dirty="0"/>
+          </a:p>
+        </p:txBody>
+      </p:sp>
+      <p:sp>
+        <p:nvSpPr>
+          <p:cNvPr id="3" name="Content Placeholder 2"/>
+          <p:cNvSpPr>
+            <a:spLocks noGrp="1"/>
+          </p:cNvSpPr>
+          <p:nvPr>
+            <p:ph idx="1"/>
+          </p:nvPr>
+        </p:nvSpPr>
+        <p:spPr>
+          <a:xfrm>
+            <a:off x="685800" y="1447800"/>
+            <a:ext cx="7772400" cy="3733800"/>
+          </a:xfrm>
+        </p:spPr>
+        <p:txBody>
+          <a:bodyPr/>
+          <a:lstStyle/>
+          <a:p>
+            <a:pPr marL="68580" indent="0">
+              <a:buNone/>
+            </a:pPr>
+            <a:r>
+              <a:rPr lang="en-US" dirty="0" smtClean="0"/>
+              <a:t>Battery Performance</a:t>
+            </a:r>
+          </a:p>
+          <a:p>
+            <a:r>
+              <a:rPr lang="en-US" dirty="0" smtClean="0"/>
+              <a:t>No significant drop in battery time with use of LP-Guardian</a:t>
+            </a:r>
+            <a:endParaRPr lang="en-US" dirty="0"/>
+          </a:p>
+        </p:txBody>
+      </p:sp>
+      <p:pic>
+        <p:nvPicPr>
+          <p:cNvPr id="1026" name="Picture 2"/>
+          <p:cNvPicPr>
+            <a:picLocks noChangeArrowheads="1"/>
+          </p:cNvPicPr>
+          <p:nvPr/>
+        </p:nvPicPr>
+        <p:blipFill>
+          <a:blip r:embed="rId3">
+            <a:extLst>
+              <a:ext uri="{28A0092B-C50C-407E-A947-70E740481C1C}">
+                <a14:useLocalDpi xmlns:a14="http://schemas.microsoft.com/office/drawing/2010/main" val="0"/>
+              </a:ext>
+            </a:extLst>
+          </a:blip>
+          <a:srcRect/>
+          <a:stretch>
+            <a:fillRect/>
+          </a:stretch>
+        </p:blipFill>
+        <p:spPr bwMode="auto">
+          <a:xfrm>
+            <a:off x="609600" y="2667000"/>
+            <a:ext cx="2468880" cy="2926080"/>
+          </a:xfrm>
+          <a:prstGeom prst="rect">
+            <a:avLst/>
+          </a:prstGeom>
+          <a:noFill/>
+          <a:ln>
+            <a:noFill/>
+          </a:ln>
+          <a:extLst>
+            <a:ext uri="{909E8E84-426E-40DD-AFC4-6F175D3DCCD1}">
+              <a14:hiddenFill xmlns:a14="http://schemas.microsoft.com/office/drawing/2010/main">
+                <a:solidFill>
+                  <a:schemeClr val="accent1"/>
+                </a:solidFill>
+              </a14:hiddenFill>
+            </a:ext>
+            <a:ext uri="{91240B29-F687-4F45-9708-019B960494DF}">
+              <a14:hiddenLine xmlns:a14="http://schemas.microsoft.com/office/drawing/2010/main" w="9525">
+                <a:solidFill>
+                  <a:schemeClr val="tx1"/>
+                </a:solidFill>
+                <a:miter lim="800000"/>
+                <a:headEnd/>
+                <a:tailEnd/>
+              </a14:hiddenLine>
+            </a:ext>
+          </a:extLst>
+        </p:spPr>
+      </p:pic>
+      <p:pic>
+        <p:nvPicPr>
+          <p:cNvPr id="1027" name="Picture 3"/>
+          <p:cNvPicPr>
+            <a:picLocks noChangeArrowheads="1"/>
+          </p:cNvPicPr>
+          <p:nvPr/>
+        </p:nvPicPr>
+        <p:blipFill>
+          <a:blip r:embed="rId4">
+            <a:extLst>
+              <a:ext uri="{28A0092B-C50C-407E-A947-70E740481C1C}">
+                <a14:useLocalDpi xmlns:a14="http://schemas.microsoft.com/office/drawing/2010/main" val="0"/>
+              </a:ext>
+            </a:extLst>
+          </a:blip>
+          <a:srcRect/>
+          <a:stretch>
+            <a:fillRect/>
+          </a:stretch>
+        </p:blipFill>
+        <p:spPr bwMode="auto">
+          <a:xfrm>
+            <a:off x="3352800" y="2667000"/>
+            <a:ext cx="2468880" cy="2926080"/>
+          </a:xfrm>
+          <a:prstGeom prst="rect">
+            <a:avLst/>
+          </a:prstGeom>
+          <a:noFill/>
+          <a:ln>
+            <a:noFill/>
+          </a:ln>
+          <a:extLst>
+            <a:ext uri="{909E8E84-426E-40DD-AFC4-6F175D3DCCD1}">
+              <a14:hiddenFill xmlns:a14="http://schemas.microsoft.com/office/drawing/2010/main">
+                <a:solidFill>
+                  <a:schemeClr val="accent1"/>
+                </a:solidFill>
+              </a14:hiddenFill>
+            </a:ext>
+            <a:ext uri="{91240B29-F687-4F45-9708-019B960494DF}">
+              <a14:hiddenLine xmlns:a14="http://schemas.microsoft.com/office/drawing/2010/main" w="9525">
+                <a:solidFill>
+                  <a:schemeClr val="tx1"/>
+                </a:solidFill>
+                <a:miter lim="800000"/>
+                <a:headEnd/>
+                <a:tailEnd/>
+              </a14:hiddenLine>
+            </a:ext>
+          </a:extLst>
+        </p:spPr>
+      </p:pic>
+      <p:pic>
+        <p:nvPicPr>
+          <p:cNvPr id="1028" name="Picture 4"/>
+          <p:cNvPicPr>
+            <a:picLocks noChangeArrowheads="1"/>
+          </p:cNvPicPr>
+          <p:nvPr/>
+        </p:nvPicPr>
+        <p:blipFill>
+          <a:blip r:embed="rId5">
+            <a:extLst>
+              <a:ext uri="{28A0092B-C50C-407E-A947-70E740481C1C}">
+                <a14:useLocalDpi xmlns:a14="http://schemas.microsoft.com/office/drawing/2010/main" val="0"/>
+              </a:ext>
+            </a:extLst>
+          </a:blip>
+          <a:srcRect/>
+          <a:stretch>
+            <a:fillRect/>
+          </a:stretch>
+        </p:blipFill>
+        <p:spPr bwMode="auto">
+          <a:xfrm>
+            <a:off x="6126480" y="2667000"/>
+            <a:ext cx="2468880" cy="2926080"/>
+          </a:xfrm>
+          <a:prstGeom prst="rect">
+            <a:avLst/>
+          </a:prstGeom>
+          <a:noFill/>
+          <a:ln>
+            <a:noFill/>
+          </a:ln>
+          <a:extLst>
+            <a:ext uri="{909E8E84-426E-40DD-AFC4-6F175D3DCCD1}">
+              <a14:hiddenFill xmlns:a14="http://schemas.microsoft.com/office/drawing/2010/main">
+                <a:solidFill>
+                  <a:schemeClr val="accent1"/>
+                </a:solidFill>
+              </a14:hiddenFill>
+            </a:ext>
+            <a:ext uri="{91240B29-F687-4F45-9708-019B960494DF}">
+              <a14:hiddenLine xmlns:a14="http://schemas.microsoft.com/office/drawing/2010/main" w="9525">
+                <a:solidFill>
+                  <a:schemeClr val="tx1"/>
+                </a:solidFill>
+                <a:miter lim="800000"/>
+                <a:headEnd/>
+                <a:tailEnd/>
+              </a14:hiddenLine>
+            </a:ext>
+          </a:extLst>
+        </p:spPr>
+      </p:pic>
+      <p:sp>
+        <p:nvSpPr>
+          <p:cNvPr id="4" name="TextBox 3"/>
+          <p:cNvSpPr txBox="1"/>
+          <p:nvPr/>
+        </p:nvSpPr>
+        <p:spPr>
+          <a:xfrm>
+            <a:off x="857265" y="5715000"/>
+            <a:ext cx="1981200" cy="381000"/>
+          </a:xfrm>
+          <a:prstGeom prst="rect">
+            <a:avLst/>
+          </a:prstGeom>
+          <a:solidFill>
+            <a:schemeClr val="tx1"/>
+          </a:solidFill>
+        </p:spPr>
+        <p:txBody>
+          <a:bodyPr wrap="square" rtlCol="0">
+            <a:spAutoFit/>
+          </a:bodyPr>
+          <a:lstStyle/>
+          <a:p>
+            <a:pPr algn="ctr"/>
+            <a:r>
+              <a:rPr lang="en-US" dirty="0" smtClean="0">
+                <a:solidFill>
+                  <a:schemeClr val="bg1"/>
+                </a:solidFill>
+              </a:rPr>
+              <a:t>Galaxy Nexus</a:t>
+            </a:r>
+            <a:endParaRPr lang="en-US" dirty="0">
+              <a:solidFill>
+                <a:schemeClr val="bg1"/>
+              </a:solidFill>
+            </a:endParaRPr>
+          </a:p>
+        </p:txBody>
+      </p:sp>
+      <p:sp>
+        <p:nvSpPr>
+          <p:cNvPr id="8" name="TextBox 7"/>
+          <p:cNvSpPr txBox="1"/>
+          <p:nvPr/>
+        </p:nvSpPr>
+        <p:spPr>
+          <a:xfrm>
+            <a:off x="3624262" y="5715000"/>
+            <a:ext cx="1981200" cy="381000"/>
+          </a:xfrm>
+          <a:prstGeom prst="rect">
+            <a:avLst/>
+          </a:prstGeom>
+          <a:solidFill>
+            <a:schemeClr val="tx1"/>
+          </a:solidFill>
+        </p:spPr>
+        <p:txBody>
+          <a:bodyPr wrap="square" rtlCol="0">
+            <a:spAutoFit/>
+          </a:bodyPr>
+          <a:lstStyle/>
+          <a:p>
+            <a:pPr algn="ctr"/>
+            <a:r>
+              <a:rPr lang="en-US" dirty="0" smtClean="0">
+                <a:solidFill>
+                  <a:schemeClr val="bg1"/>
+                </a:solidFill>
+              </a:rPr>
+              <a:t>Galaxy S3</a:t>
+            </a:r>
+            <a:endParaRPr lang="en-US" dirty="0">
+              <a:solidFill>
+                <a:schemeClr val="bg1"/>
+              </a:solidFill>
+            </a:endParaRPr>
+          </a:p>
+        </p:txBody>
+      </p:sp>
+      <p:sp>
+        <p:nvSpPr>
+          <p:cNvPr id="9" name="TextBox 8"/>
+          <p:cNvSpPr txBox="1"/>
+          <p:nvPr/>
+        </p:nvSpPr>
+        <p:spPr>
+          <a:xfrm>
+            <a:off x="6307455" y="5715000"/>
+            <a:ext cx="1981200" cy="381000"/>
+          </a:xfrm>
+          <a:prstGeom prst="rect">
+            <a:avLst/>
+          </a:prstGeom>
+          <a:solidFill>
+            <a:schemeClr val="tx1"/>
+          </a:solidFill>
+        </p:spPr>
+        <p:txBody>
+          <a:bodyPr wrap="square" rtlCol="0">
+            <a:spAutoFit/>
+          </a:bodyPr>
+          <a:lstStyle/>
+          <a:p>
+            <a:pPr algn="ctr"/>
+            <a:r>
+              <a:rPr lang="en-US" dirty="0" smtClean="0">
+                <a:solidFill>
+                  <a:schemeClr val="bg1"/>
+                </a:solidFill>
+              </a:rPr>
+              <a:t>Galaxy S4</a:t>
+            </a:r>
+            <a:endParaRPr lang="en-US" dirty="0">
+              <a:solidFill>
+                <a:schemeClr val="bg1"/>
+              </a:solidFill>
+            </a:endParaRPr>
+          </a:p>
+        </p:txBody>
+      </p:sp>
+    </p:spTree>
+    <p:extLst>
+      <p:ext uri="{BB962C8B-B14F-4D97-AF65-F5344CB8AC3E}">
+        <p14:creationId xmlns:p14="http://schemas.microsoft.com/office/powerpoint/2010/main" val="258543808"/>
+      </p:ext>
+    </p:extLst>
+  </p:cSld>
+  <p:clrMapOvr>
+    <a:masterClrMapping/>
+  </p:clrMapOvr>
+</p:sld>
+</file>
+
+<file path=ppt/slides/slide14.xml><?xml version="1.0" encoding="utf-8"?>
+<p:sld xmlns:a="http://schemas.openxmlformats.org/drawingml/2006/main" xmlns:r="http://schemas.openxmlformats.org/officeDocument/2006/relationships" xmlns:p="http://schemas.openxmlformats.org/presentationml/2006/main">
+  <p:cSld>
+    <p:spTree>
+      <p:nvGrpSpPr>
+        <p:cNvPr id="1" name=""/>
+        <p:cNvGrpSpPr/>
+        <p:nvPr/>
+      </p:nvGrpSpPr>
+      <p:grpSpPr>
+        <a:xfrm>
+          <a:off x="0" y="0"/>
+          <a:ext cx="0" cy="0"/>
+          <a:chOff x="0" y="0"/>
+          <a:chExt cx="0" cy="0"/>
+        </a:xfrm>
+      </p:grpSpPr>
+      <p:sp>
+        <p:nvSpPr>
+          <p:cNvPr id="2" name="Title 1"/>
+          <p:cNvSpPr>
+            <a:spLocks noGrp="1"/>
+          </p:cNvSpPr>
+          <p:nvPr>
+            <p:ph type="title"/>
+          </p:nvPr>
+        </p:nvSpPr>
+        <p:spPr/>
+        <p:txBody>
+          <a:bodyPr/>
+          <a:lstStyle/>
+          <a:p>
+            <a:r>
+              <a:rPr lang="en-US" dirty="0" smtClean="0"/>
+              <a:t>Experimental Results</a:t>
+            </a:r>
+            <a:endParaRPr lang="en-US" dirty="0"/>
+          </a:p>
+        </p:txBody>
+      </p:sp>
+      <p:sp>
+        <p:nvSpPr>
+          <p:cNvPr id="3" name="Content Placeholder 2"/>
+          <p:cNvSpPr>
+            <a:spLocks noGrp="1"/>
+          </p:cNvSpPr>
+          <p:nvPr>
+            <p:ph idx="1"/>
+          </p:nvPr>
+        </p:nvSpPr>
+        <p:spPr>
+          <a:xfrm>
+            <a:off x="685800" y="1447800"/>
+            <a:ext cx="7772400" cy="3733800"/>
+          </a:xfrm>
+        </p:spPr>
+        <p:txBody>
+          <a:bodyPr/>
+          <a:lstStyle/>
+          <a:p>
+            <a:pPr marL="68580" indent="0">
+              <a:buNone/>
+            </a:pPr>
+            <a:r>
+              <a:rPr lang="en-US" dirty="0" smtClean="0"/>
+              <a:t>Section 7.2??</a:t>
+            </a:r>
+            <a:endParaRPr lang="en-US" dirty="0"/>
+          </a:p>
+        </p:txBody>
+      </p:sp>
+    </p:spTree>
+    <p:extLst>
+      <p:ext uri="{BB962C8B-B14F-4D97-AF65-F5344CB8AC3E}">
+        <p14:creationId xmlns:p14="http://schemas.microsoft.com/office/powerpoint/2010/main" val="4075441197"/>
+      </p:ext>
+    </p:extLst>
+  </p:cSld>
+  <p:clrMapOvr>
+    <a:masterClrMapping/>
+  </p:clrMapOvr>
+</p:sld>
+</file>
+
+<file path=ppt/slides/slide15.xml><?xml version="1.0" encoding="utf-8"?>
+<p:sld xmlns:a="http://schemas.openxmlformats.org/drawingml/2006/main" xmlns:r="http://schemas.openxmlformats.org/officeDocument/2006/relationships" xmlns:p="http://schemas.openxmlformats.org/presentationml/2006/main">
+  <p:cSld>
+    <p:spTree>
+      <p:nvGrpSpPr>
+        <p:cNvPr id="1" name=""/>
+        <p:cNvGrpSpPr/>
+        <p:nvPr/>
+      </p:nvGrpSpPr>
+      <p:grpSpPr>
+        <a:xfrm>
+          <a:off x="0" y="0"/>
+          <a:ext cx="0" cy="0"/>
+          <a:chOff x="0" y="0"/>
+          <a:chExt cx="0" cy="0"/>
+        </a:xfrm>
+      </p:grpSpPr>
+      <p:sp>
+        <p:nvSpPr>
+          <p:cNvPr id="2" name="Title 1"/>
+          <p:cNvSpPr>
+            <a:spLocks noGrp="1"/>
+          </p:cNvSpPr>
+          <p:nvPr>
+            <p:ph type="title"/>
+          </p:nvPr>
+        </p:nvSpPr>
+        <p:spPr/>
+        <p:txBody>
+          <a:bodyPr/>
+          <a:lstStyle/>
+          <a:p>
+            <a:r>
+              <a:rPr lang="en-US" dirty="0" smtClean="0"/>
+              <a:t>Technical Weaknesses of Paper</a:t>
             </a:r>
             <a:endParaRPr lang="en-US" dirty="0"/>
           </a:p>
@@ -15117,6 +17492,112 @@
           <a:lstStyle/>
           <a:p>
             <a:r>
+              <a:rPr lang="en-US" dirty="0"/>
+              <a:t>S</a:t>
+            </a:r>
+            <a:r>
+              <a:rPr lang="en-US" dirty="0" smtClean="0"/>
+              <a:t>ynthetic routes, used for fitness related apps, could potentially create an unrealistic path such as through buildings, water, steep elevation changes, etc.</a:t>
+            </a:r>
+          </a:p>
+          <a:p>
+            <a:r>
+              <a:rPr lang="en-US" dirty="0" smtClean="0"/>
+              <a:t>Some apps also track elevation changes which would not be accurate with synthetic routes</a:t>
+            </a:r>
+          </a:p>
+          <a:p>
+            <a:r>
+              <a:rPr lang="en-US" dirty="0" smtClean="0"/>
+              <a:t>Navigational apps are not handled by the current version of LP-Guardian.</a:t>
+            </a:r>
+          </a:p>
+          <a:p>
+            <a:r>
+              <a:rPr lang="en-US" dirty="0" smtClean="0"/>
+              <a:t>City-Level Location would work for an app such as weather, but would be limited if used by a location specific search app where a user might be looking for the closest gas station, restaurant, store, </a:t>
+            </a:r>
+            <a:r>
+              <a:rPr lang="en-US" dirty="0" err="1" smtClean="0"/>
+              <a:t>etc</a:t>
+            </a:r>
+            <a:r>
+              <a:rPr lang="en-US" dirty="0" smtClean="0"/>
+              <a:t> to their location.</a:t>
+            </a:r>
+            <a:endParaRPr lang="en-US" dirty="0"/>
+          </a:p>
+        </p:txBody>
+      </p:sp>
+    </p:spTree>
+    <p:extLst>
+      <p:ext uri="{BB962C8B-B14F-4D97-AF65-F5344CB8AC3E}">
+        <p14:creationId xmlns:p14="http://schemas.microsoft.com/office/powerpoint/2010/main" val="1075420864"/>
+      </p:ext>
+    </p:extLst>
+  </p:cSld>
+  <p:clrMapOvr>
+    <a:masterClrMapping/>
+  </p:clrMapOvr>
+</p:sld>
+</file>
+
+<file path=ppt/slides/slide16.xml><?xml version="1.0" encoding="utf-8"?>
+<p:sld xmlns:a="http://schemas.openxmlformats.org/drawingml/2006/main" xmlns:r="http://schemas.openxmlformats.org/officeDocument/2006/relationships" xmlns:p="http://schemas.openxmlformats.org/presentationml/2006/main">
+  <p:cSld>
+    <p:spTree>
+      <p:nvGrpSpPr>
+        <p:cNvPr id="1" name=""/>
+        <p:cNvGrpSpPr/>
+        <p:nvPr/>
+      </p:nvGrpSpPr>
+      <p:grpSpPr>
+        <a:xfrm>
+          <a:off x="0" y="0"/>
+          <a:ext cx="0" cy="0"/>
+          <a:chOff x="0" y="0"/>
+          <a:chExt cx="0" cy="0"/>
+        </a:xfrm>
+      </p:grpSpPr>
+      <p:sp>
+        <p:nvSpPr>
+          <p:cNvPr id="2" name="Title 1"/>
+          <p:cNvSpPr>
+            <a:spLocks noGrp="1"/>
+          </p:cNvSpPr>
+          <p:nvPr>
+            <p:ph type="title"/>
+          </p:nvPr>
+        </p:nvSpPr>
+        <p:spPr/>
+        <p:txBody>
+          <a:bodyPr/>
+          <a:lstStyle/>
+          <a:p>
+            <a:r>
+              <a:rPr lang="en-US" dirty="0" smtClean="0"/>
+              <a:t>Potential Future Work</a:t>
+            </a:r>
+            <a:endParaRPr lang="en-US" dirty="0"/>
+          </a:p>
+        </p:txBody>
+      </p:sp>
+      <p:sp>
+        <p:nvSpPr>
+          <p:cNvPr id="3" name="Content Placeholder 2"/>
+          <p:cNvSpPr>
+            <a:spLocks noGrp="1"/>
+          </p:cNvSpPr>
+          <p:nvPr>
+            <p:ph idx="1"/>
+          </p:nvPr>
+        </p:nvSpPr>
+        <p:spPr/>
+        <p:txBody>
+          <a:bodyPr/>
+          <a:lstStyle/>
+          <a:p>
+            <a:r>
               <a:rPr lang="en-US" dirty="0" smtClean="0"/>
               <a:t>Deploy LP-Guardian to more diverse participants with limited technical background for 6 </a:t>
             </a:r>
@@ -15128,18 +17609,10 @@
           <a:p>
             <a:r>
               <a:rPr lang="en-US" dirty="0"/>
-              <a:t>Identify parts of the app where the privacy vs. </a:t>
-            </a:r>
-            <a:r>
-              <a:rPr lang="en-US"/>
-              <a:t>usability balance can </a:t>
-            </a:r>
-            <a:r>
-              <a:rPr lang="en-US"/>
-              <a:t>be </a:t>
-            </a:r>
-            <a:r>
-              <a:rPr lang="en-US" smtClean="0"/>
+              <a:t>Identify parts of the app where the privacy vs. usability balance can be </a:t>
+            </a:r>
+            <a:r>
+              <a:rPr lang="en-US" dirty="0" smtClean="0"/>
               <a:t>improved</a:t>
             </a:r>
             <a:endParaRPr lang="en-US" dirty="0" smtClean="0"/>
@@ -16028,14 +18501,61 @@
             <p:ph idx="1"/>
           </p:nvPr>
         </p:nvSpPr>
-        <p:spPr/>
+        <p:spPr>
+          <a:xfrm>
+            <a:off x="685800" y="1447800"/>
+            <a:ext cx="7772400" cy="3733800"/>
+          </a:xfrm>
+        </p:spPr>
         <p:txBody>
           <a:bodyPr/>
           <a:lstStyle/>
           <a:p>
+            <a:pPr marL="68580" indent="0" algn="ctr">
+              <a:buNone/>
+            </a:pPr>
             <a:r>
               <a:rPr lang="en-US" dirty="0" smtClean="0"/>
-              <a:t>Section 7.3 &amp; motivation section @ beginning</a:t>
+              <a:t>Started with study to determine users perceptions of location privacy</a:t>
+            </a:r>
+          </a:p>
+          <a:p>
+            <a:pPr marL="68580" indent="0" algn="ctr">
+              <a:buNone/>
+            </a:pPr>
+            <a:r>
+              <a:rPr lang="en-US" dirty="0" smtClean="0"/>
+              <a:t>180 smartphone users surveyed…</a:t>
+            </a:r>
+          </a:p>
+          <a:p>
+            <a:pPr marL="68580" indent="0" algn="ctr">
+              <a:buNone/>
+            </a:pPr>
+            <a:endParaRPr lang="en-US" dirty="0" smtClean="0"/>
+          </a:p>
+          <a:p>
+            <a:r>
+              <a:rPr lang="en-US" dirty="0" smtClean="0"/>
+              <a:t>78% believe apps accessing their location can pose a privacy threat</a:t>
+            </a:r>
+          </a:p>
+          <a:p>
+            <a:r>
+              <a:rPr lang="en-US" dirty="0" smtClean="0"/>
+              <a:t>85% actually care who accesses their location information</a:t>
+            </a:r>
+          </a:p>
+          <a:p>
+            <a:r>
+              <a:rPr lang="en-US" dirty="0" smtClean="0"/>
+              <a:t>52% have no problem with giving apps imprecise location information to protect privacy</a:t>
+            </a:r>
+          </a:p>
+          <a:p>
+            <a:r>
+              <a:rPr lang="en-US" dirty="0" smtClean="0"/>
+              <a:t>18% object to giving apps imprecise location information</a:t>
             </a:r>
             <a:endParaRPr lang="en-US" dirty="0"/>
           </a:p>
@@ -16088,7 +18608,7 @@
           <a:p>
             <a:r>
               <a:rPr lang="en-US" dirty="0" smtClean="0"/>
-              <a:t>Technical Weaknesses of Paper</a:t>
+              <a:t>Experimental Results</a:t>
             </a:r>
             <a:endParaRPr lang="en-US" dirty="0"/>
           </a:p>
@@ -16104,53 +18624,117 @@
             <p:ph idx="1"/>
           </p:nvPr>
         </p:nvSpPr>
-        <p:spPr/>
+        <p:spPr>
+          <a:xfrm>
+            <a:off x="685800" y="1447800"/>
+            <a:ext cx="7772400" cy="3733800"/>
+          </a:xfrm>
+        </p:spPr>
         <p:txBody>
           <a:bodyPr/>
           <a:lstStyle/>
           <a:p>
-            <a:r>
-              <a:rPr lang="en-US" dirty="0"/>
-              <a:t>S</a:t>
-            </a:r>
+            <a:pPr marL="68580" indent="0">
+              <a:buNone/>
+            </a:pPr>
             <a:r>
               <a:rPr lang="en-US" dirty="0" smtClean="0"/>
-              <a:t>ynthetic routes, used for fitness related apps, could potentially create an unrealistic path such as through buildings, water, steep elevation changes, etc.</a:t>
-            </a:r>
-          </a:p>
-          <a:p>
+              <a:t>User Study: Can the user accommodate reduced functionality from home or work for 6 types of apps?</a:t>
+            </a:r>
+          </a:p>
+          <a:p>
+            <a:pPr marL="68580" indent="0">
+              <a:buNone/>
+            </a:pPr>
+            <a:endParaRPr lang="en-US" dirty="0"/>
+          </a:p>
+          <a:p>
+            <a:pPr marL="68580" indent="0">
+              <a:buNone/>
+            </a:pPr>
             <a:r>
               <a:rPr lang="en-US" dirty="0" smtClean="0"/>
-              <a:t>Some apps also track elevation changes which would not be accurate with synthetic routes</a:t>
-            </a:r>
-          </a:p>
-          <a:p>
+              <a:t>Geo-search (Yelp): </a:t>
+            </a:r>
+          </a:p>
+          <a:p>
+            <a:pPr marL="68580" indent="0">
+              <a:buNone/>
+            </a:pPr>
+            <a:endParaRPr lang="en-US" dirty="0"/>
+          </a:p>
+          <a:p>
+            <a:pPr marL="68580" indent="0">
+              <a:buNone/>
+            </a:pPr>
+            <a:endParaRPr lang="en-US" dirty="0" smtClean="0"/>
+          </a:p>
+          <a:p>
+            <a:pPr marL="68580" indent="0">
+              <a:buNone/>
+            </a:pPr>
+            <a:endParaRPr lang="en-US" dirty="0"/>
+          </a:p>
+          <a:p>
+            <a:pPr marL="68580" indent="0">
+              <a:buNone/>
+            </a:pPr>
             <a:r>
               <a:rPr lang="en-US" dirty="0" smtClean="0"/>
-              <a:t>Navigational apps are not handled by the current version of LP-Guardian.</a:t>
-            </a:r>
-          </a:p>
-          <a:p>
-            <a:r>
-              <a:rPr lang="en-US" dirty="0" smtClean="0"/>
-              <a:t>City-Level Location would work for an app such as weather, but would be limited if used by a location specific search app where a user might be looking for the closest gas station, restaurant, store, </a:t>
-            </a:r>
-            <a:r>
-              <a:rPr lang="en-US" dirty="0" err="1" smtClean="0"/>
-              <a:t>etc</a:t>
-            </a:r>
-            <a:r>
-              <a:rPr lang="en-US" dirty="0" smtClean="0"/>
-              <a:t> to their location.</a:t>
-            </a:r>
-            <a:endParaRPr lang="en-US" dirty="0"/>
+              <a:t>Social Networking: Do they share location at or near home/work?	</a:t>
+            </a:r>
+            <a:endParaRPr lang="en-US" dirty="0" smtClean="0"/>
           </a:p>
         </p:txBody>
       </p:sp>
+      <p:graphicFrame>
+        <p:nvGraphicFramePr>
+          <p:cNvPr id="5" name="Chart 4"/>
+          <p:cNvGraphicFramePr/>
+          <p:nvPr>
+            <p:extLst>
+              <p:ext uri="{D42A27DB-BD31-4B8C-83A1-F6EECF244321}">
+                <p14:modId xmlns:p14="http://schemas.microsoft.com/office/powerpoint/2010/main" val="2781828122"/>
+              </p:ext>
+            </p:extLst>
+          </p:nvPr>
+        </p:nvGraphicFramePr>
+        <p:xfrm>
+          <a:off x="1752600" y="2209800"/>
+          <a:ext cx="7391400" cy="1803400"/>
+        </p:xfrm>
+        <a:graphic>
+          <a:graphicData uri="http://schemas.openxmlformats.org/drawingml/2006/chart">
+            <c:chart xmlns:c="http://schemas.openxmlformats.org/drawingml/2006/chart" xmlns:r="http://schemas.openxmlformats.org/officeDocument/2006/relationships" r:id="rId3"/>
+          </a:graphicData>
+        </a:graphic>
+      </p:graphicFrame>
+      <p:graphicFrame>
+        <p:nvGraphicFramePr>
+          <p:cNvPr id="6" name="Chart 5"/>
+          <p:cNvGraphicFramePr/>
+          <p:nvPr>
+            <p:extLst>
+              <p:ext uri="{D42A27DB-BD31-4B8C-83A1-F6EECF244321}">
+                <p14:modId xmlns:p14="http://schemas.microsoft.com/office/powerpoint/2010/main" val="1768841510"/>
+              </p:ext>
+            </p:extLst>
+          </p:nvPr>
+        </p:nvGraphicFramePr>
+        <p:xfrm>
+          <a:off x="2743200" y="4572000"/>
+          <a:ext cx="6019800" cy="1803400"/>
+        </p:xfrm>
+        <a:graphic>
+          <a:graphicData uri="http://schemas.openxmlformats.org/drawingml/2006/chart">
+            <c:chart xmlns:c="http://schemas.openxmlformats.org/drawingml/2006/chart" xmlns:r="http://schemas.openxmlformats.org/officeDocument/2006/relationships" r:id="rId4"/>
+          </a:graphicData>
+        </a:graphic>
+      </p:graphicFrame>
     </p:spTree>
     <p:extLst>
       <p:ext uri="{BB962C8B-B14F-4D97-AF65-F5344CB8AC3E}">
-        <p14:creationId xmlns:p14="http://schemas.microsoft.com/office/powerpoint/2010/main" val="1075420864"/>
+        <p14:creationId xmlns:p14="http://schemas.microsoft.com/office/powerpoint/2010/main" val="4045311493"/>
       </p:ext>
     </p:extLst>
   </p:cSld>

</xml_diff>

<commit_message>
Added Threat Model bullet point to Vince's Motivation slide (slide 2) based on threat model discussion in class today.
</commit_message>
<xml_diff>
--- a/PaperPresentation/Paper_Presentation_Fasburg_Reiff_Thomas.pptx
+++ b/PaperPresentation/Paper_Presentation_Fasburg_Reiff_Thomas.pptx
@@ -778,7 +778,7 @@
           <a:p>
             <a:fld id="{A63B8CFC-D614-4432-A7DB-A65856E85B43}" type="datetimeFigureOut">
               <a:rPr lang="en-US" smtClean="0"/>
-              <a:t>2/22/2015</a:t>
+              <a:t>2/23/2015</a:t>
             </a:fld>
             <a:endParaRPr lang="en-US" dirty="0"/>
           </a:p>
@@ -1960,11 +1960,7 @@
           <a:p>
             <a:r>
               <a:rPr lang="en-US" dirty="0" smtClean="0"/>
-              <a:t>Design details relate back to the diagram from the Proposed Approach slide of the presentation (slide 4</a:t>
-            </a:r>
-            <a:r>
-              <a:rPr lang="en-US" dirty="0" smtClean="0"/>
-              <a:t>)</a:t>
+              <a:t>Design details relate back to the diagram from the Proposed Approach slide of the presentation (slide 4)</a:t>
             </a:r>
           </a:p>
           <a:p>
@@ -2230,13 +2226,7 @@
               <a:rPr lang="en-US" i="0" baseline="0" dirty="0" smtClean="0">
                 <a:sym typeface="Wingdings" panose="05000000000000000000" pitchFamily="2" charset="2"/>
               </a:rPr>
-              <a:t>, value will be </a:t>
-            </a:r>
-            <a:r>
-              <a:rPr lang="en-US" i="0" baseline="0" dirty="0" smtClean="0">
-                <a:sym typeface="Wingdings" panose="05000000000000000000" pitchFamily="2" charset="2"/>
-              </a:rPr>
-              <a:t>relaxed (relies of census data that specifies the population for every city block)</a:t>
+              <a:t>, value will be relaxed (relies of census data that specifies the population for every city block)</a:t>
             </a:r>
             <a:endParaRPr lang="en-US" i="0" baseline="-25000" dirty="0" smtClean="0">
               <a:sym typeface="Wingdings" panose="05000000000000000000" pitchFamily="2" charset="2"/>
@@ -2779,11 +2769,7 @@
             </a:r>
             <a:r>
               <a:rPr lang="en-US" baseline="0" dirty="0" smtClean="0"/>
-              <a:t> LMS = Location Management Services, GMS = Google Play Services</a:t>
-            </a:r>
-            <a:r>
-              <a:rPr lang="en-US" baseline="0" dirty="0" smtClean="0"/>
-              <a:t>?</a:t>
+              <a:t> LMS = Location Management Services, GMS = Google Play Services?</a:t>
             </a:r>
           </a:p>
           <a:p>
@@ -4734,7 +4720,7 @@
           <a:p>
             <a:fld id="{ADE5661A-BDAA-4579-B2F5-AA9011776D83}" type="datetimeFigureOut">
               <a:rPr lang="en-US" smtClean="0"/>
-              <a:t>2/22/2015</a:t>
+              <a:t>2/23/2015</a:t>
             </a:fld>
             <a:endParaRPr lang="en-US" dirty="0"/>
           </a:p>
@@ -5841,7 +5827,7 @@
             <a:fld id="{1D8BD707-D9CF-40AE-B4C6-C98DA3205C09}" type="datetimeFigureOut">
               <a:rPr lang="en-US" smtClean="0"/>
               <a:pPr/>
-              <a:t>2/22/2015</a:t>
+              <a:t>2/23/2015</a:t>
             </a:fld>
             <a:endParaRPr lang="en-US" dirty="0"/>
           </a:p>
@@ -6956,7 +6942,7 @@
             <a:fld id="{1D8BD707-D9CF-40AE-B4C6-C98DA3205C09}" type="datetimeFigureOut">
               <a:rPr lang="en-US" smtClean="0"/>
               <a:pPr/>
-              <a:t>2/22/2015</a:t>
+              <a:t>2/23/2015</a:t>
             </a:fld>
             <a:endParaRPr lang="en-US" dirty="0"/>
           </a:p>
@@ -8066,7 +8052,7 @@
             <a:fld id="{1D8BD707-D9CF-40AE-B4C6-C98DA3205C09}" type="datetimeFigureOut">
               <a:rPr lang="en-US" smtClean="0"/>
               <a:pPr/>
-              <a:t>2/22/2015</a:t>
+              <a:t>2/23/2015</a:t>
             </a:fld>
             <a:endParaRPr lang="en-US" dirty="0"/>
           </a:p>
@@ -9660,7 +9646,7 @@
           <a:p>
             <a:fld id="{7D698992-9F5B-4E9D-871D-4517B2EC8643}" type="datetimeFigureOut">
               <a:rPr lang="en-US" smtClean="0"/>
-              <a:t>2/22/2015</a:t>
+              <a:t>2/23/2015</a:t>
             </a:fld>
             <a:endParaRPr lang="en-US" dirty="0"/>
           </a:p>
@@ -10719,7 +10705,7 @@
             <a:fld id="{1D8BD707-D9CF-40AE-B4C6-C98DA3205C09}" type="datetimeFigureOut">
               <a:rPr lang="en-US" smtClean="0"/>
               <a:pPr/>
-              <a:t>2/22/2015</a:t>
+              <a:t>2/23/2015</a:t>
             </a:fld>
             <a:endParaRPr lang="en-US" dirty="0"/>
           </a:p>
@@ -12048,7 +12034,7 @@
             <a:fld id="{1D8BD707-D9CF-40AE-B4C6-C98DA3205C09}" type="datetimeFigureOut">
               <a:rPr lang="en-US" smtClean="0"/>
               <a:pPr/>
-              <a:t>2/22/2015</a:t>
+              <a:t>2/23/2015</a:t>
             </a:fld>
             <a:endParaRPr lang="en-US" dirty="0"/>
           </a:p>
@@ -13187,7 +13173,7 @@
             <a:fld id="{1D8BD707-D9CF-40AE-B4C6-C98DA3205C09}" type="datetimeFigureOut">
               <a:rPr lang="en-US" smtClean="0"/>
               <a:pPr/>
-              <a:t>2/22/2015</a:t>
+              <a:t>2/23/2015</a:t>
             </a:fld>
             <a:endParaRPr lang="en-US" dirty="0"/>
           </a:p>
@@ -14245,7 +14231,7 @@
             <a:fld id="{1D8BD707-D9CF-40AE-B4C6-C98DA3205C09}" type="datetimeFigureOut">
               <a:rPr lang="en-US" smtClean="0"/>
               <a:pPr/>
-              <a:t>2/22/2015</a:t>
+              <a:t>2/23/2015</a:t>
             </a:fld>
             <a:endParaRPr lang="en-US" dirty="0"/>
           </a:p>
@@ -15285,7 +15271,7 @@
             <a:fld id="{1D8BD707-D9CF-40AE-B4C6-C98DA3205C09}" type="datetimeFigureOut">
               <a:rPr lang="en-US" smtClean="0"/>
               <a:pPr/>
-              <a:t>2/22/2015</a:t>
+              <a:t>2/23/2015</a:t>
             </a:fld>
             <a:endParaRPr lang="en-US" dirty="0"/>
           </a:p>
@@ -16522,7 +16508,7 @@
             <a:fld id="{1D8BD707-D9CF-40AE-B4C6-C98DA3205C09}" type="datetimeFigureOut">
               <a:rPr lang="en-US" smtClean="0"/>
               <a:pPr/>
-              <a:t>2/22/2015</a:t>
+              <a:t>2/23/2015</a:t>
             </a:fld>
             <a:endParaRPr lang="en-US" dirty="0"/>
           </a:p>
@@ -16877,7 +16863,7 @@
             <a:fld id="{1D8BD707-D9CF-40AE-B4C6-C98DA3205C09}" type="datetimeFigureOut">
               <a:rPr lang="en-US" smtClean="0"/>
               <a:pPr/>
-              <a:t>2/22/2015</a:t>
+              <a:t>2/23/2015</a:t>
             </a:fld>
             <a:endParaRPr lang="en-US" dirty="0"/>
           </a:p>
@@ -17882,10 +17868,6 @@
               <a:rPr lang="en-US" dirty="0" smtClean="0"/>
               <a:t>Technical Details: </a:t>
             </a:r>
-            <a:r>
-              <a:rPr lang="en-US" dirty="0" smtClean="0"/>
-              <a:t/>
-            </a:r>
             <a:br>
               <a:rPr lang="en-US" dirty="0" smtClean="0"/>
             </a:br>
@@ -17945,20 +17927,11 @@
               <a:rPr lang="en-US" dirty="0" smtClean="0"/>
               <a:t>no location from scanning nearby WiFi access points)</a:t>
             </a:r>
-            <a:endParaRPr lang="en-US" dirty="0" smtClean="0"/>
           </a:p>
           <a:p>
             <a:r>
               <a:rPr lang="en-US" dirty="0" smtClean="0"/>
-              <a:t>Instrumented the platform operatin</a:t>
-            </a:r>
-            <a:r>
-              <a:rPr lang="en-US" dirty="0" smtClean="0"/>
-              <a:t>g system and </a:t>
-            </a:r>
-            <a:r>
-              <a:rPr lang="en-US" dirty="0" smtClean="0"/>
-              <a:t>LP-Guardian modifies the location object before it reaches the application requesting the location</a:t>
+              <a:t>Instrumented the platform operating system and LP-Guardian modifies the location object before it reaches the application requesting the location</a:t>
             </a:r>
           </a:p>
           <a:p>
@@ -18140,10 +18113,6 @@
             <a:r>
               <a:rPr lang="en-US" dirty="0" smtClean="0"/>
               <a:t>Technical Details: </a:t>
-            </a:r>
-            <a:r>
-              <a:rPr lang="en-US" dirty="0" smtClean="0"/>
-              <a:t/>
             </a:r>
             <a:br>
               <a:rPr lang="en-US" dirty="0" smtClean="0"/>
@@ -18528,15 +18497,7 @@
             </a:pPr>
             <a:r>
               <a:rPr lang="en-US" dirty="0" smtClean="0"/>
-              <a:t>Messaging </a:t>
-            </a:r>
-            <a:r>
-              <a:rPr lang="en-US" dirty="0" smtClean="0"/>
-              <a:t>(WhatsApp):  </a:t>
-            </a:r>
-            <a:r>
-              <a:rPr lang="en-US" dirty="0" smtClean="0"/>
-              <a:t>Do they share location at or near home/work?</a:t>
+              <a:t>Messaging (WhatsApp):  Do they share location at or near home/work?</a:t>
             </a:r>
           </a:p>
           <a:p>
@@ -19668,17 +19629,51 @@
             <p:ph idx="1"/>
           </p:nvPr>
         </p:nvSpPr>
-        <p:spPr/>
+        <p:spPr>
+          <a:xfrm>
+            <a:off x="685800" y="1600200"/>
+            <a:ext cx="7772400" cy="4190999"/>
+          </a:xfrm>
+        </p:spPr>
         <p:txBody>
           <a:bodyPr>
-            <a:normAutofit lnSpcReduction="10000"/>
+            <a:normAutofit fontScale="92500" lnSpcReduction="10000"/>
           </a:bodyPr>
           <a:lstStyle/>
           <a:p>
             <a:r>
               <a:rPr lang="en-US" dirty="0" smtClean="0"/>
-              <a:t>Research indicated users are concerned with location data collected by smartphone apps</a:t>
-            </a:r>
+              <a:t>Research indicated users are concerned with location data collected by smartphone </a:t>
+            </a:r>
+            <a:r>
+              <a:rPr lang="en-US" dirty="0" smtClean="0"/>
+              <a:t>apps</a:t>
+            </a:r>
+          </a:p>
+          <a:p>
+            <a:r>
+              <a:rPr lang="en-US" dirty="0" smtClean="0"/>
+              <a:t>Threat Model: the adversary…</a:t>
+            </a:r>
+          </a:p>
+          <a:p>
+            <a:pPr lvl="1"/>
+            <a:r>
+              <a:rPr lang="en-US" dirty="0" smtClean="0"/>
+              <a:t>Only accesses the user’s location via available application APIs</a:t>
+            </a:r>
+          </a:p>
+          <a:p>
+            <a:pPr lvl="1"/>
+            <a:r>
+              <a:rPr lang="en-US" dirty="0" smtClean="0"/>
+              <a:t>Will not attempt to hack or modify privacy controls on the operatin</a:t>
+            </a:r>
+            <a:r>
+              <a:rPr lang="en-US" dirty="0" smtClean="0"/>
+              <a:t>g system</a:t>
+            </a:r>
+            <a:endParaRPr lang="en-US" dirty="0" smtClean="0"/>
           </a:p>
           <a:p>
             <a:r>
@@ -19822,15 +19817,7 @@
           <a:p>
             <a:r>
               <a:rPr lang="en-US" dirty="0" smtClean="0"/>
-              <a:t>City-Level Location would work for an app such as weather, but would be limited if used by a location specific search app where a user might be looking for the closest gas station, restaurant, store, </a:t>
-            </a:r>
-            <a:r>
-              <a:rPr lang="en-US" dirty="0" smtClean="0"/>
-              <a:t>etc. </a:t>
-            </a:r>
-            <a:r>
-              <a:rPr lang="en-US" dirty="0" smtClean="0"/>
-              <a:t>to their location.</a:t>
+              <a:t>City-Level Location would work for an app such as weather, but would be limited if used by a location specific search app where a user might be looking for the closest gas station, restaurant, store, etc. to their location.</a:t>
             </a:r>
             <a:endParaRPr lang="en-US" dirty="0"/>
           </a:p>
@@ -19922,15 +19909,7 @@
           <a:p>
             <a:r>
               <a:rPr lang="en-US" dirty="0" smtClean="0"/>
-              <a:t>Make a similar app for </a:t>
-            </a:r>
-            <a:r>
-              <a:rPr lang="en-US" dirty="0" smtClean="0"/>
-              <a:t>iOS </a:t>
-            </a:r>
-            <a:r>
-              <a:rPr lang="en-US" dirty="0" smtClean="0"/>
-              <a:t>devices</a:t>
+              <a:t>Make a similar app for iOS devices</a:t>
             </a:r>
           </a:p>
           <a:p>
@@ -20144,19 +20123,11 @@
                       </a:br>
                       <a:r>
                         <a:rPr lang="en-US" dirty="0" smtClean="0"/>
-                        <a:t>- Summary </a:t>
-                      </a:r>
-                      <a:r>
-                        <a:rPr lang="en-US" dirty="0" smtClean="0"/>
-                        <a:t>and Limitations</a:t>
+                        <a:t>- Summary and Limitations</a:t>
                       </a:r>
                       <a:r>
                         <a:rPr lang="en-US" baseline="0" dirty="0" smtClean="0"/>
-                        <a:t> of Prior </a:t>
-                      </a:r>
-                      <a:r>
-                        <a:rPr lang="en-US" baseline="0" dirty="0" smtClean="0"/>
-                        <a:t>Art.</a:t>
+                        <a:t> of Prior Art.</a:t>
                       </a:r>
                       <a:br>
                         <a:rPr lang="en-US" baseline="0" dirty="0" smtClean="0"/>
@@ -20170,11 +20141,7 @@
                       </a:br>
                       <a:r>
                         <a:rPr lang="en-US" baseline="0" dirty="0" smtClean="0"/>
-                        <a:t>- Advantages </a:t>
-                      </a:r>
-                      <a:r>
-                        <a:rPr lang="en-US" baseline="0" dirty="0" smtClean="0"/>
-                        <a:t>of Proposed Approach over Prior Art.</a:t>
+                        <a:t>- Advantages of Proposed Approach over Prior Art.</a:t>
                       </a:r>
                       <a:endParaRPr lang="en-US" dirty="0"/>
                     </a:p>
@@ -20204,11 +20171,7 @@
                     <a:p>
                       <a:r>
                         <a:rPr lang="en-US" dirty="0" smtClean="0"/>
-                        <a:t>- Technical </a:t>
-                      </a:r>
-                      <a:r>
-                        <a:rPr lang="en-US" dirty="0" smtClean="0"/>
-                        <a:t>Details</a:t>
+                        <a:t>- Technical Details</a:t>
                       </a:r>
                       <a:endParaRPr lang="en-US" dirty="0"/>
                     </a:p>
@@ -20248,25 +20211,13 @@
                     <a:p>
                       <a:r>
                         <a:rPr lang="en-US" baseline="0" dirty="0" smtClean="0"/>
-                        <a:t>- Technical </a:t>
-                      </a:r>
-                      <a:r>
-                        <a:rPr lang="en-US" baseline="0" dirty="0" smtClean="0"/>
-                        <a:t>Weaknesses of the </a:t>
-                      </a:r>
-                      <a:r>
-                        <a:rPr lang="en-US" baseline="0" dirty="0" smtClean="0"/>
-                        <a:t>Paper</a:t>
+                        <a:t>- Technical Weaknesses of the Paper</a:t>
                       </a:r>
                     </a:p>
                     <a:p>
                       <a:r>
                         <a:rPr lang="en-US" baseline="0" dirty="0" smtClean="0"/>
-                        <a:t>- Potential </a:t>
-                      </a:r>
-                      <a:r>
-                        <a:rPr lang="en-US" baseline="0" dirty="0" smtClean="0"/>
-                        <a:t>Future Work</a:t>
+                        <a:t>- Potential Future Work</a:t>
                       </a:r>
                       <a:endParaRPr lang="en-US" dirty="0"/>
                     </a:p>
@@ -20288,11 +20239,11 @@
   <p:clrMapOvr>
     <a:masterClrMapping/>
   </p:clrMapOvr>
-  <mc:AlternateContent xmlns:mc="http://schemas.openxmlformats.org/markup-compatibility/2006">
-    <mc:Choice xmlns:p14="http://schemas.microsoft.com/office/powerpoint/2010/main" Requires="p14">
+  <mc:AlternateContent xmlns:mc="http://schemas.openxmlformats.org/markup-compatibility/2006" xmlns:p14="http://schemas.microsoft.com/office/powerpoint/2010/main">
+    <mc:Choice Requires="p14">
       <p:transition spd="slow" p14:dur="2000"/>
     </mc:Choice>
-    <mc:Fallback>
+    <mc:Fallback xmlns="">
       <p:transition spd="slow"/>
     </mc:Fallback>
   </mc:AlternateContent>
@@ -20989,15 +20940,7 @@
             <a:pPr lvl="1"/>
             <a:r>
               <a:rPr lang="en-US" dirty="0" smtClean="0"/>
-              <a:t>LP-Guardian releases the location as long as the histogram is </a:t>
-            </a:r>
-            <a:r>
-              <a:rPr lang="en-US" dirty="0" smtClean="0"/>
-              <a:t>reasonably </a:t>
-            </a:r>
-            <a:r>
-              <a:rPr lang="en-US" dirty="0" smtClean="0"/>
-              <a:t>close to that of another individual’s</a:t>
+              <a:t>LP-Guardian releases the location as long as the histogram is reasonably close to that of another individual’s</a:t>
             </a:r>
           </a:p>
           <a:p>
@@ -21328,13 +21271,8 @@
           <a:p>
             <a:r>
               <a:rPr lang="en-US" dirty="0" smtClean="0"/>
-              <a:t>Synthetic Route: for fitness tracking applications, LP-Guardian modifies the route information while retaining speed/distance </a:t>
-            </a:r>
-            <a:r>
-              <a:rPr lang="en-US" dirty="0" smtClean="0"/>
-              <a:t>information</a:t>
-            </a:r>
-            <a:endParaRPr lang="en-US" dirty="0" smtClean="0"/>
+              <a:t>Synthetic Route: for fitness tracking applications, LP-Guardian modifies the route information while retaining speed/distance information</a:t>
+            </a:r>
           </a:p>
         </p:txBody>
       </p:sp>
@@ -21583,11 +21521,7 @@
             </a:r>
             <a:r>
               <a:rPr lang="en-US" i="1" dirty="0" smtClean="0"/>
-              <a:t>(</a:t>
-            </a:r>
-            <a:r>
-              <a:rPr lang="en-US" i="1" dirty="0" smtClean="0"/>
-              <a:t>rad, </a:t>
+              <a:t>(rad, </a:t>
             </a:r>
             <a:r>
               <a:rPr lang="el-GR" i="1" dirty="0" smtClean="0"/>
@@ -21661,11 +21595,7 @@
             <a:pPr lvl="1"/>
             <a:r>
               <a:rPr lang="en-US" dirty="0" smtClean="0"/>
-              <a:t>Same </a:t>
-            </a:r>
-            <a:r>
-              <a:rPr lang="en-US" dirty="0" smtClean="0"/>
-              <a:t>anonymized location is always mapped to the same real location</a:t>
+              <a:t>Same anonymized location is always mapped to the same real location</a:t>
             </a:r>
           </a:p>
           <a:p>
@@ -21678,13 +21608,8 @@
           <a:p>
             <a:r>
               <a:rPr lang="en-US" dirty="0" smtClean="0"/>
-              <a:t>Synthetic Route: for fitness tracking applications, LP-Guardian modifies the route information while retaining speed/distance </a:t>
-            </a:r>
-            <a:r>
-              <a:rPr lang="en-US" dirty="0" smtClean="0"/>
-              <a:t>information</a:t>
-            </a:r>
-            <a:endParaRPr lang="en-US" dirty="0" smtClean="0"/>
+              <a:t>Synthetic Route: for fitness tracking applications, LP-Guardian modifies the route information while retaining speed/distance information</a:t>
+            </a:r>
           </a:p>
         </p:txBody>
       </p:sp>
@@ -21856,11 +21781,11 @@
   <p:clrMapOvr>
     <a:masterClrMapping/>
   </p:clrMapOvr>
-  <mc:AlternateContent xmlns:mc="http://schemas.openxmlformats.org/markup-compatibility/2006">
-    <mc:Choice xmlns:p14="http://schemas.microsoft.com/office/powerpoint/2010/main" Requires="p14">
+  <mc:AlternateContent xmlns:mc="http://schemas.openxmlformats.org/markup-compatibility/2006" xmlns:p14="http://schemas.microsoft.com/office/powerpoint/2010/main">
+    <mc:Choice Requires="p14">
       <p:transition spd="slow" p14:dur="2000"/>
     </mc:Choice>
-    <mc:Fallback>
+    <mc:Fallback xmlns="">
       <p:transition spd="slow"/>
     </mc:Fallback>
   </mc:AlternateContent>

</xml_diff>

<commit_message>
Made small edits to my slides up to (not including) User Interface.
</commit_message>
<xml_diff>
--- a/PaperPresentation/Paper_Presentation_Fasburg_Reiff_Thomas.pptx
+++ b/PaperPresentation/Paper_Presentation_Fasburg_Reiff_Thomas.pptx
@@ -344,6 +344,7 @@
     </c:plotArea>
     <c:legend>
       <c:legendPos val="r"/>
+      <c:layout/>
       <c:overlay val="0"/>
     </c:legend>
     <c:plotVisOnly val="1"/>
@@ -674,6 +675,7 @@
     </c:plotArea>
     <c:legend>
       <c:legendPos val="r"/>
+      <c:layout/>
       <c:overlay val="0"/>
     </c:legend>
     <c:plotVisOnly val="1"/>
@@ -778,7 +780,7 @@
           <a:p>
             <a:fld id="{A63B8CFC-D614-4432-A7DB-A65856E85B43}" type="datetimeFigureOut">
               <a:rPr lang="en-US" smtClean="0"/>
-              <a:t>2/23/2015</a:t>
+              <a:t>2/24/2015</a:t>
             </a:fld>
             <a:endParaRPr lang="en-US" dirty="0"/>
           </a:p>
@@ -1960,13 +1962,33 @@
           <a:p>
             <a:r>
               <a:rPr lang="en-US" dirty="0" smtClean="0"/>
-              <a:t>Design details relate back to the diagram from the Proposed Approach slide of the presentation (slide 4)</a:t>
-            </a:r>
-          </a:p>
-          <a:p>
-            <a:endParaRPr lang="en-US" dirty="0" smtClean="0"/>
-          </a:p>
-          <a:p>
+              <a:t>Design details relate back to the diagram from the Proposed Approach slide of the presentation (slide 4</a:t>
+            </a:r>
+            <a:r>
+              <a:rPr lang="en-US" dirty="0" smtClean="0"/>
+              <a:t>)</a:t>
+            </a:r>
+          </a:p>
+          <a:p>
+            <a:r>
+              <a:rPr lang="en-US" i="1" dirty="0" smtClean="0">
+                <a:solidFill>
+                  <a:srgbClr val="FF0000"/>
+                </a:solidFill>
+              </a:rPr>
+              <a:t>Mention details that should have been discussed = the left half/automatic city-coarsened level of the diagram: </a:t>
+            </a:r>
+            <a:endParaRPr lang="en-US" i="1" dirty="0" smtClean="0">
+              <a:solidFill>
+                <a:srgbClr val="FF0000"/>
+              </a:solidFill>
+            </a:endParaRPr>
+          </a:p>
+          <a:p>
+            <a:pPr marL="171450" indent="-171450">
+              <a:buFont typeface="Arial" panose="020B0604020202020204" pitchFamily="34" charset="0"/>
+              <a:buChar char="•"/>
+            </a:pPr>
             <a:r>
               <a:rPr lang="en-US" dirty="0" smtClean="0"/>
               <a:t>Background</a:t>
@@ -1979,8 +2001,74 @@
               <a:rPr lang="en-US" baseline="0" dirty="0" smtClean="0">
                 <a:sym typeface="Wingdings" panose="05000000000000000000" pitchFamily="2" charset="2"/>
               </a:rPr>
-              <a:t> the rest of the information applied to foreground and persistent location access</a:t>
-            </a:r>
+              <a:t> the rest of the information </a:t>
+            </a:r>
+            <a:r>
+              <a:rPr lang="en-US" baseline="0" dirty="0" smtClean="0">
+                <a:sym typeface="Wingdings" panose="05000000000000000000" pitchFamily="2" charset="2"/>
+              </a:rPr>
+              <a:t>applies </a:t>
+            </a:r>
+            <a:r>
+              <a:rPr lang="en-US" baseline="0" dirty="0" smtClean="0">
+                <a:sym typeface="Wingdings" panose="05000000000000000000" pitchFamily="2" charset="2"/>
+              </a:rPr>
+              <a:t>to foreground and persistent </a:t>
+            </a:r>
+            <a:r>
+              <a:rPr lang="en-US" baseline="0" dirty="0" smtClean="0">
+                <a:sym typeface="Wingdings" panose="05000000000000000000" pitchFamily="2" charset="2"/>
+              </a:rPr>
+              <a:t>(perceptible applications) location access</a:t>
+            </a:r>
+          </a:p>
+          <a:p>
+            <a:pPr marL="628650" lvl="1" indent="-171450">
+              <a:buFont typeface="Arial" panose="020B0604020202020204" pitchFamily="34" charset="0"/>
+              <a:buChar char="•"/>
+            </a:pPr>
+            <a:r>
+              <a:rPr lang="en-US" baseline="0" dirty="0" smtClean="0">
+                <a:sym typeface="Wingdings" panose="05000000000000000000" pitchFamily="2" charset="2"/>
+              </a:rPr>
+              <a:t>Reasoning: analysis showed that only 3% of applications access the user’s location while running in the background</a:t>
+            </a:r>
+          </a:p>
+          <a:p>
+            <a:pPr marL="171450" lvl="0" indent="-171450">
+              <a:buFont typeface="Arial" panose="020B0604020202020204" pitchFamily="34" charset="0"/>
+              <a:buChar char="•"/>
+            </a:pPr>
+            <a:r>
+              <a:rPr lang="en-US" sz="1100" baseline="0" dirty="0" smtClean="0">
+                <a:sym typeface="Wingdings" panose="05000000000000000000" pitchFamily="2" charset="2"/>
+              </a:rPr>
+              <a:t>A&amp;A library requests can be identified (shown via stack trace) and are sent city-coarsened information</a:t>
+            </a:r>
+          </a:p>
+          <a:p>
+            <a:pPr marL="171450" lvl="0" indent="-171450">
+              <a:buFont typeface="Arial" panose="020B0604020202020204" pitchFamily="34" charset="0"/>
+              <a:buChar char="•"/>
+            </a:pPr>
+            <a:endParaRPr lang="en-US" sz="1100" baseline="0" dirty="0" smtClean="0">
+              <a:sym typeface="Wingdings" panose="05000000000000000000" pitchFamily="2" charset="2"/>
+            </a:endParaRPr>
+          </a:p>
+          <a:p>
+            <a:pPr marL="0" lvl="0" indent="0">
+              <a:buFont typeface="Arial" panose="020B0604020202020204" pitchFamily="34" charset="0"/>
+              <a:buNone/>
+            </a:pPr>
+            <a:r>
+              <a:rPr lang="en-US" sz="1100" baseline="0" dirty="0" smtClean="0">
+                <a:sym typeface="Wingdings" panose="05000000000000000000" pitchFamily="2" charset="2"/>
+              </a:rPr>
+              <a:t>Threat Model: the adversary has access to a mapping between a set of individuals’ and the probability distributions of visiting each block in the city  aims to match the anonymous mobility histogram to an individual in the database</a:t>
+            </a:r>
+            <a:endParaRPr lang="en-US" sz="1100" baseline="0" dirty="0" smtClean="0">
+              <a:sym typeface="Wingdings" panose="05000000000000000000" pitchFamily="2" charset="2"/>
+            </a:endParaRPr>
           </a:p>
           <a:p>
             <a:endParaRPr lang="en-US" baseline="0" dirty="0" smtClean="0">
@@ -1992,16 +2080,34 @@
               <a:rPr lang="en-US" baseline="0" dirty="0" smtClean="0">
                 <a:sym typeface="Wingdings" panose="05000000000000000000" pitchFamily="2" charset="2"/>
               </a:rPr>
-              <a:t>Identification Protection Formula = Probability distribution of a mobility histogram</a:t>
-            </a:r>
+              <a:t>Identification Protection Formula = Probability </a:t>
+            </a:r>
+            <a:r>
+              <a:rPr lang="en-US" baseline="0" dirty="0" smtClean="0">
+                <a:sym typeface="Wingdings" panose="05000000000000000000" pitchFamily="2" charset="2"/>
+              </a:rPr>
+              <a:t>that the histogram belongs to a given individual</a:t>
+            </a:r>
+            <a:endParaRPr lang="en-US" baseline="0" dirty="0" smtClean="0">
+              <a:sym typeface="Wingdings" panose="05000000000000000000" pitchFamily="2" charset="2"/>
+            </a:endParaRPr>
           </a:p>
           <a:p>
             <a:r>
               <a:rPr lang="en-US" i="1" baseline="0" dirty="0" smtClean="0">
                 <a:sym typeface="Wingdings" panose="05000000000000000000" pitchFamily="2" charset="2"/>
               </a:rPr>
-              <a:t>N = # of user sessions</a:t>
-            </a:r>
+              <a:t>N = # of user </a:t>
+            </a:r>
+            <a:r>
+              <a:rPr lang="en-US" i="1" baseline="0" dirty="0" smtClean="0">
+                <a:sym typeface="Wingdings" panose="05000000000000000000" pitchFamily="2" charset="2"/>
+              </a:rPr>
+              <a:t>application sessions</a:t>
+            </a:r>
+            <a:endParaRPr lang="en-US" i="1" baseline="0" dirty="0" smtClean="0">
+              <a:sym typeface="Wingdings" panose="05000000000000000000" pitchFamily="2" charset="2"/>
+            </a:endParaRPr>
           </a:p>
           <a:p>
             <a:r>
@@ -2038,8 +2144,72 @@
               <a:rPr lang="en-US" i="1" baseline="0" dirty="0" smtClean="0">
                 <a:sym typeface="Wingdings" panose="05000000000000000000" pitchFamily="2" charset="2"/>
               </a:rPr>
-              <a:t>, …, }</a:t>
-            </a:r>
+              <a:t>, …, </a:t>
+            </a:r>
+            <a:r>
+              <a:rPr lang="en-US" i="1" baseline="0" dirty="0" smtClean="0">
+                <a:sym typeface="Wingdings" panose="05000000000000000000" pitchFamily="2" charset="2"/>
+              </a:rPr>
+              <a:t>}</a:t>
+            </a:r>
+          </a:p>
+          <a:p>
+            <a:pPr marL="0" marR="0" indent="0" algn="l" defTabSz="914400" rtl="0" eaLnBrk="1" fontAlgn="auto" latinLnBrk="0" hangingPunct="1">
+              <a:lnSpc>
+                <a:spcPct val="100000"/>
+              </a:lnSpc>
+              <a:spcBef>
+                <a:spcPts val="0"/>
+              </a:spcBef>
+              <a:spcAft>
+                <a:spcPts val="0"/>
+              </a:spcAft>
+              <a:buClrTx/>
+              <a:buSzTx/>
+              <a:buFontTx/>
+              <a:buNone/>
+              <a:tabLst/>
+              <a:defRPr/>
+            </a:pPr>
+            <a:r>
+              <a:rPr lang="en-US" i="1" baseline="0" dirty="0" err="1" smtClean="0">
+                <a:sym typeface="Wingdings" panose="05000000000000000000" pitchFamily="2" charset="2"/>
+              </a:rPr>
+              <a:t>c</a:t>
+            </a:r>
+            <a:r>
+              <a:rPr lang="en-US" i="1" baseline="-25000" dirty="0" err="1" smtClean="0">
+                <a:sym typeface="Wingdings" panose="05000000000000000000" pitchFamily="2" charset="2"/>
+              </a:rPr>
+              <a:t>bli</a:t>
+            </a:r>
+            <a:r>
+              <a:rPr lang="en-US" i="1" baseline="0" dirty="0" smtClean="0">
+                <a:sym typeface="Wingdings" panose="05000000000000000000" pitchFamily="2" charset="2"/>
+              </a:rPr>
+              <a:t> = the number of times that </a:t>
+            </a:r>
+            <a:r>
+              <a:rPr lang="en-US" i="1" baseline="0" dirty="0" err="1" smtClean="0">
+                <a:sym typeface="Wingdings" panose="05000000000000000000" pitchFamily="2" charset="2"/>
+              </a:rPr>
+              <a:t>bl</a:t>
+            </a:r>
+            <a:r>
+              <a:rPr lang="en-US" i="1" baseline="-25000" dirty="0" err="1" smtClean="0">
+                <a:sym typeface="Wingdings" panose="05000000000000000000" pitchFamily="2" charset="2"/>
+              </a:rPr>
+              <a:t>i</a:t>
+            </a:r>
+            <a:r>
+              <a:rPr lang="en-US" i="1" baseline="0" dirty="0" smtClean="0">
+                <a:sym typeface="Wingdings" panose="05000000000000000000" pitchFamily="2" charset="2"/>
+              </a:rPr>
+              <a:t> is visited by the user</a:t>
+            </a:r>
+            <a:endParaRPr lang="en-US" i="1" baseline="0" dirty="0" smtClean="0">
+              <a:sym typeface="Wingdings" panose="05000000000000000000" pitchFamily="2" charset="2"/>
+            </a:endParaRPr>
           </a:p>
           <a:p>
             <a:r>
@@ -2083,44 +2253,6 @@
             </a:endParaRPr>
           </a:p>
           <a:p>
-            <a:r>
-              <a:rPr lang="en-US" i="1" baseline="0" dirty="0" err="1" smtClean="0">
-                <a:sym typeface="Wingdings" panose="05000000000000000000" pitchFamily="2" charset="2"/>
-              </a:rPr>
-              <a:t>c</a:t>
-            </a:r>
-            <a:r>
-              <a:rPr lang="en-US" i="1" baseline="-25000" dirty="0" err="1" smtClean="0">
-                <a:sym typeface="Wingdings" panose="05000000000000000000" pitchFamily="2" charset="2"/>
-              </a:rPr>
-              <a:t>bli</a:t>
-            </a:r>
-            <a:r>
-              <a:rPr lang="en-US" i="1" baseline="0" dirty="0" smtClean="0">
-                <a:sym typeface="Wingdings" panose="05000000000000000000" pitchFamily="2" charset="2"/>
-              </a:rPr>
-              <a:t> = the number of times that </a:t>
-            </a:r>
-            <a:r>
-              <a:rPr lang="en-US" i="1" baseline="0" dirty="0" err="1" smtClean="0">
-                <a:sym typeface="Wingdings" panose="05000000000000000000" pitchFamily="2" charset="2"/>
-              </a:rPr>
-              <a:t>bl</a:t>
-            </a:r>
-            <a:r>
-              <a:rPr lang="en-US" i="1" baseline="-25000" dirty="0" err="1" smtClean="0">
-                <a:sym typeface="Wingdings" panose="05000000000000000000" pitchFamily="2" charset="2"/>
-              </a:rPr>
-              <a:t>i</a:t>
-            </a:r>
-            <a:r>
-              <a:rPr lang="en-US" i="1" baseline="0" dirty="0" smtClean="0">
-                <a:sym typeface="Wingdings" panose="05000000000000000000" pitchFamily="2" charset="2"/>
-              </a:rPr>
-              <a:t> is visited by the user</a:t>
-            </a:r>
-          </a:p>
-          <a:p>
             <a:endParaRPr lang="en-US" i="1" baseline="0" dirty="0" smtClean="0">
               <a:sym typeface="Wingdings" panose="05000000000000000000" pitchFamily="2" charset="2"/>
             </a:endParaRPr>
@@ -2190,8 +2322,83 @@
               <a:rPr lang="en-US" i="0" baseline="0" dirty="0" smtClean="0">
                 <a:sym typeface="Wingdings" panose="05000000000000000000" pitchFamily="2" charset="2"/>
               </a:rPr>
-              <a:t>(min. probability) of visiting a block because LP-Guardian does not know other user’s histograms</a:t>
-            </a:r>
+              <a:t>(min. probability) of visiting a block because LP-Guardian </a:t>
+            </a:r>
+            <a:r>
+              <a:rPr lang="en-US" i="0" baseline="0" dirty="0" smtClean="0">
+                <a:sym typeface="Wingdings" panose="05000000000000000000" pitchFamily="2" charset="2"/>
+              </a:rPr>
+              <a:t>(client side) does </a:t>
+            </a:r>
+            <a:r>
+              <a:rPr lang="en-US" i="0" baseline="0" dirty="0" smtClean="0">
+                <a:sym typeface="Wingdings" panose="05000000000000000000" pitchFamily="2" charset="2"/>
+              </a:rPr>
+              <a:t>not know other user’s </a:t>
+            </a:r>
+            <a:r>
+              <a:rPr lang="en-US" i="0" baseline="0" dirty="0" smtClean="0">
+                <a:sym typeface="Wingdings" panose="05000000000000000000" pitchFamily="2" charset="2"/>
+              </a:rPr>
+              <a:t>histograms</a:t>
+            </a:r>
+          </a:p>
+          <a:p>
+            <a:pPr marL="628650" lvl="1" indent="-171450">
+              <a:buFont typeface="Arial" panose="020B0604020202020204" pitchFamily="34" charset="0"/>
+              <a:buChar char="•"/>
+            </a:pPr>
+            <a:r>
+              <a:rPr lang="en-US" i="0" baseline="0" dirty="0" smtClean="0">
+                <a:sym typeface="Wingdings" panose="05000000000000000000" pitchFamily="2" charset="2"/>
+              </a:rPr>
+              <a:t>Note: low </a:t>
+            </a:r>
+            <a:r>
+              <a:rPr lang="en-US" i="1" baseline="0" dirty="0" err="1" smtClean="0">
+                <a:sym typeface="Wingdings" panose="05000000000000000000" pitchFamily="2" charset="2"/>
+              </a:rPr>
+              <a:t>p</a:t>
+            </a:r>
+            <a:r>
+              <a:rPr lang="en-US" i="1" baseline="-25000" dirty="0" err="1" smtClean="0">
+                <a:sym typeface="Wingdings" panose="05000000000000000000" pitchFamily="2" charset="2"/>
+              </a:rPr>
+              <a:t>min</a:t>
+            </a:r>
+            <a:r>
+              <a:rPr lang="en-US" i="1" baseline="0" dirty="0" smtClean="0">
+                <a:sym typeface="Wingdings" panose="05000000000000000000" pitchFamily="2" charset="2"/>
+              </a:rPr>
+              <a:t> </a:t>
+            </a:r>
+            <a:r>
+              <a:rPr lang="en-US" i="0" baseline="0" dirty="0" smtClean="0">
+                <a:sym typeface="Wingdings" panose="05000000000000000000" pitchFamily="2" charset="2"/>
+              </a:rPr>
+              <a:t>= strict privacy, high </a:t>
+            </a:r>
+            <a:r>
+              <a:rPr lang="en-US" i="1" baseline="0" dirty="0" err="1" smtClean="0">
+                <a:sym typeface="Wingdings" panose="05000000000000000000" pitchFamily="2" charset="2"/>
+              </a:rPr>
+              <a:t>p</a:t>
+            </a:r>
+            <a:r>
+              <a:rPr lang="en-US" i="1" baseline="-25000" dirty="0" err="1" smtClean="0">
+                <a:sym typeface="Wingdings" panose="05000000000000000000" pitchFamily="2" charset="2"/>
+              </a:rPr>
+              <a:t>min</a:t>
+            </a:r>
+            <a:r>
+              <a:rPr lang="en-US" i="0" baseline="0" dirty="0" smtClean="0">
+                <a:sym typeface="Wingdings" panose="05000000000000000000" pitchFamily="2" charset="2"/>
+              </a:rPr>
+              <a:t> = more relaxed privacy</a:t>
+            </a:r>
+            <a:endParaRPr lang="en-US" i="0" baseline="0" dirty="0" smtClean="0">
+              <a:sym typeface="Wingdings" panose="05000000000000000000" pitchFamily="2" charset="2"/>
+            </a:endParaRPr>
           </a:p>
           <a:p>
             <a:pPr marL="171450" indent="-171450">
@@ -2350,6 +2557,27 @@
           <a:bodyPr/>
           <a:lstStyle/>
           <a:p>
+            <a:pPr marL="0" marR="0" indent="0" algn="l" defTabSz="914400" rtl="0" eaLnBrk="1" fontAlgn="auto" latinLnBrk="0" hangingPunct="1">
+              <a:lnSpc>
+                <a:spcPct val="100000"/>
+              </a:lnSpc>
+              <a:spcBef>
+                <a:spcPts val="0"/>
+              </a:spcBef>
+              <a:spcAft>
+                <a:spcPts val="0"/>
+              </a:spcAft>
+              <a:buClrTx/>
+              <a:buSzTx/>
+              <a:buFontTx/>
+              <a:buNone/>
+              <a:tabLst/>
+              <a:defRPr/>
+            </a:pPr>
+            <a:r>
+              <a:rPr lang="en-US" i="0" baseline="0" dirty="0" smtClean="0"/>
+              <a:t>Noise value for LP-Guardian is 200m range</a:t>
+            </a:r>
             <a:endParaRPr lang="en-US" baseline="0" dirty="0" smtClean="0">
               <a:sym typeface="Wingdings" panose="05000000000000000000" pitchFamily="2" charset="2"/>
             </a:endParaRPr>
@@ -2607,12 +2835,25 @@
             </a:pPr>
             <a:r>
               <a:rPr lang="en-US" dirty="0" smtClean="0"/>
-              <a:t>Input: the application, the state of the application (foreground or background), the location sample, and whether</a:t>
+              <a:t>Input: the application, the state of the application (foreground or background), the location sample, </a:t>
+            </a:r>
+            <a:r>
+              <a:rPr lang="en-US" dirty="0" smtClean="0"/>
+              <a:t>whether</a:t>
             </a:r>
             <a:r>
               <a:rPr lang="en-US" baseline="0" dirty="0" smtClean="0"/>
-              <a:t> the application session is new or an ongoing session</a:t>
-            </a:r>
+              <a:t> </a:t>
+            </a:r>
+            <a:r>
+              <a:rPr lang="en-US" baseline="0" dirty="0" smtClean="0"/>
+              <a:t>the application session is new or an ongoing </a:t>
+            </a:r>
+            <a:r>
+              <a:rPr lang="en-US" baseline="0" dirty="0" smtClean="0"/>
+              <a:t>session, and the place/city/block</a:t>
+            </a:r>
+            <a:endParaRPr lang="en-US" baseline="0" dirty="0" smtClean="0"/>
           </a:p>
           <a:p>
             <a:pPr marL="171450" indent="-171450">
@@ -2621,8 +2862,13 @@
             </a:pPr>
             <a:r>
               <a:rPr lang="en-US" baseline="0" dirty="0" smtClean="0"/>
-              <a:t>Global rules: one per application</a:t>
-            </a:r>
+              <a:t>Global rules: one per </a:t>
+            </a:r>
+            <a:r>
+              <a:rPr lang="en-US" baseline="0" dirty="0" smtClean="0"/>
+              <a:t>application (applies to foreground and background states)</a:t>
+            </a:r>
+            <a:endParaRPr lang="en-US" baseline="0" dirty="0" smtClean="0"/>
           </a:p>
           <a:p>
             <a:pPr marL="171450" indent="-171450">
@@ -2830,26 +3076,13 @@
               <a:rPr lang="en-US" baseline="0" dirty="0" smtClean="0">
                 <a:sym typeface="Wingdings" panose="05000000000000000000" pitchFamily="2" charset="2"/>
               </a:rPr>
-              <a:t>Continued “maintenance” required to keep up with the all released applications</a:t>
-            </a:r>
-            <a:endParaRPr lang="en-US" baseline="0" dirty="0" smtClean="0"/>
-          </a:p>
-          <a:p>
-            <a:endParaRPr lang="en-US" baseline="0" dirty="0" smtClean="0"/>
-          </a:p>
-          <a:p>
-            <a:r>
-              <a:rPr lang="en-US" baseline="0" dirty="0" smtClean="0"/>
-              <a:t>Note of OS for smartphones: Android, Windows Phone, and Blackberry all use the permission model for applications versus. iOS which uses explicit user authentication for each access</a:t>
-            </a:r>
-          </a:p>
-          <a:p>
-            <a:endParaRPr lang="en-US" baseline="0" dirty="0" smtClean="0"/>
-          </a:p>
-          <a:p>
-            <a:r>
-              <a:rPr lang="en-US" baseline="0" dirty="0" smtClean="0"/>
-              <a:t>Static context field addition allows:</a:t>
+              <a:t>Continued “maintenance” required to keep up with the all released </a:t>
+            </a:r>
+            <a:r>
+              <a:rPr lang="en-US" baseline="0" dirty="0" smtClean="0">
+                <a:sym typeface="Wingdings" panose="05000000000000000000" pitchFamily="2" charset="2"/>
+              </a:rPr>
+              <a:t>applications</a:t>
             </a:r>
           </a:p>
           <a:p>
@@ -2857,9 +3090,14 @@
               <a:buFont typeface="Arial" panose="020B0604020202020204" pitchFamily="34" charset="0"/>
               <a:buChar char="•"/>
             </a:pPr>
+            <a:endParaRPr lang="en-US" baseline="0" dirty="0" smtClean="0">
+              <a:sym typeface="Wingdings" panose="05000000000000000000" pitchFamily="2" charset="2"/>
+            </a:endParaRPr>
+          </a:p>
+          <a:p>
             <a:r>
               <a:rPr lang="en-US" baseline="0" dirty="0" smtClean="0"/>
-              <a:t>Access to information about which application is requesting the location</a:t>
+              <a:t>Static context field addition allows:</a:t>
             </a:r>
           </a:p>
           <a:p>
@@ -2869,9 +3107,33 @@
             </a:pPr>
             <a:r>
               <a:rPr lang="en-US" baseline="0" dirty="0" smtClean="0"/>
+              <a:t>Access to information about which application is requesting the location</a:t>
+            </a:r>
+          </a:p>
+          <a:p>
+            <a:pPr marL="171450" indent="-171450">
+              <a:buFont typeface="Arial" panose="020B0604020202020204" pitchFamily="34" charset="0"/>
+              <a:buChar char="•"/>
+            </a:pPr>
+            <a:r>
+              <a:rPr lang="en-US" baseline="0" dirty="0" smtClean="0"/>
               <a:t>Ability to communicate with the Operating System and other processes</a:t>
             </a:r>
-            <a:endParaRPr lang="en-US" dirty="0" smtClean="0"/>
+            <a:endParaRPr lang="en-US" baseline="0" dirty="0" smtClean="0"/>
+          </a:p>
+          <a:p>
+            <a:endParaRPr lang="en-US" baseline="0" dirty="0" smtClean="0"/>
+          </a:p>
+          <a:p>
+            <a:r>
+              <a:rPr lang="en-US" baseline="0" dirty="0" smtClean="0"/>
+              <a:t>Note of OS for smartphones: Android, Windows Phone, and Blackberry all use the permission model for applications versus. iOS which uses explicit user authentication for each </a:t>
+            </a:r>
+            <a:r>
+              <a:rPr lang="en-US" baseline="0" dirty="0" smtClean="0"/>
+              <a:t>access</a:t>
+            </a:r>
+            <a:endParaRPr lang="en-US" baseline="0" dirty="0" smtClean="0"/>
           </a:p>
         </p:txBody>
       </p:sp>
@@ -4720,7 +4982,7 @@
           <a:p>
             <a:fld id="{ADE5661A-BDAA-4579-B2F5-AA9011776D83}" type="datetimeFigureOut">
               <a:rPr lang="en-US" smtClean="0"/>
-              <a:t>2/23/2015</a:t>
+              <a:t>2/24/2015</a:t>
             </a:fld>
             <a:endParaRPr lang="en-US" dirty="0"/>
           </a:p>
@@ -5827,7 +6089,7 @@
             <a:fld id="{1D8BD707-D9CF-40AE-B4C6-C98DA3205C09}" type="datetimeFigureOut">
               <a:rPr lang="en-US" smtClean="0"/>
               <a:pPr/>
-              <a:t>2/23/2015</a:t>
+              <a:t>2/24/2015</a:t>
             </a:fld>
             <a:endParaRPr lang="en-US" dirty="0"/>
           </a:p>
@@ -6942,7 +7204,7 @@
             <a:fld id="{1D8BD707-D9CF-40AE-B4C6-C98DA3205C09}" type="datetimeFigureOut">
               <a:rPr lang="en-US" smtClean="0"/>
               <a:pPr/>
-              <a:t>2/23/2015</a:t>
+              <a:t>2/24/2015</a:t>
             </a:fld>
             <a:endParaRPr lang="en-US" dirty="0"/>
           </a:p>
@@ -8052,7 +8314,7 @@
             <a:fld id="{1D8BD707-D9CF-40AE-B4C6-C98DA3205C09}" type="datetimeFigureOut">
               <a:rPr lang="en-US" smtClean="0"/>
               <a:pPr/>
-              <a:t>2/23/2015</a:t>
+              <a:t>2/24/2015</a:t>
             </a:fld>
             <a:endParaRPr lang="en-US" dirty="0"/>
           </a:p>
@@ -9646,7 +9908,7 @@
           <a:p>
             <a:fld id="{7D698992-9F5B-4E9D-871D-4517B2EC8643}" type="datetimeFigureOut">
               <a:rPr lang="en-US" smtClean="0"/>
-              <a:t>2/23/2015</a:t>
+              <a:t>2/24/2015</a:t>
             </a:fld>
             <a:endParaRPr lang="en-US" dirty="0"/>
           </a:p>
@@ -10705,7 +10967,7 @@
             <a:fld id="{1D8BD707-D9CF-40AE-B4C6-C98DA3205C09}" type="datetimeFigureOut">
               <a:rPr lang="en-US" smtClean="0"/>
               <a:pPr/>
-              <a:t>2/23/2015</a:t>
+              <a:t>2/24/2015</a:t>
             </a:fld>
             <a:endParaRPr lang="en-US" dirty="0"/>
           </a:p>
@@ -12034,7 +12296,7 @@
             <a:fld id="{1D8BD707-D9CF-40AE-B4C6-C98DA3205C09}" type="datetimeFigureOut">
               <a:rPr lang="en-US" smtClean="0"/>
               <a:pPr/>
-              <a:t>2/23/2015</a:t>
+              <a:t>2/24/2015</a:t>
             </a:fld>
             <a:endParaRPr lang="en-US" dirty="0"/>
           </a:p>
@@ -13173,7 +13435,7 @@
             <a:fld id="{1D8BD707-D9CF-40AE-B4C6-C98DA3205C09}" type="datetimeFigureOut">
               <a:rPr lang="en-US" smtClean="0"/>
               <a:pPr/>
-              <a:t>2/23/2015</a:t>
+              <a:t>2/24/2015</a:t>
             </a:fld>
             <a:endParaRPr lang="en-US" dirty="0"/>
           </a:p>
@@ -14231,7 +14493,7 @@
             <a:fld id="{1D8BD707-D9CF-40AE-B4C6-C98DA3205C09}" type="datetimeFigureOut">
               <a:rPr lang="en-US" smtClean="0"/>
               <a:pPr/>
-              <a:t>2/23/2015</a:t>
+              <a:t>2/24/2015</a:t>
             </a:fld>
             <a:endParaRPr lang="en-US" dirty="0"/>
           </a:p>
@@ -15271,7 +15533,7 @@
             <a:fld id="{1D8BD707-D9CF-40AE-B4C6-C98DA3205C09}" type="datetimeFigureOut">
               <a:rPr lang="en-US" smtClean="0"/>
               <a:pPr/>
-              <a:t>2/23/2015</a:t>
+              <a:t>2/24/2015</a:t>
             </a:fld>
             <a:endParaRPr lang="en-US" dirty="0"/>
           </a:p>
@@ -16508,7 +16770,7 @@
             <a:fld id="{1D8BD707-D9CF-40AE-B4C6-C98DA3205C09}" type="datetimeFigureOut">
               <a:rPr lang="en-US" smtClean="0"/>
               <a:pPr/>
-              <a:t>2/23/2015</a:t>
+              <a:t>2/24/2015</a:t>
             </a:fld>
             <a:endParaRPr lang="en-US" dirty="0"/>
           </a:p>
@@ -16863,7 +17125,7 @@
             <a:fld id="{1D8BD707-D9CF-40AE-B4C6-C98DA3205C09}" type="datetimeFigureOut">
               <a:rPr lang="en-US" smtClean="0"/>
               <a:pPr/>
-              <a:t>2/23/2015</a:t>
+              <a:t>2/24/2015</a:t>
             </a:fld>
             <a:endParaRPr lang="en-US" dirty="0"/>
           </a:p>
@@ -17521,7 +17783,15 @@
           <a:p>
             <a:r>
               <a:rPr lang="en-US" dirty="0" smtClean="0"/>
-              <a:t>Location Interceptor: diverts the application flow to LP-Guardian upon location access (and blocks the app.) and returns the anonymized location</a:t>
+              <a:t>Location Interceptor: diverts the application flow to LP-Guardian upon location access </a:t>
+            </a:r>
+            <a:r>
+              <a:rPr lang="en-US" dirty="0" smtClean="0"/>
+              <a:t>(blocks </a:t>
+            </a:r>
+            <a:r>
+              <a:rPr lang="en-US" dirty="0" smtClean="0"/>
+              <a:t>the app.) and returns the anonymized location</a:t>
             </a:r>
           </a:p>
           <a:p>
@@ -17774,34 +18044,6 @@
                 <a:srgbClr val="FFFFFF"/>
               </a:solidFill>
             </a:endParaRPr>
-          </a:p>
-        </p:txBody>
-      </p:sp>
-      <p:sp>
-        <p:nvSpPr>
-          <p:cNvPr id="4" name="Rectangle 3"/>
-          <p:cNvSpPr/>
-          <p:nvPr/>
-        </p:nvSpPr>
-        <p:spPr>
-          <a:xfrm>
-            <a:off x="4424363" y="3244334"/>
-            <a:ext cx="295274" cy="369332"/>
-          </a:xfrm>
-          <a:prstGeom prst="rect">
-            <a:avLst/>
-          </a:prstGeom>
-        </p:spPr>
-        <p:txBody>
-          <a:bodyPr wrap="none">
-            <a:spAutoFit/>
-          </a:bodyPr>
-          <a:lstStyle/>
-          <a:p>
-            <a:r>
-              <a:rPr lang="en-US" dirty="0"/>
-              <a:t>e</a:t>
-            </a:r>
           </a:p>
         </p:txBody>
       </p:sp>
@@ -17892,12 +18134,12 @@
         <p:spPr>
           <a:xfrm>
             <a:off x="2743200" y="1874519"/>
-            <a:ext cx="5791200" cy="3200400"/>
+            <a:ext cx="5791200" cy="3916682"/>
           </a:xfrm>
         </p:spPr>
         <p:txBody>
           <a:bodyPr>
-            <a:normAutofit fontScale="92500" lnSpcReduction="20000"/>
+            <a:normAutofit lnSpcReduction="10000"/>
           </a:bodyPr>
           <a:lstStyle/>
           <a:p>
@@ -17931,14 +18173,26 @@
           <a:p>
             <a:r>
               <a:rPr lang="en-US" dirty="0" smtClean="0"/>
-              <a:t>Instrumented the platform operating system and LP-Guardian modifies the location object before it reaches the application requesting the location</a:t>
+              <a:t>LP-Guardian </a:t>
+            </a:r>
+            <a:r>
+              <a:rPr lang="en-US" dirty="0" smtClean="0"/>
+              <a:t>modifies the location object before it reaches the application requesting the location</a:t>
             </a:r>
           </a:p>
           <a:p>
             <a:pPr lvl="1"/>
             <a:r>
               <a:rPr lang="en-US" dirty="0" smtClean="0"/>
-              <a:t>Modified Location class to contain a static context field that is populated whenever a context is created for the application</a:t>
+              <a:t>Modified </a:t>
+            </a:r>
+            <a:r>
+              <a:rPr lang="en-US" dirty="0" smtClean="0"/>
+              <a:t>Android Location </a:t>
+            </a:r>
+            <a:r>
+              <a:rPr lang="en-US" dirty="0" smtClean="0"/>
+              <a:t>class to contain a static context field that is populated whenever a context is created for the application</a:t>
             </a:r>
           </a:p>
           <a:p>
@@ -19643,11 +19897,7 @@
           <a:p>
             <a:r>
               <a:rPr lang="en-US" dirty="0" smtClean="0"/>
-              <a:t>Research indicated users are concerned with location data collected by smartphone </a:t>
-            </a:r>
-            <a:r>
-              <a:rPr lang="en-US" dirty="0" smtClean="0"/>
-              <a:t>apps</a:t>
+              <a:t>Research indicated users are concerned with location data collected by smartphone apps</a:t>
             </a:r>
           </a:p>
           <a:p>
@@ -19667,13 +19917,8 @@
             <a:pPr lvl="1"/>
             <a:r>
               <a:rPr lang="en-US" dirty="0" smtClean="0"/>
-              <a:t>Will not attempt to hack or modify privacy controls on the operatin</a:t>
-            </a:r>
-            <a:r>
-              <a:rPr lang="en-US" dirty="0" smtClean="0"/>
-              <a:t>g system</a:t>
-            </a:r>
-            <a:endParaRPr lang="en-US" dirty="0" smtClean="0"/>
+              <a:t>Will not attempt to hack or modify privacy controls on the operating system</a:t>
+            </a:r>
           </a:p>
           <a:p>
             <a:r>
@@ -20041,7 +20286,7 @@
           <p:nvPr>
             <p:extLst>
               <p:ext uri="{D42A27DB-BD31-4B8C-83A1-F6EECF244321}">
-                <p14:modId xmlns:p14="http://schemas.microsoft.com/office/powerpoint/2010/main" val="4211512607"/>
+                <p14:modId xmlns:p14="http://schemas.microsoft.com/office/powerpoint/2010/main" val="795361454"/>
               </p:ext>
             </p:extLst>
           </p:nvPr>
@@ -20127,7 +20372,15 @@
                       </a:r>
                       <a:r>
                         <a:rPr lang="en-US" baseline="0" dirty="0" smtClean="0"/>
-                        <a:t> of Prior Art.</a:t>
+                        <a:t> of Prior </a:t>
+                      </a:r>
+                      <a:r>
+                        <a:rPr lang="en-US" baseline="0" dirty="0" smtClean="0"/>
+                        <a:t>Art</a:t>
+                      </a:r>
+                      <a:r>
+                        <a:rPr lang="en-US" baseline="0" dirty="0" smtClean="0"/>
+                        <a:t/>
                       </a:r>
                       <a:br>
                         <a:rPr lang="en-US" baseline="0" dirty="0" smtClean="0"/>
@@ -20141,7 +20394,11 @@
                       </a:br>
                       <a:r>
                         <a:rPr lang="en-US" baseline="0" dirty="0" smtClean="0"/>
-                        <a:t>- Advantages of Proposed Approach over Prior Art.</a:t>
+                        <a:t>- Advantages of Proposed Approach over Prior </a:t>
+                      </a:r>
+                      <a:r>
+                        <a:rPr lang="en-US" baseline="0" dirty="0" smtClean="0"/>
+                        <a:t>Art</a:t>
                       </a:r>
                       <a:endParaRPr lang="en-US" dirty="0"/>
                     </a:p>
@@ -20835,6 +21092,13 @@
   <p:clrMapOvr>
     <a:masterClrMapping/>
   </p:clrMapOvr>
+  <p:timing>
+    <p:tnLst>
+      <p:par>
+        <p:cTn id="1" dur="indefinite" restart="never" nodeType="tmRoot"/>
+      </p:par>
+    </p:tnLst>
+  </p:timing>
 </p:sld>
 </file>
 
@@ -20905,13 +21169,11 @@
           <a:p>
             <a:r>
               <a:rPr lang="en-US" dirty="0" smtClean="0"/>
-              <a:t>Background location access versus foreground and persistent service location access</a:t>
-            </a:r>
-          </a:p>
-          <a:p>
+              <a:t>Identification </a:t>
+            </a:r>
             <a:r>
               <a:rPr lang="en-US" dirty="0" smtClean="0"/>
-              <a:t>Identification Protection</a:t>
+              <a:t>Protection</a:t>
             </a:r>
           </a:p>
           <a:p>
@@ -20925,8 +21187,25 @@
             <a:pPr lvl="1"/>
             <a:r>
               <a:rPr lang="en-US" dirty="0" smtClean="0"/>
-              <a:t>Identification can be done via an anonymous mobility histogram</a:t>
-            </a:r>
+              <a:t>Identification can be </a:t>
+            </a:r>
+            <a:r>
+              <a:rPr lang="en-US" dirty="0" smtClean="0"/>
+              <a:t>achieved</a:t>
+            </a:r>
+            <a:r>
+              <a:rPr lang="en-US" dirty="0" smtClean="0"/>
+              <a:t> </a:t>
+            </a:r>
+            <a:r>
+              <a:rPr lang="en-US" dirty="0" smtClean="0"/>
+              <a:t>via an anonymous </a:t>
+            </a:r>
+            <a:r>
+              <a:rPr lang="en-US" dirty="0" smtClean="0"/>
+              <a:t>histogram of city blocks visited given a database of background information</a:t>
+            </a:r>
+            <a:endParaRPr lang="en-US" dirty="0" smtClean="0"/>
           </a:p>
           <a:p>
             <a:pPr lvl="1"/>
@@ -20940,8 +21219,13 @@
             <a:pPr lvl="1"/>
             <a:r>
               <a:rPr lang="en-US" dirty="0" smtClean="0"/>
-              <a:t>LP-Guardian releases the location as long as the histogram is reasonably close to that of another individual’s</a:t>
-            </a:r>
+              <a:t>LP-Guardian releases the location as long as the histogram is reasonably close to that of another </a:t>
+            </a:r>
+            <a:r>
+              <a:rPr lang="en-US" dirty="0" smtClean="0"/>
+              <a:t>individual’s in the city</a:t>
+            </a:r>
+            <a:endParaRPr lang="en-US" dirty="0" smtClean="0"/>
           </a:p>
           <a:p>
             <a:pPr lvl="1"/>
@@ -20971,7 +21255,7 @@
             </a:r>
           </a:p>
           <a:p>
-            <a:pPr lvl="5"/>
+            <a:pPr lvl="3"/>
             <a:r>
               <a:rPr lang="en-US" dirty="0" smtClean="0"/>
               <a:t>Can be a general value or set on a per-application basis</a:t>
@@ -21027,7 +21311,7 @@
         </p:blipFill>
         <p:spPr bwMode="auto">
           <a:xfrm>
-            <a:off x="3407352" y="3352800"/>
+            <a:off x="3141711" y="2826307"/>
             <a:ext cx="2124075" cy="533400"/>
           </a:xfrm>
           <a:prstGeom prst="rect">
@@ -21068,7 +21352,7 @@
         </p:blipFill>
         <p:spPr bwMode="auto">
           <a:xfrm>
-            <a:off x="3141711" y="4495800"/>
+            <a:off x="3141711" y="4038600"/>
             <a:ext cx="2057400" cy="495301"/>
           </a:xfrm>
           <a:prstGeom prst="rect">
@@ -21094,7 +21378,7 @@
         </p:nvCxnSpPr>
         <p:spPr>
           <a:xfrm>
-            <a:off x="5334000" y="4724400"/>
+            <a:off x="5279854" y="4227516"/>
             <a:ext cx="394855" cy="1"/>
           </a:xfrm>
           <a:prstGeom prst="straightConnector1">
@@ -21142,7 +21426,7 @@
         </p:blipFill>
         <p:spPr bwMode="auto">
           <a:xfrm>
-            <a:off x="5913774" y="4514851"/>
+            <a:off x="5758969" y="4038600"/>
             <a:ext cx="2800350" cy="457200"/>
           </a:xfrm>
           <a:prstGeom prst="rect">

</xml_diff>

<commit_message>
Fixed up my slides
</commit_message>
<xml_diff>
--- a/PaperPresentation/Paper_Presentation_Fasburg_Reiff_Thomas.pptx
+++ b/PaperPresentation/Paper_Presentation_Fasburg_Reiff_Thomas.pptx
@@ -131,7 +131,7 @@
   </p:defaultTextStyle>
   <p:extLst>
     <p:ext uri="{EFAFB233-063F-42B5-8137-9DF3F51BA10A}">
-      <p15:sldGuideLst xmlns:p15="http://schemas.microsoft.com/office/powerpoint/2012/main">
+      <p15:sldGuideLst xmlns:p15="http://schemas.microsoft.com/office/powerpoint/2012/main" xmlns="">
         <p15:guide id="1" orient="horz" pos="2160">
           <p15:clr>
             <a:srgbClr val="A4A3A4"/>
@@ -344,7 +344,6 @@
     </c:plotArea>
     <c:legend>
       <c:legendPos val="r"/>
-      <c:layout/>
       <c:overlay val="0"/>
     </c:legend>
     <c:plotVisOnly val="1"/>
@@ -675,7 +674,6 @@
     </c:plotArea>
     <c:legend>
       <c:legendPos val="r"/>
-      <c:layout/>
       <c:overlay val="0"/>
     </c:legend>
     <c:plotVisOnly val="1"/>
@@ -780,7 +778,7 @@
           <a:p>
             <a:fld id="{A63B8CFC-D614-4432-A7DB-A65856E85B43}" type="datetimeFigureOut">
               <a:rPr lang="en-US" smtClean="0"/>
-              <a:t>2/24/2015</a:t>
+              <a:t>2/25/2015</a:t>
             </a:fld>
             <a:endParaRPr lang="en-US" dirty="0"/>
           </a:p>
@@ -1094,24 +1092,28 @@
           <a:p>
             <a:r>
               <a:rPr lang="en-US" dirty="0" smtClean="0"/>
-              <a:t>A&amp;A = Advertising</a:t>
+              <a:t>78%</a:t>
             </a:r>
             <a:r>
               <a:rPr lang="en-US" baseline="0" dirty="0" smtClean="0"/>
-              <a:t> &amp; analytics</a:t>
-            </a:r>
-          </a:p>
-          <a:p>
+              <a:t> of survey </a:t>
+            </a:r>
+            <a:r>
+              <a:rPr lang="en-US" baseline="0" dirty="0" err="1" smtClean="0"/>
+              <a:t>respondants</a:t>
+            </a:r>
             <a:r>
               <a:rPr lang="en-US" baseline="0" dirty="0" smtClean="0"/>
-              <a:t>Rule for foreground apps is selected by user</a:t>
+              <a:t> believe mobile phone location data collection can pose a privacy threat</a:t>
             </a:r>
           </a:p>
           <a:p>
             <a:r>
               <a:rPr lang="en-US" baseline="0" dirty="0" smtClean="0"/>
-              <a:t>Unclear how LP-guardian decides if info is safe to release???</a:t>
-            </a:r>
+              <a:t>APIs that use the android “Location” object. The standard mechanism for using location in android apps</a:t>
+            </a:r>
+          </a:p>
+          <a:p>
             <a:endParaRPr lang="en-US" dirty="0"/>
           </a:p>
         </p:txBody>
@@ -1133,7 +1135,7 @@
           <a:p>
             <a:fld id="{B8B3BC3C-0900-4ACD-9030-5BE6C2442A68}" type="slidenum">
               <a:rPr lang="en-US" smtClean="0"/>
-              <a:t>4</a:t>
+              <a:t>2</a:t>
             </a:fld>
             <a:endParaRPr lang="en-US" dirty="0"/>
           </a:p>
@@ -1142,7 +1144,7 @@
     </p:spTree>
     <p:extLst>
       <p:ext uri="{BB962C8B-B14F-4D97-AF65-F5344CB8AC3E}">
-        <p14:creationId xmlns:p14="http://schemas.microsoft.com/office/powerpoint/2010/main" val="2053636732"/>
+        <p14:creationId xmlns:p14="http://schemas.microsoft.com/office/powerpoint/2010/main" val="3352367101"/>
       </p:ext>
     </p:extLst>
   </p:cSld>
@@ -1198,11 +1200,74 @@
           <a:p>
             <a:r>
               <a:rPr lang="en-US" dirty="0" smtClean="0"/>
-              <a:t>82% indicate no problem</a:t>
+              <a:t>Introduction</a:t>
             </a:r>
             <a:r>
               <a:rPr lang="en-US" baseline="0" dirty="0" smtClean="0"/>
-              <a:t> sharing city level location for social networking</a:t>
+              <a:t> to the slides: Three instances of LP-Guardian use that require user interaction…</a:t>
+            </a:r>
+            <a:endParaRPr lang="en-US" dirty="0" smtClean="0"/>
+          </a:p>
+          <a:p>
+            <a:endParaRPr lang="en-US" dirty="0" smtClean="0"/>
+          </a:p>
+          <a:p>
+            <a:r>
+              <a:rPr lang="en-US" dirty="0" smtClean="0"/>
+              <a:t>Placement of prompts</a:t>
+            </a:r>
+            <a:r>
+              <a:rPr lang="en-US" baseline="0" dirty="0" smtClean="0"/>
+              <a:t> for controlling resource access obey the four main rules/objectives:</a:t>
+            </a:r>
+          </a:p>
+          <a:p>
+            <a:pPr marL="171450" indent="-171450">
+              <a:buFont typeface="Arial" panose="020B0604020202020204" pitchFamily="34" charset="0"/>
+              <a:buChar char="•"/>
+            </a:pPr>
+            <a:r>
+              <a:rPr lang="en-US" baseline="0" dirty="0" smtClean="0"/>
+              <a:t>Safety – user prompt precedes every resource access</a:t>
+            </a:r>
+          </a:p>
+          <a:p>
+            <a:pPr marL="171450" indent="-171450">
+              <a:buFont typeface="Arial" panose="020B0604020202020204" pitchFamily="34" charset="0"/>
+              <a:buChar char="•"/>
+            </a:pPr>
+            <a:r>
+              <a:rPr lang="en-US" baseline="0" dirty="0" smtClean="0"/>
+              <a:t>Frugality – user prompt is </a:t>
+            </a:r>
+            <a:r>
+              <a:rPr lang="en-US" i="1" baseline="0" dirty="0" smtClean="0"/>
+              <a:t>only</a:t>
+            </a:r>
+            <a:r>
+              <a:rPr lang="en-US" i="0" baseline="0" dirty="0" smtClean="0"/>
+              <a:t> displayed in the event of a resource access</a:t>
+            </a:r>
+            <a:endParaRPr lang="en-US" baseline="0" dirty="0" smtClean="0"/>
+          </a:p>
+          <a:p>
+            <a:pPr marL="171450" indent="-171450">
+              <a:buFont typeface="Arial" panose="020B0604020202020204" pitchFamily="34" charset="0"/>
+              <a:buChar char="•"/>
+            </a:pPr>
+            <a:r>
+              <a:rPr lang="en-US" baseline="0" dirty="0" smtClean="0"/>
+              <a:t>Visibility – user prompt displayed only if the application in the foreground is attempting to access a resource</a:t>
+            </a:r>
+          </a:p>
+          <a:p>
+            <a:pPr marL="171450" indent="-171450">
+              <a:buFont typeface="Arial" panose="020B0604020202020204" pitchFamily="34" charset="0"/>
+              <a:buChar char="•"/>
+            </a:pPr>
+            <a:r>
+              <a:rPr lang="en-US" baseline="0" dirty="0" smtClean="0"/>
+              <a:t>Non-repetitiveness – prompt never displayed when a more critical resource of the same type has been authorized (implied authorization)</a:t>
             </a:r>
             <a:endParaRPr lang="en-US" dirty="0"/>
           </a:p>
@@ -1224,17 +1289,26 @@
           <a:lstStyle/>
           <a:p>
             <a:fld id="{B8B3BC3C-0900-4ACD-9030-5BE6C2442A68}" type="slidenum">
-              <a:rPr lang="en-US" smtClean="0"/>
-              <a:t>14</a:t>
+              <a:rPr lang="en-US" smtClean="0">
+                <a:solidFill>
+                  <a:prstClr val="black"/>
+                </a:solidFill>
+              </a:rPr>
+              <a:pPr/>
+              <a:t>12</a:t>
             </a:fld>
-            <a:endParaRPr lang="en-US" dirty="0"/>
+            <a:endParaRPr lang="en-US" dirty="0">
+              <a:solidFill>
+                <a:prstClr val="black"/>
+              </a:solidFill>
+            </a:endParaRPr>
           </a:p>
         </p:txBody>
       </p:sp>
     </p:spTree>
     <p:extLst>
       <p:ext uri="{BB962C8B-B14F-4D97-AF65-F5344CB8AC3E}">
-        <p14:creationId xmlns:p14="http://schemas.microsoft.com/office/powerpoint/2010/main" val="3574496599"/>
+        <p14:creationId xmlns:p14="http://schemas.microsoft.com/office/powerpoint/2010/main" val="1009101082"/>
       </p:ext>
     </p:extLst>
   </p:cSld>
@@ -1290,11 +1364,17 @@
           <a:p>
             <a:r>
               <a:rPr lang="en-US" dirty="0" smtClean="0"/>
-              <a:t>78% indicate no problem</a:t>
+              <a:t>Looking to see if there is a  market for an app like LP-Guardian</a:t>
+            </a:r>
+          </a:p>
+          <a:p>
+            <a:r>
+              <a:rPr lang="en-US" dirty="0" smtClean="0"/>
+              <a:t>70 from social network announcements, 110 from amazon</a:t>
             </a:r>
             <a:r>
               <a:rPr lang="en-US" baseline="0" dirty="0" smtClean="0"/>
-              <a:t> sharing city level location for messaging.</a:t>
+              <a:t> mechanical turk</a:t>
             </a:r>
             <a:endParaRPr lang="en-US" dirty="0"/>
           </a:p>
@@ -1317,7 +1397,7 @@
           <a:p>
             <a:fld id="{B8B3BC3C-0900-4ACD-9030-5BE6C2442A68}" type="slidenum">
               <a:rPr lang="en-US" smtClean="0"/>
-              <a:t>15</a:t>
+              <a:t>13</a:t>
             </a:fld>
             <a:endParaRPr lang="en-US" dirty="0"/>
           </a:p>
@@ -1382,7 +1462,11 @@
           <a:p>
             <a:r>
               <a:rPr lang="en-US" dirty="0" smtClean="0"/>
-              <a:t>Conclusion is that users generally won’t mind some loss in app location functionality at home/work</a:t>
+              <a:t>82% indicate no problem</a:t>
+            </a:r>
+            <a:r>
+              <a:rPr lang="en-US" baseline="0" dirty="0" smtClean="0"/>
+              <a:t> sharing city level location for social networking</a:t>
             </a:r>
             <a:endParaRPr lang="en-US" dirty="0"/>
           </a:p>
@@ -1405,7 +1489,7 @@
           <a:p>
             <a:fld id="{B8B3BC3C-0900-4ACD-9030-5BE6C2442A68}" type="slidenum">
               <a:rPr lang="en-US" smtClean="0"/>
-              <a:t>16</a:t>
+              <a:t>14</a:t>
             </a:fld>
             <a:endParaRPr lang="en-US" dirty="0"/>
           </a:p>
@@ -1470,17 +1554,11 @@
           <a:p>
             <a:r>
               <a:rPr lang="en-US" dirty="0" smtClean="0"/>
-              <a:t>Looked</a:t>
+              <a:t>78% indicate no problem</a:t>
             </a:r>
             <a:r>
               <a:rPr lang="en-US" baseline="0" dirty="0" smtClean="0"/>
-              <a:t> at 40 location accessing apps and took average</a:t>
-            </a:r>
-          </a:p>
-          <a:p>
-            <a:r>
-              <a:rPr lang="en-US" baseline="0" dirty="0" smtClean="0"/>
-              <a:t>Inside: anonymization delay for worst-case scenario</a:t>
+              <a:t> sharing city level location for messaging.</a:t>
             </a:r>
             <a:endParaRPr lang="en-US" dirty="0"/>
           </a:p>
@@ -1503,7 +1581,7 @@
           <a:p>
             <a:fld id="{B8B3BC3C-0900-4ACD-9030-5BE6C2442A68}" type="slidenum">
               <a:rPr lang="en-US" smtClean="0"/>
-              <a:t>17</a:t>
+              <a:t>15</a:t>
             </a:fld>
             <a:endParaRPr lang="en-US" dirty="0"/>
           </a:p>
@@ -1568,11 +1646,7 @@
           <a:p>
             <a:r>
               <a:rPr lang="en-US" dirty="0" smtClean="0"/>
-              <a:t>Looked</a:t>
-            </a:r>
-            <a:r>
-              <a:rPr lang="en-US" baseline="0" dirty="0" smtClean="0"/>
-              <a:t> at 40 location accessing apps and took average</a:t>
+              <a:t>Conclusion is that users generally won’t mind some loss in app location functionality at home/work</a:t>
             </a:r>
             <a:endParaRPr lang="en-US" dirty="0"/>
           </a:p>
@@ -1595,7 +1669,7 @@
           <a:p>
             <a:fld id="{B8B3BC3C-0900-4ACD-9030-5BE6C2442A68}" type="slidenum">
               <a:rPr lang="en-US" smtClean="0"/>
-              <a:t>18</a:t>
+              <a:t>16</a:t>
             </a:fld>
             <a:endParaRPr lang="en-US" dirty="0"/>
           </a:p>
@@ -1658,6 +1732,20 @@
           <a:bodyPr/>
           <a:lstStyle/>
           <a:p>
+            <a:r>
+              <a:rPr lang="en-US" dirty="0" smtClean="0"/>
+              <a:t>Looked</a:t>
+            </a:r>
+            <a:r>
+              <a:rPr lang="en-US" baseline="0" dirty="0" smtClean="0"/>
+              <a:t> at 40 location accessing apps and took average</a:t>
+            </a:r>
+          </a:p>
+          <a:p>
+            <a:r>
+              <a:rPr lang="en-US" baseline="0" dirty="0" smtClean="0"/>
+              <a:t>Inside: anonymization delay for worst-case scenario</a:t>
+            </a:r>
             <a:endParaRPr lang="en-US" dirty="0"/>
           </a:p>
         </p:txBody>
@@ -1679,7 +1767,7 @@
           <a:p>
             <a:fld id="{B8B3BC3C-0900-4ACD-9030-5BE6C2442A68}" type="slidenum">
               <a:rPr lang="en-US" smtClean="0"/>
-              <a:t>19</a:t>
+              <a:t>17</a:t>
             </a:fld>
             <a:endParaRPr lang="en-US" dirty="0"/>
           </a:p>
@@ -1744,6 +1832,182 @@
           <a:p>
             <a:r>
               <a:rPr lang="en-US" dirty="0" smtClean="0"/>
+              <a:t>Looked</a:t>
+            </a:r>
+            <a:r>
+              <a:rPr lang="en-US" baseline="0" dirty="0" smtClean="0"/>
+              <a:t> at 40 location accessing apps and took average</a:t>
+            </a:r>
+            <a:endParaRPr lang="en-US" dirty="0"/>
+          </a:p>
+        </p:txBody>
+      </p:sp>
+      <p:sp>
+        <p:nvSpPr>
+          <p:cNvPr id="4" name="Slide Number Placeholder 3"/>
+          <p:cNvSpPr>
+            <a:spLocks noGrp="1"/>
+          </p:cNvSpPr>
+          <p:nvPr>
+            <p:ph type="sldNum" sz="quarter" idx="10"/>
+          </p:nvPr>
+        </p:nvSpPr>
+        <p:spPr/>
+        <p:txBody>
+          <a:bodyPr/>
+          <a:lstStyle/>
+          <a:p>
+            <a:fld id="{B8B3BC3C-0900-4ACD-9030-5BE6C2442A68}" type="slidenum">
+              <a:rPr lang="en-US" smtClean="0"/>
+              <a:t>18</a:t>
+            </a:fld>
+            <a:endParaRPr lang="en-US" dirty="0"/>
+          </a:p>
+        </p:txBody>
+      </p:sp>
+    </p:spTree>
+    <p:extLst>
+      <p:ext uri="{BB962C8B-B14F-4D97-AF65-F5344CB8AC3E}">
+        <p14:creationId xmlns:p14="http://schemas.microsoft.com/office/powerpoint/2010/main" val="3574496599"/>
+      </p:ext>
+    </p:extLst>
+  </p:cSld>
+  <p:clrMapOvr>
+    <a:masterClrMapping/>
+  </p:clrMapOvr>
+</p:notes>
+</file>
+
+<file path=ppt/notesSlides/notesSlide17.xml><?xml version="1.0" encoding="utf-8"?>
+<p:notes xmlns:a="http://schemas.openxmlformats.org/drawingml/2006/main" xmlns:r="http://schemas.openxmlformats.org/officeDocument/2006/relationships" xmlns:p="http://schemas.openxmlformats.org/presentationml/2006/main">
+  <p:cSld>
+    <p:spTree>
+      <p:nvGrpSpPr>
+        <p:cNvPr id="1" name=""/>
+        <p:cNvGrpSpPr/>
+        <p:nvPr/>
+      </p:nvGrpSpPr>
+      <p:grpSpPr>
+        <a:xfrm>
+          <a:off x="0" y="0"/>
+          <a:ext cx="0" cy="0"/>
+          <a:chOff x="0" y="0"/>
+          <a:chExt cx="0" cy="0"/>
+        </a:xfrm>
+      </p:grpSpPr>
+      <p:sp>
+        <p:nvSpPr>
+          <p:cNvPr id="2" name="Slide Image Placeholder 1"/>
+          <p:cNvSpPr>
+            <a:spLocks noGrp="1" noRot="1" noChangeAspect="1"/>
+          </p:cNvSpPr>
+          <p:nvPr>
+            <p:ph type="sldImg"/>
+          </p:nvPr>
+        </p:nvSpPr>
+        <p:spPr/>
+      </p:sp>
+      <p:sp>
+        <p:nvSpPr>
+          <p:cNvPr id="3" name="Notes Placeholder 2"/>
+          <p:cNvSpPr>
+            <a:spLocks noGrp="1"/>
+          </p:cNvSpPr>
+          <p:nvPr>
+            <p:ph type="body" idx="1"/>
+          </p:nvPr>
+        </p:nvSpPr>
+        <p:spPr/>
+        <p:txBody>
+          <a:bodyPr/>
+          <a:lstStyle/>
+          <a:p>
+            <a:endParaRPr lang="en-US" dirty="0"/>
+          </a:p>
+        </p:txBody>
+      </p:sp>
+      <p:sp>
+        <p:nvSpPr>
+          <p:cNvPr id="4" name="Slide Number Placeholder 3"/>
+          <p:cNvSpPr>
+            <a:spLocks noGrp="1"/>
+          </p:cNvSpPr>
+          <p:nvPr>
+            <p:ph type="sldNum" sz="quarter" idx="10"/>
+          </p:nvPr>
+        </p:nvSpPr>
+        <p:spPr/>
+        <p:txBody>
+          <a:bodyPr/>
+          <a:lstStyle/>
+          <a:p>
+            <a:fld id="{B8B3BC3C-0900-4ACD-9030-5BE6C2442A68}" type="slidenum">
+              <a:rPr lang="en-US" smtClean="0"/>
+              <a:t>19</a:t>
+            </a:fld>
+            <a:endParaRPr lang="en-US" dirty="0"/>
+          </a:p>
+        </p:txBody>
+      </p:sp>
+    </p:spTree>
+    <p:extLst>
+      <p:ext uri="{BB962C8B-B14F-4D97-AF65-F5344CB8AC3E}">
+        <p14:creationId xmlns:p14="http://schemas.microsoft.com/office/powerpoint/2010/main" val="3574496599"/>
+      </p:ext>
+    </p:extLst>
+  </p:cSld>
+  <p:clrMapOvr>
+    <a:masterClrMapping/>
+  </p:clrMapOvr>
+</p:notes>
+</file>
+
+<file path=ppt/notesSlides/notesSlide18.xml><?xml version="1.0" encoding="utf-8"?>
+<p:notes xmlns:a="http://schemas.openxmlformats.org/drawingml/2006/main" xmlns:r="http://schemas.openxmlformats.org/officeDocument/2006/relationships" xmlns:p="http://schemas.openxmlformats.org/presentationml/2006/main">
+  <p:cSld>
+    <p:spTree>
+      <p:nvGrpSpPr>
+        <p:cNvPr id="1" name=""/>
+        <p:cNvGrpSpPr/>
+        <p:nvPr/>
+      </p:nvGrpSpPr>
+      <p:grpSpPr>
+        <a:xfrm>
+          <a:off x="0" y="0"/>
+          <a:ext cx="0" cy="0"/>
+          <a:chOff x="0" y="0"/>
+          <a:chExt cx="0" cy="0"/>
+        </a:xfrm>
+      </p:grpSpPr>
+      <p:sp>
+        <p:nvSpPr>
+          <p:cNvPr id="2" name="Slide Image Placeholder 1"/>
+          <p:cNvSpPr>
+            <a:spLocks noGrp="1" noRot="1" noChangeAspect="1"/>
+          </p:cNvSpPr>
+          <p:nvPr>
+            <p:ph type="sldImg"/>
+          </p:nvPr>
+        </p:nvSpPr>
+        <p:spPr/>
+      </p:sp>
+      <p:sp>
+        <p:nvSpPr>
+          <p:cNvPr id="3" name="Notes Placeholder 2"/>
+          <p:cNvSpPr>
+            <a:spLocks noGrp="1"/>
+          </p:cNvSpPr>
+          <p:nvPr>
+            <p:ph type="body" idx="1"/>
+          </p:nvPr>
+        </p:nvSpPr>
+        <p:spPr/>
+        <p:txBody>
+          <a:bodyPr/>
+          <a:lstStyle/>
+          <a:p>
+            <a:r>
+              <a:rPr lang="en-US" dirty="0" smtClean="0"/>
               <a:t>Synthetic routes: (S Health</a:t>
             </a:r>
             <a:r>
@@ -1858,23 +2122,11 @@
           <a:p>
             <a:r>
               <a:rPr lang="en-US" dirty="0" smtClean="0"/>
-              <a:t>“Allow” principles</a:t>
+              <a:t>Anonymized</a:t>
             </a:r>
             <a:r>
               <a:rPr lang="en-US" baseline="0" dirty="0" smtClean="0"/>
-              <a:t> relate to apps overreaching their location authority</a:t>
-            </a:r>
-          </a:p>
-          <a:p>
-            <a:r>
-              <a:rPr lang="en-US" baseline="0" dirty="0" smtClean="0"/>
-              <a:t>“Prevent” principles relate to the 3 location privacy threats from before</a:t>
-            </a:r>
-          </a:p>
-          <a:p>
-            <a:r>
-              <a:rPr lang="en-US" baseline="0" dirty="0" smtClean="0"/>
-              <a:t>Last 2 principles are practical concerns to ensure such a tool would be practical and likely to become widely used.</a:t>
+              <a:t> data meant cell tower ping based only. 95% of actions could be linked to a specific individual in the anonymous database</a:t>
             </a:r>
             <a:endParaRPr lang="en-US" dirty="0"/>
           </a:p>
@@ -1897,7 +2149,7 @@
           <a:p>
             <a:fld id="{B8B3BC3C-0900-4ACD-9030-5BE6C2442A68}" type="slidenum">
               <a:rPr lang="en-US" smtClean="0"/>
-              <a:t>5</a:t>
+              <a:t>3</a:t>
             </a:fld>
             <a:endParaRPr lang="en-US" dirty="0"/>
           </a:p>
@@ -1906,7 +2158,7 @@
     </p:spTree>
     <p:extLst>
       <p:ext uri="{BB962C8B-B14F-4D97-AF65-F5344CB8AC3E}">
-        <p14:creationId xmlns:p14="http://schemas.microsoft.com/office/powerpoint/2010/main" val="2053636732"/>
+        <p14:creationId xmlns:p14="http://schemas.microsoft.com/office/powerpoint/2010/main" val="3899786191"/>
       </p:ext>
     </p:extLst>
   </p:cSld>
@@ -1962,509 +2214,33 @@
           <a:p>
             <a:r>
               <a:rPr lang="en-US" dirty="0" smtClean="0"/>
-              <a:t>Design details relate back to the diagram from the Proposed Approach slide of the presentation (slide 4</a:t>
-            </a:r>
-            <a:r>
-              <a:rPr lang="en-US" dirty="0" smtClean="0"/>
-              <a:t>)</a:t>
-            </a:r>
-          </a:p>
-          <a:p>
-            <a:r>
-              <a:rPr lang="en-US" i="1" dirty="0" smtClean="0">
-                <a:solidFill>
-                  <a:srgbClr val="FF0000"/>
-                </a:solidFill>
-              </a:rPr>
-              <a:t>Mention details that should have been discussed = the left half/automatic city-coarsened level of the diagram: </a:t>
-            </a:r>
-            <a:endParaRPr lang="en-US" i="1" dirty="0" smtClean="0">
-              <a:solidFill>
-                <a:srgbClr val="FF0000"/>
-              </a:solidFill>
-            </a:endParaRPr>
-          </a:p>
-          <a:p>
-            <a:pPr marL="171450" indent="-171450">
-              <a:buFont typeface="Arial" panose="020B0604020202020204" pitchFamily="34" charset="0"/>
-              <a:buChar char="•"/>
-            </a:pPr>
-            <a:r>
-              <a:rPr lang="en-US" dirty="0" smtClean="0"/>
-              <a:t>Background</a:t>
+              <a:t>A&amp;A = Advertising</a:t>
             </a:r>
             <a:r>
               <a:rPr lang="en-US" baseline="0" dirty="0" smtClean="0"/>
-              <a:t> location access coarsened to city level </a:t>
-            </a:r>
-            <a:r>
-              <a:rPr lang="en-US" baseline="0" dirty="0" smtClean="0">
-                <a:sym typeface="Wingdings" panose="05000000000000000000" pitchFamily="2" charset="2"/>
-              </a:rPr>
-              <a:t> the rest of the information </a:t>
-            </a:r>
-            <a:r>
-              <a:rPr lang="en-US" baseline="0" dirty="0" smtClean="0">
-                <a:sym typeface="Wingdings" panose="05000000000000000000" pitchFamily="2" charset="2"/>
-              </a:rPr>
-              <a:t>applies </a:t>
-            </a:r>
-            <a:r>
-              <a:rPr lang="en-US" baseline="0" dirty="0" smtClean="0">
-                <a:sym typeface="Wingdings" panose="05000000000000000000" pitchFamily="2" charset="2"/>
-              </a:rPr>
-              <a:t>to foreground and persistent </a:t>
-            </a:r>
-            <a:r>
-              <a:rPr lang="en-US" baseline="0" dirty="0" smtClean="0">
-                <a:sym typeface="Wingdings" panose="05000000000000000000" pitchFamily="2" charset="2"/>
-              </a:rPr>
-              <a:t>(perceptible applications) location access</a:t>
-            </a:r>
-          </a:p>
-          <a:p>
-            <a:pPr marL="628650" lvl="1" indent="-171450">
-              <a:buFont typeface="Arial" panose="020B0604020202020204" pitchFamily="34" charset="0"/>
-              <a:buChar char="•"/>
-            </a:pPr>
-            <a:r>
-              <a:rPr lang="en-US" baseline="0" dirty="0" smtClean="0">
-                <a:sym typeface="Wingdings" panose="05000000000000000000" pitchFamily="2" charset="2"/>
-              </a:rPr>
-              <a:t>Reasoning: analysis showed that only 3% of applications access the user’s location while running in the background</a:t>
-            </a:r>
-          </a:p>
-          <a:p>
-            <a:pPr marL="171450" lvl="0" indent="-171450">
-              <a:buFont typeface="Arial" panose="020B0604020202020204" pitchFamily="34" charset="0"/>
-              <a:buChar char="•"/>
-            </a:pPr>
-            <a:r>
-              <a:rPr lang="en-US" sz="1100" baseline="0" dirty="0" smtClean="0">
-                <a:sym typeface="Wingdings" panose="05000000000000000000" pitchFamily="2" charset="2"/>
-              </a:rPr>
-              <a:t>A&amp;A library requests can be identified (shown via stack trace) and are sent city-coarsened information</a:t>
-            </a:r>
-          </a:p>
-          <a:p>
-            <a:pPr marL="171450" lvl="0" indent="-171450">
-              <a:buFont typeface="Arial" panose="020B0604020202020204" pitchFamily="34" charset="0"/>
-              <a:buChar char="•"/>
-            </a:pPr>
-            <a:endParaRPr lang="en-US" sz="1100" baseline="0" dirty="0" smtClean="0">
-              <a:sym typeface="Wingdings" panose="05000000000000000000" pitchFamily="2" charset="2"/>
-            </a:endParaRPr>
-          </a:p>
-          <a:p>
-            <a:pPr marL="0" lvl="0" indent="0">
-              <a:buFont typeface="Arial" panose="020B0604020202020204" pitchFamily="34" charset="0"/>
-              <a:buNone/>
-            </a:pPr>
-            <a:r>
-              <a:rPr lang="en-US" sz="1100" baseline="0" dirty="0" smtClean="0">
-                <a:sym typeface="Wingdings" panose="05000000000000000000" pitchFamily="2" charset="2"/>
-              </a:rPr>
-              <a:t>Threat Model: the adversary has access to a mapping between a set of individuals’ and the probability distributions of visiting each block in the city  aims to match the anonymous mobility histogram to an individual in the database</a:t>
-            </a:r>
-            <a:endParaRPr lang="en-US" sz="1100" baseline="0" dirty="0" smtClean="0">
-              <a:sym typeface="Wingdings" panose="05000000000000000000" pitchFamily="2" charset="2"/>
-            </a:endParaRPr>
-          </a:p>
-          <a:p>
-            <a:endParaRPr lang="en-US" baseline="0" dirty="0" smtClean="0">
-              <a:sym typeface="Wingdings" panose="05000000000000000000" pitchFamily="2" charset="2"/>
-            </a:endParaRPr>
-          </a:p>
-          <a:p>
-            <a:r>
-              <a:rPr lang="en-US" baseline="0" dirty="0" smtClean="0">
-                <a:sym typeface="Wingdings" panose="05000000000000000000" pitchFamily="2" charset="2"/>
-              </a:rPr>
-              <a:t>Identification Protection Formula = Probability </a:t>
-            </a:r>
-            <a:r>
-              <a:rPr lang="en-US" baseline="0" dirty="0" smtClean="0">
-                <a:sym typeface="Wingdings" panose="05000000000000000000" pitchFamily="2" charset="2"/>
-              </a:rPr>
-              <a:t>that the histogram belongs to a given individual</a:t>
-            </a:r>
-            <a:endParaRPr lang="en-US" baseline="0" dirty="0" smtClean="0">
-              <a:sym typeface="Wingdings" panose="05000000000000000000" pitchFamily="2" charset="2"/>
-            </a:endParaRPr>
-          </a:p>
-          <a:p>
-            <a:r>
-              <a:rPr lang="en-US" i="1" baseline="0" dirty="0" smtClean="0">
-                <a:sym typeface="Wingdings" panose="05000000000000000000" pitchFamily="2" charset="2"/>
-              </a:rPr>
-              <a:t>N = # of user </a:t>
-            </a:r>
-            <a:r>
-              <a:rPr lang="en-US" i="1" baseline="0" dirty="0" smtClean="0">
-                <a:sym typeface="Wingdings" panose="05000000000000000000" pitchFamily="2" charset="2"/>
-              </a:rPr>
-              <a:t>application sessions</a:t>
-            </a:r>
-            <a:endParaRPr lang="en-US" i="1" baseline="0" dirty="0" smtClean="0">
-              <a:sym typeface="Wingdings" panose="05000000000000000000" pitchFamily="2" charset="2"/>
-            </a:endParaRPr>
-          </a:p>
-          <a:p>
-            <a:r>
-              <a:rPr lang="en-US" i="1" baseline="0" dirty="0" err="1" smtClean="0">
-                <a:sym typeface="Wingdings" panose="05000000000000000000" pitchFamily="2" charset="2"/>
-              </a:rPr>
-              <a:t>Bl</a:t>
-            </a:r>
-            <a:r>
-              <a:rPr lang="en-US" i="1" baseline="0" dirty="0" smtClean="0">
-                <a:sym typeface="Wingdings" panose="05000000000000000000" pitchFamily="2" charset="2"/>
-              </a:rPr>
-              <a:t> = set of city blocks in the 2D grid of the city = {bl</a:t>
-            </a:r>
-            <a:r>
-              <a:rPr lang="en-US" i="1" baseline="-25000" dirty="0" smtClean="0">
-                <a:sym typeface="Wingdings" panose="05000000000000000000" pitchFamily="2" charset="2"/>
-              </a:rPr>
-              <a:t>1</a:t>
-            </a:r>
-            <a:r>
-              <a:rPr lang="en-US" i="1" baseline="0" dirty="0" smtClean="0">
-                <a:sym typeface="Wingdings" panose="05000000000000000000" pitchFamily="2" charset="2"/>
-              </a:rPr>
-              <a:t>, bl</a:t>
-            </a:r>
-            <a:r>
-              <a:rPr lang="en-US" i="1" baseline="-25000" dirty="0" smtClean="0">
-                <a:sym typeface="Wingdings" panose="05000000000000000000" pitchFamily="2" charset="2"/>
-              </a:rPr>
-              <a:t>2</a:t>
-            </a:r>
-            <a:r>
-              <a:rPr lang="en-US" i="1" baseline="0" dirty="0" smtClean="0">
-                <a:sym typeface="Wingdings" panose="05000000000000000000" pitchFamily="2" charset="2"/>
-              </a:rPr>
-              <a:t>, …, </a:t>
-            </a:r>
-            <a:r>
-              <a:rPr lang="en-US" i="1" baseline="0" dirty="0" smtClean="0">
-                <a:sym typeface="Wingdings" panose="05000000000000000000" pitchFamily="2" charset="2"/>
-              </a:rPr>
-              <a:t>}</a:t>
-            </a:r>
-          </a:p>
-          <a:p>
-            <a:pPr marL="0" marR="0" indent="0" algn="l" defTabSz="914400" rtl="0" eaLnBrk="1" fontAlgn="auto" latinLnBrk="0" hangingPunct="1">
-              <a:lnSpc>
-                <a:spcPct val="100000"/>
-              </a:lnSpc>
-              <a:spcBef>
-                <a:spcPts val="0"/>
-              </a:spcBef>
-              <a:spcAft>
-                <a:spcPts val="0"/>
-              </a:spcAft>
-              <a:buClrTx/>
-              <a:buSzTx/>
-              <a:buFontTx/>
-              <a:buNone/>
-              <a:tabLst/>
-              <a:defRPr/>
-            </a:pPr>
-            <a:r>
-              <a:rPr lang="en-US" i="1" baseline="0" dirty="0" err="1" smtClean="0">
-                <a:sym typeface="Wingdings" panose="05000000000000000000" pitchFamily="2" charset="2"/>
-              </a:rPr>
-              <a:t>c</a:t>
-            </a:r>
-            <a:r>
-              <a:rPr lang="en-US" i="1" baseline="-25000" dirty="0" err="1" smtClean="0">
-                <a:sym typeface="Wingdings" panose="05000000000000000000" pitchFamily="2" charset="2"/>
-              </a:rPr>
-              <a:t>bli</a:t>
-            </a:r>
-            <a:r>
-              <a:rPr lang="en-US" i="1" baseline="0" dirty="0" smtClean="0">
-                <a:sym typeface="Wingdings" panose="05000000000000000000" pitchFamily="2" charset="2"/>
-              </a:rPr>
-              <a:t> = the number of times that </a:t>
-            </a:r>
-            <a:r>
-              <a:rPr lang="en-US" i="1" baseline="0" dirty="0" err="1" smtClean="0">
-                <a:sym typeface="Wingdings" panose="05000000000000000000" pitchFamily="2" charset="2"/>
-              </a:rPr>
-              <a:t>bl</a:t>
-            </a:r>
-            <a:r>
-              <a:rPr lang="en-US" i="1" baseline="-25000" dirty="0" err="1" smtClean="0">
-                <a:sym typeface="Wingdings" panose="05000000000000000000" pitchFamily="2" charset="2"/>
-              </a:rPr>
-              <a:t>i</a:t>
-            </a:r>
-            <a:r>
-              <a:rPr lang="en-US" i="1" baseline="0" dirty="0" smtClean="0">
-                <a:sym typeface="Wingdings" panose="05000000000000000000" pitchFamily="2" charset="2"/>
-              </a:rPr>
-              <a:t> is visited by the user</a:t>
-            </a:r>
-            <a:endParaRPr lang="en-US" i="1" baseline="0" dirty="0" smtClean="0">
-              <a:sym typeface="Wingdings" panose="05000000000000000000" pitchFamily="2" charset="2"/>
-            </a:endParaRPr>
-          </a:p>
-          <a:p>
-            <a:r>
-              <a:rPr lang="en-US" i="1" baseline="0" dirty="0" smtClean="0">
-                <a:sym typeface="Wingdings" panose="05000000000000000000" pitchFamily="2" charset="2"/>
-              </a:rPr>
-              <a:t>pi = P(</a:t>
-            </a:r>
-            <a:r>
-              <a:rPr lang="en-US" i="1" baseline="0" dirty="0" err="1" smtClean="0">
-                <a:sym typeface="Wingdings" panose="05000000000000000000" pitchFamily="2" charset="2"/>
-              </a:rPr>
-              <a:t>bl</a:t>
-            </a:r>
-            <a:r>
-              <a:rPr lang="en-US" i="1" baseline="-25000" dirty="0" err="1" smtClean="0">
-                <a:sym typeface="Wingdings" panose="05000000000000000000" pitchFamily="2" charset="2"/>
-              </a:rPr>
-              <a:t>i</a:t>
-            </a:r>
-            <a:r>
-              <a:rPr lang="en-US" i="1" baseline="0" dirty="0" smtClean="0">
-                <a:sym typeface="Wingdings" panose="05000000000000000000" pitchFamily="2" charset="2"/>
-              </a:rPr>
-              <a:t>) = the probability of the user visiting block </a:t>
-            </a:r>
-            <a:r>
-              <a:rPr lang="en-US" i="1" baseline="0" dirty="0" err="1" smtClean="0">
-                <a:sym typeface="Wingdings" panose="05000000000000000000" pitchFamily="2" charset="2"/>
-              </a:rPr>
-              <a:t>bl</a:t>
-            </a:r>
-            <a:r>
-              <a:rPr lang="en-US" i="1" baseline="-25000" dirty="0" err="1" smtClean="0">
-                <a:sym typeface="Wingdings" panose="05000000000000000000" pitchFamily="2" charset="2"/>
-              </a:rPr>
-              <a:t>i</a:t>
-            </a:r>
-            <a:endParaRPr lang="en-US" i="1" baseline="-25000" dirty="0" smtClean="0">
-              <a:sym typeface="Wingdings" panose="05000000000000000000" pitchFamily="2" charset="2"/>
-            </a:endParaRPr>
-          </a:p>
-          <a:p>
-            <a:endParaRPr lang="en-US" i="1" baseline="0" dirty="0" smtClean="0">
-              <a:sym typeface="Wingdings" panose="05000000000000000000" pitchFamily="2" charset="2"/>
-            </a:endParaRPr>
-          </a:p>
-          <a:p>
-            <a:r>
-              <a:rPr lang="en-US" i="0" baseline="0" dirty="0" smtClean="0">
-                <a:sym typeface="Wingdings" panose="05000000000000000000" pitchFamily="2" charset="2"/>
-              </a:rPr>
-              <a:t>“Reasonably close” estimation notes: *if the inequality is satisfied, a dummy location is released*</a:t>
-            </a:r>
-          </a:p>
-          <a:p>
-            <a:pPr marL="171450" indent="-171450">
-              <a:buFont typeface="Arial" panose="020B0604020202020204" pitchFamily="34" charset="0"/>
-              <a:buChar char="•"/>
-            </a:pPr>
-            <a:r>
-              <a:rPr lang="en-US" i="0" baseline="0" dirty="0" smtClean="0">
-                <a:sym typeface="Wingdings" panose="05000000000000000000" pitchFamily="2" charset="2"/>
-              </a:rPr>
-              <a:t>Assume that epsilon = 0.5</a:t>
-            </a:r>
-          </a:p>
-          <a:p>
-            <a:pPr marL="171450" indent="-171450">
-              <a:buFont typeface="Arial" panose="020B0604020202020204" pitchFamily="34" charset="0"/>
-              <a:buChar char="•"/>
-            </a:pPr>
-            <a:r>
-              <a:rPr lang="en-US" i="0" baseline="0" dirty="0" smtClean="0">
-                <a:sym typeface="Wingdings" panose="05000000000000000000" pitchFamily="2" charset="2"/>
-              </a:rPr>
-              <a:t>Between the two equations, </a:t>
-            </a:r>
-            <a:r>
-              <a:rPr lang="en-US" i="1" baseline="0" dirty="0" smtClean="0">
-                <a:sym typeface="Wingdings" panose="05000000000000000000" pitchFamily="2" charset="2"/>
-              </a:rPr>
-              <a:t>y</a:t>
-            </a:r>
-            <a:r>
-              <a:rPr lang="en-US" i="0" baseline="0" dirty="0" smtClean="0">
-                <a:sym typeface="Wingdings" panose="05000000000000000000" pitchFamily="2" charset="2"/>
-              </a:rPr>
-              <a:t> is replaced with </a:t>
-            </a:r>
-            <a:r>
-              <a:rPr lang="en-US" i="1" baseline="0" dirty="0" err="1" smtClean="0">
-                <a:sym typeface="Wingdings" panose="05000000000000000000" pitchFamily="2" charset="2"/>
-              </a:rPr>
-              <a:t>p</a:t>
-            </a:r>
-            <a:r>
-              <a:rPr lang="en-US" i="1" baseline="-25000" dirty="0" err="1" smtClean="0">
-                <a:sym typeface="Wingdings" panose="05000000000000000000" pitchFamily="2" charset="2"/>
-              </a:rPr>
-              <a:t>min</a:t>
-            </a:r>
-            <a:r>
-              <a:rPr lang="en-US" i="1" baseline="-25000" dirty="0" smtClean="0">
-                <a:sym typeface="Wingdings" panose="05000000000000000000" pitchFamily="2" charset="2"/>
-              </a:rPr>
-              <a:t> </a:t>
-            </a:r>
-            <a:r>
-              <a:rPr lang="en-US" i="0" baseline="0" dirty="0" smtClean="0">
-                <a:sym typeface="Wingdings" panose="05000000000000000000" pitchFamily="2" charset="2"/>
-              </a:rPr>
-              <a:t>(min. probability) of visiting a block because LP-Guardian </a:t>
-            </a:r>
-            <a:r>
-              <a:rPr lang="en-US" i="0" baseline="0" dirty="0" smtClean="0">
-                <a:sym typeface="Wingdings" panose="05000000000000000000" pitchFamily="2" charset="2"/>
-              </a:rPr>
-              <a:t>(client side) does </a:t>
-            </a:r>
-            <a:r>
-              <a:rPr lang="en-US" i="0" baseline="0" dirty="0" smtClean="0">
-                <a:sym typeface="Wingdings" panose="05000000000000000000" pitchFamily="2" charset="2"/>
-              </a:rPr>
-              <a:t>not know other user’s </a:t>
-            </a:r>
-            <a:r>
-              <a:rPr lang="en-US" i="0" baseline="0" dirty="0" smtClean="0">
-                <a:sym typeface="Wingdings" panose="05000000000000000000" pitchFamily="2" charset="2"/>
-              </a:rPr>
-              <a:t>histograms</a:t>
-            </a:r>
-          </a:p>
-          <a:p>
-            <a:pPr marL="628650" lvl="1" indent="-171450">
-              <a:buFont typeface="Arial" panose="020B0604020202020204" pitchFamily="34" charset="0"/>
-              <a:buChar char="•"/>
-            </a:pPr>
-            <a:r>
-              <a:rPr lang="en-US" i="0" baseline="0" dirty="0" smtClean="0">
-                <a:sym typeface="Wingdings" panose="05000000000000000000" pitchFamily="2" charset="2"/>
-              </a:rPr>
-              <a:t>Note: low </a:t>
-            </a:r>
-            <a:r>
-              <a:rPr lang="en-US" i="1" baseline="0" dirty="0" err="1" smtClean="0">
-                <a:sym typeface="Wingdings" panose="05000000000000000000" pitchFamily="2" charset="2"/>
-              </a:rPr>
-              <a:t>p</a:t>
-            </a:r>
-            <a:r>
-              <a:rPr lang="en-US" i="1" baseline="-25000" dirty="0" err="1" smtClean="0">
-                <a:sym typeface="Wingdings" panose="05000000000000000000" pitchFamily="2" charset="2"/>
-              </a:rPr>
-              <a:t>min</a:t>
-            </a:r>
-            <a:r>
-              <a:rPr lang="en-US" i="1" baseline="0" dirty="0" smtClean="0">
-                <a:sym typeface="Wingdings" panose="05000000000000000000" pitchFamily="2" charset="2"/>
-              </a:rPr>
-              <a:t> </a:t>
-            </a:r>
-            <a:r>
-              <a:rPr lang="en-US" i="0" baseline="0" dirty="0" smtClean="0">
-                <a:sym typeface="Wingdings" panose="05000000000000000000" pitchFamily="2" charset="2"/>
-              </a:rPr>
-              <a:t>= strict privacy, high </a:t>
-            </a:r>
-            <a:r>
-              <a:rPr lang="en-US" i="1" baseline="0" dirty="0" err="1" smtClean="0">
-                <a:sym typeface="Wingdings" panose="05000000000000000000" pitchFamily="2" charset="2"/>
-              </a:rPr>
-              <a:t>p</a:t>
-            </a:r>
-            <a:r>
-              <a:rPr lang="en-US" i="1" baseline="-25000" dirty="0" err="1" smtClean="0">
-                <a:sym typeface="Wingdings" panose="05000000000000000000" pitchFamily="2" charset="2"/>
-              </a:rPr>
-              <a:t>min</a:t>
-            </a:r>
-            <a:r>
-              <a:rPr lang="en-US" i="0" baseline="0" dirty="0" smtClean="0">
-                <a:sym typeface="Wingdings" panose="05000000000000000000" pitchFamily="2" charset="2"/>
-              </a:rPr>
-              <a:t> = more relaxed privacy</a:t>
-            </a:r>
-            <a:endParaRPr lang="en-US" i="0" baseline="0" dirty="0" smtClean="0">
-              <a:sym typeface="Wingdings" panose="05000000000000000000" pitchFamily="2" charset="2"/>
-            </a:endParaRPr>
-          </a:p>
-          <a:p>
-            <a:pPr marL="171450" indent="-171450">
-              <a:buFont typeface="Arial" panose="020B0604020202020204" pitchFamily="34" charset="0"/>
-              <a:buChar char="•"/>
-            </a:pPr>
-            <a:r>
-              <a:rPr lang="en-US" i="0" baseline="0" dirty="0" smtClean="0">
-                <a:sym typeface="Wingdings" panose="05000000000000000000" pitchFamily="2" charset="2"/>
-              </a:rPr>
-              <a:t>If LP-Guardian determines that the same privacy level can be determined with a higher value of </a:t>
-            </a:r>
-            <a:r>
-              <a:rPr lang="en-US" i="1" baseline="0" dirty="0" err="1" smtClean="0">
-                <a:sym typeface="Wingdings" panose="05000000000000000000" pitchFamily="2" charset="2"/>
-              </a:rPr>
-              <a:t>p</a:t>
-            </a:r>
-            <a:r>
-              <a:rPr lang="en-US" i="1" baseline="-25000" dirty="0" err="1" smtClean="0">
-                <a:sym typeface="Wingdings" panose="05000000000000000000" pitchFamily="2" charset="2"/>
-              </a:rPr>
-              <a:t>min</a:t>
-            </a:r>
-            <a:r>
-              <a:rPr lang="en-US" i="1" baseline="-25000" dirty="0" smtClean="0">
-                <a:sym typeface="Wingdings" panose="05000000000000000000" pitchFamily="2" charset="2"/>
-              </a:rPr>
-              <a:t> </a:t>
-            </a:r>
-            <a:r>
-              <a:rPr lang="en-US" i="0" baseline="0" dirty="0" smtClean="0">
-                <a:sym typeface="Wingdings" panose="05000000000000000000" pitchFamily="2" charset="2"/>
-              </a:rPr>
-              <a:t>, value will be relaxed (relies of census data that specifies the population for every city block)</a:t>
-            </a:r>
-            <a:endParaRPr lang="en-US" i="0" baseline="-25000" dirty="0" smtClean="0">
-              <a:sym typeface="Wingdings" panose="05000000000000000000" pitchFamily="2" charset="2"/>
-            </a:endParaRPr>
-          </a:p>
-          <a:p>
-            <a:pPr marL="171450" indent="-171450">
-              <a:buFont typeface="Arial" panose="020B0604020202020204" pitchFamily="34" charset="0"/>
-              <a:buChar char="•"/>
-            </a:pPr>
-            <a:endParaRPr lang="en-US" i="0" baseline="0" dirty="0" smtClean="0">
-              <a:sym typeface="Wingdings" panose="05000000000000000000" pitchFamily="2" charset="2"/>
-            </a:endParaRPr>
-          </a:p>
-          <a:p>
-            <a:endParaRPr lang="en-US" i="1" baseline="0" dirty="0" smtClean="0">
-              <a:sym typeface="Wingdings" panose="05000000000000000000" pitchFamily="2" charset="2"/>
-            </a:endParaRPr>
-          </a:p>
-          <a:p>
-            <a:endParaRPr lang="en-US" baseline="0" dirty="0" smtClean="0">
-              <a:sym typeface="Wingdings" panose="05000000000000000000" pitchFamily="2" charset="2"/>
-            </a:endParaRPr>
-          </a:p>
-          <a:p>
-            <a:endParaRPr lang="en-US" baseline="0" dirty="0" smtClean="0">
-              <a:sym typeface="Wingdings" panose="05000000000000000000" pitchFamily="2" charset="2"/>
-            </a:endParaRPr>
-          </a:p>
-          <a:p>
-            <a:endParaRPr lang="en-US" baseline="0" dirty="0" smtClean="0"/>
+              <a:t> &amp; analytics</a:t>
+            </a:r>
+          </a:p>
+          <a:p>
+            <a:r>
+              <a:rPr lang="en-US" baseline="0" dirty="0" smtClean="0"/>
+              <a:t>Rule for foreground apps is selected by user</a:t>
+            </a:r>
+          </a:p>
+          <a:p>
+            <a:r>
+              <a:rPr lang="en-US" baseline="0" dirty="0" smtClean="0"/>
+              <a:t>LP-guardian </a:t>
+            </a:r>
+            <a:r>
+              <a:rPr lang="en-US" baseline="0" dirty="0" smtClean="0"/>
+              <a:t>decides if info is safe to </a:t>
+            </a:r>
+            <a:r>
+              <a:rPr lang="en-US" baseline="0" dirty="0" smtClean="0"/>
+              <a:t>release (more in Bonnie’s slides)</a:t>
+            </a:r>
+            <a:endParaRPr lang="en-US" dirty="0"/>
           </a:p>
         </p:txBody>
       </p:sp>
@@ -2484,26 +2260,17 @@
           <a:lstStyle/>
           <a:p>
             <a:fld id="{B8B3BC3C-0900-4ACD-9030-5BE6C2442A68}" type="slidenum">
-              <a:rPr lang="en-US" smtClean="0">
-                <a:solidFill>
-                  <a:prstClr val="black"/>
-                </a:solidFill>
-              </a:rPr>
-              <a:pPr/>
-              <a:t>7</a:t>
+              <a:rPr lang="en-US" smtClean="0"/>
+              <a:t>4</a:t>
             </a:fld>
-            <a:endParaRPr lang="en-US" dirty="0">
-              <a:solidFill>
-                <a:prstClr val="black"/>
-              </a:solidFill>
-            </a:endParaRPr>
+            <a:endParaRPr lang="en-US" dirty="0"/>
           </a:p>
         </p:txBody>
       </p:sp>
     </p:spTree>
     <p:extLst>
       <p:ext uri="{BB962C8B-B14F-4D97-AF65-F5344CB8AC3E}">
-        <p14:creationId xmlns:p14="http://schemas.microsoft.com/office/powerpoint/2010/main" val="1796385184"/>
+        <p14:creationId xmlns:p14="http://schemas.microsoft.com/office/powerpoint/2010/main" val="2053636732"/>
       </p:ext>
     </p:extLst>
   </p:cSld>
@@ -2557,33 +2324,27 @@
           <a:bodyPr/>
           <a:lstStyle/>
           <a:p>
-            <a:pPr marL="0" marR="0" indent="0" algn="l" defTabSz="914400" rtl="0" eaLnBrk="1" fontAlgn="auto" latinLnBrk="0" hangingPunct="1">
-              <a:lnSpc>
-                <a:spcPct val="100000"/>
-              </a:lnSpc>
-              <a:spcBef>
-                <a:spcPts val="0"/>
-              </a:spcBef>
-              <a:spcAft>
-                <a:spcPts val="0"/>
-              </a:spcAft>
-              <a:buClrTx/>
-              <a:buSzTx/>
-              <a:buFontTx/>
-              <a:buNone/>
-              <a:tabLst/>
-              <a:defRPr/>
-            </a:pPr>
-            <a:r>
-              <a:rPr lang="en-US" i="0" baseline="0" dirty="0" smtClean="0"/>
-              <a:t>Noise value for LP-Guardian is 200m range</a:t>
-            </a:r>
-            <a:endParaRPr lang="en-US" baseline="0" dirty="0" smtClean="0">
-              <a:sym typeface="Wingdings" panose="05000000000000000000" pitchFamily="2" charset="2"/>
-            </a:endParaRPr>
-          </a:p>
-          <a:p>
-            <a:endParaRPr lang="en-US" baseline="0" dirty="0" smtClean="0"/>
+            <a:r>
+              <a:rPr lang="en-US" dirty="0" smtClean="0"/>
+              <a:t>“Allow” principles</a:t>
+            </a:r>
+            <a:r>
+              <a:rPr lang="en-US" baseline="0" dirty="0" smtClean="0"/>
+              <a:t> relate to apps overreaching their location authority</a:t>
+            </a:r>
+          </a:p>
+          <a:p>
+            <a:r>
+              <a:rPr lang="en-US" baseline="0" dirty="0" smtClean="0"/>
+              <a:t>“Prevent” principles relate to the 3 location privacy threats from before</a:t>
+            </a:r>
+          </a:p>
+          <a:p>
+            <a:r>
+              <a:rPr lang="en-US" baseline="0" dirty="0" smtClean="0"/>
+              <a:t>Last 2 principles are practical concerns to ensure such a tool would be practical and likely to become widely used.</a:t>
+            </a:r>
+            <a:endParaRPr lang="en-US" dirty="0"/>
           </a:p>
         </p:txBody>
       </p:sp>
@@ -2603,26 +2364,17 @@
           <a:lstStyle/>
           <a:p>
             <a:fld id="{B8B3BC3C-0900-4ACD-9030-5BE6C2442A68}" type="slidenum">
-              <a:rPr lang="en-US" smtClean="0">
-                <a:solidFill>
-                  <a:prstClr val="black"/>
-                </a:solidFill>
-              </a:rPr>
-              <a:pPr/>
-              <a:t>8</a:t>
+              <a:rPr lang="en-US" smtClean="0"/>
+              <a:t>5</a:t>
             </a:fld>
-            <a:endParaRPr lang="en-US" dirty="0">
-              <a:solidFill>
-                <a:prstClr val="black"/>
-              </a:solidFill>
-            </a:endParaRPr>
+            <a:endParaRPr lang="en-US" dirty="0"/>
           </a:p>
         </p:txBody>
       </p:sp>
     </p:spTree>
     <p:extLst>
       <p:ext uri="{BB962C8B-B14F-4D97-AF65-F5344CB8AC3E}">
-        <p14:creationId xmlns:p14="http://schemas.microsoft.com/office/powerpoint/2010/main" val="3439409429"/>
+        <p14:creationId xmlns:p14="http://schemas.microsoft.com/office/powerpoint/2010/main" val="2053636732"/>
       </p:ext>
     </p:extLst>
   </p:cSld>
@@ -2677,8 +2429,18 @@
           <a:lstStyle/>
           <a:p>
             <a:r>
-              <a:rPr lang="en-US" i="0" baseline="0" dirty="0" smtClean="0"/>
-              <a:t>Polar noise symbol explanation: </a:t>
+              <a:rPr lang="en-US" dirty="0" smtClean="0"/>
+              <a:t>Design details relate back to the diagram from the Proposed Approach slide of the presentation (slide 4)</a:t>
+            </a:r>
+          </a:p>
+          <a:p>
+            <a:r>
+              <a:rPr lang="en-US" i="1" dirty="0" smtClean="0">
+                <a:solidFill>
+                  <a:srgbClr val="FF0000"/>
+                </a:solidFill>
+              </a:rPr>
+              <a:t>Mention details that should have been discussed = the left half/automatic city-coarsened level of the diagram: </a:t>
             </a:r>
           </a:p>
           <a:p>
@@ -2687,36 +2449,231 @@
               <a:buChar char="•"/>
             </a:pPr>
             <a:r>
-              <a:rPr lang="en-US" i="1" baseline="0" dirty="0" smtClean="0"/>
-              <a:t>W</a:t>
-            </a:r>
-            <a:r>
-              <a:rPr lang="en-US" i="1" baseline="-25000" dirty="0" smtClean="0"/>
-              <a:t>-1</a:t>
-            </a:r>
-            <a:r>
-              <a:rPr lang="en-US" i="1" baseline="0" dirty="0" smtClean="0"/>
-              <a:t> </a:t>
-            </a:r>
-            <a:r>
-              <a:rPr lang="en-US" i="0" baseline="0" dirty="0" smtClean="0"/>
-              <a:t>is the -1 branch of the Lambert </a:t>
-            </a:r>
-            <a:r>
-              <a:rPr lang="en-US" i="1" baseline="0" dirty="0" smtClean="0"/>
-              <a:t>W</a:t>
-            </a:r>
-            <a:r>
-              <a:rPr lang="en-US" i="0" baseline="0" dirty="0" smtClean="0"/>
-              <a:t> function and </a:t>
-            </a:r>
-            <a:r>
-              <a:rPr lang="en-US" i="1" baseline="0" dirty="0" smtClean="0"/>
-              <a:t>l </a:t>
-            </a:r>
-            <a:r>
-              <a:rPr lang="en-US" i="0" baseline="0" dirty="0" smtClean="0"/>
-              <a:t>is a privacy level (typically close to 1)</a:t>
+              <a:rPr lang="en-US" dirty="0" smtClean="0"/>
+              <a:t>Background</a:t>
+            </a:r>
+            <a:r>
+              <a:rPr lang="en-US" baseline="0" dirty="0" smtClean="0"/>
+              <a:t> location access coarsened to city level </a:t>
+            </a:r>
+            <a:r>
+              <a:rPr lang="en-US" baseline="0" dirty="0" smtClean="0">
+                <a:sym typeface="Wingdings" panose="05000000000000000000" pitchFamily="2" charset="2"/>
+              </a:rPr>
+              <a:t> the rest of the information applies to foreground and persistent (perceptible applications) location access</a:t>
+            </a:r>
+          </a:p>
+          <a:p>
+            <a:pPr marL="628650" lvl="1" indent="-171450">
+              <a:buFont typeface="Arial" panose="020B0604020202020204" pitchFamily="34" charset="0"/>
+              <a:buChar char="•"/>
+            </a:pPr>
+            <a:r>
+              <a:rPr lang="en-US" baseline="0" dirty="0" smtClean="0">
+                <a:sym typeface="Wingdings" panose="05000000000000000000" pitchFamily="2" charset="2"/>
+              </a:rPr>
+              <a:t>Reasoning: analysis showed that only 3% of applications access the user’s location while running in the background</a:t>
+            </a:r>
+          </a:p>
+          <a:p>
+            <a:pPr marL="171450" lvl="0" indent="-171450">
+              <a:buFont typeface="Arial" panose="020B0604020202020204" pitchFamily="34" charset="0"/>
+              <a:buChar char="•"/>
+            </a:pPr>
+            <a:r>
+              <a:rPr lang="en-US" sz="1100" baseline="0" dirty="0" smtClean="0">
+                <a:sym typeface="Wingdings" panose="05000000000000000000" pitchFamily="2" charset="2"/>
+              </a:rPr>
+              <a:t>A&amp;A library requests can be identified (shown via stack trace) and are sent city-coarsened information</a:t>
+            </a:r>
+          </a:p>
+          <a:p>
+            <a:pPr marL="171450" lvl="0" indent="-171450">
+              <a:buFont typeface="Arial" panose="020B0604020202020204" pitchFamily="34" charset="0"/>
+              <a:buChar char="•"/>
+            </a:pPr>
+            <a:endParaRPr lang="en-US" sz="1100" baseline="0" dirty="0" smtClean="0">
+              <a:sym typeface="Wingdings" panose="05000000000000000000" pitchFamily="2" charset="2"/>
+            </a:endParaRPr>
+          </a:p>
+          <a:p>
+            <a:pPr marL="0" lvl="0" indent="0">
+              <a:buFont typeface="Arial" panose="020B0604020202020204" pitchFamily="34" charset="0"/>
+              <a:buNone/>
+            </a:pPr>
+            <a:r>
+              <a:rPr lang="en-US" sz="1100" baseline="0" dirty="0" smtClean="0">
+                <a:sym typeface="Wingdings" panose="05000000000000000000" pitchFamily="2" charset="2"/>
+              </a:rPr>
+              <a:t>Threat Model: the adversary has access to a mapping between a set of individuals’ and the probability distributions of visiting each block in the city  aims to match the anonymous mobility histogram to an individual in the database</a:t>
+            </a:r>
+          </a:p>
+          <a:p>
+            <a:endParaRPr lang="en-US" baseline="0" dirty="0" smtClean="0">
+              <a:sym typeface="Wingdings" panose="05000000000000000000" pitchFamily="2" charset="2"/>
+            </a:endParaRPr>
+          </a:p>
+          <a:p>
+            <a:r>
+              <a:rPr lang="en-US" baseline="0" dirty="0" smtClean="0">
+                <a:sym typeface="Wingdings" panose="05000000000000000000" pitchFamily="2" charset="2"/>
+              </a:rPr>
+              <a:t>Identification Protection Formula = Probability that the histogram belongs to a given individual</a:t>
+            </a:r>
+          </a:p>
+          <a:p>
+            <a:r>
+              <a:rPr lang="en-US" i="1" baseline="0" dirty="0" smtClean="0">
+                <a:sym typeface="Wingdings" panose="05000000000000000000" pitchFamily="2" charset="2"/>
+              </a:rPr>
+              <a:t>N = # of user application sessions</a:t>
+            </a:r>
+          </a:p>
+          <a:p>
+            <a:r>
+              <a:rPr lang="en-US" i="1" baseline="0" dirty="0" err="1" smtClean="0">
+                <a:sym typeface="Wingdings" panose="05000000000000000000" pitchFamily="2" charset="2"/>
+              </a:rPr>
+              <a:t>Bl</a:t>
+            </a:r>
+            <a:r>
+              <a:rPr lang="en-US" i="1" baseline="0" dirty="0" smtClean="0">
+                <a:sym typeface="Wingdings" panose="05000000000000000000" pitchFamily="2" charset="2"/>
+              </a:rPr>
+              <a:t> = set of city blocks in the 2D grid of the city = {bl</a:t>
+            </a:r>
+            <a:r>
+              <a:rPr lang="en-US" i="1" baseline="-25000" dirty="0" smtClean="0">
+                <a:sym typeface="Wingdings" panose="05000000000000000000" pitchFamily="2" charset="2"/>
+              </a:rPr>
+              <a:t>1</a:t>
+            </a:r>
+            <a:r>
+              <a:rPr lang="en-US" i="1" baseline="0" dirty="0" smtClean="0">
+                <a:sym typeface="Wingdings" panose="05000000000000000000" pitchFamily="2" charset="2"/>
+              </a:rPr>
+              <a:t>, bl</a:t>
+            </a:r>
+            <a:r>
+              <a:rPr lang="en-US" i="1" baseline="-25000" dirty="0" smtClean="0">
+                <a:sym typeface="Wingdings" panose="05000000000000000000" pitchFamily="2" charset="2"/>
+              </a:rPr>
+              <a:t>2</a:t>
+            </a:r>
+            <a:r>
+              <a:rPr lang="en-US" i="1" baseline="0" dirty="0" smtClean="0">
+                <a:sym typeface="Wingdings" panose="05000000000000000000" pitchFamily="2" charset="2"/>
+              </a:rPr>
+              <a:t>, …, }</a:t>
+            </a:r>
+          </a:p>
+          <a:p>
+            <a:pPr marL="0" marR="0" indent="0" algn="l" defTabSz="914400" rtl="0" eaLnBrk="1" fontAlgn="auto" latinLnBrk="0" hangingPunct="1">
+              <a:lnSpc>
+                <a:spcPct val="100000"/>
+              </a:lnSpc>
+              <a:spcBef>
+                <a:spcPts val="0"/>
+              </a:spcBef>
+              <a:spcAft>
+                <a:spcPts val="0"/>
+              </a:spcAft>
+              <a:buClrTx/>
+              <a:buSzTx/>
+              <a:buFontTx/>
+              <a:buNone/>
+              <a:tabLst/>
+              <a:defRPr/>
+            </a:pPr>
+            <a:r>
+              <a:rPr lang="en-US" i="1" baseline="0" dirty="0" err="1" smtClean="0">
+                <a:sym typeface="Wingdings" panose="05000000000000000000" pitchFamily="2" charset="2"/>
+              </a:rPr>
+              <a:t>c</a:t>
+            </a:r>
+            <a:r>
+              <a:rPr lang="en-US" i="1" baseline="-25000" dirty="0" err="1" smtClean="0">
+                <a:sym typeface="Wingdings" panose="05000000000000000000" pitchFamily="2" charset="2"/>
+              </a:rPr>
+              <a:t>bli</a:t>
+            </a:r>
+            <a:r>
+              <a:rPr lang="en-US" i="1" baseline="0" dirty="0" smtClean="0">
+                <a:sym typeface="Wingdings" panose="05000000000000000000" pitchFamily="2" charset="2"/>
+              </a:rPr>
+              <a:t> = the number of times that </a:t>
+            </a:r>
+            <a:r>
+              <a:rPr lang="en-US" i="1" baseline="0" dirty="0" err="1" smtClean="0">
+                <a:sym typeface="Wingdings" panose="05000000000000000000" pitchFamily="2" charset="2"/>
+              </a:rPr>
+              <a:t>bl</a:t>
+            </a:r>
+            <a:r>
+              <a:rPr lang="en-US" i="1" baseline="-25000" dirty="0" err="1" smtClean="0">
+                <a:sym typeface="Wingdings" panose="05000000000000000000" pitchFamily="2" charset="2"/>
+              </a:rPr>
+              <a:t>i</a:t>
+            </a:r>
+            <a:r>
+              <a:rPr lang="en-US" i="1" baseline="0" dirty="0" smtClean="0">
+                <a:sym typeface="Wingdings" panose="05000000000000000000" pitchFamily="2" charset="2"/>
+              </a:rPr>
+              <a:t> is visited by the user</a:t>
+            </a:r>
+          </a:p>
+          <a:p>
+            <a:r>
+              <a:rPr lang="en-US" i="1" baseline="0" dirty="0" smtClean="0">
+                <a:sym typeface="Wingdings" panose="05000000000000000000" pitchFamily="2" charset="2"/>
+              </a:rPr>
+              <a:t>pi = P(</a:t>
+            </a:r>
+            <a:r>
+              <a:rPr lang="en-US" i="1" baseline="0" dirty="0" err="1" smtClean="0">
+                <a:sym typeface="Wingdings" panose="05000000000000000000" pitchFamily="2" charset="2"/>
+              </a:rPr>
+              <a:t>bl</a:t>
+            </a:r>
+            <a:r>
+              <a:rPr lang="en-US" i="1" baseline="-25000" dirty="0" err="1" smtClean="0">
+                <a:sym typeface="Wingdings" panose="05000000000000000000" pitchFamily="2" charset="2"/>
+              </a:rPr>
+              <a:t>i</a:t>
+            </a:r>
+            <a:r>
+              <a:rPr lang="en-US" i="1" baseline="0" dirty="0" smtClean="0">
+                <a:sym typeface="Wingdings" panose="05000000000000000000" pitchFamily="2" charset="2"/>
+              </a:rPr>
+              <a:t>) = the probability of the user visiting block </a:t>
+            </a:r>
+            <a:r>
+              <a:rPr lang="en-US" i="1" baseline="0" dirty="0" err="1" smtClean="0">
+                <a:sym typeface="Wingdings" panose="05000000000000000000" pitchFamily="2" charset="2"/>
+              </a:rPr>
+              <a:t>bl</a:t>
+            </a:r>
+            <a:r>
+              <a:rPr lang="en-US" i="1" baseline="-25000" dirty="0" err="1" smtClean="0">
+                <a:sym typeface="Wingdings" panose="05000000000000000000" pitchFamily="2" charset="2"/>
+              </a:rPr>
+              <a:t>i</a:t>
+            </a:r>
+            <a:endParaRPr lang="en-US" i="1" baseline="-25000" dirty="0" smtClean="0">
+              <a:sym typeface="Wingdings" panose="05000000000000000000" pitchFamily="2" charset="2"/>
+            </a:endParaRPr>
+          </a:p>
+          <a:p>
+            <a:endParaRPr lang="en-US" i="1" baseline="0" dirty="0" smtClean="0">
+              <a:sym typeface="Wingdings" panose="05000000000000000000" pitchFamily="2" charset="2"/>
+            </a:endParaRPr>
+          </a:p>
+          <a:p>
+            <a:r>
+              <a:rPr lang="en-US" i="0" baseline="0" dirty="0" smtClean="0">
+                <a:sym typeface="Wingdings" panose="05000000000000000000" pitchFamily="2" charset="2"/>
+              </a:rPr>
+              <a:t>“Reasonably close” estimation notes: *if the inequality is satisfied, a dummy location is released*</a:t>
             </a:r>
           </a:p>
           <a:p>
@@ -2725,12 +2682,179 @@
               <a:buChar char="•"/>
             </a:pPr>
             <a:r>
-              <a:rPr lang="en-US" i="0" baseline="0" dirty="0" smtClean="0"/>
-              <a:t>Noise value for LP-Guardian is 200m range</a:t>
-            </a:r>
-          </a:p>
-          <a:p>
-            <a:endParaRPr lang="en-US" i="1" baseline="0" dirty="0" smtClean="0"/>
+              <a:rPr lang="en-US" i="0" baseline="0" dirty="0" smtClean="0">
+                <a:sym typeface="Wingdings" panose="05000000000000000000" pitchFamily="2" charset="2"/>
+              </a:rPr>
+              <a:t>Assume that epsilon = 0.5</a:t>
+            </a:r>
+          </a:p>
+          <a:p>
+            <a:pPr marL="171450" indent="-171450">
+              <a:buFont typeface="Arial" panose="020B0604020202020204" pitchFamily="34" charset="0"/>
+              <a:buChar char="•"/>
+            </a:pPr>
+            <a:r>
+              <a:rPr lang="en-US" i="0" baseline="0" dirty="0" smtClean="0">
+                <a:sym typeface="Wingdings" panose="05000000000000000000" pitchFamily="2" charset="2"/>
+              </a:rPr>
+              <a:t>Between the two equations, </a:t>
+            </a:r>
+            <a:r>
+              <a:rPr lang="en-US" i="1" baseline="0" dirty="0" smtClean="0">
+                <a:sym typeface="Wingdings" panose="05000000000000000000" pitchFamily="2" charset="2"/>
+              </a:rPr>
+              <a:t>y</a:t>
+            </a:r>
+            <a:r>
+              <a:rPr lang="en-US" i="0" baseline="0" dirty="0" smtClean="0">
+                <a:sym typeface="Wingdings" panose="05000000000000000000" pitchFamily="2" charset="2"/>
+              </a:rPr>
+              <a:t> is replaced with </a:t>
+            </a:r>
+            <a:r>
+              <a:rPr lang="en-US" i="1" baseline="0" dirty="0" err="1" smtClean="0">
+                <a:sym typeface="Wingdings" panose="05000000000000000000" pitchFamily="2" charset="2"/>
+              </a:rPr>
+              <a:t>p</a:t>
+            </a:r>
+            <a:r>
+              <a:rPr lang="en-US" i="1" baseline="-25000" dirty="0" err="1" smtClean="0">
+                <a:sym typeface="Wingdings" panose="05000000000000000000" pitchFamily="2" charset="2"/>
+              </a:rPr>
+              <a:t>min</a:t>
+            </a:r>
+            <a:r>
+              <a:rPr lang="en-US" i="1" baseline="-25000" dirty="0" smtClean="0">
+                <a:sym typeface="Wingdings" panose="05000000000000000000" pitchFamily="2" charset="2"/>
+              </a:rPr>
+              <a:t> </a:t>
+            </a:r>
+            <a:r>
+              <a:rPr lang="en-US" i="0" baseline="0" dirty="0" smtClean="0">
+                <a:sym typeface="Wingdings" panose="05000000000000000000" pitchFamily="2" charset="2"/>
+              </a:rPr>
+              <a:t>(min. probability) of visiting a block because LP-Guardian (client side) does not know other user’s histograms</a:t>
+            </a:r>
+          </a:p>
+          <a:p>
+            <a:pPr marL="628650" lvl="1" indent="-171450">
+              <a:buFont typeface="Arial" panose="020B0604020202020204" pitchFamily="34" charset="0"/>
+              <a:buChar char="•"/>
+            </a:pPr>
+            <a:r>
+              <a:rPr lang="en-US" i="0" baseline="0" dirty="0" smtClean="0">
+                <a:sym typeface="Wingdings" panose="05000000000000000000" pitchFamily="2" charset="2"/>
+              </a:rPr>
+              <a:t>Note: low </a:t>
+            </a:r>
+            <a:r>
+              <a:rPr lang="en-US" i="1" baseline="0" dirty="0" err="1" smtClean="0">
+                <a:sym typeface="Wingdings" panose="05000000000000000000" pitchFamily="2" charset="2"/>
+              </a:rPr>
+              <a:t>p</a:t>
+            </a:r>
+            <a:r>
+              <a:rPr lang="en-US" i="1" baseline="-25000" dirty="0" err="1" smtClean="0">
+                <a:sym typeface="Wingdings" panose="05000000000000000000" pitchFamily="2" charset="2"/>
+              </a:rPr>
+              <a:t>min</a:t>
+            </a:r>
+            <a:r>
+              <a:rPr lang="en-US" i="1" baseline="0" dirty="0" smtClean="0">
+                <a:sym typeface="Wingdings" panose="05000000000000000000" pitchFamily="2" charset="2"/>
+              </a:rPr>
+              <a:t> </a:t>
+            </a:r>
+            <a:r>
+              <a:rPr lang="en-US" i="0" baseline="0" dirty="0" smtClean="0">
+                <a:sym typeface="Wingdings" panose="05000000000000000000" pitchFamily="2" charset="2"/>
+              </a:rPr>
+              <a:t>= strict privacy, high </a:t>
+            </a:r>
+            <a:r>
+              <a:rPr lang="en-US" i="1" baseline="0" dirty="0" err="1" smtClean="0">
+                <a:sym typeface="Wingdings" panose="05000000000000000000" pitchFamily="2" charset="2"/>
+              </a:rPr>
+              <a:t>p</a:t>
+            </a:r>
+            <a:r>
+              <a:rPr lang="en-US" i="1" baseline="-25000" dirty="0" err="1" smtClean="0">
+                <a:sym typeface="Wingdings" panose="05000000000000000000" pitchFamily="2" charset="2"/>
+              </a:rPr>
+              <a:t>min</a:t>
+            </a:r>
+            <a:r>
+              <a:rPr lang="en-US" i="0" baseline="0" dirty="0" smtClean="0">
+                <a:sym typeface="Wingdings" panose="05000000000000000000" pitchFamily="2" charset="2"/>
+              </a:rPr>
+              <a:t> = more relaxed privacy</a:t>
+            </a:r>
+          </a:p>
+          <a:p>
+            <a:pPr marL="171450" indent="-171450">
+              <a:buFont typeface="Arial" panose="020B0604020202020204" pitchFamily="34" charset="0"/>
+              <a:buChar char="•"/>
+            </a:pPr>
+            <a:r>
+              <a:rPr lang="en-US" i="0" baseline="0" dirty="0" smtClean="0">
+                <a:sym typeface="Wingdings" panose="05000000000000000000" pitchFamily="2" charset="2"/>
+              </a:rPr>
+              <a:t>If LP-Guardian determines that the same privacy level can be determined with a higher value of </a:t>
+            </a:r>
+            <a:r>
+              <a:rPr lang="en-US" i="1" baseline="0" dirty="0" err="1" smtClean="0">
+                <a:sym typeface="Wingdings" panose="05000000000000000000" pitchFamily="2" charset="2"/>
+              </a:rPr>
+              <a:t>p</a:t>
+            </a:r>
+            <a:r>
+              <a:rPr lang="en-US" i="1" baseline="-25000" dirty="0" err="1" smtClean="0">
+                <a:sym typeface="Wingdings" panose="05000000000000000000" pitchFamily="2" charset="2"/>
+              </a:rPr>
+              <a:t>min</a:t>
+            </a:r>
+            <a:r>
+              <a:rPr lang="en-US" i="1" baseline="-25000" dirty="0" smtClean="0">
+                <a:sym typeface="Wingdings" panose="05000000000000000000" pitchFamily="2" charset="2"/>
+              </a:rPr>
+              <a:t> </a:t>
+            </a:r>
+            <a:r>
+              <a:rPr lang="en-US" i="0" baseline="0" dirty="0" smtClean="0">
+                <a:sym typeface="Wingdings" panose="05000000000000000000" pitchFamily="2" charset="2"/>
+              </a:rPr>
+              <a:t>, value will be relaxed (relies of census data that specifies the population for every city block)</a:t>
+            </a:r>
+            <a:endParaRPr lang="en-US" i="0" baseline="-25000" dirty="0" smtClean="0">
+              <a:sym typeface="Wingdings" panose="05000000000000000000" pitchFamily="2" charset="2"/>
+            </a:endParaRPr>
+          </a:p>
+          <a:p>
+            <a:pPr marL="171450" indent="-171450">
+              <a:buFont typeface="Arial" panose="020B0604020202020204" pitchFamily="34" charset="0"/>
+              <a:buChar char="•"/>
+            </a:pPr>
+            <a:endParaRPr lang="en-US" i="0" baseline="0" dirty="0" smtClean="0">
+              <a:sym typeface="Wingdings" panose="05000000000000000000" pitchFamily="2" charset="2"/>
+            </a:endParaRPr>
+          </a:p>
+          <a:p>
+            <a:endParaRPr lang="en-US" i="1" baseline="0" dirty="0" smtClean="0">
+              <a:sym typeface="Wingdings" panose="05000000000000000000" pitchFamily="2" charset="2"/>
+            </a:endParaRPr>
+          </a:p>
+          <a:p>
+            <a:endParaRPr lang="en-US" baseline="0" dirty="0" smtClean="0">
+              <a:sym typeface="Wingdings" panose="05000000000000000000" pitchFamily="2" charset="2"/>
+            </a:endParaRPr>
+          </a:p>
+          <a:p>
+            <a:endParaRPr lang="en-US" baseline="0" dirty="0" smtClean="0">
+              <a:sym typeface="Wingdings" panose="05000000000000000000" pitchFamily="2" charset="2"/>
+            </a:endParaRPr>
+          </a:p>
+          <a:p>
+            <a:endParaRPr lang="en-US" baseline="0" dirty="0" smtClean="0"/>
           </a:p>
         </p:txBody>
       </p:sp>
@@ -2756,7 +2880,7 @@
                 </a:solidFill>
               </a:rPr>
               <a:pPr/>
-              <a:t>9</a:t>
+              <a:t>7</a:t>
             </a:fld>
             <a:endParaRPr lang="en-US" dirty="0">
               <a:solidFill>
@@ -2769,7 +2893,7 @@
     </p:spTree>
     <p:extLst>
       <p:ext uri="{BB962C8B-B14F-4D97-AF65-F5344CB8AC3E}">
-        <p14:creationId xmlns:p14="http://schemas.microsoft.com/office/powerpoint/2010/main" val="1073290682"/>
+        <p14:creationId xmlns:p14="http://schemas.microsoft.com/office/powerpoint/2010/main" val="1796385184"/>
       </p:ext>
     </p:extLst>
   </p:cSld>
@@ -2823,100 +2947,33 @@
           <a:bodyPr/>
           <a:lstStyle/>
           <a:p>
-            <a:r>
-              <a:rPr lang="en-US" dirty="0" smtClean="0"/>
-              <a:t>Rule Manager: </a:t>
-            </a:r>
-          </a:p>
-          <a:p>
-            <a:pPr marL="171450" indent="-171450">
-              <a:buFont typeface="Arial" panose="020B0604020202020204" pitchFamily="34" charset="0"/>
-              <a:buChar char="•"/>
+            <a:pPr marL="0" marR="0" indent="0" algn="l" defTabSz="914400" rtl="0" eaLnBrk="1" fontAlgn="auto" latinLnBrk="0" hangingPunct="1">
+              <a:lnSpc>
+                <a:spcPct val="100000"/>
+              </a:lnSpc>
+              <a:spcBef>
+                <a:spcPts val="0"/>
+              </a:spcBef>
+              <a:spcAft>
+                <a:spcPts val="0"/>
+              </a:spcAft>
+              <a:buClrTx/>
+              <a:buSzTx/>
+              <a:buFontTx/>
+              <a:buNone/>
+              <a:tabLst/>
+              <a:defRPr/>
             </a:pPr>
             <a:r>
-              <a:rPr lang="en-US" dirty="0" smtClean="0"/>
-              <a:t>Input: the application, the state of the application (foreground or background), the location sample, </a:t>
-            </a:r>
-            <a:r>
-              <a:rPr lang="en-US" dirty="0" smtClean="0"/>
-              <a:t>whether</a:t>
-            </a:r>
-            <a:r>
-              <a:rPr lang="en-US" baseline="0" dirty="0" smtClean="0"/>
-              <a:t> </a:t>
-            </a:r>
-            <a:r>
-              <a:rPr lang="en-US" baseline="0" dirty="0" smtClean="0"/>
-              <a:t>the application session is new or an ongoing </a:t>
-            </a:r>
-            <a:r>
-              <a:rPr lang="en-US" baseline="0" dirty="0" smtClean="0"/>
-              <a:t>session, and the place/city/block</a:t>
-            </a:r>
+              <a:rPr lang="en-US" i="0" baseline="0" dirty="0" smtClean="0"/>
+              <a:t>Noise value for LP-Guardian is 200m range</a:t>
+            </a:r>
+            <a:endParaRPr lang="en-US" baseline="0" dirty="0" smtClean="0">
+              <a:sym typeface="Wingdings" panose="05000000000000000000" pitchFamily="2" charset="2"/>
+            </a:endParaRPr>
+          </a:p>
+          <a:p>
             <a:endParaRPr lang="en-US" baseline="0" dirty="0" smtClean="0"/>
-          </a:p>
-          <a:p>
-            <a:pPr marL="171450" indent="-171450">
-              <a:buFont typeface="Arial" panose="020B0604020202020204" pitchFamily="34" charset="0"/>
-              <a:buChar char="•"/>
-            </a:pPr>
-            <a:r>
-              <a:rPr lang="en-US" baseline="0" dirty="0" smtClean="0"/>
-              <a:t>Global rules: one per </a:t>
-            </a:r>
-            <a:r>
-              <a:rPr lang="en-US" baseline="0" dirty="0" smtClean="0"/>
-              <a:t>application (applies to foreground and background states)</a:t>
-            </a:r>
-            <a:endParaRPr lang="en-US" baseline="0" dirty="0" smtClean="0"/>
-          </a:p>
-          <a:p>
-            <a:pPr marL="171450" indent="-171450">
-              <a:buFont typeface="Arial" panose="020B0604020202020204" pitchFamily="34" charset="0"/>
-              <a:buChar char="•"/>
-            </a:pPr>
-            <a:r>
-              <a:rPr lang="en-US" baseline="0" dirty="0" smtClean="0"/>
-              <a:t>Per-place rules: one per application-location combination</a:t>
-            </a:r>
-          </a:p>
-          <a:p>
-            <a:pPr marL="171450" indent="-171450">
-              <a:buFont typeface="Arial" panose="020B0604020202020204" pitchFamily="34" charset="0"/>
-              <a:buChar char="•"/>
-            </a:pPr>
-            <a:endParaRPr lang="en-US" baseline="0" dirty="0" smtClean="0"/>
-          </a:p>
-          <a:p>
-            <a:pPr marL="0" indent="0">
-              <a:buFont typeface="Arial" panose="020B0604020202020204" pitchFamily="34" charset="0"/>
-              <a:buNone/>
-            </a:pPr>
-            <a:r>
-              <a:rPr lang="en-US" baseline="0" dirty="0" smtClean="0"/>
-              <a:t>Place/City Detector:</a:t>
-            </a:r>
-          </a:p>
-          <a:p>
-            <a:pPr marL="171450" indent="-171450">
-              <a:buFont typeface="Arial" panose="020B0604020202020204" pitchFamily="34" charset="0"/>
-              <a:buChar char="•"/>
-            </a:pPr>
-            <a:r>
-              <a:rPr lang="en-US" baseline="0" dirty="0" smtClean="0"/>
-              <a:t>Place = a cluster of locations within a radius of 100m and over a minimum duration of 5 minutes</a:t>
-            </a:r>
-          </a:p>
-          <a:p>
-            <a:pPr marL="171450" indent="-171450">
-              <a:buFont typeface="Arial" panose="020B0604020202020204" pitchFamily="34" charset="0"/>
-              <a:buChar char="•"/>
-            </a:pPr>
-            <a:r>
-              <a:rPr lang="en-US" baseline="0" dirty="0" smtClean="0"/>
-              <a:t>Mobility Model = set of places the user has visited along with total visiting time of each place</a:t>
-            </a:r>
-            <a:endParaRPr lang="en-US" dirty="0"/>
           </a:p>
         </p:txBody>
       </p:sp>
@@ -2942,7 +2999,7 @@
                 </a:solidFill>
               </a:rPr>
               <a:pPr/>
-              <a:t>10</a:t>
+              <a:t>8</a:t>
             </a:fld>
             <a:endParaRPr lang="en-US" dirty="0">
               <a:solidFill>
@@ -2955,7 +3012,7 @@
     </p:spTree>
     <p:extLst>
       <p:ext uri="{BB962C8B-B14F-4D97-AF65-F5344CB8AC3E}">
-        <p14:creationId xmlns:p14="http://schemas.microsoft.com/office/powerpoint/2010/main" val="2493574430"/>
+        <p14:creationId xmlns:p14="http://schemas.microsoft.com/office/powerpoint/2010/main" val="3439409429"/>
       </p:ext>
     </p:extLst>
   </p:cSld>
@@ -3010,37 +3067,8 @@
           <a:lstStyle/>
           <a:p>
             <a:r>
-              <a:rPr lang="en-US" dirty="0" smtClean="0"/>
-              <a:t>Diagram:</a:t>
-            </a:r>
-            <a:r>
-              <a:rPr lang="en-US" baseline="0" dirty="0" smtClean="0"/>
-              <a:t> LMS = Location Management Services, GMS = Google Play Services?</a:t>
-            </a:r>
-          </a:p>
-          <a:p>
-            <a:endParaRPr lang="en-US" baseline="0" dirty="0" smtClean="0"/>
-          </a:p>
-          <a:p>
-            <a:r>
-              <a:rPr lang="en-US" dirty="0" smtClean="0"/>
-              <a:t>Alternative approach to implementation: modify each application’s location accessing</a:t>
-            </a:r>
-            <a:r>
-              <a:rPr lang="en-US" baseline="0" dirty="0" smtClean="0"/>
-              <a:t> interface</a:t>
-            </a:r>
-          </a:p>
-          <a:p>
-            <a:pPr marL="0" indent="0">
-              <a:buFont typeface="Wingdings" panose="05000000000000000000" pitchFamily="2" charset="2"/>
-              <a:buNone/>
-            </a:pPr>
-            <a:r>
-              <a:rPr lang="en-US" baseline="0" dirty="0" smtClean="0">
-                <a:sym typeface="Wingdings" panose="05000000000000000000" pitchFamily="2" charset="2"/>
-              </a:rPr>
-              <a:t>Disadvantages to this approach:</a:t>
+              <a:rPr lang="en-US" i="0" baseline="0" dirty="0" smtClean="0"/>
+              <a:t>Polar noise symbol explanation: </a:t>
             </a:r>
           </a:p>
           <a:p>
@@ -3049,10 +3077,36 @@
               <a:buChar char="•"/>
             </a:pPr>
             <a:r>
-              <a:rPr lang="en-US" baseline="0" dirty="0" smtClean="0">
-                <a:sym typeface="Wingdings" panose="05000000000000000000" pitchFamily="2" charset="2"/>
-              </a:rPr>
-              <a:t>Requires repackaging the application, which changes its signature  may prevent updates and access to content that checks the signature</a:t>
+              <a:rPr lang="en-US" i="1" baseline="0" dirty="0" smtClean="0"/>
+              <a:t>W</a:t>
+            </a:r>
+            <a:r>
+              <a:rPr lang="en-US" i="1" baseline="-25000" dirty="0" smtClean="0"/>
+              <a:t>-1</a:t>
+            </a:r>
+            <a:r>
+              <a:rPr lang="en-US" i="1" baseline="0" dirty="0" smtClean="0"/>
+              <a:t> </a:t>
+            </a:r>
+            <a:r>
+              <a:rPr lang="en-US" i="0" baseline="0" dirty="0" smtClean="0"/>
+              <a:t>is the -1 branch of the Lambert </a:t>
+            </a:r>
+            <a:r>
+              <a:rPr lang="en-US" i="1" baseline="0" dirty="0" smtClean="0"/>
+              <a:t>W</a:t>
+            </a:r>
+            <a:r>
+              <a:rPr lang="en-US" i="0" baseline="0" dirty="0" smtClean="0"/>
+              <a:t> function and </a:t>
+            </a:r>
+            <a:r>
+              <a:rPr lang="en-US" i="1" baseline="0" dirty="0" smtClean="0"/>
+              <a:t>l </a:t>
+            </a:r>
+            <a:r>
+              <a:rPr lang="en-US" i="0" baseline="0" dirty="0" smtClean="0"/>
+              <a:t>is a privacy level (typically close to 1)</a:t>
             </a:r>
           </a:p>
           <a:p>
@@ -3061,79 +3115,12 @@
               <a:buChar char="•"/>
             </a:pPr>
             <a:r>
-              <a:rPr lang="en-US" baseline="0" dirty="0" smtClean="0">
-                <a:sym typeface="Wingdings" panose="05000000000000000000" pitchFamily="2" charset="2"/>
-              </a:rPr>
-              <a:t>Users would need to download the applications from a different App Store</a:t>
-            </a:r>
-          </a:p>
-          <a:p>
-            <a:pPr marL="171450" indent="-171450">
-              <a:buFont typeface="Arial" panose="020B0604020202020204" pitchFamily="34" charset="0"/>
-              <a:buChar char="•"/>
-            </a:pPr>
-            <a:r>
-              <a:rPr lang="en-US" baseline="0" dirty="0" smtClean="0">
-                <a:sym typeface="Wingdings" panose="05000000000000000000" pitchFamily="2" charset="2"/>
-              </a:rPr>
-              <a:t>Continued “maintenance” required to keep up with the all released </a:t>
-            </a:r>
-            <a:r>
-              <a:rPr lang="en-US" baseline="0" dirty="0" smtClean="0">
-                <a:sym typeface="Wingdings" panose="05000000000000000000" pitchFamily="2" charset="2"/>
-              </a:rPr>
-              <a:t>applications</a:t>
-            </a:r>
-          </a:p>
-          <a:p>
-            <a:pPr marL="171450" indent="-171450">
-              <a:buFont typeface="Arial" panose="020B0604020202020204" pitchFamily="34" charset="0"/>
-              <a:buChar char="•"/>
-            </a:pPr>
-            <a:endParaRPr lang="en-US" baseline="0" dirty="0" smtClean="0">
-              <a:sym typeface="Wingdings" panose="05000000000000000000" pitchFamily="2" charset="2"/>
-            </a:endParaRPr>
-          </a:p>
-          <a:p>
-            <a:r>
-              <a:rPr lang="en-US" baseline="0" dirty="0" smtClean="0"/>
-              <a:t>Static context field addition allows:</a:t>
-            </a:r>
-          </a:p>
-          <a:p>
-            <a:pPr marL="171450" indent="-171450">
-              <a:buFont typeface="Arial" panose="020B0604020202020204" pitchFamily="34" charset="0"/>
-              <a:buChar char="•"/>
-            </a:pPr>
-            <a:r>
-              <a:rPr lang="en-US" baseline="0" dirty="0" smtClean="0"/>
-              <a:t>Access to information about which application is requesting the location</a:t>
-            </a:r>
-          </a:p>
-          <a:p>
-            <a:pPr marL="171450" indent="-171450">
-              <a:buFont typeface="Arial" panose="020B0604020202020204" pitchFamily="34" charset="0"/>
-              <a:buChar char="•"/>
-            </a:pPr>
-            <a:r>
-              <a:rPr lang="en-US" baseline="0" dirty="0" smtClean="0"/>
-              <a:t>Ability to communicate with the Operating System and other processes</a:t>
-            </a:r>
-            <a:endParaRPr lang="en-US" baseline="0" dirty="0" smtClean="0"/>
-          </a:p>
-          <a:p>
-            <a:endParaRPr lang="en-US" baseline="0" dirty="0" smtClean="0"/>
-          </a:p>
-          <a:p>
-            <a:r>
-              <a:rPr lang="en-US" baseline="0" dirty="0" smtClean="0"/>
-              <a:t>Note of OS for smartphones: Android, Windows Phone, and Blackberry all use the permission model for applications versus. iOS which uses explicit user authentication for each </a:t>
-            </a:r>
-            <a:r>
-              <a:rPr lang="en-US" baseline="0" dirty="0" smtClean="0"/>
-              <a:t>access</a:t>
-            </a:r>
-            <a:endParaRPr lang="en-US" baseline="0" dirty="0" smtClean="0"/>
+              <a:rPr lang="en-US" i="0" baseline="0" dirty="0" smtClean="0"/>
+              <a:t>Noise value for LP-Guardian is 200m range</a:t>
+            </a:r>
+          </a:p>
+          <a:p>
+            <a:endParaRPr lang="en-US" i="1" baseline="0" dirty="0" smtClean="0"/>
           </a:p>
         </p:txBody>
       </p:sp>
@@ -3159,7 +3146,7 @@
                 </a:solidFill>
               </a:rPr>
               <a:pPr/>
-              <a:t>11</a:t>
+              <a:t>9</a:t>
             </a:fld>
             <a:endParaRPr lang="en-US" dirty="0">
               <a:solidFill>
@@ -3172,7 +3159,7 @@
     </p:spTree>
     <p:extLst>
       <p:ext uri="{BB962C8B-B14F-4D97-AF65-F5344CB8AC3E}">
-        <p14:creationId xmlns:p14="http://schemas.microsoft.com/office/powerpoint/2010/main" val="3461803317"/>
+        <p14:creationId xmlns:p14="http://schemas.microsoft.com/office/powerpoint/2010/main" val="1073290682"/>
       </p:ext>
     </p:extLst>
   </p:cSld>
@@ -3228,25 +3215,7 @@
           <a:p>
             <a:r>
               <a:rPr lang="en-US" dirty="0" smtClean="0"/>
-              <a:t>Introduction</a:t>
-            </a:r>
-            <a:r>
-              <a:rPr lang="en-US" baseline="0" dirty="0" smtClean="0"/>
-              <a:t> to the slides: Three instances of LP-Guardian use that require user interaction…</a:t>
-            </a:r>
-            <a:endParaRPr lang="en-US" dirty="0" smtClean="0"/>
-          </a:p>
-          <a:p>
-            <a:endParaRPr lang="en-US" dirty="0" smtClean="0"/>
-          </a:p>
-          <a:p>
-            <a:r>
-              <a:rPr lang="en-US" dirty="0" smtClean="0"/>
-              <a:t>Placement of prompts</a:t>
-            </a:r>
-            <a:r>
-              <a:rPr lang="en-US" baseline="0" dirty="0" smtClean="0"/>
-              <a:t> for controlling resource access obey the four main rules/objectives:</a:t>
+              <a:t>Rule Manager: </a:t>
             </a:r>
           </a:p>
           <a:p>
@@ -3255,8 +3224,12 @@
               <a:buChar char="•"/>
             </a:pPr>
             <a:r>
+              <a:rPr lang="en-US" dirty="0" smtClean="0"/>
+              <a:t>Input: the application, the state of the application (foreground or background), the location sample, whether</a:t>
+            </a:r>
+            <a:r>
               <a:rPr lang="en-US" baseline="0" dirty="0" smtClean="0"/>
-              <a:t>Safety – user prompt precedes every resource access</a:t>
+              <a:t> the application session is new or an ongoing session, and the place/city/block</a:t>
             </a:r>
           </a:p>
           <a:p>
@@ -3266,17 +3239,8 @@
             </a:pPr>
             <a:r>
               <a:rPr lang="en-US" baseline="0" dirty="0" smtClean="0"/>
-              <a:t>Frugality – user prompt is </a:t>
-            </a:r>
-            <a:r>
-              <a:rPr lang="en-US" i="1" baseline="0" dirty="0" smtClean="0"/>
-              <a:t>only</a:t>
-            </a:r>
-            <a:r>
-              <a:rPr lang="en-US" i="0" baseline="0" dirty="0" smtClean="0"/>
-              <a:t> displayed in the event of a resource access</a:t>
-            </a:r>
-            <a:endParaRPr lang="en-US" baseline="0" dirty="0" smtClean="0"/>
+              <a:t>Global rules: one per application (applies to foreground and background states)</a:t>
+            </a:r>
           </a:p>
           <a:p>
             <a:pPr marL="171450" indent="-171450">
@@ -3285,7 +3249,7 @@
             </a:pPr>
             <a:r>
               <a:rPr lang="en-US" baseline="0" dirty="0" smtClean="0"/>
-              <a:t>Visibility – user prompt displayed only if the application in the foreground is attempting to access a resource</a:t>
+              <a:t>Per-place rules: one per application-location combination</a:t>
             </a:r>
           </a:p>
           <a:p>
@@ -3293,9 +3257,36 @@
               <a:buFont typeface="Arial" panose="020B0604020202020204" pitchFamily="34" charset="0"/>
               <a:buChar char="•"/>
             </a:pPr>
+            <a:endParaRPr lang="en-US" baseline="0" dirty="0" smtClean="0"/>
+          </a:p>
+          <a:p>
+            <a:pPr marL="0" indent="0">
+              <a:buFont typeface="Arial" panose="020B0604020202020204" pitchFamily="34" charset="0"/>
+              <a:buNone/>
+            </a:pPr>
             <a:r>
               <a:rPr lang="en-US" baseline="0" dirty="0" smtClean="0"/>
-              <a:t>Non-repetitiveness – prompt never displayed when a more critical resource of the same type has been authorized (implied authorization)</a:t>
+              <a:t>Place/City Detector:</a:t>
+            </a:r>
+          </a:p>
+          <a:p>
+            <a:pPr marL="171450" indent="-171450">
+              <a:buFont typeface="Arial" panose="020B0604020202020204" pitchFamily="34" charset="0"/>
+              <a:buChar char="•"/>
+            </a:pPr>
+            <a:r>
+              <a:rPr lang="en-US" baseline="0" dirty="0" smtClean="0"/>
+              <a:t>Place = a cluster of locations within a radius of 100m and over a minimum duration of 5 minutes</a:t>
+            </a:r>
+          </a:p>
+          <a:p>
+            <a:pPr marL="171450" indent="-171450">
+              <a:buFont typeface="Arial" panose="020B0604020202020204" pitchFamily="34" charset="0"/>
+              <a:buChar char="•"/>
+            </a:pPr>
+            <a:r>
+              <a:rPr lang="en-US" baseline="0" dirty="0" smtClean="0"/>
+              <a:t>Mobility Model = set of places the user has visited along with total visiting time of each place</a:t>
             </a:r>
             <a:endParaRPr lang="en-US" dirty="0"/>
           </a:p>
@@ -3323,7 +3314,7 @@
                 </a:solidFill>
               </a:rPr>
               <a:pPr/>
-              <a:t>12</a:t>
+              <a:t>10</a:t>
             </a:fld>
             <a:endParaRPr lang="en-US" dirty="0">
               <a:solidFill>
@@ -3336,7 +3327,7 @@
     </p:spTree>
     <p:extLst>
       <p:ext uri="{BB962C8B-B14F-4D97-AF65-F5344CB8AC3E}">
-        <p14:creationId xmlns:p14="http://schemas.microsoft.com/office/powerpoint/2010/main" val="1009101082"/>
+        <p14:creationId xmlns:p14="http://schemas.microsoft.com/office/powerpoint/2010/main" val="2493574430"/>
       </p:ext>
     </p:extLst>
   </p:cSld>
@@ -3392,19 +3383,117 @@
           <a:p>
             <a:r>
               <a:rPr lang="en-US" dirty="0" smtClean="0"/>
-              <a:t>Looking to see if there is a  market for an app like LP-Guardian</a:t>
-            </a:r>
+              <a:t>Diagram:</a:t>
+            </a:r>
+            <a:r>
+              <a:rPr lang="en-US" baseline="0" dirty="0" smtClean="0"/>
+              <a:t> LMS = Location Management Services, GMS = Google Play Services?</a:t>
+            </a:r>
+          </a:p>
+          <a:p>
+            <a:endParaRPr lang="en-US" baseline="0" dirty="0" smtClean="0"/>
           </a:p>
           <a:p>
             <a:r>
               <a:rPr lang="en-US" dirty="0" smtClean="0"/>
-              <a:t>70 from social network announcements, 110 from amazon</a:t>
+              <a:t>Alternative approach to implementation: modify each application’s location accessing</a:t>
             </a:r>
             <a:r>
               <a:rPr lang="en-US" baseline="0" dirty="0" smtClean="0"/>
-              <a:t> mechanical turk</a:t>
-            </a:r>
-            <a:endParaRPr lang="en-US" dirty="0"/>
+              <a:t> interface</a:t>
+            </a:r>
+          </a:p>
+          <a:p>
+            <a:pPr marL="0" indent="0">
+              <a:buFont typeface="Wingdings" panose="05000000000000000000" pitchFamily="2" charset="2"/>
+              <a:buNone/>
+            </a:pPr>
+            <a:r>
+              <a:rPr lang="en-US" baseline="0" dirty="0" smtClean="0">
+                <a:sym typeface="Wingdings" panose="05000000000000000000" pitchFamily="2" charset="2"/>
+              </a:rPr>
+              <a:t>Disadvantages to this approach:</a:t>
+            </a:r>
+          </a:p>
+          <a:p>
+            <a:pPr marL="171450" indent="-171450">
+              <a:buFont typeface="Arial" panose="020B0604020202020204" pitchFamily="34" charset="0"/>
+              <a:buChar char="•"/>
+            </a:pPr>
+            <a:r>
+              <a:rPr lang="en-US" baseline="0" dirty="0" smtClean="0">
+                <a:sym typeface="Wingdings" panose="05000000000000000000" pitchFamily="2" charset="2"/>
+              </a:rPr>
+              <a:t>Requires repackaging the application, which changes its signature  may prevent updates and access to content that checks the signature</a:t>
+            </a:r>
+          </a:p>
+          <a:p>
+            <a:pPr marL="171450" indent="-171450">
+              <a:buFont typeface="Arial" panose="020B0604020202020204" pitchFamily="34" charset="0"/>
+              <a:buChar char="•"/>
+            </a:pPr>
+            <a:r>
+              <a:rPr lang="en-US" baseline="0" dirty="0" smtClean="0">
+                <a:sym typeface="Wingdings" panose="05000000000000000000" pitchFamily="2" charset="2"/>
+              </a:rPr>
+              <a:t>Users would need to download the applications from a different App Store</a:t>
+            </a:r>
+          </a:p>
+          <a:p>
+            <a:pPr marL="171450" indent="-171450">
+              <a:buFont typeface="Arial" panose="020B0604020202020204" pitchFamily="34" charset="0"/>
+              <a:buChar char="•"/>
+            </a:pPr>
+            <a:r>
+              <a:rPr lang="en-US" baseline="0" dirty="0" smtClean="0">
+                <a:sym typeface="Wingdings" panose="05000000000000000000" pitchFamily="2" charset="2"/>
+              </a:rPr>
+              <a:t>Continued “maintenance” required to keep up with the all released applications</a:t>
+            </a:r>
+          </a:p>
+          <a:p>
+            <a:pPr marL="171450" indent="-171450">
+              <a:buFont typeface="Arial" panose="020B0604020202020204" pitchFamily="34" charset="0"/>
+              <a:buChar char="•"/>
+            </a:pPr>
+            <a:endParaRPr lang="en-US" baseline="0" dirty="0" smtClean="0">
+              <a:sym typeface="Wingdings" panose="05000000000000000000" pitchFamily="2" charset="2"/>
+            </a:endParaRPr>
+          </a:p>
+          <a:p>
+            <a:r>
+              <a:rPr lang="en-US" baseline="0" dirty="0" smtClean="0"/>
+              <a:t>Static context field addition allows:</a:t>
+            </a:r>
+          </a:p>
+          <a:p>
+            <a:pPr marL="171450" indent="-171450">
+              <a:buFont typeface="Arial" panose="020B0604020202020204" pitchFamily="34" charset="0"/>
+              <a:buChar char="•"/>
+            </a:pPr>
+            <a:r>
+              <a:rPr lang="en-US" baseline="0" dirty="0" smtClean="0"/>
+              <a:t>Access to information about which application is requesting the location</a:t>
+            </a:r>
+          </a:p>
+          <a:p>
+            <a:pPr marL="171450" indent="-171450">
+              <a:buFont typeface="Arial" panose="020B0604020202020204" pitchFamily="34" charset="0"/>
+              <a:buChar char="•"/>
+            </a:pPr>
+            <a:r>
+              <a:rPr lang="en-US" baseline="0" dirty="0" smtClean="0"/>
+              <a:t>Ability to communicate with the Operating System and other processes</a:t>
+            </a:r>
+          </a:p>
+          <a:p>
+            <a:endParaRPr lang="en-US" baseline="0" dirty="0" smtClean="0"/>
+          </a:p>
+          <a:p>
+            <a:r>
+              <a:rPr lang="en-US" baseline="0" dirty="0" smtClean="0"/>
+              <a:t>Note of OS for smartphones: Android, Windows Phone, and Blackberry all use the permission model for applications versus. iOS which uses explicit user authentication for each access</a:t>
+            </a:r>
           </a:p>
         </p:txBody>
       </p:sp>
@@ -3424,17 +3513,26 @@
           <a:lstStyle/>
           <a:p>
             <a:fld id="{B8B3BC3C-0900-4ACD-9030-5BE6C2442A68}" type="slidenum">
-              <a:rPr lang="en-US" smtClean="0"/>
-              <a:t>13</a:t>
+              <a:rPr lang="en-US" smtClean="0">
+                <a:solidFill>
+                  <a:prstClr val="black"/>
+                </a:solidFill>
+              </a:rPr>
+              <a:pPr/>
+              <a:t>11</a:t>
             </a:fld>
-            <a:endParaRPr lang="en-US" dirty="0"/>
+            <a:endParaRPr lang="en-US" dirty="0">
+              <a:solidFill>
+                <a:prstClr val="black"/>
+              </a:solidFill>
+            </a:endParaRPr>
           </a:p>
         </p:txBody>
       </p:sp>
     </p:spTree>
     <p:extLst>
       <p:ext uri="{BB962C8B-B14F-4D97-AF65-F5344CB8AC3E}">
-        <p14:creationId xmlns:p14="http://schemas.microsoft.com/office/powerpoint/2010/main" val="3574496599"/>
+        <p14:creationId xmlns:p14="http://schemas.microsoft.com/office/powerpoint/2010/main" val="3461803317"/>
       </p:ext>
     </p:extLst>
   </p:cSld>
@@ -4982,7 +5080,7 @@
           <a:p>
             <a:fld id="{ADE5661A-BDAA-4579-B2F5-AA9011776D83}" type="datetimeFigureOut">
               <a:rPr lang="en-US" smtClean="0"/>
-              <a:t>2/24/2015</a:t>
+              <a:t>2/25/2015</a:t>
             </a:fld>
             <a:endParaRPr lang="en-US" dirty="0"/>
           </a:p>
@@ -6089,7 +6187,7 @@
             <a:fld id="{1D8BD707-D9CF-40AE-B4C6-C98DA3205C09}" type="datetimeFigureOut">
               <a:rPr lang="en-US" smtClean="0"/>
               <a:pPr/>
-              <a:t>2/24/2015</a:t>
+              <a:t>2/25/2015</a:t>
             </a:fld>
             <a:endParaRPr lang="en-US" dirty="0"/>
           </a:p>
@@ -7204,7 +7302,7 @@
             <a:fld id="{1D8BD707-D9CF-40AE-B4C6-C98DA3205C09}" type="datetimeFigureOut">
               <a:rPr lang="en-US" smtClean="0"/>
               <a:pPr/>
-              <a:t>2/24/2015</a:t>
+              <a:t>2/25/2015</a:t>
             </a:fld>
             <a:endParaRPr lang="en-US" dirty="0"/>
           </a:p>
@@ -8314,7 +8412,7 @@
             <a:fld id="{1D8BD707-D9CF-40AE-B4C6-C98DA3205C09}" type="datetimeFigureOut">
               <a:rPr lang="en-US" smtClean="0"/>
               <a:pPr/>
-              <a:t>2/24/2015</a:t>
+              <a:t>2/25/2015</a:t>
             </a:fld>
             <a:endParaRPr lang="en-US" dirty="0"/>
           </a:p>
@@ -9908,7 +10006,7 @@
           <a:p>
             <a:fld id="{7D698992-9F5B-4E9D-871D-4517B2EC8643}" type="datetimeFigureOut">
               <a:rPr lang="en-US" smtClean="0"/>
-              <a:t>2/24/2015</a:t>
+              <a:t>2/25/2015</a:t>
             </a:fld>
             <a:endParaRPr lang="en-US" dirty="0"/>
           </a:p>
@@ -10967,7 +11065,7 @@
             <a:fld id="{1D8BD707-D9CF-40AE-B4C6-C98DA3205C09}" type="datetimeFigureOut">
               <a:rPr lang="en-US" smtClean="0"/>
               <a:pPr/>
-              <a:t>2/24/2015</a:t>
+              <a:t>2/25/2015</a:t>
             </a:fld>
             <a:endParaRPr lang="en-US" dirty="0"/>
           </a:p>
@@ -12296,7 +12394,7 @@
             <a:fld id="{1D8BD707-D9CF-40AE-B4C6-C98DA3205C09}" type="datetimeFigureOut">
               <a:rPr lang="en-US" smtClean="0"/>
               <a:pPr/>
-              <a:t>2/24/2015</a:t>
+              <a:t>2/25/2015</a:t>
             </a:fld>
             <a:endParaRPr lang="en-US" dirty="0"/>
           </a:p>
@@ -13435,7 +13533,7 @@
             <a:fld id="{1D8BD707-D9CF-40AE-B4C6-C98DA3205C09}" type="datetimeFigureOut">
               <a:rPr lang="en-US" smtClean="0"/>
               <a:pPr/>
-              <a:t>2/24/2015</a:t>
+              <a:t>2/25/2015</a:t>
             </a:fld>
             <a:endParaRPr lang="en-US" dirty="0"/>
           </a:p>
@@ -14493,7 +14591,7 @@
             <a:fld id="{1D8BD707-D9CF-40AE-B4C6-C98DA3205C09}" type="datetimeFigureOut">
               <a:rPr lang="en-US" smtClean="0"/>
               <a:pPr/>
-              <a:t>2/24/2015</a:t>
+              <a:t>2/25/2015</a:t>
             </a:fld>
             <a:endParaRPr lang="en-US" dirty="0"/>
           </a:p>
@@ -15533,7 +15631,7 @@
             <a:fld id="{1D8BD707-D9CF-40AE-B4C6-C98DA3205C09}" type="datetimeFigureOut">
               <a:rPr lang="en-US" smtClean="0"/>
               <a:pPr/>
-              <a:t>2/24/2015</a:t>
+              <a:t>2/25/2015</a:t>
             </a:fld>
             <a:endParaRPr lang="en-US" dirty="0"/>
           </a:p>
@@ -16770,7 +16868,7 @@
             <a:fld id="{1D8BD707-D9CF-40AE-B4C6-C98DA3205C09}" type="datetimeFigureOut">
               <a:rPr lang="en-US" smtClean="0"/>
               <a:pPr/>
-              <a:t>2/24/2015</a:t>
+              <a:t>2/25/2015</a:t>
             </a:fld>
             <a:endParaRPr lang="en-US" dirty="0"/>
           </a:p>
@@ -17125,7 +17223,7 @@
             <a:fld id="{1D8BD707-D9CF-40AE-B4C6-C98DA3205C09}" type="datetimeFigureOut">
               <a:rPr lang="en-US" smtClean="0"/>
               <a:pPr/>
-              <a:t>2/24/2015</a:t>
+              <a:t>2/25/2015</a:t>
             </a:fld>
             <a:endParaRPr lang="en-US" dirty="0"/>
           </a:p>
@@ -17783,15 +17881,7 @@
           <a:p>
             <a:r>
               <a:rPr lang="en-US" dirty="0" smtClean="0"/>
-              <a:t>Location Interceptor: diverts the application flow to LP-Guardian upon location access </a:t>
-            </a:r>
-            <a:r>
-              <a:rPr lang="en-US" dirty="0" smtClean="0"/>
-              <a:t>(blocks </a:t>
-            </a:r>
-            <a:r>
-              <a:rPr lang="en-US" dirty="0" smtClean="0"/>
-              <a:t>the app.) and returns the anonymized location</a:t>
+              <a:t>Location Interceptor: diverts the application flow to LP-Guardian upon location access (blocks the app.) and returns the anonymized location</a:t>
             </a:r>
           </a:p>
           <a:p>
@@ -18173,26 +18263,14 @@
           <a:p>
             <a:r>
               <a:rPr lang="en-US" dirty="0" smtClean="0"/>
-              <a:t>LP-Guardian </a:t>
-            </a:r>
+              <a:t>LP-Guardian modifies the location object before it reaches the application requesting the location</a:t>
+            </a:r>
+          </a:p>
+          <a:p>
+            <a:pPr lvl="1"/>
             <a:r>
               <a:rPr lang="en-US" dirty="0" smtClean="0"/>
-              <a:t>modifies the location object before it reaches the application requesting the location</a:t>
-            </a:r>
-          </a:p>
-          <a:p>
-            <a:pPr lvl="1"/>
-            <a:r>
-              <a:rPr lang="en-US" dirty="0" smtClean="0"/>
-              <a:t>Modified </a:t>
-            </a:r>
-            <a:r>
-              <a:rPr lang="en-US" dirty="0" smtClean="0"/>
-              <a:t>Android Location </a:t>
-            </a:r>
-            <a:r>
-              <a:rPr lang="en-US" dirty="0" smtClean="0"/>
-              <a:t>class to contain a static context field that is populated whenever a context is created for the application</a:t>
+              <a:t>Modified Android Location class to contain a static context field that is populated whenever a context is created for the application</a:t>
             </a:r>
           </a:p>
           <a:p>
@@ -19891,7 +19969,7 @@
         </p:spPr>
         <p:txBody>
           <a:bodyPr>
-            <a:normAutofit fontScale="92500" lnSpcReduction="10000"/>
+            <a:normAutofit/>
           </a:bodyPr>
           <a:lstStyle/>
           <a:p>
@@ -19944,29 +20022,13 @@
             <a:pPr lvl="1"/>
             <a:r>
               <a:rPr lang="en-US" dirty="0" smtClean="0"/>
-              <a:t>User profiling even without identification</a:t>
-            </a:r>
-          </a:p>
-          <a:p>
+              <a:t>User profiling even without </a:t>
+            </a:r>
             <a:r>
               <a:rPr lang="en-US" dirty="0" smtClean="0"/>
-              <a:t>Threats indicate need for system to make following security improvements:</a:t>
-            </a:r>
-          </a:p>
-          <a:p>
-            <a:pPr lvl="1"/>
-            <a:r>
-              <a:rPr lang="en-US" dirty="0" smtClean="0"/>
-              <a:t>Only access location data when the user expects the app to do so</a:t>
-            </a:r>
-          </a:p>
-          <a:p>
-            <a:pPr lvl="1"/>
-            <a:r>
-              <a:rPr lang="en-US" dirty="0" smtClean="0"/>
-              <a:t>Only access location data with granularity necessary to perform intended function</a:t>
-            </a:r>
-            <a:endParaRPr lang="en-US" dirty="0"/>
+              <a:t>identification</a:t>
+            </a:r>
+            <a:endParaRPr lang="en-US" dirty="0" smtClean="0"/>
           </a:p>
         </p:txBody>
       </p:sp>
@@ -20372,15 +20434,7 @@
                       </a:r>
                       <a:r>
                         <a:rPr lang="en-US" baseline="0" dirty="0" smtClean="0"/>
-                        <a:t> of Prior </a:t>
-                      </a:r>
-                      <a:r>
-                        <a:rPr lang="en-US" baseline="0" dirty="0" smtClean="0"/>
-                        <a:t>Art</a:t>
-                      </a:r>
-                      <a:r>
-                        <a:rPr lang="en-US" baseline="0" dirty="0" smtClean="0"/>
-                        <a:t/>
+                        <a:t> of Prior Art</a:t>
                       </a:r>
                       <a:br>
                         <a:rPr lang="en-US" baseline="0" dirty="0" smtClean="0"/>
@@ -20394,11 +20448,7 @@
                       </a:br>
                       <a:r>
                         <a:rPr lang="en-US" baseline="0" dirty="0" smtClean="0"/>
-                        <a:t>- Advantages of Proposed Approach over Prior </a:t>
-                      </a:r>
-                      <a:r>
-                        <a:rPr lang="en-US" baseline="0" dirty="0" smtClean="0"/>
-                        <a:t>Art</a:t>
+                        <a:t>- Advantages of Proposed Approach over Prior Art</a:t>
                       </a:r>
                       <a:endParaRPr lang="en-US" dirty="0"/>
                     </a:p>
@@ -20561,45 +20611,67 @@
         </p:nvSpPr>
         <p:spPr/>
         <p:txBody>
-          <a:bodyPr/>
+          <a:bodyPr>
+            <a:normAutofit/>
+          </a:bodyPr>
           <a:lstStyle/>
           <a:p>
             <a:r>
               <a:rPr lang="en-US" dirty="0" smtClean="0"/>
+              <a:t>Practical Approaches</a:t>
+            </a:r>
+            <a:endParaRPr lang="en-US" dirty="0" smtClean="0"/>
+          </a:p>
+          <a:p>
+            <a:pPr lvl="1"/>
+            <a:r>
+              <a:rPr lang="en-US" dirty="0" err="1" smtClean="0"/>
               <a:t>MockDroid</a:t>
             </a:r>
+            <a:r>
+              <a:rPr lang="en-US" dirty="0" smtClean="0"/>
+              <a:t>: Allows complete disabling collection of location data</a:t>
+            </a:r>
+            <a:endParaRPr lang="en-US" dirty="0" smtClean="0"/>
           </a:p>
           <a:p>
             <a:pPr lvl="1"/>
             <a:r>
               <a:rPr lang="en-US" dirty="0" smtClean="0"/>
-              <a:t>Allows user to disable apps using any location data</a:t>
+              <a:t>Koi &amp; Cache: Require apps to use their APIs</a:t>
             </a:r>
           </a:p>
           <a:p>
             <a:pPr lvl="1"/>
             <a:r>
+              <a:rPr lang="en-US" dirty="0" err="1" smtClean="0"/>
+              <a:t>Micinski</a:t>
+            </a:r>
+            <a:r>
               <a:rPr lang="en-US" dirty="0" smtClean="0"/>
-              <a:t>Very secure, but severely hinders functionality of many apps</a:t>
-            </a:r>
-          </a:p>
-          <a:p>
+              <a:t>:  Coarsens all location data without regard to threat level or functionality</a:t>
+            </a:r>
+          </a:p>
+          <a:p>
+            <a:pPr lvl="1"/>
+            <a:r>
+              <a:rPr lang="en-US" dirty="0" err="1" smtClean="0"/>
+              <a:t>PlaceMask</a:t>
+            </a:r>
             <a:r>
               <a:rPr lang="en-US" dirty="0" smtClean="0"/>
-              <a:t>Koi &amp; Caché</a:t>
-            </a:r>
-          </a:p>
-          <a:p>
-            <a:pPr lvl="1"/>
+              <a:t>: Allows users to provide false location data. Can make apps unusable</a:t>
+            </a:r>
+            <a:endParaRPr lang="en-US" dirty="0" smtClean="0"/>
+          </a:p>
+          <a:p>
             <a:r>
               <a:rPr lang="en-US" dirty="0" smtClean="0"/>
-              <a:t>These require other apps to use their APIs to provide secure location</a:t>
-            </a:r>
-          </a:p>
-          <a:p>
+              <a:t>Theoretical </a:t>
+            </a:r>
             <a:r>
               <a:rPr lang="en-US" dirty="0" smtClean="0"/>
-              <a:t>Theoretical Approaches</a:t>
+              <a:t>Approaches</a:t>
             </a:r>
           </a:p>
           <a:p>
@@ -20613,7 +20685,25 @@
             <a:pPr lvl="1"/>
             <a:r>
               <a:rPr lang="en-US" dirty="0" smtClean="0"/>
-              <a:t>Shown that profiling &amp; identification may be possible even with “anonymized” location data only</a:t>
+              <a:t>Shown that profiling &amp; identification may be possible even with “anonymized” location data </a:t>
+            </a:r>
+            <a:r>
+              <a:rPr lang="en-US" dirty="0" smtClean="0"/>
+              <a:t>only (cell tower based location)</a:t>
+            </a:r>
+          </a:p>
+          <a:p>
+            <a:pPr lvl="1"/>
+            <a:r>
+              <a:rPr lang="en-US" dirty="0" smtClean="0"/>
+              <a:t>Requires connection to anonymity server to provide anonymized location data</a:t>
+            </a:r>
+          </a:p>
+          <a:p>
+            <a:pPr lvl="1"/>
+            <a:r>
+              <a:rPr lang="en-US" dirty="0" smtClean="0"/>
+              <a:t>Requires many other users in the same location at the same time</a:t>
             </a:r>
             <a:endParaRPr lang="en-US" dirty="0"/>
           </a:p>
@@ -21169,11 +21259,7 @@
           <a:p>
             <a:r>
               <a:rPr lang="en-US" dirty="0" smtClean="0"/>
-              <a:t>Identification </a:t>
-            </a:r>
-            <a:r>
-              <a:rPr lang="en-US" dirty="0" smtClean="0"/>
-              <a:t>Protection</a:t>
+              <a:t>Identification Protection</a:t>
             </a:r>
           </a:p>
           <a:p>
@@ -21187,25 +21273,8 @@
             <a:pPr lvl="1"/>
             <a:r>
               <a:rPr lang="en-US" dirty="0" smtClean="0"/>
-              <a:t>Identification can be </a:t>
-            </a:r>
-            <a:r>
-              <a:rPr lang="en-US" dirty="0" smtClean="0"/>
-              <a:t>achieved</a:t>
-            </a:r>
-            <a:r>
-              <a:rPr lang="en-US" dirty="0" smtClean="0"/>
-              <a:t> </a:t>
-            </a:r>
-            <a:r>
-              <a:rPr lang="en-US" dirty="0" smtClean="0"/>
-              <a:t>via an anonymous </a:t>
-            </a:r>
-            <a:r>
-              <a:rPr lang="en-US" dirty="0" smtClean="0"/>
-              <a:t>histogram of city blocks visited given a database of background information</a:t>
-            </a:r>
-            <a:endParaRPr lang="en-US" dirty="0" smtClean="0"/>
+              <a:t>Identification can be achieved via an anonymous histogram of city blocks visited given a database of background information</a:t>
+            </a:r>
           </a:p>
           <a:p>
             <a:pPr lvl="1"/>
@@ -21219,13 +21288,8 @@
             <a:pPr lvl="1"/>
             <a:r>
               <a:rPr lang="en-US" dirty="0" smtClean="0"/>
-              <a:t>LP-Guardian releases the location as long as the histogram is reasonably close to that of another </a:t>
-            </a:r>
-            <a:r>
-              <a:rPr lang="en-US" dirty="0" smtClean="0"/>
-              <a:t>individual’s in the city</a:t>
-            </a:r>
-            <a:endParaRPr lang="en-US" dirty="0" smtClean="0"/>
+              <a:t>LP-Guardian releases the location as long as the histogram is reasonably close to that of another individual’s in the city</a:t>
+            </a:r>
           </a:p>
           <a:p>
             <a:pPr lvl="1"/>

</xml_diff>

<commit_message>
Final (?) version of my slides. At least for now.
</commit_message>
<xml_diff>
--- a/PaperPresentation/Paper_Presentation_Fasburg_Reiff_Thomas.pptx
+++ b/PaperPresentation/Paper_Presentation_Fasburg_Reiff_Thomas.pptx
@@ -5,32 +5,33 @@
     <p:sldMasterId id="2147483749" r:id="rId1"/>
   </p:sldMasterIdLst>
   <p:notesMasterIdLst>
-    <p:notesMasterId r:id="rId25"/>
+    <p:notesMasterId r:id="rId26"/>
   </p:notesMasterIdLst>
   <p:sldIdLst>
     <p:sldId id="256" r:id="rId2"/>
-    <p:sldId id="257" r:id="rId3"/>
-    <p:sldId id="258" r:id="rId4"/>
-    <p:sldId id="259" r:id="rId5"/>
-    <p:sldId id="265" r:id="rId6"/>
-    <p:sldId id="260" r:id="rId7"/>
-    <p:sldId id="276" r:id="rId8"/>
-    <p:sldId id="277" r:id="rId9"/>
-    <p:sldId id="278" r:id="rId10"/>
-    <p:sldId id="279" r:id="rId11"/>
-    <p:sldId id="281" r:id="rId12"/>
-    <p:sldId id="280" r:id="rId13"/>
-    <p:sldId id="262" r:id="rId14"/>
-    <p:sldId id="269" r:id="rId15"/>
-    <p:sldId id="270" r:id="rId16"/>
-    <p:sldId id="271" r:id="rId17"/>
-    <p:sldId id="268" r:id="rId18"/>
-    <p:sldId id="266" r:id="rId19"/>
-    <p:sldId id="272" r:id="rId20"/>
-    <p:sldId id="263" r:id="rId21"/>
-    <p:sldId id="264" r:id="rId22"/>
-    <p:sldId id="274" r:id="rId23"/>
-    <p:sldId id="275" r:id="rId24"/>
+    <p:sldId id="282" r:id="rId3"/>
+    <p:sldId id="257" r:id="rId4"/>
+    <p:sldId id="258" r:id="rId5"/>
+    <p:sldId id="259" r:id="rId6"/>
+    <p:sldId id="265" r:id="rId7"/>
+    <p:sldId id="260" r:id="rId8"/>
+    <p:sldId id="276" r:id="rId9"/>
+    <p:sldId id="277" r:id="rId10"/>
+    <p:sldId id="278" r:id="rId11"/>
+    <p:sldId id="279" r:id="rId12"/>
+    <p:sldId id="281" r:id="rId13"/>
+    <p:sldId id="280" r:id="rId14"/>
+    <p:sldId id="262" r:id="rId15"/>
+    <p:sldId id="269" r:id="rId16"/>
+    <p:sldId id="270" r:id="rId17"/>
+    <p:sldId id="271" r:id="rId18"/>
+    <p:sldId id="268" r:id="rId19"/>
+    <p:sldId id="266" r:id="rId20"/>
+    <p:sldId id="272" r:id="rId21"/>
+    <p:sldId id="263" r:id="rId22"/>
+    <p:sldId id="264" r:id="rId23"/>
+    <p:sldId id="274" r:id="rId24"/>
+    <p:sldId id="275" r:id="rId25"/>
   </p:sldIdLst>
   <p:sldSz cx="9144000" cy="6858000" type="screen4x3"/>
   <p:notesSz cx="6858000" cy="9144000"/>
@@ -131,7 +132,7 @@
   </p:defaultTextStyle>
   <p:extLst>
     <p:ext uri="{EFAFB233-063F-42B5-8137-9DF3F51BA10A}">
-      <p15:sldGuideLst xmlns:p15="http://schemas.microsoft.com/office/powerpoint/2012/main" xmlns="">
+      <p15:sldGuideLst xmlns:p15="http://schemas.microsoft.com/office/powerpoint/2012/main">
         <p15:guide id="1" orient="horz" pos="2160">
           <p15:clr>
             <a:srgbClr val="A4A3A4"/>
@@ -344,6 +345,7 @@
     </c:plotArea>
     <c:legend>
       <c:legendPos val="r"/>
+      <c:layout/>
       <c:overlay val="0"/>
     </c:legend>
     <c:plotVisOnly val="1"/>
@@ -778,7 +780,7 @@
           <a:p>
             <a:fld id="{A63B8CFC-D614-4432-A7DB-A65856E85B43}" type="datetimeFigureOut">
               <a:rPr lang="en-US" smtClean="0"/>
-              <a:t>2/25/2015</a:t>
+              <a:t>2/26/2015</a:t>
             </a:fld>
             <a:endParaRPr lang="en-US" dirty="0"/>
           </a:p>
@@ -1099,12 +1101,12 @@
               <a:t> of survey </a:t>
             </a:r>
             <a:r>
-              <a:rPr lang="en-US" baseline="0" dirty="0" err="1" smtClean="0"/>
-              <a:t>respondants</a:t>
-            </a:r>
-            <a:r>
               <a:rPr lang="en-US" baseline="0" dirty="0" smtClean="0"/>
-              <a:t> believe mobile phone location data collection can pose a privacy threat</a:t>
+              <a:t>respondents </a:t>
+            </a:r>
+            <a:r>
+              <a:rPr lang="en-US" baseline="0" dirty="0" smtClean="0"/>
+              <a:t>believe mobile phone location data collection can pose a privacy threat</a:t>
             </a:r>
           </a:p>
           <a:p>
@@ -1135,7 +1137,7 @@
           <a:p>
             <a:fld id="{B8B3BC3C-0900-4ACD-9030-5BE6C2442A68}" type="slidenum">
               <a:rPr lang="en-US" smtClean="0"/>
-              <a:t>2</a:t>
+              <a:t>3</a:t>
             </a:fld>
             <a:endParaRPr lang="en-US" dirty="0"/>
           </a:p>
@@ -1204,9 +1206,58 @@
             </a:r>
             <a:r>
               <a:rPr lang="en-US" baseline="0" dirty="0" smtClean="0"/>
-              <a:t> to the slides: Three instances of LP-Guardian use that require user interaction…</a:t>
-            </a:r>
-            <a:endParaRPr lang="en-US" dirty="0" smtClean="0"/>
+              <a:t> to the slides: Three instances of LP-Guardian use that require user interaction</a:t>
+            </a:r>
+            <a:r>
+              <a:rPr lang="en-US" baseline="0" dirty="0" smtClean="0"/>
+              <a:t>…</a:t>
+            </a:r>
+          </a:p>
+          <a:p>
+            <a:endParaRPr lang="en-US" baseline="0" dirty="0" smtClean="0"/>
+          </a:p>
+          <a:p>
+            <a:r>
+              <a:rPr lang="en-US" baseline="0" dirty="0" smtClean="0"/>
+              <a:t>When a user chooses to hide his or her location, two options:</a:t>
+            </a:r>
+          </a:p>
+          <a:p>
+            <a:pPr marL="171450" indent="-171450">
+              <a:buFont typeface="Arial" panose="020B0604020202020204" pitchFamily="34" charset="0"/>
+              <a:buChar char="•"/>
+            </a:pPr>
+            <a:r>
+              <a:rPr lang="en-US" baseline="0" dirty="0" smtClean="0"/>
+              <a:t>City-level coarsening</a:t>
+            </a:r>
+          </a:p>
+          <a:p>
+            <a:pPr marL="171450" indent="-171450">
+              <a:buFont typeface="Arial" panose="020B0604020202020204" pitchFamily="34" charset="0"/>
+              <a:buChar char="•"/>
+            </a:pPr>
+            <a:r>
+              <a:rPr lang="en-US" baseline="0" dirty="0" smtClean="0"/>
+              <a:t>Note: </a:t>
+            </a:r>
+            <a:r>
+              <a:rPr lang="en-US" i="1" baseline="0" dirty="0" smtClean="0"/>
+              <a:t>p</a:t>
+            </a:r>
+            <a:r>
+              <a:rPr lang="en-US" i="1" baseline="-25000" dirty="0" smtClean="0"/>
+              <a:t>min</a:t>
+            </a:r>
+            <a:r>
+              <a:rPr lang="en-US" i="1" baseline="0" dirty="0" smtClean="0"/>
+              <a:t> </a:t>
+            </a:r>
+            <a:r>
+              <a:rPr lang="en-US" i="0" baseline="0" dirty="0" smtClean="0"/>
+              <a:t>for identification protection defaults to 0.0005 = 30 minutes at a certain location each day for 40 days</a:t>
+            </a:r>
+            <a:endParaRPr lang="en-US" i="0" dirty="0" smtClean="0"/>
           </a:p>
           <a:p>
             <a:endParaRPr lang="en-US" dirty="0" smtClean="0"/>
@@ -1295,7 +1346,7 @@
                 </a:solidFill>
               </a:rPr>
               <a:pPr/>
-              <a:t>12</a:t>
+              <a:t>13</a:t>
             </a:fld>
             <a:endParaRPr lang="en-US" dirty="0">
               <a:solidFill>
@@ -1397,7 +1448,7 @@
           <a:p>
             <a:fld id="{B8B3BC3C-0900-4ACD-9030-5BE6C2442A68}" type="slidenum">
               <a:rPr lang="en-US" smtClean="0"/>
-              <a:t>13</a:t>
+              <a:t>14</a:t>
             </a:fld>
             <a:endParaRPr lang="en-US" dirty="0"/>
           </a:p>
@@ -1489,7 +1540,7 @@
           <a:p>
             <a:fld id="{B8B3BC3C-0900-4ACD-9030-5BE6C2442A68}" type="slidenum">
               <a:rPr lang="en-US" smtClean="0"/>
-              <a:t>14</a:t>
+              <a:t>15</a:t>
             </a:fld>
             <a:endParaRPr lang="en-US" dirty="0"/>
           </a:p>
@@ -1581,7 +1632,7 @@
           <a:p>
             <a:fld id="{B8B3BC3C-0900-4ACD-9030-5BE6C2442A68}" type="slidenum">
               <a:rPr lang="en-US" smtClean="0"/>
-              <a:t>15</a:t>
+              <a:t>16</a:t>
             </a:fld>
             <a:endParaRPr lang="en-US" dirty="0"/>
           </a:p>
@@ -1669,7 +1720,7 @@
           <a:p>
             <a:fld id="{B8B3BC3C-0900-4ACD-9030-5BE6C2442A68}" type="slidenum">
               <a:rPr lang="en-US" smtClean="0"/>
-              <a:t>16</a:t>
+              <a:t>17</a:t>
             </a:fld>
             <a:endParaRPr lang="en-US" dirty="0"/>
           </a:p>
@@ -1767,7 +1818,7 @@
           <a:p>
             <a:fld id="{B8B3BC3C-0900-4ACD-9030-5BE6C2442A68}" type="slidenum">
               <a:rPr lang="en-US" smtClean="0"/>
-              <a:t>17</a:t>
+              <a:t>18</a:t>
             </a:fld>
             <a:endParaRPr lang="en-US" dirty="0"/>
           </a:p>
@@ -1859,7 +1910,7 @@
           <a:p>
             <a:fld id="{B8B3BC3C-0900-4ACD-9030-5BE6C2442A68}" type="slidenum">
               <a:rPr lang="en-US" smtClean="0"/>
-              <a:t>18</a:t>
+              <a:t>19</a:t>
             </a:fld>
             <a:endParaRPr lang="en-US" dirty="0"/>
           </a:p>
@@ -1943,7 +1994,7 @@
           <a:p>
             <a:fld id="{B8B3BC3C-0900-4ACD-9030-5BE6C2442A68}" type="slidenum">
               <a:rPr lang="en-US" smtClean="0"/>
-              <a:t>19</a:t>
+              <a:t>20</a:t>
             </a:fld>
             <a:endParaRPr lang="en-US" dirty="0"/>
           </a:p>
@@ -2057,7 +2108,7 @@
           <a:p>
             <a:fld id="{B8B3BC3C-0900-4ACD-9030-5BE6C2442A68}" type="slidenum">
               <a:rPr lang="en-US" smtClean="0"/>
-              <a:t>20</a:t>
+              <a:t>21</a:t>
             </a:fld>
             <a:endParaRPr lang="en-US" dirty="0"/>
           </a:p>
@@ -2149,7 +2200,7 @@
           <a:p>
             <a:fld id="{B8B3BC3C-0900-4ACD-9030-5BE6C2442A68}" type="slidenum">
               <a:rPr lang="en-US" smtClean="0"/>
-              <a:t>3</a:t>
+              <a:t>4</a:t>
             </a:fld>
             <a:endParaRPr lang="en-US" dirty="0"/>
           </a:p>
@@ -2230,15 +2281,7 @@
           <a:p>
             <a:r>
               <a:rPr lang="en-US" baseline="0" dirty="0" smtClean="0"/>
-              <a:t>LP-guardian </a:t>
-            </a:r>
-            <a:r>
-              <a:rPr lang="en-US" baseline="0" dirty="0" smtClean="0"/>
-              <a:t>decides if info is safe to </a:t>
-            </a:r>
-            <a:r>
-              <a:rPr lang="en-US" baseline="0" dirty="0" smtClean="0"/>
-              <a:t>release (more in Bonnie’s slides)</a:t>
+              <a:t>LP-guardian decides if info is safe to release (more in Bonnie’s slides)</a:t>
             </a:r>
             <a:endParaRPr lang="en-US" dirty="0"/>
           </a:p>
@@ -2261,7 +2304,7 @@
           <a:p>
             <a:fld id="{B8B3BC3C-0900-4ACD-9030-5BE6C2442A68}" type="slidenum">
               <a:rPr lang="en-US" smtClean="0"/>
-              <a:t>4</a:t>
+              <a:t>5</a:t>
             </a:fld>
             <a:endParaRPr lang="en-US" dirty="0"/>
           </a:p>
@@ -2365,7 +2408,7 @@
           <a:p>
             <a:fld id="{B8B3BC3C-0900-4ACD-9030-5BE6C2442A68}" type="slidenum">
               <a:rPr lang="en-US" smtClean="0"/>
-              <a:t>5</a:t>
+              <a:t>6</a:t>
             </a:fld>
             <a:endParaRPr lang="en-US" dirty="0"/>
           </a:p>
@@ -2502,7 +2545,7 @@
               <a:buNone/>
             </a:pPr>
             <a:r>
-              <a:rPr lang="en-US" sz="1100" baseline="0" dirty="0" smtClean="0">
+              <a:rPr lang="en-US" sz="1100" b="1" baseline="0" dirty="0" smtClean="0">
                 <a:sym typeface="Wingdings" panose="05000000000000000000" pitchFamily="2" charset="2"/>
               </a:rPr>
               <a:t>Threat Model: the adversary has access to a mapping between a set of individuals’ and the probability distributions of visiting each block in the city  aims to match the anonymous mobility histogram to an individual in the database</a:t>
@@ -2518,8 +2561,17 @@
               <a:rPr lang="en-US" baseline="0" dirty="0" smtClean="0">
                 <a:sym typeface="Wingdings" panose="05000000000000000000" pitchFamily="2" charset="2"/>
               </a:rPr>
-              <a:t>Identification Protection Formula = Probability that the histogram belongs to a given individual</a:t>
-            </a:r>
+              <a:t>Identification Protection Formula = Probability that the histogram belongs to a given </a:t>
+            </a:r>
+            <a:r>
+              <a:rPr lang="en-US" baseline="0" dirty="0" smtClean="0">
+                <a:sym typeface="Wingdings" panose="05000000000000000000" pitchFamily="2" charset="2"/>
+              </a:rPr>
+              <a:t>individual (multinomial distribution)</a:t>
+            </a:r>
+            <a:endParaRPr lang="en-US" baseline="0" dirty="0" smtClean="0">
+              <a:sym typeface="Wingdings" panose="05000000000000000000" pitchFamily="2" charset="2"/>
+            </a:endParaRPr>
           </a:p>
           <a:p>
             <a:r>
@@ -2531,16 +2583,10 @@
           </a:p>
           <a:p>
             <a:r>
-              <a:rPr lang="en-US" i="1" baseline="0" dirty="0" err="1" smtClean="0">
-                <a:sym typeface="Wingdings" panose="05000000000000000000" pitchFamily="2" charset="2"/>
-              </a:rPr>
-              <a:t>Bl</a:t>
-            </a:r>
-            <a:r>
               <a:rPr lang="en-US" i="1" baseline="0" dirty="0" smtClean="0">
                 <a:sym typeface="Wingdings" panose="05000000000000000000" pitchFamily="2" charset="2"/>
               </a:rPr>
-              <a:t> = set of city blocks in the 2D grid of the city = {bl</a:t>
+              <a:t>Bl = set of city blocks in the 2D grid of the city = {bl</a:t>
             </a:r>
             <a:r>
               <a:rPr lang="en-US" i="1" baseline="-25000" dirty="0" smtClean="0">
@@ -2586,13 +2632,13 @@
               <a:defRPr/>
             </a:pPr>
             <a:r>
-              <a:rPr lang="en-US" i="1" baseline="0" dirty="0" err="1" smtClean="0">
+              <a:rPr lang="en-US" i="1" baseline="0" dirty="0" smtClean="0">
                 <a:sym typeface="Wingdings" panose="05000000000000000000" pitchFamily="2" charset="2"/>
               </a:rPr>
               <a:t>c</a:t>
             </a:r>
             <a:r>
-              <a:rPr lang="en-US" i="1" baseline="-25000" dirty="0" err="1" smtClean="0">
+              <a:rPr lang="en-US" i="1" baseline="-25000" dirty="0" smtClean="0">
                 <a:sym typeface="Wingdings" panose="05000000000000000000" pitchFamily="2" charset="2"/>
               </a:rPr>
               <a:t>bli</a:t>
@@ -2601,16 +2647,10 @@
               <a:rPr lang="en-US" i="1" baseline="0" dirty="0" smtClean="0">
                 <a:sym typeface="Wingdings" panose="05000000000000000000" pitchFamily="2" charset="2"/>
               </a:rPr>
-              <a:t> = the number of times that </a:t>
-            </a:r>
-            <a:r>
-              <a:rPr lang="en-US" i="1" baseline="0" dirty="0" err="1" smtClean="0">
-                <a:sym typeface="Wingdings" panose="05000000000000000000" pitchFamily="2" charset="2"/>
-              </a:rPr>
-              <a:t>bl</a:t>
-            </a:r>
-            <a:r>
-              <a:rPr lang="en-US" i="1" baseline="-25000" dirty="0" err="1" smtClean="0">
+              <a:t> = the number of times that bl</a:t>
+            </a:r>
+            <a:r>
+              <a:rPr lang="en-US" i="1" baseline="-25000" dirty="0" smtClean="0">
                 <a:sym typeface="Wingdings" panose="05000000000000000000" pitchFamily="2" charset="2"/>
               </a:rPr>
               <a:t>i</a:t>
@@ -2619,24 +2659,27 @@
               <a:rPr lang="en-US" i="1" baseline="0" dirty="0" smtClean="0">
                 <a:sym typeface="Wingdings" panose="05000000000000000000" pitchFamily="2" charset="2"/>
               </a:rPr>
-              <a:t> is visited by the user</a:t>
-            </a:r>
-          </a:p>
-          <a:p>
+              <a:t> is visited by the </a:t>
+            </a:r>
             <a:r>
               <a:rPr lang="en-US" i="1" baseline="0" dirty="0" smtClean="0">
                 <a:sym typeface="Wingdings" panose="05000000000000000000" pitchFamily="2" charset="2"/>
               </a:rPr>
-              <a:t>pi = P(</a:t>
-            </a:r>
-            <a:r>
-              <a:rPr lang="en-US" i="1" baseline="0" dirty="0" err="1" smtClean="0">
+              <a:t>user out of the total N sessions</a:t>
+            </a:r>
+            <a:endParaRPr lang="en-US" i="1" baseline="0" dirty="0" smtClean="0">
+              <a:sym typeface="Wingdings" panose="05000000000000000000" pitchFamily="2" charset="2"/>
+            </a:endParaRPr>
+          </a:p>
+          <a:p>
+            <a:r>
+              <a:rPr lang="en-US" i="1" baseline="0" dirty="0" smtClean="0">
                 <a:sym typeface="Wingdings" panose="05000000000000000000" pitchFamily="2" charset="2"/>
               </a:rPr>
-              <a:t>bl</a:t>
-            </a:r>
-            <a:r>
-              <a:rPr lang="en-US" i="1" baseline="-25000" dirty="0" err="1" smtClean="0">
+              <a:t>pi = P(bl</a:t>
+            </a:r>
+            <a:r>
+              <a:rPr lang="en-US" i="1" baseline="-25000" dirty="0" smtClean="0">
                 <a:sym typeface="Wingdings" panose="05000000000000000000" pitchFamily="2" charset="2"/>
               </a:rPr>
               <a:t>i</a:t>
@@ -2645,23 +2688,14 @@
               <a:rPr lang="en-US" i="1" baseline="0" dirty="0" smtClean="0">
                 <a:sym typeface="Wingdings" panose="05000000000000000000" pitchFamily="2" charset="2"/>
               </a:rPr>
-              <a:t>) = the probability of the user visiting block </a:t>
-            </a:r>
-            <a:r>
-              <a:rPr lang="en-US" i="1" baseline="0" dirty="0" err="1" smtClean="0">
-                <a:sym typeface="Wingdings" panose="05000000000000000000" pitchFamily="2" charset="2"/>
-              </a:rPr>
-              <a:t>bl</a:t>
-            </a:r>
-            <a:r>
-              <a:rPr lang="en-US" i="1" baseline="-25000" dirty="0" err="1" smtClean="0">
+              <a:t>) = the probability of the user visiting block bl</a:t>
+            </a:r>
+            <a:r>
+              <a:rPr lang="en-US" i="1" baseline="-25000" dirty="0" smtClean="0">
                 <a:sym typeface="Wingdings" panose="05000000000000000000" pitchFamily="2" charset="2"/>
               </a:rPr>
               <a:t>i</a:t>
             </a:r>
-            <a:endParaRPr lang="en-US" i="1" baseline="-25000" dirty="0" smtClean="0">
-              <a:sym typeface="Wingdings" panose="05000000000000000000" pitchFamily="2" charset="2"/>
-            </a:endParaRPr>
           </a:p>
           <a:p>
             <a:endParaRPr lang="en-US" i="1" baseline="0" dirty="0" smtClean="0">
@@ -2712,22 +2746,16 @@
               <a:t> is replaced with </a:t>
             </a:r>
             <a:r>
-              <a:rPr lang="en-US" i="1" baseline="0" dirty="0" err="1" smtClean="0">
+              <a:rPr lang="en-US" i="1" baseline="0" dirty="0" smtClean="0">
                 <a:sym typeface="Wingdings" panose="05000000000000000000" pitchFamily="2" charset="2"/>
               </a:rPr>
               <a:t>p</a:t>
             </a:r>
             <a:r>
-              <a:rPr lang="en-US" i="1" baseline="-25000" dirty="0" err="1" smtClean="0">
-                <a:sym typeface="Wingdings" panose="05000000000000000000" pitchFamily="2" charset="2"/>
-              </a:rPr>
-              <a:t>min</a:t>
-            </a:r>
-            <a:r>
               <a:rPr lang="en-US" i="1" baseline="-25000" dirty="0" smtClean="0">
                 <a:sym typeface="Wingdings" panose="05000000000000000000" pitchFamily="2" charset="2"/>
               </a:rPr>
-              <a:t> </a:t>
+              <a:t>min </a:t>
             </a:r>
             <a:r>
               <a:rPr lang="en-US" i="0" baseline="0" dirty="0" smtClean="0">
@@ -2748,13 +2776,13 @@
               <a:t>Note: low </a:t>
             </a:r>
             <a:r>
-              <a:rPr lang="en-US" i="1" baseline="0" dirty="0" err="1" smtClean="0">
+              <a:rPr lang="en-US" i="1" baseline="0" dirty="0" smtClean="0">
                 <a:sym typeface="Wingdings" panose="05000000000000000000" pitchFamily="2" charset="2"/>
               </a:rPr>
               <a:t>p</a:t>
             </a:r>
             <a:r>
-              <a:rPr lang="en-US" i="1" baseline="-25000" dirty="0" err="1" smtClean="0">
+              <a:rPr lang="en-US" i="1" baseline="-25000" dirty="0" smtClean="0">
                 <a:sym typeface="Wingdings" panose="05000000000000000000" pitchFamily="2" charset="2"/>
               </a:rPr>
               <a:t>min</a:t>
@@ -2772,13 +2800,13 @@
               <a:t>= strict privacy, high </a:t>
             </a:r>
             <a:r>
-              <a:rPr lang="en-US" i="1" baseline="0" dirty="0" err="1" smtClean="0">
+              <a:rPr lang="en-US" i="1" baseline="0" dirty="0" smtClean="0">
                 <a:sym typeface="Wingdings" panose="05000000000000000000" pitchFamily="2" charset="2"/>
               </a:rPr>
               <a:t>p</a:t>
             </a:r>
             <a:r>
-              <a:rPr lang="en-US" i="1" baseline="-25000" dirty="0" err="1" smtClean="0">
+              <a:rPr lang="en-US" i="1" baseline="-25000" dirty="0" smtClean="0">
                 <a:sym typeface="Wingdings" panose="05000000000000000000" pitchFamily="2" charset="2"/>
               </a:rPr>
               <a:t>min</a:t>
@@ -2802,22 +2830,16 @@
               <a:t>If LP-Guardian determines that the same privacy level can be determined with a higher value of </a:t>
             </a:r>
             <a:r>
-              <a:rPr lang="en-US" i="1" baseline="0" dirty="0" err="1" smtClean="0">
+              <a:rPr lang="en-US" i="1" baseline="0" dirty="0" smtClean="0">
                 <a:sym typeface="Wingdings" panose="05000000000000000000" pitchFamily="2" charset="2"/>
               </a:rPr>
               <a:t>p</a:t>
             </a:r>
             <a:r>
-              <a:rPr lang="en-US" i="1" baseline="-25000" dirty="0" err="1" smtClean="0">
-                <a:sym typeface="Wingdings" panose="05000000000000000000" pitchFamily="2" charset="2"/>
-              </a:rPr>
-              <a:t>min</a:t>
-            </a:r>
-            <a:r>
               <a:rPr lang="en-US" i="1" baseline="-25000" dirty="0" smtClean="0">
                 <a:sym typeface="Wingdings" panose="05000000000000000000" pitchFamily="2" charset="2"/>
               </a:rPr>
-              <a:t> </a:t>
+              <a:t>min </a:t>
             </a:r>
             <a:r>
               <a:rPr lang="en-US" i="0" baseline="0" dirty="0" smtClean="0">
@@ -2880,7 +2902,7 @@
                 </a:solidFill>
               </a:rPr>
               <a:pPr/>
-              <a:t>7</a:t>
+              <a:t>8</a:t>
             </a:fld>
             <a:endParaRPr lang="en-US" dirty="0">
               <a:solidFill>
@@ -2999,7 +3021,7 @@
                 </a:solidFill>
               </a:rPr>
               <a:pPr/>
-              <a:t>8</a:t>
+              <a:t>9</a:t>
             </a:fld>
             <a:endParaRPr lang="en-US" dirty="0">
               <a:solidFill>
@@ -3146,7 +3168,7 @@
                 </a:solidFill>
               </a:rPr>
               <a:pPr/>
-              <a:t>9</a:t>
+              <a:t>10</a:t>
             </a:fld>
             <a:endParaRPr lang="en-US" dirty="0">
               <a:solidFill>
@@ -3314,7 +3336,7 @@
                 </a:solidFill>
               </a:rPr>
               <a:pPr/>
-              <a:t>10</a:t>
+              <a:t>11</a:t>
             </a:fld>
             <a:endParaRPr lang="en-US" dirty="0">
               <a:solidFill>
@@ -3519,7 +3541,7 @@
                 </a:solidFill>
               </a:rPr>
               <a:pPr/>
-              <a:t>11</a:t>
+              <a:t>12</a:t>
             </a:fld>
             <a:endParaRPr lang="en-US" dirty="0">
               <a:solidFill>
@@ -5080,7 +5102,7 @@
           <a:p>
             <a:fld id="{ADE5661A-BDAA-4579-B2F5-AA9011776D83}" type="datetimeFigureOut">
               <a:rPr lang="en-US" smtClean="0"/>
-              <a:t>2/25/2015</a:t>
+              <a:t>2/26/2015</a:t>
             </a:fld>
             <a:endParaRPr lang="en-US" dirty="0"/>
           </a:p>
@@ -6187,7 +6209,7 @@
             <a:fld id="{1D8BD707-D9CF-40AE-B4C6-C98DA3205C09}" type="datetimeFigureOut">
               <a:rPr lang="en-US" smtClean="0"/>
               <a:pPr/>
-              <a:t>2/25/2015</a:t>
+              <a:t>2/26/2015</a:t>
             </a:fld>
             <a:endParaRPr lang="en-US" dirty="0"/>
           </a:p>
@@ -7302,7 +7324,7 @@
             <a:fld id="{1D8BD707-D9CF-40AE-B4C6-C98DA3205C09}" type="datetimeFigureOut">
               <a:rPr lang="en-US" smtClean="0"/>
               <a:pPr/>
-              <a:t>2/25/2015</a:t>
+              <a:t>2/26/2015</a:t>
             </a:fld>
             <a:endParaRPr lang="en-US" dirty="0"/>
           </a:p>
@@ -8412,7 +8434,7 @@
             <a:fld id="{1D8BD707-D9CF-40AE-B4C6-C98DA3205C09}" type="datetimeFigureOut">
               <a:rPr lang="en-US" smtClean="0"/>
               <a:pPr/>
-              <a:t>2/25/2015</a:t>
+              <a:t>2/26/2015</a:t>
             </a:fld>
             <a:endParaRPr lang="en-US" dirty="0"/>
           </a:p>
@@ -10006,7 +10028,7 @@
           <a:p>
             <a:fld id="{7D698992-9F5B-4E9D-871D-4517B2EC8643}" type="datetimeFigureOut">
               <a:rPr lang="en-US" smtClean="0"/>
-              <a:t>2/25/2015</a:t>
+              <a:t>2/26/2015</a:t>
             </a:fld>
             <a:endParaRPr lang="en-US" dirty="0"/>
           </a:p>
@@ -11065,7 +11087,7 @@
             <a:fld id="{1D8BD707-D9CF-40AE-B4C6-C98DA3205C09}" type="datetimeFigureOut">
               <a:rPr lang="en-US" smtClean="0"/>
               <a:pPr/>
-              <a:t>2/25/2015</a:t>
+              <a:t>2/26/2015</a:t>
             </a:fld>
             <a:endParaRPr lang="en-US" dirty="0"/>
           </a:p>
@@ -12394,7 +12416,7 @@
             <a:fld id="{1D8BD707-D9CF-40AE-B4C6-C98DA3205C09}" type="datetimeFigureOut">
               <a:rPr lang="en-US" smtClean="0"/>
               <a:pPr/>
-              <a:t>2/25/2015</a:t>
+              <a:t>2/26/2015</a:t>
             </a:fld>
             <a:endParaRPr lang="en-US" dirty="0"/>
           </a:p>
@@ -13533,7 +13555,7 @@
             <a:fld id="{1D8BD707-D9CF-40AE-B4C6-C98DA3205C09}" type="datetimeFigureOut">
               <a:rPr lang="en-US" smtClean="0"/>
               <a:pPr/>
-              <a:t>2/25/2015</a:t>
+              <a:t>2/26/2015</a:t>
             </a:fld>
             <a:endParaRPr lang="en-US" dirty="0"/>
           </a:p>
@@ -14591,7 +14613,7 @@
             <a:fld id="{1D8BD707-D9CF-40AE-B4C6-C98DA3205C09}" type="datetimeFigureOut">
               <a:rPr lang="en-US" smtClean="0"/>
               <a:pPr/>
-              <a:t>2/25/2015</a:t>
+              <a:t>2/26/2015</a:t>
             </a:fld>
             <a:endParaRPr lang="en-US" dirty="0"/>
           </a:p>
@@ -15631,7 +15653,7 @@
             <a:fld id="{1D8BD707-D9CF-40AE-B4C6-C98DA3205C09}" type="datetimeFigureOut">
               <a:rPr lang="en-US" smtClean="0"/>
               <a:pPr/>
-              <a:t>2/25/2015</a:t>
+              <a:t>2/26/2015</a:t>
             </a:fld>
             <a:endParaRPr lang="en-US" dirty="0"/>
           </a:p>
@@ -16868,7 +16890,7 @@
             <a:fld id="{1D8BD707-D9CF-40AE-B4C6-C98DA3205C09}" type="datetimeFigureOut">
               <a:rPr lang="en-US" smtClean="0"/>
               <a:pPr/>
-              <a:t>2/25/2015</a:t>
+              <a:t>2/26/2015</a:t>
             </a:fld>
             <a:endParaRPr lang="en-US" dirty="0"/>
           </a:p>
@@ -17223,7 +17245,7 @@
             <a:fld id="{1D8BD707-D9CF-40AE-B4C6-C98DA3205C09}" type="datetimeFigureOut">
               <a:rPr lang="en-US" smtClean="0"/>
               <a:pPr/>
-              <a:t>2/25/2015</a:t>
+              <a:t>2/26/2015</a:t>
             </a:fld>
             <a:endParaRPr lang="en-US" dirty="0"/>
           </a:p>
@@ -17793,6 +17815,375 @@
 </file>
 
 <file path=ppt/slides/slide10.xml><?xml version="1.0" encoding="utf-8"?>
+<p:sld xmlns:a="http://schemas.openxmlformats.org/drawingml/2006/main" xmlns:r="http://schemas.openxmlformats.org/officeDocument/2006/relationships" xmlns:p="http://schemas.openxmlformats.org/presentationml/2006/main" show="0">
+  <p:cSld>
+    <p:spTree>
+      <p:nvGrpSpPr>
+        <p:cNvPr id="1" name=""/>
+        <p:cNvGrpSpPr/>
+        <p:nvPr/>
+      </p:nvGrpSpPr>
+      <p:grpSpPr>
+        <a:xfrm>
+          <a:off x="0" y="0"/>
+          <a:ext cx="0" cy="0"/>
+          <a:chOff x="0" y="0"/>
+          <a:chExt cx="0" cy="0"/>
+        </a:xfrm>
+      </p:grpSpPr>
+      <p:sp>
+        <p:nvSpPr>
+          <p:cNvPr id="2" name="Title 1"/>
+          <p:cNvSpPr>
+            <a:spLocks noGrp="1"/>
+          </p:cNvSpPr>
+          <p:nvPr>
+            <p:ph type="title"/>
+          </p:nvPr>
+        </p:nvSpPr>
+        <p:spPr/>
+        <p:txBody>
+          <a:bodyPr/>
+          <a:lstStyle/>
+          <a:p>
+            <a:r>
+              <a:rPr lang="en-US" dirty="0" smtClean="0"/>
+              <a:t>Technical Details: Design</a:t>
+            </a:r>
+            <a:endParaRPr lang="en-US" dirty="0"/>
+          </a:p>
+        </p:txBody>
+      </p:sp>
+      <p:sp>
+        <p:nvSpPr>
+          <p:cNvPr id="3" name="Content Placeholder 2"/>
+          <p:cNvSpPr>
+            <a:spLocks noGrp="1"/>
+          </p:cNvSpPr>
+          <p:nvPr>
+            <p:ph idx="1"/>
+          </p:nvPr>
+        </p:nvSpPr>
+        <p:spPr>
+          <a:xfrm>
+            <a:off x="2362200" y="1647682"/>
+            <a:ext cx="6553200" cy="4067318"/>
+          </a:xfrm>
+        </p:spPr>
+        <p:txBody>
+          <a:bodyPr>
+            <a:normAutofit lnSpcReduction="10000"/>
+          </a:bodyPr>
+          <a:lstStyle/>
+          <a:p>
+            <a:r>
+              <a:rPr lang="en-US" dirty="0" smtClean="0"/>
+              <a:t>Profiling Protection: each time the user opens a location-polling application from a new place, he must decide whether to hide the location</a:t>
+            </a:r>
+          </a:p>
+          <a:p>
+            <a:pPr lvl="1"/>
+            <a:r>
+              <a:rPr lang="en-US" dirty="0" smtClean="0"/>
+              <a:t>Given a user’s location </a:t>
+            </a:r>
+            <a:r>
+              <a:rPr lang="en-US" i="1" dirty="0" smtClean="0"/>
+              <a:t> (x, y)</a:t>
+            </a:r>
+            <a:r>
+              <a:rPr lang="en-US" dirty="0" smtClean="0"/>
+              <a:t> and anonymization radius </a:t>
+            </a:r>
+            <a:r>
+              <a:rPr lang="en-US" i="1" dirty="0" smtClean="0"/>
+              <a:t>r</a:t>
+            </a:r>
+            <a:r>
+              <a:rPr lang="en-US" dirty="0" smtClean="0"/>
+              <a:t>, noise pair </a:t>
+            </a:r>
+            <a:r>
+              <a:rPr lang="en-US" i="1" dirty="0" smtClean="0"/>
+              <a:t>(rad, </a:t>
+            </a:r>
+            <a:r>
+              <a:rPr lang="el-GR" i="1" dirty="0" smtClean="0"/>
+              <a:t>θ</a:t>
+            </a:r>
+            <a:r>
+              <a:rPr lang="en-US" i="1" dirty="0" smtClean="0"/>
+              <a:t>) </a:t>
+            </a:r>
+            <a:r>
+              <a:rPr lang="en-US" dirty="0" smtClean="0"/>
+              <a:t>is computed as:</a:t>
+            </a:r>
+          </a:p>
+          <a:p>
+            <a:pPr lvl="2"/>
+            <a:r>
+              <a:rPr lang="el-GR" i="1" dirty="0" smtClean="0"/>
+              <a:t>θ</a:t>
+            </a:r>
+            <a:r>
+              <a:rPr lang="en-US" i="1" dirty="0" smtClean="0"/>
+              <a:t> </a:t>
+            </a:r>
+            <a:r>
+              <a:rPr lang="en-US" dirty="0" smtClean="0"/>
+              <a:t>is drawn from the uniform distribution </a:t>
+            </a:r>
+            <a:r>
+              <a:rPr lang="en-US" i="1" dirty="0" smtClean="0"/>
+              <a:t>[0, 2</a:t>
+            </a:r>
+            <a:r>
+              <a:rPr lang="el-GR" i="1" dirty="0" smtClean="0"/>
+              <a:t>π</a:t>
+            </a:r>
+            <a:r>
+              <a:rPr lang="en-US" i="1" dirty="0" smtClean="0"/>
+              <a:t>)</a:t>
+            </a:r>
+          </a:p>
+          <a:p>
+            <a:pPr lvl="2"/>
+            <a:r>
+              <a:rPr lang="en-US" i="1" dirty="0" smtClean="0"/>
+              <a:t>p </a:t>
+            </a:r>
+            <a:r>
+              <a:rPr lang="en-US" dirty="0" smtClean="0"/>
+              <a:t>is drawn from the uniform distribution </a:t>
+            </a:r>
+            <a:r>
+              <a:rPr lang="en-US" i="1" dirty="0" smtClean="0"/>
+              <a:t>[0, 1] </a:t>
+            </a:r>
+            <a:r>
+              <a:rPr lang="en-US" dirty="0" smtClean="0"/>
+              <a:t>and </a:t>
+            </a:r>
+            <a:r>
+              <a:rPr lang="en-US" i="1" dirty="0" smtClean="0"/>
+              <a:t>rad = </a:t>
+            </a:r>
+            <a:endParaRPr lang="en-US" dirty="0" smtClean="0"/>
+          </a:p>
+          <a:p>
+            <a:pPr lvl="2"/>
+            <a:endParaRPr lang="en-US" i="1" dirty="0" smtClean="0"/>
+          </a:p>
+          <a:p>
+            <a:pPr lvl="1"/>
+            <a:r>
+              <a:rPr lang="en-US" dirty="0" smtClean="0"/>
+              <a:t>Same anonymized location is always mapped to the same real location</a:t>
+            </a:r>
+          </a:p>
+          <a:p>
+            <a:pPr lvl="1"/>
+            <a:r>
+              <a:rPr lang="en-US" dirty="0" smtClean="0"/>
+              <a:t>Additional suggestion to use TOR application to anonymize IP address</a:t>
+            </a:r>
+          </a:p>
+          <a:p>
+            <a:r>
+              <a:rPr lang="en-US" dirty="0" smtClean="0"/>
+              <a:t>Synthetic Route: for fitness tracking applications, LP-Guardian modifies the route information while retaining speed/distance information</a:t>
+            </a:r>
+          </a:p>
+        </p:txBody>
+      </p:sp>
+      <p:sp>
+        <p:nvSpPr>
+          <p:cNvPr id="6" name="Title 1"/>
+          <p:cNvSpPr txBox="1">
+            <a:spLocks/>
+          </p:cNvSpPr>
+          <p:nvPr/>
+        </p:nvSpPr>
+        <p:spPr>
+          <a:xfrm>
+            <a:off x="685800" y="274638"/>
+            <a:ext cx="8153400" cy="1143000"/>
+          </a:xfrm>
+          <a:prstGeom prst="rect">
+            <a:avLst/>
+          </a:prstGeom>
+        </p:spPr>
+        <p:txBody>
+          <a:bodyPr vert="horz" lIns="0" tIns="45720" rIns="0" bIns="45720" rtlCol="0" anchor="ctr">
+            <a:normAutofit/>
+          </a:bodyPr>
+          <a:lstStyle>
+            <a:lvl1pPr algn="l" defTabSz="914400" rtl="0" eaLnBrk="1" latinLnBrk="0" hangingPunct="1">
+              <a:spcBef>
+                <a:spcPct val="0"/>
+              </a:spcBef>
+              <a:buNone/>
+              <a:defRPr sz="3600" kern="1200" cap="all" baseline="0">
+                <a:solidFill>
+                  <a:schemeClr val="tx1"/>
+                </a:solidFill>
+                <a:latin typeface="+mj-lt"/>
+                <a:ea typeface="+mj-ea"/>
+                <a:cs typeface="+mj-cs"/>
+              </a:defRPr>
+            </a:lvl1pPr>
+            <a:lvl2pPr eaLnBrk="1" hangingPunct="1">
+              <a:defRPr>
+                <a:solidFill>
+                  <a:schemeClr val="tx2"/>
+                </a:solidFill>
+              </a:defRPr>
+            </a:lvl2pPr>
+            <a:lvl3pPr eaLnBrk="1" hangingPunct="1">
+              <a:defRPr>
+                <a:solidFill>
+                  <a:schemeClr val="tx2"/>
+                </a:solidFill>
+              </a:defRPr>
+            </a:lvl3pPr>
+            <a:lvl4pPr eaLnBrk="1" hangingPunct="1">
+              <a:defRPr>
+                <a:solidFill>
+                  <a:schemeClr val="tx2"/>
+                </a:solidFill>
+              </a:defRPr>
+            </a:lvl4pPr>
+            <a:lvl5pPr eaLnBrk="1" hangingPunct="1">
+              <a:defRPr>
+                <a:solidFill>
+                  <a:schemeClr val="tx2"/>
+                </a:solidFill>
+              </a:defRPr>
+            </a:lvl5pPr>
+            <a:lvl6pPr eaLnBrk="1" hangingPunct="1">
+              <a:defRPr>
+                <a:solidFill>
+                  <a:schemeClr val="tx2"/>
+                </a:solidFill>
+              </a:defRPr>
+            </a:lvl6pPr>
+            <a:lvl7pPr eaLnBrk="1" hangingPunct="1">
+              <a:defRPr>
+                <a:solidFill>
+                  <a:schemeClr val="tx2"/>
+                </a:solidFill>
+              </a:defRPr>
+            </a:lvl7pPr>
+            <a:lvl8pPr eaLnBrk="1" hangingPunct="1">
+              <a:defRPr>
+                <a:solidFill>
+                  <a:schemeClr val="tx2"/>
+                </a:solidFill>
+              </a:defRPr>
+            </a:lvl8pPr>
+            <a:lvl9pPr eaLnBrk="1" hangingPunct="1">
+              <a:defRPr>
+                <a:solidFill>
+                  <a:schemeClr val="tx2"/>
+                </a:solidFill>
+              </a:defRPr>
+            </a:lvl9pPr>
+          </a:lstStyle>
+          <a:p>
+            <a:r>
+              <a:rPr lang="en-US" dirty="0" smtClean="0">
+                <a:solidFill>
+                  <a:srgbClr val="FFFFFF"/>
+                </a:solidFill>
+              </a:rPr>
+              <a:t>Technical Details: Design (2 of 2)</a:t>
+            </a:r>
+            <a:endParaRPr lang="en-US" dirty="0">
+              <a:solidFill>
+                <a:srgbClr val="FFFFFF"/>
+              </a:solidFill>
+            </a:endParaRPr>
+          </a:p>
+        </p:txBody>
+      </p:sp>
+      <p:pic>
+        <p:nvPicPr>
+          <p:cNvPr id="7" name="Picture 6"/>
+          <p:cNvPicPr>
+            <a:picLocks noChangeAspect="1"/>
+          </p:cNvPicPr>
+          <p:nvPr/>
+        </p:nvPicPr>
+        <p:blipFill>
+          <a:blip r:embed="rId3"/>
+          <a:stretch>
+            <a:fillRect/>
+          </a:stretch>
+        </p:blipFill>
+        <p:spPr>
+          <a:xfrm>
+            <a:off x="179724" y="1958499"/>
+            <a:ext cx="1953876" cy="2269017"/>
+          </a:xfrm>
+          <a:prstGeom prst="rect">
+            <a:avLst/>
+          </a:prstGeom>
+        </p:spPr>
+      </p:pic>
+      <p:pic>
+        <p:nvPicPr>
+          <p:cNvPr id="4" name="Picture 3"/>
+          <p:cNvPicPr>
+            <a:picLocks noChangeAspect="1"/>
+          </p:cNvPicPr>
+          <p:nvPr/>
+        </p:nvPicPr>
+        <p:blipFill>
+          <a:blip r:embed="rId4"/>
+          <a:stretch>
+            <a:fillRect/>
+          </a:stretch>
+        </p:blipFill>
+        <p:spPr>
+          <a:xfrm>
+            <a:off x="3505200" y="3684753"/>
+            <a:ext cx="1695450" cy="257175"/>
+          </a:xfrm>
+          <a:prstGeom prst="rect">
+            <a:avLst/>
+          </a:prstGeom>
+        </p:spPr>
+      </p:pic>
+    </p:spTree>
+    <p:extLst>
+      <p:ext uri="{BB962C8B-B14F-4D97-AF65-F5344CB8AC3E}">
+        <p14:creationId xmlns:p14="http://schemas.microsoft.com/office/powerpoint/2010/main" val="3646194003"/>
+      </p:ext>
+    </p:extLst>
+  </p:cSld>
+  <p:clrMapOvr>
+    <a:masterClrMapping/>
+  </p:clrMapOvr>
+  <mc:AlternateContent xmlns:mc="http://schemas.openxmlformats.org/markup-compatibility/2006" xmlns:p14="http://schemas.microsoft.com/office/powerpoint/2010/main">
+    <mc:Choice Requires="p14">
+      <p:transition spd="slow" p14:dur="2000"/>
+    </mc:Choice>
+    <mc:Fallback xmlns="">
+      <p:transition spd="slow"/>
+    </mc:Fallback>
+  </mc:AlternateContent>
+  <p:timing>
+    <p:tnLst>
+      <p:par>
+        <p:cTn id="1" dur="indefinite" restart="never" nodeType="tmRoot"/>
+      </p:par>
+    </p:tnLst>
+  </p:timing>
+</p:sld>
+</file>
+
+<file path=ppt/slides/slide11.xml><?xml version="1.0" encoding="utf-8"?>
 <p:sld xmlns:a="http://schemas.openxmlformats.org/drawingml/2006/main" xmlns:r="http://schemas.openxmlformats.org/officeDocument/2006/relationships" xmlns:p="http://schemas.openxmlformats.org/presentationml/2006/main">
   <p:cSld>
     <p:spTree>
@@ -17967,7 +18358,7 @@
           <a:lstStyle/>
           <a:p>
             <a:pPr algn="ctr"/>
-            <a:endParaRPr lang="en-US">
+            <a:endParaRPr lang="en-US" dirty="0">
               <a:solidFill>
                 <a:srgbClr val="FFFFFF"/>
               </a:solidFill>
@@ -18021,7 +18412,7 @@
           <a:lstStyle/>
           <a:p>
             <a:pPr algn="ctr"/>
-            <a:endParaRPr lang="en-US">
+            <a:endParaRPr lang="en-US" dirty="0">
               <a:solidFill>
                 <a:srgbClr val="FFFFFF"/>
               </a:solidFill>
@@ -18075,7 +18466,7 @@
           <a:lstStyle/>
           <a:p>
             <a:pPr algn="ctr"/>
-            <a:endParaRPr lang="en-US">
+            <a:endParaRPr lang="en-US" dirty="0">
               <a:solidFill>
                 <a:srgbClr val="FFFFFF"/>
               </a:solidFill>
@@ -18129,7 +18520,7 @@
           <a:lstStyle/>
           <a:p>
             <a:pPr algn="ctr"/>
-            <a:endParaRPr lang="en-US">
+            <a:endParaRPr lang="en-US" dirty="0">
               <a:solidFill>
                 <a:srgbClr val="FFFFFF"/>
               </a:solidFill>
@@ -18157,7 +18548,7 @@
 </p:sld>
 </file>
 
-<file path=ppt/slides/slide11.xml><?xml version="1.0" encoding="utf-8"?>
+<file path=ppt/slides/slide12.xml><?xml version="1.0" encoding="utf-8"?>
 <p:sld xmlns:a="http://schemas.openxmlformats.org/drawingml/2006/main" xmlns:r="http://schemas.openxmlformats.org/officeDocument/2006/relationships" xmlns:p="http://schemas.openxmlformats.org/presentationml/2006/main">
   <p:cSld>
     <p:spTree>
@@ -18323,10 +18714,17 @@
   <p:clrMapOvr>
     <a:masterClrMapping/>
   </p:clrMapOvr>
+  <p:timing>
+    <p:tnLst>
+      <p:par>
+        <p:cTn id="1" dur="indefinite" restart="never" nodeType="tmRoot"/>
+      </p:par>
+    </p:tnLst>
+  </p:timing>
 </p:sld>
 </file>
 
-<file path=ppt/slides/slide12.xml><?xml version="1.0" encoding="utf-8"?>
+<file path=ppt/slides/slide13.xml><?xml version="1.0" encoding="utf-8"?>
 <p:sld xmlns:a="http://schemas.openxmlformats.org/drawingml/2006/main" xmlns:r="http://schemas.openxmlformats.org/officeDocument/2006/relationships" xmlns:p="http://schemas.openxmlformats.org/presentationml/2006/main">
   <p:cSld>
     <p:spTree>
@@ -18362,14 +18760,26 @@
           <a:p>
             <a:r>
               <a:rPr lang="en-US" dirty="0" smtClean="0"/>
-              <a:t>Initial Application User (bootstrapping)</a:t>
+              <a:t>Initial Application </a:t>
+            </a:r>
+            <a:r>
+              <a:rPr lang="en-US" dirty="0" smtClean="0"/>
+              <a:t>Use </a:t>
+            </a:r>
+            <a:r>
+              <a:rPr lang="en-US" dirty="0" smtClean="0"/>
+              <a:t>(bootstrapping)</a:t>
             </a:r>
           </a:p>
           <a:p>
             <a:pPr lvl="1"/>
             <a:r>
               <a:rPr lang="en-US" dirty="0" smtClean="0"/>
-              <a:t>First use of LP-Guardian: the user ranks his or her top </a:t>
+              <a:t>User mobility data: the </a:t>
+            </a:r>
+            <a:r>
+              <a:rPr lang="en-US" dirty="0" smtClean="0"/>
+              <a:t>user ranks his or her top </a:t>
             </a:r>
             <a:r>
               <a:rPr lang="en-US" i="1" dirty="0" smtClean="0"/>
@@ -18377,7 +18787,15 @@
             </a:r>
             <a:r>
               <a:rPr lang="en-US" dirty="0" smtClean="0"/>
-              <a:t> visited locations so the application can assign probabilities of visitation</a:t>
+              <a:t> visited locations </a:t>
+            </a:r>
+            <a:r>
+              <a:rPr lang="en-US" dirty="0" smtClean="0"/>
+              <a:t>with first LP-Guardian use so </a:t>
+            </a:r>
+            <a:r>
+              <a:rPr lang="en-US" dirty="0" smtClean="0"/>
+              <a:t>the application can assign probabilities of visitation</a:t>
             </a:r>
           </a:p>
           <a:p>
@@ -18397,8 +18815,13 @@
           <a:p>
             <a:r>
               <a:rPr lang="en-US" dirty="0" smtClean="0"/>
-              <a:t>Per-place Control Decisions</a:t>
-            </a:r>
+              <a:t>Per-place Control </a:t>
+            </a:r>
+            <a:r>
+              <a:rPr lang="en-US" dirty="0" smtClean="0"/>
+              <a:t>Decisions (profiling protection)</a:t>
+            </a:r>
+            <a:endParaRPr lang="en-US" dirty="0" smtClean="0"/>
           </a:p>
           <a:p>
             <a:pPr lvl="1"/>
@@ -18417,7 +18840,15 @@
             <a:pPr lvl="1"/>
             <a:r>
               <a:rPr lang="en-US" dirty="0" smtClean="0"/>
-              <a:t>Push notifications inform the user of anonymization and allow disabling/re-enabling of the feature</a:t>
+              <a:t>Push notifications inform the user of </a:t>
+            </a:r>
+            <a:r>
+              <a:rPr lang="en-US" dirty="0" smtClean="0"/>
+              <a:t>anonymization within an application </a:t>
+            </a:r>
+            <a:r>
+              <a:rPr lang="en-US" dirty="0" smtClean="0"/>
+              <a:t>and allow disabling/re-enabling of the feature</a:t>
             </a:r>
           </a:p>
           <a:p>
@@ -18467,10 +18898,17 @@
   <p:clrMapOvr>
     <a:masterClrMapping/>
   </p:clrMapOvr>
+  <p:timing>
+    <p:tnLst>
+      <p:par>
+        <p:cTn id="1" dur="indefinite" restart="never" nodeType="tmRoot"/>
+      </p:par>
+    </p:tnLst>
+  </p:timing>
 </p:sld>
 </file>
 
-<file path=ppt/slides/slide13.xml><?xml version="1.0" encoding="utf-8"?>
+<file path=ppt/slides/slide14.xml><?xml version="1.0" encoding="utf-8"?>
 <p:sld xmlns:a="http://schemas.openxmlformats.org/drawingml/2006/main" xmlns:r="http://schemas.openxmlformats.org/officeDocument/2006/relationships" xmlns:p="http://schemas.openxmlformats.org/presentationml/2006/main">
   <p:cSld>
     <p:spTree>
@@ -18590,10 +19028,17 @@
   <p:clrMapOvr>
     <a:masterClrMapping/>
   </p:clrMapOvr>
+  <p:timing>
+    <p:tnLst>
+      <p:par>
+        <p:cTn id="1" dur="indefinite" restart="never" nodeType="tmRoot"/>
+      </p:par>
+    </p:tnLst>
+  </p:timing>
 </p:sld>
 </file>
 
-<file path=ppt/slides/slide14.xml><?xml version="1.0" encoding="utf-8"?>
+<file path=ppt/slides/slide15.xml><?xml version="1.0" encoding="utf-8"?>
 <p:sld xmlns:a="http://schemas.openxmlformats.org/drawingml/2006/main" xmlns:r="http://schemas.openxmlformats.org/officeDocument/2006/relationships" xmlns:p="http://schemas.openxmlformats.org/presentationml/2006/main">
   <p:cSld>
     <p:spTree>
@@ -18759,10 +19204,17 @@
   <p:clrMapOvr>
     <a:masterClrMapping/>
   </p:clrMapOvr>
+  <p:timing>
+    <p:tnLst>
+      <p:par>
+        <p:cTn id="1" dur="indefinite" restart="never" nodeType="tmRoot"/>
+      </p:par>
+    </p:tnLst>
+  </p:timing>
 </p:sld>
 </file>
 
-<file path=ppt/slides/slide15.xml><?xml version="1.0" encoding="utf-8"?>
+<file path=ppt/slides/slide16.xml><?xml version="1.0" encoding="utf-8"?>
 <p:sld xmlns:a="http://schemas.openxmlformats.org/drawingml/2006/main" xmlns:r="http://schemas.openxmlformats.org/officeDocument/2006/relationships" xmlns:p="http://schemas.openxmlformats.org/presentationml/2006/main">
   <p:cSld>
     <p:spTree>
@@ -18930,7 +19382,7 @@
 </p:sld>
 </file>
 
-<file path=ppt/slides/slide16.xml><?xml version="1.0" encoding="utf-8"?>
+<file path=ppt/slides/slide17.xml><?xml version="1.0" encoding="utf-8"?>
 <p:sld xmlns:a="http://schemas.openxmlformats.org/drawingml/2006/main" xmlns:r="http://schemas.openxmlformats.org/officeDocument/2006/relationships" xmlns:p="http://schemas.openxmlformats.org/presentationml/2006/main">
   <p:cSld>
     <p:spTree>
@@ -19077,7 +19529,7 @@
 </p:sld>
 </file>
 
-<file path=ppt/slides/slide17.xml><?xml version="1.0" encoding="utf-8"?>
+<file path=ppt/slides/slide18.xml><?xml version="1.0" encoding="utf-8"?>
 <p:sld xmlns:a="http://schemas.openxmlformats.org/drawingml/2006/main" xmlns:r="http://schemas.openxmlformats.org/officeDocument/2006/relationships" xmlns:p="http://schemas.openxmlformats.org/presentationml/2006/main">
   <p:cSld>
     <p:spTree>
@@ -19452,7 +19904,7 @@
 </p:sld>
 </file>
 
-<file path=ppt/slides/slide18.xml><?xml version="1.0" encoding="utf-8"?>
+<file path=ppt/slides/slide19.xml><?xml version="1.0" encoding="utf-8"?>
 <p:sld xmlns:a="http://schemas.openxmlformats.org/drawingml/2006/main" xmlns:r="http://schemas.openxmlformats.org/officeDocument/2006/relationships" xmlns:p="http://schemas.openxmlformats.org/presentationml/2006/main">
   <p:cSld>
     <p:spTree>
@@ -19827,90 +20279,6 @@
 </p:sld>
 </file>
 
-<file path=ppt/slides/slide19.xml><?xml version="1.0" encoding="utf-8"?>
-<p:sld xmlns:a="http://schemas.openxmlformats.org/drawingml/2006/main" xmlns:r="http://schemas.openxmlformats.org/officeDocument/2006/relationships" xmlns:p="http://schemas.openxmlformats.org/presentationml/2006/main">
-  <p:cSld>
-    <p:spTree>
-      <p:nvGrpSpPr>
-        <p:cNvPr id="1" name=""/>
-        <p:cNvGrpSpPr/>
-        <p:nvPr/>
-      </p:nvGrpSpPr>
-      <p:grpSpPr>
-        <a:xfrm>
-          <a:off x="0" y="0"/>
-          <a:ext cx="0" cy="0"/>
-          <a:chOff x="0" y="0"/>
-          <a:chExt cx="0" cy="0"/>
-        </a:xfrm>
-      </p:grpSpPr>
-      <p:sp>
-        <p:nvSpPr>
-          <p:cNvPr id="2" name="Title 1"/>
-          <p:cNvSpPr>
-            <a:spLocks noGrp="1"/>
-          </p:cNvSpPr>
-          <p:nvPr>
-            <p:ph type="title"/>
-          </p:nvPr>
-        </p:nvSpPr>
-        <p:spPr/>
-        <p:txBody>
-          <a:bodyPr/>
-          <a:lstStyle/>
-          <a:p>
-            <a:r>
-              <a:rPr lang="en-US" dirty="0" smtClean="0"/>
-              <a:t>Experimental Results</a:t>
-            </a:r>
-            <a:endParaRPr lang="en-US" dirty="0"/>
-          </a:p>
-        </p:txBody>
-      </p:sp>
-      <p:sp>
-        <p:nvSpPr>
-          <p:cNvPr id="3" name="Content Placeholder 2"/>
-          <p:cNvSpPr>
-            <a:spLocks noGrp="1"/>
-          </p:cNvSpPr>
-          <p:nvPr>
-            <p:ph idx="1"/>
-          </p:nvPr>
-        </p:nvSpPr>
-        <p:spPr>
-          <a:xfrm>
-            <a:off x="685800" y="1447800"/>
-            <a:ext cx="7772400" cy="3733800"/>
-          </a:xfrm>
-        </p:spPr>
-        <p:txBody>
-          <a:bodyPr/>
-          <a:lstStyle/>
-          <a:p>
-            <a:pPr marL="68580" indent="0">
-              <a:buNone/>
-            </a:pPr>
-            <a:r>
-              <a:rPr lang="en-US" dirty="0" smtClean="0"/>
-              <a:t>Section 7.2??</a:t>
-            </a:r>
-            <a:endParaRPr lang="en-US" dirty="0"/>
-          </a:p>
-        </p:txBody>
-      </p:sp>
-    </p:spTree>
-    <p:extLst>
-      <p:ext uri="{BB962C8B-B14F-4D97-AF65-F5344CB8AC3E}">
-        <p14:creationId xmlns:p14="http://schemas.microsoft.com/office/powerpoint/2010/main" val="4075441197"/>
-      </p:ext>
-    </p:extLst>
-  </p:cSld>
-  <p:clrMapOvr>
-    <a:masterClrMapping/>
-  </p:clrMapOvr>
-</p:sld>
-</file>
-
 <file path=ppt/slides/slide2.xml><?xml version="1.0" encoding="utf-8"?>
 <p:sld xmlns:a="http://schemas.openxmlformats.org/drawingml/2006/main" xmlns:r="http://schemas.openxmlformats.org/officeDocument/2006/relationships" xmlns:p="http://schemas.openxmlformats.org/presentationml/2006/main">
   <p:cSld>
@@ -19943,10 +20311,6 @@
           <a:bodyPr/>
           <a:lstStyle/>
           <a:p>
-            <a:r>
-              <a:rPr lang="en-US" dirty="0" smtClean="0"/>
-              <a:t>Motivation</a:t>
-            </a:r>
             <a:endParaRPr lang="en-US" dirty="0"/>
           </a:p>
         </p:txBody>
@@ -19961,87 +20325,32 @@
             <p:ph idx="1"/>
           </p:nvPr>
         </p:nvSpPr>
-        <p:spPr>
-          <a:xfrm>
-            <a:off x="685800" y="1600200"/>
-            <a:ext cx="7772400" cy="4190999"/>
-          </a:xfrm>
-        </p:spPr>
+        <p:spPr/>
         <p:txBody>
-          <a:bodyPr>
-            <a:normAutofit/>
-          </a:bodyPr>
+          <a:bodyPr/>
           <a:lstStyle/>
           <a:p>
-            <a:r>
-              <a:rPr lang="en-US" dirty="0" smtClean="0"/>
-              <a:t>Research indicated users are concerned with location data collected by smartphone apps</a:t>
-            </a:r>
-          </a:p>
-          <a:p>
-            <a:r>
-              <a:rPr lang="en-US" dirty="0" smtClean="0"/>
-              <a:t>Threat Model: the adversary…</a:t>
-            </a:r>
-          </a:p>
-          <a:p>
-            <a:pPr lvl="1"/>
-            <a:r>
-              <a:rPr lang="en-US" dirty="0" smtClean="0"/>
-              <a:t>Only accesses the user’s location via available application APIs</a:t>
-            </a:r>
-          </a:p>
-          <a:p>
-            <a:pPr lvl="1"/>
-            <a:r>
-              <a:rPr lang="en-US" dirty="0" smtClean="0"/>
-              <a:t>Will not attempt to hack or modify privacy controls on the operating system</a:t>
-            </a:r>
-          </a:p>
-          <a:p>
-            <a:r>
-              <a:rPr lang="en-US" dirty="0" smtClean="0"/>
-              <a:t>Collected location data by malicious application poses the following privacy threats:</a:t>
-            </a:r>
-          </a:p>
-          <a:p>
-            <a:pPr lvl="1"/>
-            <a:r>
-              <a:rPr lang="en-US" dirty="0" smtClean="0"/>
-              <a:t>Real-time location tracking of user</a:t>
-            </a:r>
-          </a:p>
-          <a:p>
-            <a:pPr lvl="1"/>
-            <a:r>
-              <a:rPr lang="en-US" dirty="0" smtClean="0"/>
-              <a:t>User identification through frequently visited locations</a:t>
-            </a:r>
-          </a:p>
-          <a:p>
-            <a:pPr lvl="1"/>
-            <a:r>
-              <a:rPr lang="en-US" dirty="0" smtClean="0"/>
-              <a:t>User profiling even without </a:t>
-            </a:r>
-            <a:r>
-              <a:rPr lang="en-US" dirty="0" smtClean="0"/>
-              <a:t>identification</a:t>
-            </a:r>
-            <a:endParaRPr lang="en-US" dirty="0" smtClean="0"/>
+            <a:endParaRPr lang="en-US" dirty="0"/>
           </a:p>
         </p:txBody>
       </p:sp>
     </p:spTree>
     <p:extLst>
       <p:ext uri="{BB962C8B-B14F-4D97-AF65-F5344CB8AC3E}">
-        <p14:creationId xmlns:p14="http://schemas.microsoft.com/office/powerpoint/2010/main" val="3722578641"/>
+        <p14:creationId xmlns:p14="http://schemas.microsoft.com/office/powerpoint/2010/main" val="2313750110"/>
       </p:ext>
     </p:extLst>
   </p:cSld>
   <p:clrMapOvr>
     <a:masterClrMapping/>
   </p:clrMapOvr>
+  <p:timing>
+    <p:tnLst>
+      <p:par>
+        <p:cTn id="1" dur="indefinite" restart="never" nodeType="tmRoot"/>
+      </p:par>
+    </p:tnLst>
+  </p:timing>
 </p:sld>
 </file>
 
@@ -20079,7 +20388,7 @@
           <a:p>
             <a:r>
               <a:rPr lang="en-US" dirty="0" smtClean="0"/>
-              <a:t>Technical Weaknesses of Paper</a:t>
+              <a:t>Experimental Results</a:t>
             </a:r>
             <a:endParaRPr lang="en-US" dirty="0"/>
           </a:p>
@@ -20095,36 +20404,22 @@
             <p:ph idx="1"/>
           </p:nvPr>
         </p:nvSpPr>
-        <p:spPr/>
+        <p:spPr>
+          <a:xfrm>
+            <a:off x="685800" y="1447800"/>
+            <a:ext cx="7772400" cy="3733800"/>
+          </a:xfrm>
+        </p:spPr>
         <p:txBody>
           <a:bodyPr/>
           <a:lstStyle/>
           <a:p>
-            <a:r>
-              <a:rPr lang="en-US" dirty="0"/>
-              <a:t>S</a:t>
-            </a:r>
+            <a:pPr marL="68580" indent="0">
+              <a:buNone/>
+            </a:pPr>
             <a:r>
               <a:rPr lang="en-US" dirty="0" smtClean="0"/>
-              <a:t>ynthetic routes, used for fitness related apps, could potentially create an unrealistic path such as through buildings, water, steep elevation changes, etc.</a:t>
-            </a:r>
-          </a:p>
-          <a:p>
-            <a:r>
-              <a:rPr lang="en-US" dirty="0" smtClean="0"/>
-              <a:t>Some apps also track elevation changes which would not be accurate with synthetic routes</a:t>
-            </a:r>
-          </a:p>
-          <a:p>
-            <a:r>
-              <a:rPr lang="en-US" dirty="0" smtClean="0"/>
-              <a:t>Navigational apps are not handled by the current version of LP-Guardian.</a:t>
-            </a:r>
-          </a:p>
-          <a:p>
-            <a:r>
-              <a:rPr lang="en-US" dirty="0" smtClean="0"/>
-              <a:t>City-Level Location would work for an app such as weather, but would be limited if used by a location specific search app where a user might be looking for the closest gas station, restaurant, store, etc. to their location.</a:t>
+              <a:t>Section 7.2??</a:t>
             </a:r>
             <a:endParaRPr lang="en-US" dirty="0"/>
           </a:p>
@@ -20133,7 +20428,7 @@
     </p:spTree>
     <p:extLst>
       <p:ext uri="{BB962C8B-B14F-4D97-AF65-F5344CB8AC3E}">
-        <p14:creationId xmlns:p14="http://schemas.microsoft.com/office/powerpoint/2010/main" val="1075420864"/>
+        <p14:creationId xmlns:p14="http://schemas.microsoft.com/office/powerpoint/2010/main" val="4075441197"/>
       </p:ext>
     </p:extLst>
   </p:cSld>
@@ -20177,7 +20472,7 @@
           <a:p>
             <a:r>
               <a:rPr lang="en-US" dirty="0" smtClean="0"/>
-              <a:t>Potential Future Work</a:t>
+              <a:t>Technical Weaknesses of Paper</a:t>
             </a:r>
             <a:endParaRPr lang="en-US" dirty="0"/>
           </a:p>
@@ -20199,6 +20494,104 @@
           <a:lstStyle/>
           <a:p>
             <a:r>
+              <a:rPr lang="en-US" dirty="0"/>
+              <a:t>S</a:t>
+            </a:r>
+            <a:r>
+              <a:rPr lang="en-US" dirty="0" smtClean="0"/>
+              <a:t>ynthetic routes, used for fitness related apps, could potentially create an unrealistic path such as through buildings, water, steep elevation changes, etc.</a:t>
+            </a:r>
+          </a:p>
+          <a:p>
+            <a:r>
+              <a:rPr lang="en-US" dirty="0" smtClean="0"/>
+              <a:t>Some apps also track elevation changes which would not be accurate with synthetic routes</a:t>
+            </a:r>
+          </a:p>
+          <a:p>
+            <a:r>
+              <a:rPr lang="en-US" dirty="0" smtClean="0"/>
+              <a:t>Navigational apps are not handled by the current version of LP-Guardian.</a:t>
+            </a:r>
+          </a:p>
+          <a:p>
+            <a:r>
+              <a:rPr lang="en-US" dirty="0" smtClean="0"/>
+              <a:t>City-Level Location would work for an app such as weather, but would be limited if used by a location specific search app where a user might be looking for the closest gas station, restaurant, store, etc. to their location.</a:t>
+            </a:r>
+            <a:endParaRPr lang="en-US" dirty="0"/>
+          </a:p>
+        </p:txBody>
+      </p:sp>
+    </p:spTree>
+    <p:extLst>
+      <p:ext uri="{BB962C8B-B14F-4D97-AF65-F5344CB8AC3E}">
+        <p14:creationId xmlns:p14="http://schemas.microsoft.com/office/powerpoint/2010/main" val="1075420864"/>
+      </p:ext>
+    </p:extLst>
+  </p:cSld>
+  <p:clrMapOvr>
+    <a:masterClrMapping/>
+  </p:clrMapOvr>
+</p:sld>
+</file>
+
+<file path=ppt/slides/slide22.xml><?xml version="1.0" encoding="utf-8"?>
+<p:sld xmlns:a="http://schemas.openxmlformats.org/drawingml/2006/main" xmlns:r="http://schemas.openxmlformats.org/officeDocument/2006/relationships" xmlns:p="http://schemas.openxmlformats.org/presentationml/2006/main">
+  <p:cSld>
+    <p:spTree>
+      <p:nvGrpSpPr>
+        <p:cNvPr id="1" name=""/>
+        <p:cNvGrpSpPr/>
+        <p:nvPr/>
+      </p:nvGrpSpPr>
+      <p:grpSpPr>
+        <a:xfrm>
+          <a:off x="0" y="0"/>
+          <a:ext cx="0" cy="0"/>
+          <a:chOff x="0" y="0"/>
+          <a:chExt cx="0" cy="0"/>
+        </a:xfrm>
+      </p:grpSpPr>
+      <p:sp>
+        <p:nvSpPr>
+          <p:cNvPr id="2" name="Title 1"/>
+          <p:cNvSpPr>
+            <a:spLocks noGrp="1"/>
+          </p:cNvSpPr>
+          <p:nvPr>
+            <p:ph type="title"/>
+          </p:nvPr>
+        </p:nvSpPr>
+        <p:spPr/>
+        <p:txBody>
+          <a:bodyPr/>
+          <a:lstStyle/>
+          <a:p>
+            <a:r>
+              <a:rPr lang="en-US" dirty="0" smtClean="0"/>
+              <a:t>Potential Future Work</a:t>
+            </a:r>
+            <a:endParaRPr lang="en-US" dirty="0"/>
+          </a:p>
+        </p:txBody>
+      </p:sp>
+      <p:sp>
+        <p:nvSpPr>
+          <p:cNvPr id="3" name="Content Placeholder 2"/>
+          <p:cNvSpPr>
+            <a:spLocks noGrp="1"/>
+          </p:cNvSpPr>
+          <p:nvPr>
+            <p:ph idx="1"/>
+          </p:nvPr>
+        </p:nvSpPr>
+        <p:spPr/>
+        <p:txBody>
+          <a:bodyPr/>
+          <a:lstStyle/>
+          <a:p>
+            <a:r>
               <a:rPr lang="en-US" dirty="0" smtClean="0"/>
               <a:t>Deploy LP-Guardian to more diverse participants with limited technical background for 6 months</a:t>
             </a:r>
@@ -20240,7 +20633,7 @@
 </p:sld>
 </file>
 
-<file path=ppt/slides/slide22.xml><?xml version="1.0" encoding="utf-8"?>
+<file path=ppt/slides/slide23.xml><?xml version="1.0" encoding="utf-8"?>
 <p:sld xmlns:a="http://schemas.openxmlformats.org/drawingml/2006/main" xmlns:r="http://schemas.openxmlformats.org/officeDocument/2006/relationships" xmlns:p="http://schemas.openxmlformats.org/presentationml/2006/main">
   <p:cSld>
     <p:spTree>
@@ -20299,7 +20692,7 @@
 </p:sld>
 </file>
 
-<file path=ppt/slides/slide23.xml><?xml version="1.0" encoding="utf-8"?>
+<file path=ppt/slides/slide24.xml><?xml version="1.0" encoding="utf-8"?>
 <p:sld xmlns:a="http://schemas.openxmlformats.org/drawingml/2006/main" xmlns:r="http://schemas.openxmlformats.org/officeDocument/2006/relationships" xmlns:p="http://schemas.openxmlformats.org/presentationml/2006/main" show="0">
   <p:cSld>
     <p:spTree>
@@ -20586,6 +20979,142 @@
         </p:nvSpPr>
         <p:spPr/>
         <p:txBody>
+          <a:bodyPr/>
+          <a:lstStyle/>
+          <a:p>
+            <a:r>
+              <a:rPr lang="en-US" dirty="0" smtClean="0"/>
+              <a:t>Motivation</a:t>
+            </a:r>
+            <a:endParaRPr lang="en-US" dirty="0"/>
+          </a:p>
+        </p:txBody>
+      </p:sp>
+      <p:sp>
+        <p:nvSpPr>
+          <p:cNvPr id="3" name="Content Placeholder 2"/>
+          <p:cNvSpPr>
+            <a:spLocks noGrp="1"/>
+          </p:cNvSpPr>
+          <p:nvPr>
+            <p:ph idx="1"/>
+          </p:nvPr>
+        </p:nvSpPr>
+        <p:spPr>
+          <a:xfrm>
+            <a:off x="685800" y="1600200"/>
+            <a:ext cx="7772400" cy="4190999"/>
+          </a:xfrm>
+        </p:spPr>
+        <p:txBody>
+          <a:bodyPr>
+            <a:normAutofit/>
+          </a:bodyPr>
+          <a:lstStyle/>
+          <a:p>
+            <a:r>
+              <a:rPr lang="en-US" dirty="0" smtClean="0"/>
+              <a:t>Research indicated users are concerned with location data collected by smartphone apps</a:t>
+            </a:r>
+          </a:p>
+          <a:p>
+            <a:r>
+              <a:rPr lang="en-US" dirty="0" smtClean="0"/>
+              <a:t>Threat Model: the adversary…</a:t>
+            </a:r>
+          </a:p>
+          <a:p>
+            <a:pPr lvl="1"/>
+            <a:r>
+              <a:rPr lang="en-US" dirty="0" smtClean="0"/>
+              <a:t>Only accesses the user’s location via available application APIs</a:t>
+            </a:r>
+          </a:p>
+          <a:p>
+            <a:pPr lvl="1"/>
+            <a:r>
+              <a:rPr lang="en-US" dirty="0" smtClean="0"/>
+              <a:t>Will not attempt to hack or modify privacy controls on the operating system</a:t>
+            </a:r>
+          </a:p>
+          <a:p>
+            <a:r>
+              <a:rPr lang="en-US" dirty="0" smtClean="0"/>
+              <a:t>Collected location data by malicious application poses the following privacy threats:</a:t>
+            </a:r>
+          </a:p>
+          <a:p>
+            <a:pPr lvl="1"/>
+            <a:r>
+              <a:rPr lang="en-US" dirty="0" smtClean="0"/>
+              <a:t>Real-time location tracking of user</a:t>
+            </a:r>
+          </a:p>
+          <a:p>
+            <a:pPr lvl="1"/>
+            <a:r>
+              <a:rPr lang="en-US" dirty="0" smtClean="0"/>
+              <a:t>User identification through frequently visited locations</a:t>
+            </a:r>
+          </a:p>
+          <a:p>
+            <a:pPr lvl="1"/>
+            <a:r>
+              <a:rPr lang="en-US" dirty="0" smtClean="0"/>
+              <a:t>User profiling even without identification</a:t>
+            </a:r>
+          </a:p>
+        </p:txBody>
+      </p:sp>
+    </p:spTree>
+    <p:extLst>
+      <p:ext uri="{BB962C8B-B14F-4D97-AF65-F5344CB8AC3E}">
+        <p14:creationId xmlns:p14="http://schemas.microsoft.com/office/powerpoint/2010/main" val="3722578641"/>
+      </p:ext>
+    </p:extLst>
+  </p:cSld>
+  <p:clrMapOvr>
+    <a:masterClrMapping/>
+  </p:clrMapOvr>
+  <p:timing>
+    <p:tnLst>
+      <p:par>
+        <p:cTn id="1" dur="indefinite" restart="never" nodeType="tmRoot"/>
+      </p:par>
+    </p:tnLst>
+  </p:timing>
+</p:sld>
+</file>
+
+<file path=ppt/slides/slide4.xml><?xml version="1.0" encoding="utf-8"?>
+<p:sld xmlns:a="http://schemas.openxmlformats.org/drawingml/2006/main" xmlns:r="http://schemas.openxmlformats.org/officeDocument/2006/relationships" xmlns:p="http://schemas.openxmlformats.org/presentationml/2006/main">
+  <p:cSld>
+    <p:spTree>
+      <p:nvGrpSpPr>
+        <p:cNvPr id="1" name=""/>
+        <p:cNvGrpSpPr/>
+        <p:nvPr/>
+      </p:nvGrpSpPr>
+      <p:grpSpPr>
+        <a:xfrm>
+          <a:off x="0" y="0"/>
+          <a:ext cx="0" cy="0"/>
+          <a:chOff x="0" y="0"/>
+          <a:chExt cx="0" cy="0"/>
+        </a:xfrm>
+      </p:grpSpPr>
+      <p:sp>
+        <p:nvSpPr>
+          <p:cNvPr id="2" name="Title 1"/>
+          <p:cNvSpPr>
+            <a:spLocks noGrp="1"/>
+          </p:cNvSpPr>
+          <p:nvPr>
+            <p:ph type="title"/>
+          </p:nvPr>
+        </p:nvSpPr>
+        <p:spPr/>
+        <p:txBody>
           <a:bodyPr>
             <a:normAutofit fontScale="90000"/>
           </a:bodyPr>
@@ -20620,58 +21149,47 @@
               <a:rPr lang="en-US" dirty="0" smtClean="0"/>
               <a:t>Practical Approaches</a:t>
             </a:r>
-            <a:endParaRPr lang="en-US" dirty="0" smtClean="0"/>
           </a:p>
           <a:p>
             <a:pPr lvl="1"/>
             <a:r>
-              <a:rPr lang="en-US" dirty="0" err="1" smtClean="0"/>
-              <a:t>MockDroid</a:t>
-            </a:r>
-            <a:r>
               <a:rPr lang="en-US" dirty="0" smtClean="0"/>
-              <a:t>: Allows complete disabling collection of location data</a:t>
-            </a:r>
-            <a:endParaRPr lang="en-US" dirty="0" smtClean="0"/>
+              <a:t>MockDroid: Allows complete disabling collection of location data</a:t>
+            </a:r>
           </a:p>
           <a:p>
             <a:pPr lvl="1"/>
             <a:r>
               <a:rPr lang="en-US" dirty="0" smtClean="0"/>
-              <a:t>Koi &amp; Cache: Require apps to use their APIs</a:t>
+              <a:t>Koi &amp; </a:t>
+            </a:r>
+            <a:r>
+              <a:rPr lang="en-US" dirty="0" smtClean="0"/>
+              <a:t>Cache: </a:t>
+            </a:r>
+            <a:r>
+              <a:rPr lang="en-US" dirty="0" smtClean="0"/>
+              <a:t>Require apps to use their APIs</a:t>
             </a:r>
           </a:p>
           <a:p>
             <a:pPr lvl="1"/>
             <a:r>
-              <a:rPr lang="en-US" dirty="0" err="1" smtClean="0"/>
-              <a:t>Micinski</a:t>
-            </a:r>
-            <a:r>
               <a:rPr lang="en-US" dirty="0" smtClean="0"/>
-              <a:t>:  Coarsens all location data without regard to threat level or functionality</a:t>
+              <a:t>Micinski:  Coarsens all location data without regard to threat level or functionality</a:t>
             </a:r>
           </a:p>
           <a:p>
             <a:pPr lvl="1"/>
             <a:r>
-              <a:rPr lang="en-US" dirty="0" err="1" smtClean="0"/>
-              <a:t>PlaceMask</a:t>
-            </a:r>
-            <a:r>
               <a:rPr lang="en-US" dirty="0" smtClean="0"/>
-              <a:t>: Allows users to provide false location data. Can make apps unusable</a:t>
-            </a:r>
-            <a:endParaRPr lang="en-US" dirty="0" smtClean="0"/>
+              <a:t>PlaceMask: Allows users to provide false location data. Can make apps unusable</a:t>
+            </a:r>
           </a:p>
           <a:p>
             <a:r>
               <a:rPr lang="en-US" dirty="0" smtClean="0"/>
-              <a:t>Theoretical </a:t>
-            </a:r>
-            <a:r>
-              <a:rPr lang="en-US" dirty="0" smtClean="0"/>
-              <a:t>Approaches</a:t>
+              <a:t>Theoretical Approaches</a:t>
             </a:r>
           </a:p>
           <a:p>
@@ -20685,11 +21203,7 @@
             <a:pPr lvl="1"/>
             <a:r>
               <a:rPr lang="en-US" dirty="0" smtClean="0"/>
-              <a:t>Shown that profiling &amp; identification may be possible even with “anonymized” location data </a:t>
-            </a:r>
-            <a:r>
-              <a:rPr lang="en-US" dirty="0" smtClean="0"/>
-              <a:t>only (cell tower based location)</a:t>
+              <a:t>Shown that profiling &amp; identification may be possible even with “anonymized” location data only (cell tower based location)</a:t>
             </a:r>
           </a:p>
           <a:p>
@@ -20719,10 +21233,17 @@
   <p:clrMapOvr>
     <a:masterClrMapping/>
   </p:clrMapOvr>
+  <p:timing>
+    <p:tnLst>
+      <p:par>
+        <p:cTn id="1" dur="indefinite" restart="never" nodeType="tmRoot"/>
+      </p:par>
+    </p:tnLst>
+  </p:timing>
 </p:sld>
 </file>
 
-<file path=ppt/slides/slide4.xml><?xml version="1.0" encoding="utf-8"?>
+<file path=ppt/slides/slide5.xml><?xml version="1.0" encoding="utf-8"?>
 <p:sld xmlns:a="http://schemas.openxmlformats.org/drawingml/2006/main" xmlns:r="http://schemas.openxmlformats.org/officeDocument/2006/relationships" xmlns:p="http://schemas.openxmlformats.org/presentationml/2006/main">
   <p:cSld>
     <p:spTree>
@@ -20861,10 +21382,17 @@
   <p:clrMapOvr>
     <a:masterClrMapping/>
   </p:clrMapOvr>
+  <p:timing>
+    <p:tnLst>
+      <p:par>
+        <p:cTn id="1" dur="indefinite" restart="never" nodeType="tmRoot"/>
+      </p:par>
+    </p:tnLst>
+  </p:timing>
 </p:sld>
 </file>
 
-<file path=ppt/slides/slide5.xml><?xml version="1.0" encoding="utf-8"?>
+<file path=ppt/slides/slide6.xml><?xml version="1.0" encoding="utf-8"?>
 <p:sld xmlns:a="http://schemas.openxmlformats.org/drawingml/2006/main" xmlns:r="http://schemas.openxmlformats.org/officeDocument/2006/relationships" xmlns:p="http://schemas.openxmlformats.org/presentationml/2006/main">
   <p:cSld>
     <p:spTree>
@@ -20959,7 +21487,7 @@
         </p:nvSpPr>
         <p:spPr>
           <a:xfrm>
-            <a:off x="685800" y="1600200"/>
+            <a:off x="685800" y="1524000"/>
             <a:ext cx="7772400" cy="4038600"/>
           </a:xfrm>
         </p:spPr>
@@ -21017,165 +21545,6 @@
     <p:extLst>
       <p:ext uri="{BB962C8B-B14F-4D97-AF65-F5344CB8AC3E}">
         <p14:creationId xmlns:p14="http://schemas.microsoft.com/office/powerpoint/2010/main" val="2403925547"/>
-      </p:ext>
-    </p:extLst>
-  </p:cSld>
-  <p:clrMapOvr>
-    <a:masterClrMapping/>
-  </p:clrMapOvr>
-</p:sld>
-</file>
-
-<file path=ppt/slides/slide6.xml><?xml version="1.0" encoding="utf-8"?>
-<p:sld xmlns:a="http://schemas.openxmlformats.org/drawingml/2006/main" xmlns:r="http://schemas.openxmlformats.org/officeDocument/2006/relationships" xmlns:p="http://schemas.openxmlformats.org/presentationml/2006/main">
-  <p:cSld>
-    <p:spTree>
-      <p:nvGrpSpPr>
-        <p:cNvPr id="1" name=""/>
-        <p:cNvGrpSpPr/>
-        <p:nvPr/>
-      </p:nvGrpSpPr>
-      <p:grpSpPr>
-        <a:xfrm>
-          <a:off x="0" y="0"/>
-          <a:ext cx="0" cy="0"/>
-          <a:chOff x="0" y="0"/>
-          <a:chExt cx="0" cy="0"/>
-        </a:xfrm>
-      </p:grpSpPr>
-      <p:sp>
-        <p:nvSpPr>
-          <p:cNvPr id="2" name="Title 1"/>
-          <p:cNvSpPr>
-            <a:spLocks noGrp="1"/>
-          </p:cNvSpPr>
-          <p:nvPr>
-            <p:ph type="title"/>
-          </p:nvPr>
-        </p:nvSpPr>
-        <p:spPr/>
-        <p:txBody>
-          <a:bodyPr/>
-          <a:lstStyle/>
-          <a:p>
-            <a:r>
-              <a:rPr lang="en-US" dirty="0" smtClean="0"/>
-              <a:t>Advantages over Prior Art</a:t>
-            </a:r>
-            <a:endParaRPr lang="en-US" dirty="0"/>
-          </a:p>
-        </p:txBody>
-      </p:sp>
-      <p:sp>
-        <p:nvSpPr>
-          <p:cNvPr id="3" name="Content Placeholder 2"/>
-          <p:cNvSpPr>
-            <a:spLocks noGrp="1"/>
-          </p:cNvSpPr>
-          <p:nvPr>
-            <p:ph idx="1"/>
-          </p:nvPr>
-        </p:nvSpPr>
-        <p:spPr/>
-        <p:txBody>
-          <a:bodyPr>
-            <a:normAutofit/>
-          </a:bodyPr>
-          <a:lstStyle/>
-          <a:p>
-            <a:r>
-              <a:rPr lang="en-US" dirty="0" smtClean="0"/>
-              <a:t>Protection from all 3 types of threats, and most types of app </a:t>
-            </a:r>
-          </a:p>
-          <a:p>
-            <a:r>
-              <a:rPr lang="en-US" dirty="0"/>
-              <a:t>Avoids various unrealistic assumptions 	</a:t>
-            </a:r>
-          </a:p>
-          <a:p>
-            <a:pPr lvl="1"/>
-            <a:r>
-              <a:rPr lang="en-US" dirty="0"/>
-              <a:t>Require trusted </a:t>
-            </a:r>
-            <a:r>
-              <a:rPr lang="en-US" dirty="0" smtClean="0"/>
-              <a:t>infrastructure</a:t>
-            </a:r>
-          </a:p>
-          <a:p>
-            <a:pPr lvl="1"/>
-            <a:r>
-              <a:rPr lang="en-US" dirty="0" smtClean="0"/>
-              <a:t>Requires apps to conform to specific location API</a:t>
-            </a:r>
-            <a:endParaRPr lang="en-US" dirty="0"/>
-          </a:p>
-          <a:p>
-            <a:pPr lvl="1"/>
-            <a:r>
-              <a:rPr lang="en-US" dirty="0"/>
-              <a:t>Require other users at the same time and in the same place as </a:t>
-            </a:r>
-            <a:r>
-              <a:rPr lang="en-US" dirty="0" smtClean="0"/>
-              <a:t>user</a:t>
-            </a:r>
-          </a:p>
-          <a:p>
-            <a:r>
-              <a:rPr lang="en-US" dirty="0" smtClean="0"/>
-              <a:t>Minimal </a:t>
-            </a:r>
-            <a:r>
-              <a:rPr lang="en-US" dirty="0"/>
-              <a:t>interference with </a:t>
-            </a:r>
-            <a:r>
-              <a:rPr lang="en-US" dirty="0" smtClean="0"/>
-              <a:t>functionality</a:t>
-            </a:r>
-          </a:p>
-          <a:p>
-            <a:pPr lvl="1"/>
-            <a:r>
-              <a:rPr lang="en-US" dirty="0" smtClean="0"/>
-              <a:t>Allows most apps to provide full or only slightly reduced functionality</a:t>
-            </a:r>
-          </a:p>
-          <a:p>
-            <a:pPr lvl="1"/>
-            <a:r>
-              <a:rPr lang="en-US" dirty="0" smtClean="0"/>
-              <a:t>Applies different privacy rules to different apps</a:t>
-            </a:r>
-          </a:p>
-          <a:p>
-            <a:pPr lvl="1"/>
-            <a:r>
-              <a:rPr lang="en-US" dirty="0" smtClean="0"/>
-              <a:t>Balances need for functionality and privacy</a:t>
-            </a:r>
-          </a:p>
-          <a:p>
-            <a:pPr lvl="1"/>
-            <a:r>
-              <a:rPr lang="en-US" dirty="0" smtClean="0"/>
-              <a:t>Less than 10% energy overhead</a:t>
-            </a:r>
-            <a:endParaRPr lang="en-US" dirty="0"/>
-          </a:p>
-          <a:p>
-            <a:endParaRPr lang="en-US" dirty="0"/>
-          </a:p>
-        </p:txBody>
-      </p:sp>
-    </p:spTree>
-    <p:extLst>
-      <p:ext uri="{BB962C8B-B14F-4D97-AF65-F5344CB8AC3E}">
-        <p14:creationId xmlns:p14="http://schemas.microsoft.com/office/powerpoint/2010/main" val="1075420864"/>
       </p:ext>
     </p:extLst>
   </p:cSld>
@@ -21219,6 +21588,172 @@
             <p:ph type="title"/>
           </p:nvPr>
         </p:nvSpPr>
+        <p:spPr/>
+        <p:txBody>
+          <a:bodyPr/>
+          <a:lstStyle/>
+          <a:p>
+            <a:r>
+              <a:rPr lang="en-US" dirty="0" smtClean="0"/>
+              <a:t>Advantages over Prior Art</a:t>
+            </a:r>
+            <a:endParaRPr lang="en-US" dirty="0"/>
+          </a:p>
+        </p:txBody>
+      </p:sp>
+      <p:sp>
+        <p:nvSpPr>
+          <p:cNvPr id="3" name="Content Placeholder 2"/>
+          <p:cNvSpPr>
+            <a:spLocks noGrp="1"/>
+          </p:cNvSpPr>
+          <p:nvPr>
+            <p:ph idx="1"/>
+          </p:nvPr>
+        </p:nvSpPr>
+        <p:spPr/>
+        <p:txBody>
+          <a:bodyPr>
+            <a:normAutofit/>
+          </a:bodyPr>
+          <a:lstStyle/>
+          <a:p>
+            <a:r>
+              <a:rPr lang="en-US" dirty="0" smtClean="0"/>
+              <a:t>Protection from all 3 types of threats, and most types of app </a:t>
+            </a:r>
+          </a:p>
+          <a:p>
+            <a:r>
+              <a:rPr lang="en-US" dirty="0"/>
+              <a:t>Avoids various unrealistic assumptions 	</a:t>
+            </a:r>
+          </a:p>
+          <a:p>
+            <a:pPr lvl="1"/>
+            <a:r>
+              <a:rPr lang="en-US" dirty="0"/>
+              <a:t>Require trusted </a:t>
+            </a:r>
+            <a:r>
+              <a:rPr lang="en-US" dirty="0" smtClean="0"/>
+              <a:t>infrastructure</a:t>
+            </a:r>
+          </a:p>
+          <a:p>
+            <a:pPr lvl="1"/>
+            <a:r>
+              <a:rPr lang="en-US" dirty="0" smtClean="0"/>
+              <a:t>Requires apps to conform to specific location API</a:t>
+            </a:r>
+            <a:endParaRPr lang="en-US" dirty="0"/>
+          </a:p>
+          <a:p>
+            <a:pPr lvl="1"/>
+            <a:r>
+              <a:rPr lang="en-US" dirty="0"/>
+              <a:t>Require other users at the same time and in the same place as </a:t>
+            </a:r>
+            <a:r>
+              <a:rPr lang="en-US" dirty="0" smtClean="0"/>
+              <a:t>user</a:t>
+            </a:r>
+          </a:p>
+          <a:p>
+            <a:r>
+              <a:rPr lang="en-US" dirty="0" smtClean="0"/>
+              <a:t>Minimal </a:t>
+            </a:r>
+            <a:r>
+              <a:rPr lang="en-US" dirty="0"/>
+              <a:t>interference with </a:t>
+            </a:r>
+            <a:r>
+              <a:rPr lang="en-US" dirty="0" smtClean="0"/>
+              <a:t>functionality</a:t>
+            </a:r>
+          </a:p>
+          <a:p>
+            <a:pPr lvl="1"/>
+            <a:r>
+              <a:rPr lang="en-US" dirty="0" smtClean="0"/>
+              <a:t>Allows most apps to provide full or only slightly reduced functionality</a:t>
+            </a:r>
+          </a:p>
+          <a:p>
+            <a:pPr lvl="1"/>
+            <a:r>
+              <a:rPr lang="en-US" dirty="0" smtClean="0"/>
+              <a:t>Applies different privacy rules to different apps</a:t>
+            </a:r>
+          </a:p>
+          <a:p>
+            <a:pPr lvl="1"/>
+            <a:r>
+              <a:rPr lang="en-US" dirty="0" smtClean="0"/>
+              <a:t>Balances need for functionality and privacy</a:t>
+            </a:r>
+          </a:p>
+          <a:p>
+            <a:pPr lvl="1"/>
+            <a:r>
+              <a:rPr lang="en-US" dirty="0" smtClean="0"/>
+              <a:t>Less than 10% energy overhead</a:t>
+            </a:r>
+            <a:endParaRPr lang="en-US" dirty="0"/>
+          </a:p>
+          <a:p>
+            <a:endParaRPr lang="en-US" dirty="0"/>
+          </a:p>
+        </p:txBody>
+      </p:sp>
+    </p:spTree>
+    <p:extLst>
+      <p:ext uri="{BB962C8B-B14F-4D97-AF65-F5344CB8AC3E}">
+        <p14:creationId xmlns:p14="http://schemas.microsoft.com/office/powerpoint/2010/main" val="1075420864"/>
+      </p:ext>
+    </p:extLst>
+  </p:cSld>
+  <p:clrMapOvr>
+    <a:masterClrMapping/>
+  </p:clrMapOvr>
+  <p:timing>
+    <p:tnLst>
+      <p:par>
+        <p:cTn id="1" dur="indefinite" restart="never" nodeType="tmRoot"/>
+      </p:par>
+    </p:tnLst>
+  </p:timing>
+</p:sld>
+</file>
+
+<file path=ppt/slides/slide8.xml><?xml version="1.0" encoding="utf-8"?>
+<p:sld xmlns:a="http://schemas.openxmlformats.org/drawingml/2006/main" xmlns:r="http://schemas.openxmlformats.org/officeDocument/2006/relationships" xmlns:p="http://schemas.openxmlformats.org/presentationml/2006/main">
+  <p:cSld>
+    <p:spTree>
+      <p:nvGrpSpPr>
+        <p:cNvPr id="1" name=""/>
+        <p:cNvGrpSpPr/>
+        <p:nvPr/>
+      </p:nvGrpSpPr>
+      <p:grpSpPr>
+        <a:xfrm>
+          <a:off x="0" y="0"/>
+          <a:ext cx="0" cy="0"/>
+          <a:chOff x="0" y="0"/>
+          <a:chExt cx="0" cy="0"/>
+        </a:xfrm>
+      </p:grpSpPr>
+      <p:sp>
+        <p:nvSpPr>
+          <p:cNvPr id="2" name="Title 1"/>
+          <p:cNvSpPr>
+            <a:spLocks noGrp="1"/>
+          </p:cNvSpPr>
+          <p:nvPr>
+            <p:ph type="title"/>
+          </p:nvPr>
+        </p:nvSpPr>
         <p:spPr>
           <a:xfrm>
             <a:off x="685800" y="274638"/>
@@ -21249,8 +21784,8 @@
         </p:nvSpPr>
         <p:spPr>
           <a:xfrm>
-            <a:off x="2318519" y="1200943"/>
-            <a:ext cx="6673081" cy="5370513"/>
+            <a:off x="1905001" y="1200943"/>
+            <a:ext cx="7086600" cy="5370513"/>
           </a:xfrm>
         </p:spPr>
         <p:txBody>
@@ -21302,16 +21837,12 @@
           <a:p>
             <a:pPr lvl="2"/>
             <a:r>
-              <a:rPr lang="en-US" i="1" dirty="0" err="1"/>
+              <a:rPr lang="en-US" i="1" dirty="0"/>
               <a:t>p</a:t>
             </a:r>
             <a:r>
-              <a:rPr lang="en-US" i="1" baseline="-25000" dirty="0" err="1" smtClean="0"/>
-              <a:t>min</a:t>
-            </a:r>
-            <a:r>
               <a:rPr lang="en-US" i="1" baseline="-25000" dirty="0" smtClean="0"/>
-              <a:t> </a:t>
+              <a:t>min </a:t>
             </a:r>
             <a:r>
               <a:rPr lang="en-US" dirty="0" smtClean="0"/>
@@ -21321,8 +21852,32 @@
           <a:p>
             <a:pPr lvl="3"/>
             <a:r>
+              <a:rPr lang="en-US" i="1" dirty="0" smtClean="0"/>
+              <a:t>p</a:t>
+            </a:r>
+            <a:r>
+              <a:rPr lang="en-US" i="1" baseline="-25000" dirty="0" smtClean="0"/>
+              <a:t>min</a:t>
+            </a:r>
+            <a:r>
+              <a:rPr lang="en-US" dirty="0"/>
+              <a:t> </a:t>
+            </a:r>
+            <a:r>
               <a:rPr lang="en-US" dirty="0" smtClean="0"/>
-              <a:t>Can be a general value or set on a per-application basis</a:t>
+              <a:t>can be tuned using census data</a:t>
+            </a:r>
+            <a:endParaRPr lang="en-US" dirty="0" smtClean="0"/>
+          </a:p>
+          <a:p>
+            <a:pPr lvl="3"/>
+            <a:r>
+              <a:rPr lang="en-US" dirty="0" smtClean="0"/>
+              <a:t>Can </a:t>
+            </a:r>
+            <a:r>
+              <a:rPr lang="en-US" dirty="0" smtClean="0"/>
+              <a:t>be a general value or set on a per-application basis</a:t>
             </a:r>
             <a:endParaRPr lang="en-US" dirty="0"/>
           </a:p>
@@ -21344,7 +21899,7 @@
         </p:blipFill>
         <p:spPr>
           <a:xfrm>
-            <a:off x="179724" y="1958499"/>
+            <a:off x="179724" y="2286000"/>
             <a:ext cx="1953876" cy="2269017"/>
           </a:xfrm>
           <a:prstGeom prst="rect">
@@ -21528,7 +22083,7 @@
 </p:sld>
 </file>
 
-<file path=ppt/slides/slide8.xml><?xml version="1.0" encoding="utf-8"?>
+<file path=ppt/slides/slide9.xml><?xml version="1.0" encoding="utf-8"?>
 <p:sld xmlns:a="http://schemas.openxmlformats.org/drawingml/2006/main" xmlns:r="http://schemas.openxmlformats.org/officeDocument/2006/relationships" xmlns:p="http://schemas.openxmlformats.org/presentationml/2006/main">
   <p:cSld>
     <p:spTree>
@@ -21750,7 +22305,7 @@
         </p:blipFill>
         <p:spPr>
           <a:xfrm>
-            <a:off x="179724" y="1958499"/>
+            <a:off x="179724" y="2286000"/>
             <a:ext cx="1953876" cy="2269017"/>
           </a:xfrm>
           <a:prstGeom prst="rect">
@@ -21768,375 +22323,6 @@
   <p:clrMapOvr>
     <a:masterClrMapping/>
   </p:clrMapOvr>
-  <p:timing>
-    <p:tnLst>
-      <p:par>
-        <p:cTn id="1" dur="indefinite" restart="never" nodeType="tmRoot"/>
-      </p:par>
-    </p:tnLst>
-  </p:timing>
-</p:sld>
-</file>
-
-<file path=ppt/slides/slide9.xml><?xml version="1.0" encoding="utf-8"?>
-<p:sld xmlns:a="http://schemas.openxmlformats.org/drawingml/2006/main" xmlns:r="http://schemas.openxmlformats.org/officeDocument/2006/relationships" xmlns:p="http://schemas.openxmlformats.org/presentationml/2006/main" show="0">
-  <p:cSld>
-    <p:spTree>
-      <p:nvGrpSpPr>
-        <p:cNvPr id="1" name=""/>
-        <p:cNvGrpSpPr/>
-        <p:nvPr/>
-      </p:nvGrpSpPr>
-      <p:grpSpPr>
-        <a:xfrm>
-          <a:off x="0" y="0"/>
-          <a:ext cx="0" cy="0"/>
-          <a:chOff x="0" y="0"/>
-          <a:chExt cx="0" cy="0"/>
-        </a:xfrm>
-      </p:grpSpPr>
-      <p:sp>
-        <p:nvSpPr>
-          <p:cNvPr id="2" name="Title 1"/>
-          <p:cNvSpPr>
-            <a:spLocks noGrp="1"/>
-          </p:cNvSpPr>
-          <p:nvPr>
-            <p:ph type="title"/>
-          </p:nvPr>
-        </p:nvSpPr>
-        <p:spPr/>
-        <p:txBody>
-          <a:bodyPr/>
-          <a:lstStyle/>
-          <a:p>
-            <a:r>
-              <a:rPr lang="en-US" dirty="0" smtClean="0"/>
-              <a:t>Technical Details: Design</a:t>
-            </a:r>
-            <a:endParaRPr lang="en-US" dirty="0"/>
-          </a:p>
-        </p:txBody>
-      </p:sp>
-      <p:sp>
-        <p:nvSpPr>
-          <p:cNvPr id="3" name="Content Placeholder 2"/>
-          <p:cNvSpPr>
-            <a:spLocks noGrp="1"/>
-          </p:cNvSpPr>
-          <p:nvPr>
-            <p:ph idx="1"/>
-          </p:nvPr>
-        </p:nvSpPr>
-        <p:spPr>
-          <a:xfrm>
-            <a:off x="2362200" y="1647682"/>
-            <a:ext cx="6553200" cy="4067318"/>
-          </a:xfrm>
-        </p:spPr>
-        <p:txBody>
-          <a:bodyPr>
-            <a:normAutofit lnSpcReduction="10000"/>
-          </a:bodyPr>
-          <a:lstStyle/>
-          <a:p>
-            <a:r>
-              <a:rPr lang="en-US" dirty="0" smtClean="0"/>
-              <a:t>Profiling Protection: each time the user opens a location-polling application from a new place, he must decide whether to hide the location</a:t>
-            </a:r>
-          </a:p>
-          <a:p>
-            <a:pPr lvl="1"/>
-            <a:r>
-              <a:rPr lang="en-US" dirty="0" smtClean="0"/>
-              <a:t>Given a user’s location </a:t>
-            </a:r>
-            <a:r>
-              <a:rPr lang="en-US" i="1" dirty="0" smtClean="0"/>
-              <a:t> (x, y)</a:t>
-            </a:r>
-            <a:r>
-              <a:rPr lang="en-US" dirty="0" smtClean="0"/>
-              <a:t> and anonymization radius </a:t>
-            </a:r>
-            <a:r>
-              <a:rPr lang="en-US" i="1" dirty="0" smtClean="0"/>
-              <a:t>r</a:t>
-            </a:r>
-            <a:r>
-              <a:rPr lang="en-US" dirty="0" smtClean="0"/>
-              <a:t>, noise pair </a:t>
-            </a:r>
-            <a:r>
-              <a:rPr lang="en-US" i="1" dirty="0" smtClean="0"/>
-              <a:t>(rad, </a:t>
-            </a:r>
-            <a:r>
-              <a:rPr lang="el-GR" i="1" dirty="0" smtClean="0"/>
-              <a:t>θ</a:t>
-            </a:r>
-            <a:r>
-              <a:rPr lang="en-US" i="1" dirty="0" smtClean="0"/>
-              <a:t>) </a:t>
-            </a:r>
-            <a:r>
-              <a:rPr lang="en-US" dirty="0" smtClean="0"/>
-              <a:t>is computed as:</a:t>
-            </a:r>
-          </a:p>
-          <a:p>
-            <a:pPr lvl="2"/>
-            <a:r>
-              <a:rPr lang="el-GR" i="1" dirty="0" smtClean="0"/>
-              <a:t>θ</a:t>
-            </a:r>
-            <a:r>
-              <a:rPr lang="en-US" i="1" dirty="0" smtClean="0"/>
-              <a:t> </a:t>
-            </a:r>
-            <a:r>
-              <a:rPr lang="en-US" dirty="0" smtClean="0"/>
-              <a:t>is drawn from the uniform distribution </a:t>
-            </a:r>
-            <a:r>
-              <a:rPr lang="en-US" i="1" dirty="0" smtClean="0"/>
-              <a:t>[0, 2</a:t>
-            </a:r>
-            <a:r>
-              <a:rPr lang="el-GR" i="1" dirty="0" smtClean="0"/>
-              <a:t>π</a:t>
-            </a:r>
-            <a:r>
-              <a:rPr lang="en-US" i="1" dirty="0" smtClean="0"/>
-              <a:t>)</a:t>
-            </a:r>
-          </a:p>
-          <a:p>
-            <a:pPr lvl="2"/>
-            <a:r>
-              <a:rPr lang="en-US" i="1" dirty="0" smtClean="0"/>
-              <a:t>p </a:t>
-            </a:r>
-            <a:r>
-              <a:rPr lang="en-US" dirty="0" smtClean="0"/>
-              <a:t>is drawn from the uniform distribution </a:t>
-            </a:r>
-            <a:r>
-              <a:rPr lang="en-US" i="1" dirty="0" smtClean="0"/>
-              <a:t>[0, 1] </a:t>
-            </a:r>
-            <a:r>
-              <a:rPr lang="en-US" dirty="0" smtClean="0"/>
-              <a:t>and </a:t>
-            </a:r>
-            <a:r>
-              <a:rPr lang="en-US" i="1" dirty="0" smtClean="0"/>
-              <a:t>rad = </a:t>
-            </a:r>
-            <a:endParaRPr lang="en-US" dirty="0" smtClean="0"/>
-          </a:p>
-          <a:p>
-            <a:pPr lvl="2"/>
-            <a:endParaRPr lang="en-US" i="1" dirty="0" smtClean="0"/>
-          </a:p>
-          <a:p>
-            <a:pPr lvl="1"/>
-            <a:r>
-              <a:rPr lang="en-US" dirty="0" smtClean="0"/>
-              <a:t>Same anonymized location is always mapped to the same real location</a:t>
-            </a:r>
-          </a:p>
-          <a:p>
-            <a:pPr lvl="1"/>
-            <a:r>
-              <a:rPr lang="en-US" dirty="0" smtClean="0"/>
-              <a:t>Additional suggestion to use TOR application to anonymize IP address</a:t>
-            </a:r>
-          </a:p>
-          <a:p>
-            <a:r>
-              <a:rPr lang="en-US" dirty="0" smtClean="0"/>
-              <a:t>Synthetic Route: for fitness tracking applications, LP-Guardian modifies the route information while retaining speed/distance information</a:t>
-            </a:r>
-          </a:p>
-        </p:txBody>
-      </p:sp>
-      <p:sp>
-        <p:nvSpPr>
-          <p:cNvPr id="6" name="Title 1"/>
-          <p:cNvSpPr txBox="1">
-            <a:spLocks/>
-          </p:cNvSpPr>
-          <p:nvPr/>
-        </p:nvSpPr>
-        <p:spPr>
-          <a:xfrm>
-            <a:off x="685800" y="274638"/>
-            <a:ext cx="8153400" cy="1143000"/>
-          </a:xfrm>
-          <a:prstGeom prst="rect">
-            <a:avLst/>
-          </a:prstGeom>
-        </p:spPr>
-        <p:txBody>
-          <a:bodyPr vert="horz" lIns="0" tIns="45720" rIns="0" bIns="45720" rtlCol="0" anchor="ctr">
-            <a:normAutofit/>
-          </a:bodyPr>
-          <a:lstStyle>
-            <a:lvl1pPr algn="l" defTabSz="914400" rtl="0" eaLnBrk="1" latinLnBrk="0" hangingPunct="1">
-              <a:spcBef>
-                <a:spcPct val="0"/>
-              </a:spcBef>
-              <a:buNone/>
-              <a:defRPr sz="3600" kern="1200" cap="all" baseline="0">
-                <a:solidFill>
-                  <a:schemeClr val="tx1"/>
-                </a:solidFill>
-                <a:latin typeface="+mj-lt"/>
-                <a:ea typeface="+mj-ea"/>
-                <a:cs typeface="+mj-cs"/>
-              </a:defRPr>
-            </a:lvl1pPr>
-            <a:lvl2pPr eaLnBrk="1" hangingPunct="1">
-              <a:defRPr>
-                <a:solidFill>
-                  <a:schemeClr val="tx2"/>
-                </a:solidFill>
-              </a:defRPr>
-            </a:lvl2pPr>
-            <a:lvl3pPr eaLnBrk="1" hangingPunct="1">
-              <a:defRPr>
-                <a:solidFill>
-                  <a:schemeClr val="tx2"/>
-                </a:solidFill>
-              </a:defRPr>
-            </a:lvl3pPr>
-            <a:lvl4pPr eaLnBrk="1" hangingPunct="1">
-              <a:defRPr>
-                <a:solidFill>
-                  <a:schemeClr val="tx2"/>
-                </a:solidFill>
-              </a:defRPr>
-            </a:lvl4pPr>
-            <a:lvl5pPr eaLnBrk="1" hangingPunct="1">
-              <a:defRPr>
-                <a:solidFill>
-                  <a:schemeClr val="tx2"/>
-                </a:solidFill>
-              </a:defRPr>
-            </a:lvl5pPr>
-            <a:lvl6pPr eaLnBrk="1" hangingPunct="1">
-              <a:defRPr>
-                <a:solidFill>
-                  <a:schemeClr val="tx2"/>
-                </a:solidFill>
-              </a:defRPr>
-            </a:lvl6pPr>
-            <a:lvl7pPr eaLnBrk="1" hangingPunct="1">
-              <a:defRPr>
-                <a:solidFill>
-                  <a:schemeClr val="tx2"/>
-                </a:solidFill>
-              </a:defRPr>
-            </a:lvl7pPr>
-            <a:lvl8pPr eaLnBrk="1" hangingPunct="1">
-              <a:defRPr>
-                <a:solidFill>
-                  <a:schemeClr val="tx2"/>
-                </a:solidFill>
-              </a:defRPr>
-            </a:lvl8pPr>
-            <a:lvl9pPr eaLnBrk="1" hangingPunct="1">
-              <a:defRPr>
-                <a:solidFill>
-                  <a:schemeClr val="tx2"/>
-                </a:solidFill>
-              </a:defRPr>
-            </a:lvl9pPr>
-          </a:lstStyle>
-          <a:p>
-            <a:r>
-              <a:rPr lang="en-US" dirty="0" smtClean="0">
-                <a:solidFill>
-                  <a:srgbClr val="FFFFFF"/>
-                </a:solidFill>
-              </a:rPr>
-              <a:t>Technical Details: Design (2 of 2)</a:t>
-            </a:r>
-            <a:endParaRPr lang="en-US" dirty="0">
-              <a:solidFill>
-                <a:srgbClr val="FFFFFF"/>
-              </a:solidFill>
-            </a:endParaRPr>
-          </a:p>
-        </p:txBody>
-      </p:sp>
-      <p:pic>
-        <p:nvPicPr>
-          <p:cNvPr id="7" name="Picture 6"/>
-          <p:cNvPicPr>
-            <a:picLocks noChangeAspect="1"/>
-          </p:cNvPicPr>
-          <p:nvPr/>
-        </p:nvPicPr>
-        <p:blipFill>
-          <a:blip r:embed="rId3"/>
-          <a:stretch>
-            <a:fillRect/>
-          </a:stretch>
-        </p:blipFill>
-        <p:spPr>
-          <a:xfrm>
-            <a:off x="179724" y="1958499"/>
-            <a:ext cx="1953876" cy="2269017"/>
-          </a:xfrm>
-          <a:prstGeom prst="rect">
-            <a:avLst/>
-          </a:prstGeom>
-        </p:spPr>
-      </p:pic>
-      <p:pic>
-        <p:nvPicPr>
-          <p:cNvPr id="4" name="Picture 3"/>
-          <p:cNvPicPr>
-            <a:picLocks noChangeAspect="1"/>
-          </p:cNvPicPr>
-          <p:nvPr/>
-        </p:nvPicPr>
-        <p:blipFill>
-          <a:blip r:embed="rId4"/>
-          <a:stretch>
-            <a:fillRect/>
-          </a:stretch>
-        </p:blipFill>
-        <p:spPr>
-          <a:xfrm>
-            <a:off x="3505200" y="3684753"/>
-            <a:ext cx="1695450" cy="257175"/>
-          </a:xfrm>
-          <a:prstGeom prst="rect">
-            <a:avLst/>
-          </a:prstGeom>
-        </p:spPr>
-      </p:pic>
-    </p:spTree>
-    <p:extLst>
-      <p:ext uri="{BB962C8B-B14F-4D97-AF65-F5344CB8AC3E}">
-        <p14:creationId xmlns:p14="http://schemas.microsoft.com/office/powerpoint/2010/main" val="3646194003"/>
-      </p:ext>
-    </p:extLst>
-  </p:cSld>
-  <p:clrMapOvr>
-    <a:masterClrMapping/>
-  </p:clrMapOvr>
-  <mc:AlternateContent xmlns:mc="http://schemas.openxmlformats.org/markup-compatibility/2006" xmlns:p14="http://schemas.microsoft.com/office/powerpoint/2010/main">
-    <mc:Choice Requires="p14">
-      <p:transition spd="slow" p14:dur="2000"/>
-    </mc:Choice>
-    <mc:Fallback xmlns="">
-      <p:transition spd="slow"/>
-    </mc:Fallback>
-  </mc:AlternateContent>
   <p:timing>
     <p:tnLst>
       <p:par>

</xml_diff>

<commit_message>
Final check-in with a few small edits. Version submitted to Professor Liu.
</commit_message>
<xml_diff>
--- a/PaperPresentation/Paper_Presentation_Fasburg_Reiff_Thomas.pptx
+++ b/PaperPresentation/Paper_Presentation_Fasburg_Reiff_Thomas.pptx
@@ -133,7 +133,7 @@
   </p:defaultTextStyle>
   <p:extLst>
     <p:ext uri="{EFAFB233-063F-42B5-8137-9DF3F51BA10A}">
-      <p15:sldGuideLst xmlns="" xmlns:p15="http://schemas.microsoft.com/office/powerpoint/2012/main">
+      <p15:sldGuideLst xmlns:p15="http://schemas.microsoft.com/office/powerpoint/2012/main">
         <p15:guide id="1" orient="horz" pos="2160">
           <p15:clr>
             <a:srgbClr val="A4A3A4"/>
@@ -346,6 +346,7 @@
     </c:plotArea>
     <c:legend>
       <c:legendPos val="r"/>
+      <c:layout/>
       <c:overlay val="0"/>
     </c:legend>
     <c:plotVisOnly val="1"/>
@@ -676,6 +677,7 @@
     </c:plotArea>
     <c:legend>
       <c:legendPos val="r"/>
+      <c:layout/>
       <c:overlay val="0"/>
     </c:legend>
     <c:plotVisOnly val="1"/>
@@ -1094,62 +1096,19 @@
           <a:p>
             <a:r>
               <a:rPr lang="en-US" dirty="0" smtClean="0"/>
-              <a:t>78%</a:t>
+              <a:t>Paper</a:t>
             </a:r>
             <a:r>
               <a:rPr lang="en-US" baseline="0" dirty="0" smtClean="0"/>
-              <a:t> of </a:t>
-            </a:r>
-            <a:r>
-              <a:rPr lang="en-US" baseline="0" dirty="0" smtClean="0"/>
-              <a:t>180 survey </a:t>
-            </a:r>
-            <a:r>
-              <a:rPr lang="en-US" baseline="0" dirty="0" smtClean="0"/>
-              <a:t>respondents believe mobile phone location data collection can pose a privacy </a:t>
-            </a:r>
-            <a:r>
-              <a:rPr lang="en-US" baseline="0" dirty="0" smtClean="0"/>
-              <a:t>threat. 85 – 87% care who views their </a:t>
-            </a:r>
-            <a:r>
-              <a:rPr lang="en-US" baseline="0" dirty="0" err="1" smtClean="0"/>
-              <a:t>loc</a:t>
-            </a:r>
-            <a:r>
-              <a:rPr lang="en-US" baseline="0" dirty="0" smtClean="0"/>
-              <a:t> info.</a:t>
-            </a:r>
-            <a:endParaRPr lang="en-US" baseline="0" dirty="0" smtClean="0"/>
-          </a:p>
-          <a:p>
-            <a:r>
-              <a:rPr lang="en-US" baseline="0" dirty="0" smtClean="0"/>
-              <a:t>APIs that use the android “Location” object. The standard mechanism for using location in android </a:t>
-            </a:r>
-            <a:r>
-              <a:rPr lang="en-US" baseline="0" dirty="0" smtClean="0"/>
-              <a:t>apps</a:t>
-            </a:r>
-          </a:p>
-          <a:p>
-            <a:endParaRPr lang="en-US" baseline="0" dirty="0" smtClean="0"/>
-          </a:p>
-          <a:p>
-            <a:r>
-              <a:rPr lang="en-US" baseline="0" dirty="0" smtClean="0"/>
-              <a:t>“Available application APIs” refers to the Android Location object, which is the only way most apps can view loc. </a:t>
-            </a:r>
-          </a:p>
-          <a:p>
-            <a:r>
-              <a:rPr lang="en-US" baseline="0" dirty="0" smtClean="0"/>
-              <a:t>Carrier can use cell towers, these are not included.</a:t>
-            </a:r>
-            <a:endParaRPr lang="en-US" baseline="0" dirty="0" smtClean="0"/>
-          </a:p>
-          <a:p>
-            <a:endParaRPr lang="en-US" dirty="0"/>
+              <a:t> presented at the 2014 ACM SIGSAC Conference on Computer and Communications Security</a:t>
+            </a:r>
+          </a:p>
+          <a:p>
+            <a:r>
+              <a:rPr lang="en-US" i="1" baseline="0" dirty="0" smtClean="0"/>
+              <a:t>(SIGSAC = Special Interest Group on Security, Audit, and Control)</a:t>
+            </a:r>
+            <a:endParaRPr lang="en-US" i="1" dirty="0"/>
           </a:p>
         </p:txBody>
       </p:sp>
@@ -1170,7 +1129,7 @@
           <a:p>
             <a:fld id="{B8B3BC3C-0900-4ACD-9030-5BE6C2442A68}" type="slidenum">
               <a:rPr lang="en-US" smtClean="0"/>
-              <a:t>2</a:t>
+              <a:t>1</a:t>
             </a:fld>
             <a:endParaRPr lang="en-US" dirty="0"/>
           </a:p>
@@ -1179,7 +1138,7 @@
     </p:spTree>
     <p:extLst>
       <p:ext uri="{BB962C8B-B14F-4D97-AF65-F5344CB8AC3E}">
-        <p14:creationId xmlns:p14="http://schemas.microsoft.com/office/powerpoint/2010/main" val="3352367101"/>
+        <p14:creationId xmlns:p14="http://schemas.microsoft.com/office/powerpoint/2010/main" val="240085532"/>
       </p:ext>
     </p:extLst>
   </p:cSld>
@@ -1235,36 +1194,7 @@
           <a:p>
             <a:r>
               <a:rPr lang="en-US" dirty="0" smtClean="0"/>
-              <a:t>Diagram:</a:t>
-            </a:r>
-            <a:r>
-              <a:rPr lang="en-US" baseline="0" dirty="0" smtClean="0"/>
-              <a:t> LMS = Location Management Services, GMS = Google Play Services?</a:t>
-            </a:r>
-          </a:p>
-          <a:p>
-            <a:endParaRPr lang="en-US" baseline="0" dirty="0" smtClean="0"/>
-          </a:p>
-          <a:p>
-            <a:r>
-              <a:rPr lang="en-US" dirty="0" smtClean="0"/>
-              <a:t>Alternative approach to implementation: modify each application’s location accessing</a:t>
-            </a:r>
-            <a:r>
-              <a:rPr lang="en-US" baseline="0" dirty="0" smtClean="0"/>
-              <a:t> interface</a:t>
-            </a:r>
-          </a:p>
-          <a:p>
-            <a:pPr marL="0" indent="0">
-              <a:buFont typeface="Wingdings" panose="05000000000000000000" pitchFamily="2" charset="2"/>
-              <a:buNone/>
-            </a:pPr>
-            <a:r>
-              <a:rPr lang="en-US" baseline="0" dirty="0" smtClean="0">
-                <a:sym typeface="Wingdings" panose="05000000000000000000" pitchFamily="2" charset="2"/>
-              </a:rPr>
-              <a:t>Disadvantages to this approach:</a:t>
+              <a:t>Rule Manager: </a:t>
             </a:r>
           </a:p>
           <a:p>
@@ -1273,10 +1203,12 @@
               <a:buChar char="•"/>
             </a:pPr>
             <a:r>
-              <a:rPr lang="en-US" baseline="0" dirty="0" smtClean="0">
-                <a:sym typeface="Wingdings" panose="05000000000000000000" pitchFamily="2" charset="2"/>
-              </a:rPr>
-              <a:t>Requires repackaging the application, which changes its signature  may prevent updates and access to content that checks the signature</a:t>
+              <a:rPr lang="en-US" dirty="0" smtClean="0"/>
+              <a:t>Input: the application, the state of the application (foreground or background), the location sample, whether</a:t>
+            </a:r>
+            <a:r>
+              <a:rPr lang="en-US" baseline="0" dirty="0" smtClean="0"/>
+              <a:t> the application session is new or an ongoing session, and the place/city/block</a:t>
             </a:r>
           </a:p>
           <a:p>
@@ -1285,10 +1217,8 @@
               <a:buChar char="•"/>
             </a:pPr>
             <a:r>
-              <a:rPr lang="en-US" baseline="0" dirty="0" smtClean="0">
-                <a:sym typeface="Wingdings" panose="05000000000000000000" pitchFamily="2" charset="2"/>
-              </a:rPr>
-              <a:t>Users would need to download the applications from a different App Store</a:t>
+              <a:rPr lang="en-US" baseline="0" dirty="0" smtClean="0"/>
+              <a:t>Global rules: one per application (applies to foreground and background states)</a:t>
             </a:r>
           </a:p>
           <a:p>
@@ -1297,10 +1227,8 @@
               <a:buChar char="•"/>
             </a:pPr>
             <a:r>
-              <a:rPr lang="en-US" baseline="0" dirty="0" smtClean="0">
-                <a:sym typeface="Wingdings" panose="05000000000000000000" pitchFamily="2" charset="2"/>
-              </a:rPr>
-              <a:t>Continued “maintenance” required to keep up with the all released applications</a:t>
+              <a:rPr lang="en-US" baseline="0" dirty="0" smtClean="0"/>
+              <a:t>Per-place rules: one per application-location combination</a:t>
             </a:r>
           </a:p>
           <a:p>
@@ -1308,14 +1236,16 @@
               <a:buFont typeface="Arial" panose="020B0604020202020204" pitchFamily="34" charset="0"/>
               <a:buChar char="•"/>
             </a:pPr>
-            <a:endParaRPr lang="en-US" baseline="0" dirty="0" smtClean="0">
-              <a:sym typeface="Wingdings" panose="05000000000000000000" pitchFamily="2" charset="2"/>
-            </a:endParaRPr>
-          </a:p>
-          <a:p>
+            <a:endParaRPr lang="en-US" baseline="0" dirty="0" smtClean="0"/>
+          </a:p>
+          <a:p>
+            <a:pPr marL="0" indent="0">
+              <a:buFont typeface="Arial" panose="020B0604020202020204" pitchFamily="34" charset="0"/>
+              <a:buNone/>
+            </a:pPr>
             <a:r>
               <a:rPr lang="en-US" baseline="0" dirty="0" smtClean="0"/>
-              <a:t>Static context field addition allows:</a:t>
+              <a:t>Place/City Detector:</a:t>
             </a:r>
           </a:p>
           <a:p>
@@ -1325,7 +1255,7 @@
             </a:pPr>
             <a:r>
               <a:rPr lang="en-US" baseline="0" dirty="0" smtClean="0"/>
-              <a:t>Access to information about which application is requesting the location</a:t>
+              <a:t>Place = a cluster of locations within a radius of 100m and over a minimum duration of 5 minutes</a:t>
             </a:r>
           </a:p>
           <a:p>
@@ -1335,17 +1265,9 @@
             </a:pPr>
             <a:r>
               <a:rPr lang="en-US" baseline="0" dirty="0" smtClean="0"/>
-              <a:t>Ability to communicate with the Operating System and other processes</a:t>
-            </a:r>
-          </a:p>
-          <a:p>
-            <a:endParaRPr lang="en-US" baseline="0" dirty="0" smtClean="0"/>
-          </a:p>
-          <a:p>
-            <a:r>
-              <a:rPr lang="en-US" baseline="0" dirty="0" smtClean="0"/>
-              <a:t>Note of OS for smartphones: Android, Windows Phone, and Blackberry all use the permission model for applications versus. iOS which uses explicit user authentication for each access</a:t>
-            </a:r>
+              <a:t>Mobility Model = set of places the user has visited along with total visiting time of each place</a:t>
+            </a:r>
+            <a:endParaRPr lang="en-US" dirty="0"/>
           </a:p>
         </p:txBody>
       </p:sp>
@@ -1371,7 +1293,7 @@
                 </a:solidFill>
               </a:rPr>
               <a:pPr/>
-              <a:t>11</a:t>
+              <a:t>10</a:t>
             </a:fld>
             <a:endParaRPr lang="en-US" dirty="0">
               <a:solidFill>
@@ -1384,7 +1306,7 @@
     </p:spTree>
     <p:extLst>
       <p:ext uri="{BB962C8B-B14F-4D97-AF65-F5344CB8AC3E}">
-        <p14:creationId xmlns:p14="http://schemas.microsoft.com/office/powerpoint/2010/main" val="3461803317"/>
+        <p14:creationId xmlns:p14="http://schemas.microsoft.com/office/powerpoint/2010/main" val="2493574430"/>
       </p:ext>
     </p:extLst>
   </p:cSld>
@@ -1440,11 +1362,11 @@
           <a:p>
             <a:r>
               <a:rPr lang="en-US" dirty="0" smtClean="0"/>
-              <a:t>Introduction</a:t>
+              <a:t>Diagram:</a:t>
             </a:r>
             <a:r>
               <a:rPr lang="en-US" baseline="0" dirty="0" smtClean="0"/>
-              <a:t> to the slides: Three instances of LP-Guardian use that require user interaction…</a:t>
+              <a:t> LMS = Location Management Services, GMS = Google Play Services?</a:t>
             </a:r>
           </a:p>
           <a:p>
@@ -1452,8 +1374,24 @@
           </a:p>
           <a:p>
             <a:r>
+              <a:rPr lang="en-US" dirty="0" smtClean="0"/>
+              <a:t>Alternative approach to implementation: modify each application’s location accessing</a:t>
+            </a:r>
+            <a:r>
               <a:rPr lang="en-US" baseline="0" dirty="0" smtClean="0"/>
-              <a:t>When a user chooses to hide his or her location, two options:</a:t>
+              <a:t> interface</a:t>
+            </a:r>
+          </a:p>
+          <a:p>
+            <a:pPr marL="0" indent="0">
+              <a:buFont typeface="Wingdings" panose="05000000000000000000" pitchFamily="2" charset="2"/>
+              <a:buNone/>
+            </a:pPr>
+            <a:r>
+              <a:rPr lang="en-US" baseline="0" dirty="0" smtClean="0">
+                <a:sym typeface="Wingdings" panose="05000000000000000000" pitchFamily="2" charset="2"/>
+              </a:rPr>
+              <a:t>Disadvantages to this approach:</a:t>
             </a:r>
           </a:p>
           <a:p>
@@ -1462,8 +1400,10 @@
               <a:buChar char="•"/>
             </a:pPr>
             <a:r>
-              <a:rPr lang="en-US" baseline="0" dirty="0" smtClean="0"/>
-              <a:t>City-level coarsening</a:t>
+              <a:rPr lang="en-US" baseline="0" dirty="0" smtClean="0">
+                <a:sym typeface="Wingdings" panose="05000000000000000000" pitchFamily="2" charset="2"/>
+              </a:rPr>
+              <a:t>Requires repackaging the application, which changes its signature  may prevent updates and access to content that checks the signature</a:t>
             </a:r>
           </a:p>
           <a:p>
@@ -1472,38 +1412,10 @@
               <a:buChar char="•"/>
             </a:pPr>
             <a:r>
-              <a:rPr lang="en-US" baseline="0" dirty="0" smtClean="0"/>
-              <a:t>Note: </a:t>
-            </a:r>
-            <a:r>
-              <a:rPr lang="en-US" i="1" baseline="0" dirty="0" smtClean="0"/>
-              <a:t>p</a:t>
-            </a:r>
-            <a:r>
-              <a:rPr lang="en-US" i="1" baseline="-25000" dirty="0" smtClean="0"/>
-              <a:t>min</a:t>
-            </a:r>
-            <a:r>
-              <a:rPr lang="en-US" i="1" baseline="0" dirty="0" smtClean="0"/>
-              <a:t> </a:t>
-            </a:r>
-            <a:r>
-              <a:rPr lang="en-US" i="0" baseline="0" dirty="0" smtClean="0"/>
-              <a:t>for identification protection defaults to 0.0005 = 30 minutes at a certain location each day for 40 days</a:t>
-            </a:r>
-            <a:endParaRPr lang="en-US" i="0" dirty="0" smtClean="0"/>
-          </a:p>
-          <a:p>
-            <a:endParaRPr lang="en-US" dirty="0" smtClean="0"/>
-          </a:p>
-          <a:p>
-            <a:r>
-              <a:rPr lang="en-US" dirty="0" smtClean="0"/>
-              <a:t>Placement of prompts</a:t>
-            </a:r>
-            <a:r>
-              <a:rPr lang="en-US" baseline="0" dirty="0" smtClean="0"/>
-              <a:t> for controlling resource access obey the four main rules/objectives:</a:t>
+              <a:rPr lang="en-US" baseline="0" dirty="0" smtClean="0">
+                <a:sym typeface="Wingdings" panose="05000000000000000000" pitchFamily="2" charset="2"/>
+              </a:rPr>
+              <a:t>Users would need to download the applications from a different App Store</a:t>
             </a:r>
           </a:p>
           <a:p>
@@ -1512,8 +1424,10 @@
               <a:buChar char="•"/>
             </a:pPr>
             <a:r>
-              <a:rPr lang="en-US" baseline="0" dirty="0" smtClean="0"/>
-              <a:t>Safety – user prompt precedes every resource access</a:t>
+              <a:rPr lang="en-US" baseline="0" dirty="0" smtClean="0">
+                <a:sym typeface="Wingdings" panose="05000000000000000000" pitchFamily="2" charset="2"/>
+              </a:rPr>
+              <a:t>Continued “maintenance” required to keep up with the all released applications</a:t>
             </a:r>
           </a:p>
           <a:p>
@@ -1521,19 +1435,15 @@
               <a:buFont typeface="Arial" panose="020B0604020202020204" pitchFamily="34" charset="0"/>
               <a:buChar char="•"/>
             </a:pPr>
+            <a:endParaRPr lang="en-US" baseline="0" dirty="0" smtClean="0">
+              <a:sym typeface="Wingdings" panose="05000000000000000000" pitchFamily="2" charset="2"/>
+            </a:endParaRPr>
+          </a:p>
+          <a:p>
             <a:r>
               <a:rPr lang="en-US" baseline="0" dirty="0" smtClean="0"/>
-              <a:t>Frugality – user prompt is </a:t>
-            </a:r>
-            <a:r>
-              <a:rPr lang="en-US" i="1" baseline="0" dirty="0" smtClean="0"/>
-              <a:t>only</a:t>
-            </a:r>
-            <a:r>
-              <a:rPr lang="en-US" i="0" baseline="0" dirty="0" smtClean="0"/>
-              <a:t> displayed in the event of a resource access</a:t>
-            </a:r>
-            <a:endParaRPr lang="en-US" baseline="0" dirty="0" smtClean="0"/>
+              <a:t>Static context field addition allows:</a:t>
+            </a:r>
           </a:p>
           <a:p>
             <a:pPr marL="171450" indent="-171450">
@@ -1542,7 +1452,7 @@
             </a:pPr>
             <a:r>
               <a:rPr lang="en-US" baseline="0" dirty="0" smtClean="0"/>
-              <a:t>Visibility – user prompt displayed only if the application in the foreground is attempting to access a resource</a:t>
+              <a:t>Access to information about which application is requesting the location</a:t>
             </a:r>
           </a:p>
           <a:p>
@@ -1552,9 +1462,17 @@
             </a:pPr>
             <a:r>
               <a:rPr lang="en-US" baseline="0" dirty="0" smtClean="0"/>
-              <a:t>Non-repetitiveness – prompt never displayed when a more critical resource of the same type has been authorized (implied authorization)</a:t>
-            </a:r>
-            <a:endParaRPr lang="en-US" dirty="0"/>
+              <a:t>Ability to communicate with the Operating System and other processes</a:t>
+            </a:r>
+          </a:p>
+          <a:p>
+            <a:endParaRPr lang="en-US" baseline="0" dirty="0" smtClean="0"/>
+          </a:p>
+          <a:p>
+            <a:r>
+              <a:rPr lang="en-US" baseline="0" dirty="0" smtClean="0"/>
+              <a:t>Note of OS for smartphones: Android, Windows Phone, and Blackberry all use the permission model for applications versus. iOS which uses explicit user authentication for each access</a:t>
+            </a:r>
           </a:p>
         </p:txBody>
       </p:sp>
@@ -1580,7 +1498,7 @@
                 </a:solidFill>
               </a:rPr>
               <a:pPr/>
-              <a:t>12</a:t>
+              <a:t>11</a:t>
             </a:fld>
             <a:endParaRPr lang="en-US" dirty="0">
               <a:solidFill>
@@ -1593,7 +1511,7 @@
     </p:spTree>
     <p:extLst>
       <p:ext uri="{BB962C8B-B14F-4D97-AF65-F5344CB8AC3E}">
-        <p14:creationId xmlns:p14="http://schemas.microsoft.com/office/powerpoint/2010/main" val="1009101082"/>
+        <p14:creationId xmlns:p14="http://schemas.microsoft.com/office/powerpoint/2010/main" val="3461803317"/>
       </p:ext>
     </p:extLst>
   </p:cSld>
@@ -1647,7 +1565,123 @@
           <a:bodyPr/>
           <a:lstStyle/>
           <a:p>
+            <a:r>
+              <a:rPr lang="en-US" dirty="0" smtClean="0"/>
+              <a:t>Introduction</a:t>
+            </a:r>
+            <a:r>
+              <a:rPr lang="en-US" baseline="0" dirty="0" smtClean="0"/>
+              <a:t> to the slides: Three instances of LP-Guardian use that require user interaction…</a:t>
+            </a:r>
+          </a:p>
+          <a:p>
+            <a:endParaRPr lang="en-US" baseline="0" dirty="0" smtClean="0"/>
+          </a:p>
+          <a:p>
+            <a:r>
+              <a:rPr lang="en-US" baseline="0" dirty="0" smtClean="0"/>
+              <a:t>When a user chooses to hide his or her location, two options:</a:t>
+            </a:r>
+          </a:p>
+          <a:p>
+            <a:pPr marL="171450" indent="-171450">
+              <a:buFont typeface="Arial" panose="020B0604020202020204" pitchFamily="34" charset="0"/>
+              <a:buChar char="•"/>
+            </a:pPr>
+            <a:r>
+              <a:rPr lang="en-US" baseline="0" dirty="0" smtClean="0"/>
+              <a:t>City-level coarsening</a:t>
+            </a:r>
+          </a:p>
+          <a:p>
+            <a:pPr marL="171450" indent="-171450">
+              <a:buFont typeface="Arial" panose="020B0604020202020204" pitchFamily="34" charset="0"/>
+              <a:buChar char="•"/>
+            </a:pPr>
+            <a:r>
+              <a:rPr lang="en-US" baseline="0" dirty="0" smtClean="0"/>
+              <a:t>Note: </a:t>
+            </a:r>
+            <a:r>
+              <a:rPr lang="en-US" i="1" baseline="0" dirty="0" smtClean="0"/>
+              <a:t>p</a:t>
+            </a:r>
+            <a:r>
+              <a:rPr lang="en-US" i="1" baseline="-25000" dirty="0" smtClean="0"/>
+              <a:t>min</a:t>
+            </a:r>
+            <a:r>
+              <a:rPr lang="en-US" i="1" baseline="0" dirty="0" smtClean="0"/>
+              <a:t> </a:t>
+            </a:r>
+            <a:r>
+              <a:rPr lang="en-US" i="0" baseline="0" dirty="0" smtClean="0"/>
+              <a:t>for identification protection defaults to 0.0005 = 30 minutes at a certain location each day for 40 days</a:t>
+            </a:r>
+            <a:endParaRPr lang="en-US" i="0" dirty="0" smtClean="0"/>
+          </a:p>
+          <a:p>
             <a:endParaRPr lang="en-US" dirty="0" smtClean="0"/>
+          </a:p>
+          <a:p>
+            <a:r>
+              <a:rPr lang="en-US" dirty="0" smtClean="0"/>
+              <a:t>Placement of prompts</a:t>
+            </a:r>
+            <a:r>
+              <a:rPr lang="en-US" baseline="0" dirty="0" smtClean="0"/>
+              <a:t> for controlling resource access obey the four main rules/objectives:</a:t>
+            </a:r>
+          </a:p>
+          <a:p>
+            <a:pPr marL="171450" indent="-171450">
+              <a:buFont typeface="Arial" panose="020B0604020202020204" pitchFamily="34" charset="0"/>
+              <a:buChar char="•"/>
+            </a:pPr>
+            <a:r>
+              <a:rPr lang="en-US" baseline="0" dirty="0" smtClean="0"/>
+              <a:t>Safety – user prompt precedes every resource access</a:t>
+            </a:r>
+          </a:p>
+          <a:p>
+            <a:pPr marL="171450" indent="-171450">
+              <a:buFont typeface="Arial" panose="020B0604020202020204" pitchFamily="34" charset="0"/>
+              <a:buChar char="•"/>
+            </a:pPr>
+            <a:r>
+              <a:rPr lang="en-US" baseline="0" dirty="0" smtClean="0"/>
+              <a:t>Frugality – user prompt is </a:t>
+            </a:r>
+            <a:r>
+              <a:rPr lang="en-US" i="1" baseline="0" dirty="0" smtClean="0"/>
+              <a:t>only</a:t>
+            </a:r>
+            <a:r>
+              <a:rPr lang="en-US" i="0" baseline="0" dirty="0" smtClean="0"/>
+              <a:t> displayed in the event of a resource access</a:t>
+            </a:r>
+            <a:endParaRPr lang="en-US" baseline="0" dirty="0" smtClean="0"/>
+          </a:p>
+          <a:p>
+            <a:pPr marL="171450" indent="-171450">
+              <a:buFont typeface="Arial" panose="020B0604020202020204" pitchFamily="34" charset="0"/>
+              <a:buChar char="•"/>
+            </a:pPr>
+            <a:r>
+              <a:rPr lang="en-US" baseline="0" dirty="0" smtClean="0"/>
+              <a:t>Visibility – user prompt displayed only if the application in the foreground is attempting to access a resource</a:t>
+            </a:r>
+          </a:p>
+          <a:p>
+            <a:pPr marL="171450" indent="-171450">
+              <a:buFont typeface="Arial" panose="020B0604020202020204" pitchFamily="34" charset="0"/>
+              <a:buChar char="•"/>
+            </a:pPr>
+            <a:r>
+              <a:rPr lang="en-US" baseline="0" dirty="0" smtClean="0"/>
+              <a:t>Non-repetitiveness – prompt never displayed when a more critical resource of the same type has been authorized (implied authorization)</a:t>
+            </a:r>
+            <a:endParaRPr lang="en-US" dirty="0"/>
           </a:p>
         </p:txBody>
       </p:sp>
@@ -1667,17 +1701,26 @@
           <a:lstStyle/>
           <a:p>
             <a:fld id="{B8B3BC3C-0900-4ACD-9030-5BE6C2442A68}" type="slidenum">
-              <a:rPr lang="en-US" smtClean="0"/>
-              <a:t>13</a:t>
+              <a:rPr lang="en-US" smtClean="0">
+                <a:solidFill>
+                  <a:prstClr val="black"/>
+                </a:solidFill>
+              </a:rPr>
+              <a:pPr/>
+              <a:t>12</a:t>
             </a:fld>
-            <a:endParaRPr lang="en-US"/>
+            <a:endParaRPr lang="en-US" dirty="0">
+              <a:solidFill>
+                <a:prstClr val="black"/>
+              </a:solidFill>
+            </a:endParaRPr>
           </a:p>
         </p:txBody>
       </p:sp>
     </p:spTree>
     <p:extLst>
       <p:ext uri="{BB962C8B-B14F-4D97-AF65-F5344CB8AC3E}">
-        <p14:creationId xmlns:p14="http://schemas.microsoft.com/office/powerpoint/2010/main" val="3574496599"/>
+        <p14:creationId xmlns:p14="http://schemas.microsoft.com/office/powerpoint/2010/main" val="1009101082"/>
       </p:ext>
     </p:extLst>
   </p:cSld>
@@ -1731,25 +1774,7 @@
           <a:bodyPr/>
           <a:lstStyle/>
           <a:p>
-            <a:r>
-              <a:rPr lang="en-US" dirty="0" smtClean="0"/>
-              <a:t>Looking to see if there is a  market for an app like LP-Guardian</a:t>
-            </a:r>
-          </a:p>
-          <a:p>
-            <a:r>
-              <a:rPr lang="en-US" dirty="0" smtClean="0"/>
-              <a:t>70 from social network announcements, 110 from amazon</a:t>
-            </a:r>
-            <a:r>
-              <a:rPr lang="en-US" baseline="0" dirty="0" smtClean="0"/>
-              <a:t> mechanical </a:t>
-            </a:r>
-            <a:r>
-              <a:rPr lang="en-US" baseline="0" dirty="0" err="1" smtClean="0"/>
-              <a:t>turk</a:t>
-            </a:r>
-            <a:endParaRPr lang="en-US" dirty="0"/>
+            <a:endParaRPr lang="en-US" dirty="0" smtClean="0"/>
           </a:p>
         </p:txBody>
       </p:sp>
@@ -1770,9 +1795,9 @@
           <a:p>
             <a:fld id="{B8B3BC3C-0900-4ACD-9030-5BE6C2442A68}" type="slidenum">
               <a:rPr lang="en-US" smtClean="0"/>
-              <a:t>14</a:t>
+              <a:t>13</a:t>
             </a:fld>
-            <a:endParaRPr lang="en-US"/>
+            <a:endParaRPr lang="en-US" dirty="0"/>
           </a:p>
         </p:txBody>
       </p:sp>
@@ -1835,11 +1860,21 @@
           <a:p>
             <a:r>
               <a:rPr lang="en-US" dirty="0" smtClean="0"/>
-              <a:t>82% indicate no problem</a:t>
+              <a:t>Looking to see if there is a  market for an app like LP-Guardian</a:t>
+            </a:r>
+          </a:p>
+          <a:p>
+            <a:r>
+              <a:rPr lang="en-US" dirty="0" smtClean="0"/>
+              <a:t>70 from social network announcements, 110 from </a:t>
+            </a:r>
+            <a:r>
+              <a:rPr lang="en-US" dirty="0" smtClean="0"/>
+              <a:t>Amazon</a:t>
             </a:r>
             <a:r>
               <a:rPr lang="en-US" baseline="0" dirty="0" smtClean="0"/>
-              <a:t> sharing city level location for social networking</a:t>
+              <a:t> Mechanical Turk</a:t>
             </a:r>
             <a:endParaRPr lang="en-US" dirty="0"/>
           </a:p>
@@ -1862,9 +1897,9 @@
           <a:p>
             <a:fld id="{B8B3BC3C-0900-4ACD-9030-5BE6C2442A68}" type="slidenum">
               <a:rPr lang="en-US" smtClean="0"/>
-              <a:t>15</a:t>
+              <a:t>14</a:t>
             </a:fld>
-            <a:endParaRPr lang="en-US"/>
+            <a:endParaRPr lang="en-US" dirty="0"/>
           </a:p>
         </p:txBody>
       </p:sp>
@@ -1927,11 +1962,11 @@
           <a:p>
             <a:r>
               <a:rPr lang="en-US" dirty="0" smtClean="0"/>
-              <a:t>78% indicate no problem</a:t>
+              <a:t>82% indicate no problem</a:t>
             </a:r>
             <a:r>
               <a:rPr lang="en-US" baseline="0" dirty="0" smtClean="0"/>
-              <a:t> sharing city level location for messaging.</a:t>
+              <a:t> sharing city level location for social networking</a:t>
             </a:r>
             <a:endParaRPr lang="en-US" dirty="0"/>
           </a:p>
@@ -1954,9 +1989,9 @@
           <a:p>
             <a:fld id="{B8B3BC3C-0900-4ACD-9030-5BE6C2442A68}" type="slidenum">
               <a:rPr lang="en-US" smtClean="0"/>
-              <a:t>16</a:t>
+              <a:t>15</a:t>
             </a:fld>
-            <a:endParaRPr lang="en-US"/>
+            <a:endParaRPr lang="en-US" dirty="0"/>
           </a:p>
         </p:txBody>
       </p:sp>
@@ -2019,7 +2054,11 @@
           <a:p>
             <a:r>
               <a:rPr lang="en-US" dirty="0" smtClean="0"/>
-              <a:t>Conclusion is that users generally won’t mind some loss in app location functionality at home/work</a:t>
+              <a:t>78% indicate no problem</a:t>
+            </a:r>
+            <a:r>
+              <a:rPr lang="en-US" baseline="0" dirty="0" smtClean="0"/>
+              <a:t> sharing city level location for messaging.</a:t>
             </a:r>
             <a:endParaRPr lang="en-US" dirty="0"/>
           </a:p>
@@ -2042,9 +2081,9 @@
           <a:p>
             <a:fld id="{B8B3BC3C-0900-4ACD-9030-5BE6C2442A68}" type="slidenum">
               <a:rPr lang="en-US" smtClean="0"/>
-              <a:t>17</a:t>
+              <a:t>16</a:t>
             </a:fld>
-            <a:endParaRPr lang="en-US"/>
+            <a:endParaRPr lang="en-US" dirty="0"/>
           </a:p>
         </p:txBody>
       </p:sp>
@@ -2107,62 +2146,7 @@
           <a:p>
             <a:r>
               <a:rPr lang="en-US" dirty="0" smtClean="0"/>
-              <a:t>Looked</a:t>
-            </a:r>
-            <a:r>
-              <a:rPr lang="en-US" baseline="0" dirty="0" smtClean="0"/>
-              <a:t> at 40 location accessing apps and took average</a:t>
-            </a:r>
-          </a:p>
-          <a:p>
-            <a:r>
-              <a:rPr lang="en-US" baseline="0" dirty="0" smtClean="0"/>
-              <a:t>Inside: </a:t>
-            </a:r>
-            <a:r>
-              <a:rPr lang="en-US" baseline="0" dirty="0" err="1" smtClean="0"/>
-              <a:t>anonymization</a:t>
-            </a:r>
-            <a:r>
-              <a:rPr lang="en-US" baseline="0" dirty="0" smtClean="0"/>
-              <a:t> delay for worst-case scenario</a:t>
-            </a:r>
-          </a:p>
-          <a:p>
-            <a:r>
-              <a:rPr lang="en-US" sz="1200" b="0" i="0" u="none" strike="noStrike" kern="1200" baseline="0" dirty="0" err="1" smtClean="0">
-                <a:solidFill>
-                  <a:schemeClr val="tx1"/>
-                </a:solidFill>
-                <a:latin typeface="+mn-lt"/>
-                <a:ea typeface="+mn-ea"/>
-                <a:cs typeface="+mn-cs"/>
-              </a:rPr>
-              <a:t>LPGuardian</a:t>
-            </a:r>
-            <a:r>
-              <a:rPr lang="en-US" sz="1200" b="0" i="0" u="none" strike="noStrike" kern="1200" baseline="0" dirty="0" smtClean="0">
-                <a:solidFill>
-                  <a:schemeClr val="tx1"/>
-                </a:solidFill>
-                <a:latin typeface="+mn-lt"/>
-                <a:ea typeface="+mn-ea"/>
-                <a:cs typeface="+mn-cs"/>
-              </a:rPr>
-              <a:t> temporarily caches location, the delay value increases with the increase of the inter-request interval.</a:t>
-            </a:r>
-          </a:p>
-          <a:p>
-            <a:r>
-              <a:rPr lang="en-US" sz="1200" b="0" i="0" u="none" strike="noStrike" kern="1200" baseline="0" dirty="0" smtClean="0">
-                <a:solidFill>
-                  <a:schemeClr val="tx1"/>
-                </a:solidFill>
-                <a:latin typeface="+mn-lt"/>
-                <a:ea typeface="+mn-ea"/>
-                <a:cs typeface="+mn-cs"/>
-              </a:rPr>
-              <a:t>Conclusion: LP-Guardian imposes a maximum delay of 30ms every 750ms which shouldn’t impact the app usability.</a:t>
+              <a:t>Conclusion is that users generally won’t mind some loss in app location functionality at home/work</a:t>
             </a:r>
             <a:endParaRPr lang="en-US" dirty="0"/>
           </a:p>
@@ -2185,9 +2169,9 @@
           <a:p>
             <a:fld id="{B8B3BC3C-0900-4ACD-9030-5BE6C2442A68}" type="slidenum">
               <a:rPr lang="en-US" smtClean="0"/>
-              <a:t>18</a:t>
+              <a:t>17</a:t>
             </a:fld>
-            <a:endParaRPr lang="en-US"/>
+            <a:endParaRPr lang="en-US" dirty="0"/>
           </a:p>
         </p:txBody>
       </p:sp>
@@ -2256,6 +2240,49 @@
               <a:rPr lang="en-US" baseline="0" dirty="0" smtClean="0"/>
               <a:t> at 40 location accessing apps and took average</a:t>
             </a:r>
+          </a:p>
+          <a:p>
+            <a:r>
+              <a:rPr lang="en-US" baseline="0" dirty="0" smtClean="0"/>
+              <a:t>Inside: anonymization delay for worst-case scenario</a:t>
+            </a:r>
+          </a:p>
+          <a:p>
+            <a:r>
+              <a:rPr lang="en-US" sz="1200" b="0" i="0" u="none" strike="noStrike" kern="1200" baseline="0" dirty="0" smtClean="0">
+                <a:solidFill>
+                  <a:schemeClr val="tx1"/>
+                </a:solidFill>
+                <a:latin typeface="+mn-lt"/>
+                <a:ea typeface="+mn-ea"/>
+                <a:cs typeface="+mn-cs"/>
+              </a:rPr>
+              <a:t>LP-Guardian </a:t>
+            </a:r>
+            <a:r>
+              <a:rPr lang="en-US" sz="1200" b="0" i="0" u="none" strike="noStrike" kern="1200" baseline="0" dirty="0" smtClean="0">
+                <a:solidFill>
+                  <a:schemeClr val="tx1"/>
+                </a:solidFill>
+                <a:latin typeface="+mn-lt"/>
+                <a:ea typeface="+mn-ea"/>
+                <a:cs typeface="+mn-cs"/>
+              </a:rPr>
+              <a:t>temporarily caches location, the delay value increases with the increase of the inter-request interval.</a:t>
+            </a:r>
+          </a:p>
+          <a:p>
+            <a:r>
+              <a:rPr lang="en-US" sz="1200" b="0" i="0" u="none" strike="noStrike" kern="1200" baseline="0" dirty="0" smtClean="0">
+                <a:solidFill>
+                  <a:schemeClr val="tx1"/>
+                </a:solidFill>
+                <a:latin typeface="+mn-lt"/>
+                <a:ea typeface="+mn-ea"/>
+                <a:cs typeface="+mn-cs"/>
+              </a:rPr>
+              <a:t>Conclusion: LP-Guardian imposes a maximum delay of 30ms every 750ms which shouldn’t impact the app usability.</a:t>
+            </a:r>
             <a:endParaRPr lang="en-US" dirty="0"/>
           </a:p>
         </p:txBody>
@@ -2277,9 +2304,9 @@
           <a:p>
             <a:fld id="{B8B3BC3C-0900-4ACD-9030-5BE6C2442A68}" type="slidenum">
               <a:rPr lang="en-US" smtClean="0"/>
-              <a:t>19</a:t>
+              <a:t>18</a:t>
             </a:fld>
-            <a:endParaRPr lang="en-US"/>
+            <a:endParaRPr lang="en-US" dirty="0"/>
           </a:p>
         </p:txBody>
       </p:sp>
@@ -2341,83 +2368,14 @@
           <a:lstStyle/>
           <a:p>
             <a:r>
-              <a:rPr lang="en-US" dirty="0" err="1" smtClean="0"/>
-              <a:t>P</a:t>
-            </a:r>
-            <a:r>
-              <a:rPr lang="en-US" baseline="-25000" dirty="0" err="1" smtClean="0"/>
-              <a:t>min</a:t>
-            </a:r>
-            <a:r>
               <a:rPr lang="en-US" dirty="0" smtClean="0"/>
-              <a:t> of 0.05 is more relaxed</a:t>
-            </a:r>
-          </a:p>
-          <a:p>
-            <a:r>
-              <a:rPr lang="en-US" dirty="0" smtClean="0"/>
-              <a:t>Cumulative Distribution Function: </a:t>
-            </a:r>
-            <a:r>
-              <a:rPr lang="en-US" sz="1200" b="0" i="0" u="none" strike="noStrike" kern="1200" baseline="0" dirty="0" smtClean="0">
-                <a:solidFill>
-                  <a:schemeClr val="tx1"/>
-                </a:solidFill>
-                <a:latin typeface="+mn-lt"/>
-                <a:ea typeface="+mn-ea"/>
-                <a:cs typeface="+mn-cs"/>
-              </a:rPr>
-              <a:t>report the percentage of sessions in which app functionality is negatively affected</a:t>
-            </a:r>
-            <a:endParaRPr lang="en-US" dirty="0" smtClean="0"/>
-          </a:p>
-          <a:p>
-            <a:r>
-              <a:rPr lang="en-US" sz="1200" b="0" i="0" u="none" strike="noStrike" kern="1200" baseline="0" dirty="0" smtClean="0">
-                <a:solidFill>
-                  <a:schemeClr val="tx1"/>
-                </a:solidFill>
-                <a:latin typeface="+mn-lt"/>
-                <a:ea typeface="+mn-ea"/>
-                <a:cs typeface="+mn-cs"/>
-              </a:rPr>
-              <a:t>More than 60% of the sessions are released for more than 60% of the users in the more privacy-constraint scenario of </a:t>
-            </a:r>
-            <a:r>
-              <a:rPr lang="en-US" sz="1200" b="0" i="0" u="none" strike="noStrike" kern="1200" baseline="0" dirty="0" err="1" smtClean="0">
-                <a:solidFill>
-                  <a:schemeClr val="tx1"/>
-                </a:solidFill>
-                <a:latin typeface="+mn-lt"/>
-                <a:ea typeface="+mn-ea"/>
-                <a:cs typeface="+mn-cs"/>
-              </a:rPr>
-              <a:t>pmin</a:t>
-            </a:r>
-            <a:r>
-              <a:rPr lang="en-US" sz="1200" b="0" i="0" u="none" strike="noStrike" kern="1200" baseline="0" dirty="0" smtClean="0">
-                <a:solidFill>
-                  <a:schemeClr val="tx1"/>
-                </a:solidFill>
-                <a:latin typeface="+mn-lt"/>
-                <a:ea typeface="+mn-ea"/>
-                <a:cs typeface="+mn-cs"/>
-              </a:rPr>
-              <a:t> = 0:0005</a:t>
-            </a:r>
-          </a:p>
-          <a:p>
-            <a:r>
-              <a:rPr lang="en-US" sz="1200" b="0" i="0" u="none" strike="noStrike" kern="1200" baseline="0" dirty="0" smtClean="0">
-                <a:solidFill>
-                  <a:schemeClr val="tx1"/>
-                </a:solidFill>
-                <a:latin typeface="+mn-lt"/>
-                <a:ea typeface="+mn-ea"/>
-                <a:cs typeface="+mn-cs"/>
-              </a:rPr>
-              <a:t>Dummy: Adding dummy locations</a:t>
-            </a:r>
+              <a:t>Looked</a:t>
+            </a:r>
+            <a:r>
+              <a:rPr lang="en-US" baseline="0" dirty="0" smtClean="0"/>
+              <a:t> at 40 location accessing apps and took average</a:t>
+            </a:r>
+            <a:endParaRPr lang="en-US" dirty="0"/>
           </a:p>
         </p:txBody>
       </p:sp>
@@ -2438,9 +2396,9 @@
           <a:p>
             <a:fld id="{B8B3BC3C-0900-4ACD-9030-5BE6C2442A68}" type="slidenum">
               <a:rPr lang="en-US" smtClean="0"/>
-              <a:t>20</a:t>
+              <a:t>19</a:t>
             </a:fld>
-            <a:endParaRPr lang="en-US"/>
+            <a:endParaRPr lang="en-US" dirty="0"/>
           </a:p>
         </p:txBody>
       </p:sp>
@@ -2503,15 +2461,41 @@
           <a:p>
             <a:r>
               <a:rPr lang="en-US" dirty="0" smtClean="0"/>
-              <a:t>Anonymized</a:t>
+              <a:t>78%</a:t>
             </a:r>
             <a:r>
               <a:rPr lang="en-US" baseline="0" dirty="0" smtClean="0"/>
-              <a:t> data meant cell tower ping based only. 95% of actions could be linked to a specific individual in the anonymous </a:t>
+              <a:t> of 180 survey respondents believe mobile phone location data collection can pose a privacy threat. 85 – 87% care who views their </a:t>
             </a:r>
             <a:r>
               <a:rPr lang="en-US" baseline="0" dirty="0" smtClean="0"/>
-              <a:t>database</a:t>
+              <a:t>loc. </a:t>
+            </a:r>
+            <a:r>
+              <a:rPr lang="en-US" baseline="0" dirty="0" smtClean="0"/>
+              <a:t>info.</a:t>
+            </a:r>
+          </a:p>
+          <a:p>
+            <a:r>
+              <a:rPr lang="en-US" baseline="0" dirty="0" smtClean="0"/>
+              <a:t>APIs that use the </a:t>
+            </a:r>
+            <a:r>
+              <a:rPr lang="en-US" baseline="0" dirty="0" smtClean="0"/>
+              <a:t>Android </a:t>
+            </a:r>
+            <a:r>
+              <a:rPr lang="en-US" baseline="0" dirty="0" smtClean="0"/>
+              <a:t>“Location” object. The standard mechanism for using location in </a:t>
+            </a:r>
+            <a:r>
+              <a:rPr lang="en-US" baseline="0" dirty="0" smtClean="0"/>
+              <a:t>Android </a:t>
+            </a:r>
+            <a:r>
+              <a:rPr lang="en-US" baseline="0" dirty="0" smtClean="0"/>
+              <a:t>apps</a:t>
             </a:r>
           </a:p>
           <a:p>
@@ -2520,17 +2504,16 @@
           <a:p>
             <a:r>
               <a:rPr lang="en-US" baseline="0" dirty="0" smtClean="0"/>
-              <a:t>Apps fall on continuum between poor usability and poor security.</a:t>
-            </a:r>
-          </a:p>
-          <a:p>
-            <a:endParaRPr lang="en-US" baseline="0" dirty="0" smtClean="0"/>
+              <a:t>“Available application APIs” refers to the Android Location object, which is the only way most apps can view loc. </a:t>
+            </a:r>
           </a:p>
           <a:p>
             <a:r>
               <a:rPr lang="en-US" baseline="0" dirty="0" smtClean="0"/>
-              <a:t>Unrealistic assumptions cause many proposed solutions to be unworkable in real life. </a:t>
-            </a:r>
+              <a:t>Carrier can use cell towers, these are not included.</a:t>
+            </a:r>
+          </a:p>
+          <a:p>
             <a:endParaRPr lang="en-US" dirty="0"/>
           </a:p>
         </p:txBody>
@@ -2552,7 +2535,7 @@
           <a:p>
             <a:fld id="{B8B3BC3C-0900-4ACD-9030-5BE6C2442A68}" type="slidenum">
               <a:rPr lang="en-US" smtClean="0"/>
-              <a:t>3</a:t>
+              <a:t>2</a:t>
             </a:fld>
             <a:endParaRPr lang="en-US" dirty="0"/>
           </a:p>
@@ -2561,7 +2544,7 @@
     </p:spTree>
     <p:extLst>
       <p:ext uri="{BB962C8B-B14F-4D97-AF65-F5344CB8AC3E}">
-        <p14:creationId xmlns:p14="http://schemas.microsoft.com/office/powerpoint/2010/main" val="3899786191"/>
+        <p14:creationId xmlns:p14="http://schemas.microsoft.com/office/powerpoint/2010/main" val="3352367101"/>
       </p:ext>
     </p:extLst>
   </p:cSld>
@@ -2616,22 +2599,106 @@
           <a:lstStyle/>
           <a:p>
             <a:r>
+              <a:rPr lang="en-US" baseline="0" dirty="0" smtClean="0"/>
+              <a:t>p</a:t>
+            </a:r>
+            <a:r>
+              <a:rPr lang="en-US" baseline="-25000" dirty="0" smtClean="0"/>
+              <a:t>min</a:t>
+            </a:r>
+            <a:r>
               <a:rPr lang="en-US" dirty="0" smtClean="0"/>
-              <a:t>Tracking</a:t>
-            </a:r>
-            <a:r>
-              <a:rPr lang="en-US" baseline="0" dirty="0" smtClean="0"/>
-              <a:t> is not a big issue for normal apps. LP-Guardian handles special case such as fitness apps where location is accessed constantly </a:t>
-            </a:r>
-            <a:r>
-              <a:rPr lang="en-US" baseline="0" smtClean="0"/>
-              <a:t>and creates </a:t>
-            </a:r>
-            <a:r>
-              <a:rPr lang="en-US" baseline="0" dirty="0" smtClean="0"/>
-              <a:t>and artificial path.</a:t>
-            </a:r>
-            <a:endParaRPr lang="en-US" dirty="0"/>
+              <a:t> </a:t>
+            </a:r>
+            <a:r>
+              <a:rPr lang="en-US" dirty="0" smtClean="0"/>
+              <a:t>of 0.05 is more relaxed</a:t>
+            </a:r>
+          </a:p>
+          <a:p>
+            <a:r>
+              <a:rPr lang="en-US" dirty="0" smtClean="0"/>
+              <a:t>Cumulative Distribution Function: </a:t>
+            </a:r>
+            <a:r>
+              <a:rPr lang="en-US" sz="1200" b="0" i="0" u="none" strike="noStrike" kern="1200" baseline="0" dirty="0" smtClean="0">
+                <a:solidFill>
+                  <a:schemeClr val="tx1"/>
+                </a:solidFill>
+                <a:latin typeface="+mn-lt"/>
+                <a:ea typeface="+mn-ea"/>
+                <a:cs typeface="+mn-cs"/>
+              </a:rPr>
+              <a:t>report the percentage of sessions in which app functionality is negatively affected</a:t>
+            </a:r>
+            <a:endParaRPr lang="en-US" dirty="0" smtClean="0"/>
+          </a:p>
+          <a:p>
+            <a:r>
+              <a:rPr lang="en-US" sz="1200" b="0" i="0" u="none" strike="noStrike" kern="1200" baseline="0" dirty="0" smtClean="0">
+                <a:solidFill>
+                  <a:schemeClr val="tx1"/>
+                </a:solidFill>
+                <a:latin typeface="+mn-lt"/>
+                <a:ea typeface="+mn-ea"/>
+                <a:cs typeface="+mn-cs"/>
+              </a:rPr>
+              <a:t>More than 60% of the sessions are released for more than 60% of the users in the more privacy-constraint scenario of p</a:t>
+            </a:r>
+            <a:r>
+              <a:rPr lang="en-US" sz="1200" b="0" i="0" u="none" strike="noStrike" kern="1200" baseline="-25000" dirty="0" smtClean="0">
+                <a:solidFill>
+                  <a:schemeClr val="tx1"/>
+                </a:solidFill>
+                <a:latin typeface="+mn-lt"/>
+                <a:ea typeface="+mn-ea"/>
+                <a:cs typeface="+mn-cs"/>
+              </a:rPr>
+              <a:t>min</a:t>
+            </a:r>
+            <a:r>
+              <a:rPr lang="en-US" sz="1200" b="0" i="0" u="none" strike="noStrike" kern="1200" baseline="0" dirty="0" smtClean="0">
+                <a:solidFill>
+                  <a:schemeClr val="tx1"/>
+                </a:solidFill>
+                <a:latin typeface="+mn-lt"/>
+                <a:ea typeface="+mn-ea"/>
+                <a:cs typeface="+mn-cs"/>
+              </a:rPr>
+              <a:t> = </a:t>
+            </a:r>
+            <a:r>
+              <a:rPr lang="en-US" sz="1200" b="0" i="0" u="none" strike="noStrike" kern="1200" baseline="0" dirty="0" smtClean="0">
+                <a:solidFill>
+                  <a:schemeClr val="tx1"/>
+                </a:solidFill>
+                <a:latin typeface="+mn-lt"/>
+                <a:ea typeface="+mn-ea"/>
+                <a:cs typeface="+mn-cs"/>
+              </a:rPr>
+              <a:t>0.0005</a:t>
+            </a:r>
+            <a:endParaRPr lang="en-US" sz="1200" b="0" i="0" u="none" strike="noStrike" kern="1200" baseline="0" dirty="0" smtClean="0">
+              <a:solidFill>
+                <a:schemeClr val="tx1"/>
+              </a:solidFill>
+              <a:latin typeface="+mn-lt"/>
+              <a:ea typeface="+mn-ea"/>
+              <a:cs typeface="+mn-cs"/>
+            </a:endParaRPr>
+          </a:p>
+          <a:p>
+            <a:r>
+              <a:rPr lang="en-US" sz="1200" b="0" i="0" u="none" strike="noStrike" kern="1200" baseline="0" dirty="0" smtClean="0">
+                <a:solidFill>
+                  <a:schemeClr val="tx1"/>
+                </a:solidFill>
+                <a:latin typeface="+mn-lt"/>
+                <a:ea typeface="+mn-ea"/>
+                <a:cs typeface="+mn-cs"/>
+              </a:rPr>
+              <a:t>Dummy: Adding dummy locations</a:t>
+            </a:r>
           </a:p>
         </p:txBody>
       </p:sp>
@@ -2652,9 +2719,9 @@
           <a:p>
             <a:fld id="{B8B3BC3C-0900-4ACD-9030-5BE6C2442A68}" type="slidenum">
               <a:rPr lang="en-US" smtClean="0"/>
-              <a:t>21</a:t>
+              <a:t>20</a:t>
             </a:fld>
-            <a:endParaRPr lang="en-US"/>
+            <a:endParaRPr lang="en-US" dirty="0"/>
           </a:p>
         </p:txBody>
       </p:sp>
@@ -2717,37 +2784,11 @@
           <a:p>
             <a:r>
               <a:rPr lang="en-US" dirty="0" smtClean="0"/>
-              <a:t>Synthetic routes: (S Health</a:t>
+              <a:t>Tracking</a:t>
             </a:r>
             <a:r>
               <a:rPr lang="en-US" baseline="0" dirty="0" smtClean="0"/>
-              <a:t> as an example</a:t>
-            </a:r>
-            <a:r>
-              <a:rPr lang="en-US" dirty="0" smtClean="0"/>
-              <a:t>)</a:t>
-            </a:r>
-          </a:p>
-          <a:p>
-            <a:r>
-              <a:rPr lang="en-US" dirty="0" err="1" smtClean="0"/>
-              <a:t>Nav</a:t>
-            </a:r>
-            <a:r>
-              <a:rPr lang="en-US" dirty="0" smtClean="0"/>
-              <a:t> Apps: Offline navigation is a possibility (load map before leaving).</a:t>
-            </a:r>
-            <a:r>
-              <a:rPr lang="en-US" baseline="0" dirty="0" smtClean="0"/>
-              <a:t> H</a:t>
-            </a:r>
-            <a:r>
-              <a:rPr lang="en-US" dirty="0" smtClean="0"/>
-              <a:t>owever, this does not allow for real-time traffic</a:t>
-            </a:r>
-            <a:r>
-              <a:rPr lang="en-US" baseline="0" dirty="0" smtClean="0"/>
-              <a:t> updates.</a:t>
+              <a:t> is not a big issue for normal apps. LP-Guardian handles special case such as fitness apps where location is accessed constantly and creates and artificial path.</a:t>
             </a:r>
             <a:endParaRPr lang="en-US" dirty="0"/>
           </a:p>
@@ -2770,9 +2811,123 @@
           <a:p>
             <a:fld id="{B8B3BC3C-0900-4ACD-9030-5BE6C2442A68}" type="slidenum">
               <a:rPr lang="en-US" smtClean="0"/>
+              <a:t>21</a:t>
+            </a:fld>
+            <a:endParaRPr lang="en-US" dirty="0"/>
+          </a:p>
+        </p:txBody>
+      </p:sp>
+    </p:spTree>
+    <p:extLst>
+      <p:ext uri="{BB962C8B-B14F-4D97-AF65-F5344CB8AC3E}">
+        <p14:creationId xmlns:p14="http://schemas.microsoft.com/office/powerpoint/2010/main" val="3574496599"/>
+      </p:ext>
+    </p:extLst>
+  </p:cSld>
+  <p:clrMapOvr>
+    <a:masterClrMapping/>
+  </p:clrMapOvr>
+</p:notes>
+</file>
+
+<file path=ppt/notesSlides/notesSlide22.xml><?xml version="1.0" encoding="utf-8"?>
+<p:notes xmlns:a="http://schemas.openxmlformats.org/drawingml/2006/main" xmlns:r="http://schemas.openxmlformats.org/officeDocument/2006/relationships" xmlns:p="http://schemas.openxmlformats.org/presentationml/2006/main">
+  <p:cSld>
+    <p:spTree>
+      <p:nvGrpSpPr>
+        <p:cNvPr id="1" name=""/>
+        <p:cNvGrpSpPr/>
+        <p:nvPr/>
+      </p:nvGrpSpPr>
+      <p:grpSpPr>
+        <a:xfrm>
+          <a:off x="0" y="0"/>
+          <a:ext cx="0" cy="0"/>
+          <a:chOff x="0" y="0"/>
+          <a:chExt cx="0" cy="0"/>
+        </a:xfrm>
+      </p:grpSpPr>
+      <p:sp>
+        <p:nvSpPr>
+          <p:cNvPr id="2" name="Slide Image Placeholder 1"/>
+          <p:cNvSpPr>
+            <a:spLocks noGrp="1" noRot="1" noChangeAspect="1"/>
+          </p:cNvSpPr>
+          <p:nvPr>
+            <p:ph type="sldImg"/>
+          </p:nvPr>
+        </p:nvSpPr>
+        <p:spPr/>
+      </p:sp>
+      <p:sp>
+        <p:nvSpPr>
+          <p:cNvPr id="3" name="Notes Placeholder 2"/>
+          <p:cNvSpPr>
+            <a:spLocks noGrp="1"/>
+          </p:cNvSpPr>
+          <p:nvPr>
+            <p:ph type="body" idx="1"/>
+          </p:nvPr>
+        </p:nvSpPr>
+        <p:spPr/>
+        <p:txBody>
+          <a:bodyPr/>
+          <a:lstStyle/>
+          <a:p>
+            <a:r>
+              <a:rPr lang="en-US" dirty="0" smtClean="0"/>
+              <a:t>Synthetic routes: (S Health</a:t>
+            </a:r>
+            <a:r>
+              <a:rPr lang="en-US" baseline="0" dirty="0" smtClean="0"/>
+              <a:t> as an example</a:t>
+            </a:r>
+            <a:r>
+              <a:rPr lang="en-US" dirty="0" smtClean="0"/>
+              <a:t>)</a:t>
+            </a:r>
+          </a:p>
+          <a:p>
+            <a:r>
+              <a:rPr lang="en-US" dirty="0" smtClean="0"/>
+              <a:t>Nav Apps: Offline navigation is a possibility (load map before leaving).</a:t>
+            </a:r>
+            <a:r>
+              <a:rPr lang="en-US" baseline="0" dirty="0" smtClean="0"/>
+              <a:t> H</a:t>
+            </a:r>
+            <a:r>
+              <a:rPr lang="en-US" dirty="0" smtClean="0"/>
+              <a:t>owever, this does not allow for real-time traffic</a:t>
+            </a:r>
+            <a:r>
+              <a:rPr lang="en-US" baseline="0" dirty="0" smtClean="0"/>
+              <a:t> updates.</a:t>
+            </a:r>
+            <a:endParaRPr lang="en-US" dirty="0"/>
+          </a:p>
+        </p:txBody>
+      </p:sp>
+      <p:sp>
+        <p:nvSpPr>
+          <p:cNvPr id="4" name="Slide Number Placeholder 3"/>
+          <p:cNvSpPr>
+            <a:spLocks noGrp="1"/>
+          </p:cNvSpPr>
+          <p:nvPr>
+            <p:ph type="sldNum" sz="quarter" idx="10"/>
+          </p:nvPr>
+        </p:nvSpPr>
+        <p:spPr/>
+        <p:txBody>
+          <a:bodyPr/>
+          <a:lstStyle/>
+          <a:p>
+            <a:fld id="{B8B3BC3C-0900-4ACD-9030-5BE6C2442A68}" type="slidenum">
+              <a:rPr lang="en-US" smtClean="0"/>
               <a:t>22</a:t>
             </a:fld>
-            <a:endParaRPr lang="en-US"/>
+            <a:endParaRPr lang="en-US" dirty="0"/>
           </a:p>
         </p:txBody>
       </p:sp>
@@ -2835,23 +2990,29 @@
           <a:p>
             <a:r>
               <a:rPr lang="en-US" dirty="0" smtClean="0"/>
-              <a:t>“Allow” principles</a:t>
+              <a:t>Anonymized</a:t>
             </a:r>
             <a:r>
               <a:rPr lang="en-US" baseline="0" dirty="0" smtClean="0"/>
-              <a:t> relate to apps overreaching their location authority</a:t>
-            </a:r>
+              <a:t> data meant cell tower ping based only. 95% of actions could be linked to a specific individual in the anonymous database</a:t>
+            </a:r>
+          </a:p>
+          <a:p>
+            <a:endParaRPr lang="en-US" baseline="0" dirty="0" smtClean="0"/>
           </a:p>
           <a:p>
             <a:r>
               <a:rPr lang="en-US" baseline="0" dirty="0" smtClean="0"/>
-              <a:t>“Prevent” principles relate to the 3 location privacy threats from before</a:t>
-            </a:r>
+              <a:t>Apps fall on continuum between poor usability and poor security.</a:t>
+            </a:r>
+          </a:p>
+          <a:p>
+            <a:endParaRPr lang="en-US" baseline="0" dirty="0" smtClean="0"/>
           </a:p>
           <a:p>
             <a:r>
               <a:rPr lang="en-US" baseline="0" dirty="0" smtClean="0"/>
-              <a:t>Last 2 principles are practical concerns to ensure such a tool would be practical and likely to become widely used.</a:t>
+              <a:t>Unrealistic assumptions cause many proposed solutions to be unworkable in real life. </a:t>
             </a:r>
             <a:endParaRPr lang="en-US" dirty="0"/>
           </a:p>
@@ -2874,7 +3035,7 @@
           <a:p>
             <a:fld id="{B8B3BC3C-0900-4ACD-9030-5BE6C2442A68}" type="slidenum">
               <a:rPr lang="en-US" smtClean="0"/>
-              <a:t>4</a:t>
+              <a:t>3</a:t>
             </a:fld>
             <a:endParaRPr lang="en-US" dirty="0"/>
           </a:p>
@@ -2883,7 +3044,7 @@
     </p:spTree>
     <p:extLst>
       <p:ext uri="{BB962C8B-B14F-4D97-AF65-F5344CB8AC3E}">
-        <p14:creationId xmlns:p14="http://schemas.microsoft.com/office/powerpoint/2010/main" val="2053636732"/>
+        <p14:creationId xmlns:p14="http://schemas.microsoft.com/office/powerpoint/2010/main" val="3899786191"/>
       </p:ext>
     </p:extLst>
   </p:cSld>
@@ -2939,49 +3100,23 @@
           <a:p>
             <a:r>
               <a:rPr lang="en-US" dirty="0" smtClean="0"/>
-              <a:t>A&amp;A = Advertising</a:t>
+              <a:t>“Allow” principles</a:t>
             </a:r>
             <a:r>
               <a:rPr lang="en-US" baseline="0" dirty="0" smtClean="0"/>
-              <a:t> &amp; </a:t>
-            </a:r>
+              <a:t> relate to apps overreaching their location authority</a:t>
+            </a:r>
+          </a:p>
+          <a:p>
             <a:r>
               <a:rPr lang="en-US" baseline="0" dirty="0" smtClean="0"/>
-              <a:t>analytics</a:t>
+              <a:t>“Prevent” principles relate to the 3 location privacy threats from before</a:t>
             </a:r>
           </a:p>
           <a:p>
             <a:r>
               <a:rPr lang="en-US" baseline="0" dirty="0" smtClean="0"/>
-              <a:t>A &amp; A or app running in background is automatically given only city-level location info. </a:t>
-            </a:r>
-            <a:endParaRPr lang="en-US" baseline="0" dirty="0" smtClean="0"/>
-          </a:p>
-          <a:p>
-            <a:r>
-              <a:rPr lang="en-US" baseline="0" dirty="0" smtClean="0"/>
-              <a:t>Rule for foreground apps is selected by </a:t>
-            </a:r>
-            <a:r>
-              <a:rPr lang="en-US" baseline="0" dirty="0" smtClean="0"/>
-              <a:t>user.</a:t>
-            </a:r>
-          </a:p>
-          <a:p>
-            <a:r>
-              <a:rPr lang="en-US" baseline="0" dirty="0" smtClean="0"/>
-              <a:t>“Follow rule” has 3 further options.</a:t>
-            </a:r>
-            <a:endParaRPr lang="en-US" baseline="0" dirty="0" smtClean="0"/>
-          </a:p>
-          <a:p>
-            <a:r>
-              <a:rPr lang="en-US" baseline="0" dirty="0" smtClean="0"/>
-              <a:t>When accurate location is needed, LP-guardian </a:t>
-            </a:r>
-            <a:r>
-              <a:rPr lang="en-US" baseline="0" dirty="0" smtClean="0"/>
-              <a:t>decides if info is safe to release (more in Bonnie’s slides)</a:t>
+              <a:t>Last 2 principles are practical concerns to ensure such a tool would be practical and likely to become widely used.</a:t>
             </a:r>
             <a:endParaRPr lang="en-US" dirty="0"/>
           </a:p>
@@ -3004,7 +3139,7 @@
           <a:p>
             <a:fld id="{B8B3BC3C-0900-4ACD-9030-5BE6C2442A68}" type="slidenum">
               <a:rPr lang="en-US" smtClean="0"/>
-              <a:t>5</a:t>
+              <a:t>4</a:t>
             </a:fld>
             <a:endParaRPr lang="en-US" dirty="0"/>
           </a:p>
@@ -3069,11 +3204,43 @@
           <a:p>
             <a:r>
               <a:rPr lang="en-US" dirty="0" smtClean="0"/>
-              <a:t>In most cases, LP-guardian</a:t>
+              <a:t>A&amp;A = Advertising</a:t>
             </a:r>
             <a:r>
               <a:rPr lang="en-US" baseline="0" dirty="0" smtClean="0"/>
-              <a:t> can achieve a good balance between functionality and security.</a:t>
+              <a:t> &amp; analytics</a:t>
+            </a:r>
+          </a:p>
+          <a:p>
+            <a:r>
+              <a:rPr lang="en-US" baseline="0" dirty="0" smtClean="0"/>
+              <a:t>A &amp; A or app running in background is automatically given only city-level location info. </a:t>
+            </a:r>
+          </a:p>
+          <a:p>
+            <a:r>
+              <a:rPr lang="en-US" baseline="0" dirty="0" smtClean="0"/>
+              <a:t>Rule for foreground apps is selected by user.</a:t>
+            </a:r>
+          </a:p>
+          <a:p>
+            <a:r>
+              <a:rPr lang="en-US" baseline="0" dirty="0" smtClean="0"/>
+              <a:t>“Follow rule” has 3 further options.</a:t>
+            </a:r>
+          </a:p>
+          <a:p>
+            <a:r>
+              <a:rPr lang="en-US" baseline="0" dirty="0" smtClean="0"/>
+              <a:t>When accurate location is needed, </a:t>
+            </a:r>
+            <a:r>
+              <a:rPr lang="en-US" baseline="0" dirty="0" smtClean="0"/>
+              <a:t>LP-Guardian </a:t>
+            </a:r>
+            <a:r>
+              <a:rPr lang="en-US" baseline="0" dirty="0" smtClean="0"/>
+              <a:t>decides if info is safe to release (more in Bonnie’s slides)</a:t>
             </a:r>
             <a:endParaRPr lang="en-US" dirty="0"/>
           </a:p>
@@ -3096,7 +3263,7 @@
           <a:p>
             <a:fld id="{B8B3BC3C-0900-4ACD-9030-5BE6C2442A68}" type="slidenum">
               <a:rPr lang="en-US" smtClean="0"/>
-              <a:t>6</a:t>
+              <a:t>5</a:t>
             </a:fld>
             <a:endParaRPr lang="en-US" dirty="0"/>
           </a:p>
@@ -3105,7 +3272,7 @@
     </p:spTree>
     <p:extLst>
       <p:ext uri="{BB962C8B-B14F-4D97-AF65-F5344CB8AC3E}">
-        <p14:creationId xmlns:p14="http://schemas.microsoft.com/office/powerpoint/2010/main" val="3077308115"/>
+        <p14:creationId xmlns:p14="http://schemas.microsoft.com/office/powerpoint/2010/main" val="2053636732"/>
       </p:ext>
     </p:extLst>
   </p:cSld>
@@ -3161,392 +3328,21 @@
           <a:p>
             <a:r>
               <a:rPr lang="en-US" dirty="0" smtClean="0"/>
-              <a:t>Design details relate back to the diagram from the Proposed Approach slide of the presentation (slide 4)</a:t>
-            </a:r>
-          </a:p>
-          <a:p>
-            <a:r>
-              <a:rPr lang="en-US" i="1" dirty="0" smtClean="0">
-                <a:solidFill>
-                  <a:srgbClr val="FF0000"/>
-                </a:solidFill>
-              </a:rPr>
-              <a:t>Mention details that should have been discussed = the left half/automatic city-coarsened level of the diagram: </a:t>
-            </a:r>
-          </a:p>
-          <a:p>
-            <a:pPr marL="171450" indent="-171450">
-              <a:buFont typeface="Arial" panose="020B0604020202020204" pitchFamily="34" charset="0"/>
-              <a:buChar char="•"/>
-            </a:pPr>
+              <a:t>In most cases, </a:t>
+            </a:r>
             <a:r>
               <a:rPr lang="en-US" dirty="0" smtClean="0"/>
-              <a:t>Background</a:t>
+              <a:t>LP-Guardian</a:t>
             </a:r>
             <a:r>
               <a:rPr lang="en-US" baseline="0" dirty="0" smtClean="0"/>
-              <a:t> location access coarsened to city level </a:t>
-            </a:r>
-            <a:r>
-              <a:rPr lang="en-US" baseline="0" dirty="0" smtClean="0">
-                <a:sym typeface="Wingdings" panose="05000000000000000000" pitchFamily="2" charset="2"/>
-              </a:rPr>
-              <a:t> the rest of the information applies to foreground and persistent (perceptible applications) location access</a:t>
-            </a:r>
-          </a:p>
-          <a:p>
-            <a:pPr marL="628650" lvl="1" indent="-171450">
-              <a:buFont typeface="Arial" panose="020B0604020202020204" pitchFamily="34" charset="0"/>
-              <a:buChar char="•"/>
-            </a:pPr>
-            <a:r>
-              <a:rPr lang="en-US" baseline="0" dirty="0" smtClean="0">
-                <a:sym typeface="Wingdings" panose="05000000000000000000" pitchFamily="2" charset="2"/>
-              </a:rPr>
-              <a:t>Reasoning: analysis showed that only 3% of applications access the user’s location while running in the background</a:t>
-            </a:r>
-          </a:p>
-          <a:p>
-            <a:pPr marL="171450" lvl="0" indent="-171450">
-              <a:buFont typeface="Arial" panose="020B0604020202020204" pitchFamily="34" charset="0"/>
-              <a:buChar char="•"/>
-            </a:pPr>
-            <a:r>
-              <a:rPr lang="en-US" sz="1100" baseline="0" dirty="0" smtClean="0">
-                <a:sym typeface="Wingdings" panose="05000000000000000000" pitchFamily="2" charset="2"/>
-              </a:rPr>
-              <a:t>A&amp;A library requests can be identified (shown via stack trace) and are sent city-coarsened information</a:t>
-            </a:r>
-          </a:p>
-          <a:p>
-            <a:pPr marL="171450" lvl="0" indent="-171450">
-              <a:buFont typeface="Arial" panose="020B0604020202020204" pitchFamily="34" charset="0"/>
-              <a:buChar char="•"/>
-            </a:pPr>
-            <a:endParaRPr lang="en-US" sz="1100" baseline="0" dirty="0" smtClean="0">
-              <a:sym typeface="Wingdings" panose="05000000000000000000" pitchFamily="2" charset="2"/>
-            </a:endParaRPr>
-          </a:p>
-          <a:p>
-            <a:pPr marL="0" lvl="0" indent="0">
-              <a:buFont typeface="Arial" panose="020B0604020202020204" pitchFamily="34" charset="0"/>
-              <a:buNone/>
-            </a:pPr>
-            <a:r>
-              <a:rPr lang="en-US" sz="1100" b="1" baseline="0" dirty="0" smtClean="0">
-                <a:sym typeface="Wingdings" panose="05000000000000000000" pitchFamily="2" charset="2"/>
-              </a:rPr>
-              <a:t>Threat Model: the adversary has access to a mapping between a set of individuals’ and the probability distributions of visiting each block in the city  aims to match the anonymous mobility histogram to an individual in the database</a:t>
-            </a:r>
-          </a:p>
-          <a:p>
-            <a:endParaRPr lang="en-US" baseline="0" dirty="0" smtClean="0">
-              <a:sym typeface="Wingdings" panose="05000000000000000000" pitchFamily="2" charset="2"/>
-            </a:endParaRPr>
-          </a:p>
-          <a:p>
-            <a:r>
-              <a:rPr lang="en-US" baseline="0" dirty="0" smtClean="0">
-                <a:sym typeface="Wingdings" panose="05000000000000000000" pitchFamily="2" charset="2"/>
-              </a:rPr>
-              <a:t>Identification Protection Formula = Probability that the histogram belongs to a given individual (multinomial distribution)</a:t>
-            </a:r>
-          </a:p>
-          <a:p>
-            <a:r>
-              <a:rPr lang="en-US" i="1" baseline="0" dirty="0" smtClean="0">
-                <a:sym typeface="Wingdings" panose="05000000000000000000" pitchFamily="2" charset="2"/>
-              </a:rPr>
-              <a:t>N = # of user application sessions</a:t>
-            </a:r>
-          </a:p>
-          <a:p>
-            <a:r>
-              <a:rPr lang="en-US" i="1" baseline="0" dirty="0" smtClean="0">
-                <a:sym typeface="Wingdings" panose="05000000000000000000" pitchFamily="2" charset="2"/>
-              </a:rPr>
-              <a:t>Bl = set of city blocks in the 2D grid of the city = {bl</a:t>
-            </a:r>
-            <a:r>
-              <a:rPr lang="en-US" i="1" baseline="-25000" dirty="0" smtClean="0">
-                <a:sym typeface="Wingdings" panose="05000000000000000000" pitchFamily="2" charset="2"/>
-              </a:rPr>
-              <a:t>1</a:t>
-            </a:r>
-            <a:r>
-              <a:rPr lang="en-US" i="1" baseline="0" dirty="0" smtClean="0">
-                <a:sym typeface="Wingdings" panose="05000000000000000000" pitchFamily="2" charset="2"/>
-              </a:rPr>
-              <a:t>, bl</a:t>
-            </a:r>
-            <a:r>
-              <a:rPr lang="en-US" i="1" baseline="-25000" dirty="0" smtClean="0">
-                <a:sym typeface="Wingdings" panose="05000000000000000000" pitchFamily="2" charset="2"/>
-              </a:rPr>
-              <a:t>2</a:t>
-            </a:r>
-            <a:r>
-              <a:rPr lang="en-US" i="1" baseline="0" dirty="0" smtClean="0">
-                <a:sym typeface="Wingdings" panose="05000000000000000000" pitchFamily="2" charset="2"/>
-              </a:rPr>
-              <a:t>, …, }</a:t>
-            </a:r>
-          </a:p>
-          <a:p>
-            <a:pPr marL="0" marR="0" indent="0" algn="l" defTabSz="914400" rtl="0" eaLnBrk="1" fontAlgn="auto" latinLnBrk="0" hangingPunct="1">
-              <a:lnSpc>
-                <a:spcPct val="100000"/>
-              </a:lnSpc>
-              <a:spcBef>
-                <a:spcPts val="0"/>
-              </a:spcBef>
-              <a:spcAft>
-                <a:spcPts val="0"/>
-              </a:spcAft>
-              <a:buClrTx/>
-              <a:buSzTx/>
-              <a:buFontTx/>
-              <a:buNone/>
-              <a:tabLst/>
-              <a:defRPr/>
-            </a:pPr>
-            <a:r>
-              <a:rPr lang="en-US" i="1" baseline="0" dirty="0" smtClean="0">
-                <a:sym typeface="Wingdings" panose="05000000000000000000" pitchFamily="2" charset="2"/>
-              </a:rPr>
-              <a:t>c</a:t>
-            </a:r>
-            <a:r>
-              <a:rPr lang="en-US" i="1" baseline="-25000" dirty="0" smtClean="0">
-                <a:sym typeface="Wingdings" panose="05000000000000000000" pitchFamily="2" charset="2"/>
-              </a:rPr>
-              <a:t>bli</a:t>
-            </a:r>
-            <a:r>
-              <a:rPr lang="en-US" i="1" baseline="0" dirty="0" smtClean="0">
-                <a:sym typeface="Wingdings" panose="05000000000000000000" pitchFamily="2" charset="2"/>
-              </a:rPr>
-              <a:t> = the number of times that bl</a:t>
-            </a:r>
-            <a:r>
-              <a:rPr lang="en-US" i="1" baseline="-25000" dirty="0" smtClean="0">
-                <a:sym typeface="Wingdings" panose="05000000000000000000" pitchFamily="2" charset="2"/>
-              </a:rPr>
-              <a:t>i</a:t>
-            </a:r>
-            <a:r>
-              <a:rPr lang="en-US" i="1" baseline="0" dirty="0" smtClean="0">
-                <a:sym typeface="Wingdings" panose="05000000000000000000" pitchFamily="2" charset="2"/>
-              </a:rPr>
-              <a:t> is visited by the user out of the total N sessions</a:t>
-            </a:r>
-          </a:p>
-          <a:p>
-            <a:r>
-              <a:rPr lang="en-US" i="1" baseline="0" dirty="0" smtClean="0">
-                <a:sym typeface="Wingdings" panose="05000000000000000000" pitchFamily="2" charset="2"/>
-              </a:rPr>
-              <a:t>pi = P(bl</a:t>
-            </a:r>
-            <a:r>
-              <a:rPr lang="en-US" i="1" baseline="-25000" dirty="0" smtClean="0">
-                <a:sym typeface="Wingdings" panose="05000000000000000000" pitchFamily="2" charset="2"/>
-              </a:rPr>
-              <a:t>i</a:t>
-            </a:r>
-            <a:r>
-              <a:rPr lang="en-US" i="1" baseline="0" dirty="0" smtClean="0">
-                <a:sym typeface="Wingdings" panose="05000000000000000000" pitchFamily="2" charset="2"/>
-              </a:rPr>
-              <a:t>) = the probability of the user visiting block bl</a:t>
-            </a:r>
-            <a:r>
-              <a:rPr lang="en-US" i="1" baseline="-25000" dirty="0" smtClean="0">
-                <a:sym typeface="Wingdings" panose="05000000000000000000" pitchFamily="2" charset="2"/>
-              </a:rPr>
-              <a:t>i</a:t>
-            </a:r>
-          </a:p>
-          <a:p>
-            <a:endParaRPr lang="en-US" i="1" baseline="0" dirty="0" smtClean="0">
-              <a:sym typeface="Wingdings" panose="05000000000000000000" pitchFamily="2" charset="2"/>
-            </a:endParaRPr>
-          </a:p>
-          <a:p>
-            <a:r>
-              <a:rPr lang="en-US" i="0" baseline="0" dirty="0" smtClean="0">
-                <a:sym typeface="Wingdings" panose="05000000000000000000" pitchFamily="2" charset="2"/>
-              </a:rPr>
-              <a:t>“Reasonably close” estimation notes: *if the inequality is satisfied, a dummy location is released*</a:t>
-            </a:r>
-          </a:p>
-          <a:p>
-            <a:pPr marL="171450" indent="-171450">
-              <a:buFont typeface="Arial" panose="020B0604020202020204" pitchFamily="34" charset="0"/>
-              <a:buChar char="•"/>
-            </a:pPr>
-            <a:r>
-              <a:rPr lang="en-US" i="0" baseline="0" dirty="0" smtClean="0">
-                <a:sym typeface="Wingdings" panose="05000000000000000000" pitchFamily="2" charset="2"/>
-              </a:rPr>
-              <a:t>Assume that epsilon = 0.5</a:t>
-            </a:r>
-          </a:p>
-          <a:p>
-            <a:pPr marL="171450" indent="-171450">
-              <a:buFont typeface="Arial" panose="020B0604020202020204" pitchFamily="34" charset="0"/>
-              <a:buChar char="•"/>
-            </a:pPr>
-            <a:r>
-              <a:rPr lang="en-US" i="0" baseline="0" dirty="0" smtClean="0">
-                <a:sym typeface="Wingdings" panose="05000000000000000000" pitchFamily="2" charset="2"/>
-              </a:rPr>
-              <a:t>Between the two equations, </a:t>
-            </a:r>
-            <a:r>
-              <a:rPr lang="en-US" i="1" baseline="0" dirty="0" smtClean="0">
-                <a:sym typeface="Wingdings" panose="05000000000000000000" pitchFamily="2" charset="2"/>
-              </a:rPr>
-              <a:t>y</a:t>
-            </a:r>
-            <a:r>
-              <a:rPr lang="en-US" i="0" baseline="0" dirty="0" smtClean="0">
-                <a:sym typeface="Wingdings" panose="05000000000000000000" pitchFamily="2" charset="2"/>
-              </a:rPr>
-              <a:t> is replaced with </a:t>
-            </a:r>
-            <a:r>
-              <a:rPr lang="en-US" i="1" baseline="0" dirty="0" smtClean="0">
-                <a:sym typeface="Wingdings" panose="05000000000000000000" pitchFamily="2" charset="2"/>
-              </a:rPr>
-              <a:t>p</a:t>
-            </a:r>
-            <a:r>
-              <a:rPr lang="en-US" i="1" baseline="-25000" dirty="0" smtClean="0">
-                <a:sym typeface="Wingdings" panose="05000000000000000000" pitchFamily="2" charset="2"/>
-              </a:rPr>
-              <a:t>min </a:t>
-            </a:r>
-            <a:r>
-              <a:rPr lang="en-US" i="0" baseline="0" dirty="0" smtClean="0">
-                <a:sym typeface="Wingdings" panose="05000000000000000000" pitchFamily="2" charset="2"/>
-              </a:rPr>
-              <a:t>(min. probability) of visiting a block because LP-Guardian (client side) does not know other user’s histograms</a:t>
-            </a:r>
-          </a:p>
-          <a:p>
-            <a:pPr marL="628650" lvl="1" indent="-171450">
-              <a:buFont typeface="Arial" panose="020B0604020202020204" pitchFamily="34" charset="0"/>
-              <a:buChar char="•"/>
-            </a:pPr>
-            <a:r>
-              <a:rPr lang="en-US" i="0" baseline="0" dirty="0" smtClean="0">
-                <a:sym typeface="Wingdings" panose="05000000000000000000" pitchFamily="2" charset="2"/>
-              </a:rPr>
-              <a:t>Note: low </a:t>
-            </a:r>
-            <a:r>
-              <a:rPr lang="en-US" i="1" baseline="0" dirty="0" smtClean="0">
-                <a:sym typeface="Wingdings" panose="05000000000000000000" pitchFamily="2" charset="2"/>
-              </a:rPr>
-              <a:t>p</a:t>
-            </a:r>
-            <a:r>
-              <a:rPr lang="en-US" i="1" baseline="-25000" dirty="0" smtClean="0">
-                <a:sym typeface="Wingdings" panose="05000000000000000000" pitchFamily="2" charset="2"/>
-              </a:rPr>
-              <a:t>min</a:t>
-            </a:r>
-            <a:r>
-              <a:rPr lang="en-US" i="1" baseline="0" dirty="0" smtClean="0">
-                <a:sym typeface="Wingdings" panose="05000000000000000000" pitchFamily="2" charset="2"/>
-              </a:rPr>
               <a:t> </a:t>
             </a:r>
             <a:r>
-              <a:rPr lang="en-US" i="0" baseline="0" dirty="0" smtClean="0">
-                <a:sym typeface="Wingdings" panose="05000000000000000000" pitchFamily="2" charset="2"/>
-              </a:rPr>
-              <a:t>= strict privacy, high </a:t>
-            </a:r>
-            <a:r>
-              <a:rPr lang="en-US" i="1" baseline="0" dirty="0" smtClean="0">
-                <a:sym typeface="Wingdings" panose="05000000000000000000" pitchFamily="2" charset="2"/>
-              </a:rPr>
-              <a:t>p</a:t>
-            </a:r>
-            <a:r>
-              <a:rPr lang="en-US" i="1" baseline="-25000" dirty="0" smtClean="0">
-                <a:sym typeface="Wingdings" panose="05000000000000000000" pitchFamily="2" charset="2"/>
-              </a:rPr>
-              <a:t>min</a:t>
-            </a:r>
-            <a:r>
-              <a:rPr lang="en-US" i="0" baseline="0" dirty="0" smtClean="0">
-                <a:sym typeface="Wingdings" panose="05000000000000000000" pitchFamily="2" charset="2"/>
-              </a:rPr>
-              <a:t> = more relaxed privacy</a:t>
-            </a:r>
-          </a:p>
-          <a:p>
-            <a:pPr marL="171450" indent="-171450">
-              <a:buFont typeface="Arial" panose="020B0604020202020204" pitchFamily="34" charset="0"/>
-              <a:buChar char="•"/>
-            </a:pPr>
-            <a:r>
-              <a:rPr lang="en-US" i="0" baseline="0" dirty="0" smtClean="0">
-                <a:sym typeface="Wingdings" panose="05000000000000000000" pitchFamily="2" charset="2"/>
-              </a:rPr>
-              <a:t>If LP-Guardian determines that the same privacy level can be determined with a higher value of </a:t>
-            </a:r>
-            <a:r>
-              <a:rPr lang="en-US" i="1" baseline="0" dirty="0" smtClean="0">
-                <a:sym typeface="Wingdings" panose="05000000000000000000" pitchFamily="2" charset="2"/>
-              </a:rPr>
-              <a:t>p</a:t>
-            </a:r>
-            <a:r>
-              <a:rPr lang="en-US" i="1" baseline="-25000" dirty="0" smtClean="0">
-                <a:sym typeface="Wingdings" panose="05000000000000000000" pitchFamily="2" charset="2"/>
-              </a:rPr>
-              <a:t>min </a:t>
-            </a:r>
-            <a:r>
-              <a:rPr lang="en-US" i="0" baseline="0" dirty="0" smtClean="0">
-                <a:sym typeface="Wingdings" panose="05000000000000000000" pitchFamily="2" charset="2"/>
-              </a:rPr>
-              <a:t>, value will be relaxed (relies of census data that specifies the population for every city block)</a:t>
-            </a:r>
-            <a:endParaRPr lang="en-US" i="0" baseline="-25000" dirty="0" smtClean="0">
-              <a:sym typeface="Wingdings" panose="05000000000000000000" pitchFamily="2" charset="2"/>
-            </a:endParaRPr>
-          </a:p>
-          <a:p>
-            <a:pPr marL="171450" indent="-171450">
-              <a:buFont typeface="Arial" panose="020B0604020202020204" pitchFamily="34" charset="0"/>
-              <a:buChar char="•"/>
-            </a:pPr>
-            <a:endParaRPr lang="en-US" i="0" baseline="0" dirty="0" smtClean="0">
-              <a:sym typeface="Wingdings" panose="05000000000000000000" pitchFamily="2" charset="2"/>
-            </a:endParaRPr>
-          </a:p>
-          <a:p>
-            <a:endParaRPr lang="en-US" i="1" baseline="0" dirty="0" smtClean="0">
-              <a:sym typeface="Wingdings" panose="05000000000000000000" pitchFamily="2" charset="2"/>
-            </a:endParaRPr>
-          </a:p>
-          <a:p>
-            <a:endParaRPr lang="en-US" baseline="0" dirty="0" smtClean="0">
-              <a:sym typeface="Wingdings" panose="05000000000000000000" pitchFamily="2" charset="2"/>
-            </a:endParaRPr>
-          </a:p>
-          <a:p>
-            <a:endParaRPr lang="en-US" baseline="0" dirty="0" smtClean="0">
-              <a:sym typeface="Wingdings" panose="05000000000000000000" pitchFamily="2" charset="2"/>
-            </a:endParaRPr>
-          </a:p>
-          <a:p>
-            <a:endParaRPr lang="en-US" baseline="0" dirty="0" smtClean="0"/>
+              <a:rPr lang="en-US" baseline="0" dirty="0" smtClean="0"/>
+              <a:t>can achieve a good balance between functionality and security.</a:t>
+            </a:r>
+            <a:endParaRPr lang="en-US" dirty="0"/>
           </a:p>
         </p:txBody>
       </p:sp>
@@ -3566,26 +3362,17 @@
           <a:lstStyle/>
           <a:p>
             <a:fld id="{B8B3BC3C-0900-4ACD-9030-5BE6C2442A68}" type="slidenum">
-              <a:rPr lang="en-US" smtClean="0">
-                <a:solidFill>
-                  <a:prstClr val="black"/>
-                </a:solidFill>
-              </a:rPr>
-              <a:pPr/>
-              <a:t>7</a:t>
+              <a:rPr lang="en-US" smtClean="0"/>
+              <a:t>6</a:t>
             </a:fld>
-            <a:endParaRPr lang="en-US" dirty="0">
-              <a:solidFill>
-                <a:prstClr val="black"/>
-              </a:solidFill>
-            </a:endParaRPr>
+            <a:endParaRPr lang="en-US" dirty="0"/>
           </a:p>
         </p:txBody>
       </p:sp>
     </p:spTree>
     <p:extLst>
       <p:ext uri="{BB962C8B-B14F-4D97-AF65-F5344CB8AC3E}">
-        <p14:creationId xmlns:p14="http://schemas.microsoft.com/office/powerpoint/2010/main" val="1796385184"/>
+        <p14:creationId xmlns:p14="http://schemas.microsoft.com/office/powerpoint/2010/main" val="3077308115"/>
       </p:ext>
     </p:extLst>
   </p:cSld>
@@ -3639,6 +3426,168 @@
           <a:bodyPr/>
           <a:lstStyle/>
           <a:p>
+            <a:r>
+              <a:rPr lang="en-US" dirty="0" smtClean="0"/>
+              <a:t>Design details relate back to the diagram from the Proposed Approach slide of the presentation (slide 4)</a:t>
+            </a:r>
+          </a:p>
+          <a:p>
+            <a:r>
+              <a:rPr lang="en-US" i="1" dirty="0" smtClean="0">
+                <a:solidFill>
+                  <a:srgbClr val="FF0000"/>
+                </a:solidFill>
+              </a:rPr>
+              <a:t>Mention details that </a:t>
+            </a:r>
+            <a:r>
+              <a:rPr lang="en-US" i="1" dirty="0" smtClean="0">
+                <a:solidFill>
+                  <a:srgbClr val="FF0000"/>
+                </a:solidFill>
+              </a:rPr>
+              <a:t>were </a:t>
+            </a:r>
+            <a:r>
+              <a:rPr lang="en-US" i="1" dirty="0" smtClean="0">
+                <a:solidFill>
+                  <a:srgbClr val="FF0000"/>
+                </a:solidFill>
+              </a:rPr>
+              <a:t>discussed = the left half/automatic city-coarsened level of the diagram: </a:t>
+            </a:r>
+          </a:p>
+          <a:p>
+            <a:pPr marL="171450" indent="-171450">
+              <a:buFont typeface="Arial" panose="020B0604020202020204" pitchFamily="34" charset="0"/>
+              <a:buChar char="•"/>
+            </a:pPr>
+            <a:r>
+              <a:rPr lang="en-US" dirty="0" smtClean="0"/>
+              <a:t>Background</a:t>
+            </a:r>
+            <a:r>
+              <a:rPr lang="en-US" baseline="0" dirty="0" smtClean="0"/>
+              <a:t> location access coarsened to city level </a:t>
+            </a:r>
+            <a:r>
+              <a:rPr lang="en-US" baseline="0" dirty="0" smtClean="0">
+                <a:sym typeface="Wingdings" panose="05000000000000000000" pitchFamily="2" charset="2"/>
+              </a:rPr>
+              <a:t> the rest of the information applies to foreground and persistent (perceptible applications) location access</a:t>
+            </a:r>
+          </a:p>
+          <a:p>
+            <a:pPr marL="628650" lvl="1" indent="-171450">
+              <a:buFont typeface="Arial" panose="020B0604020202020204" pitchFamily="34" charset="0"/>
+              <a:buChar char="•"/>
+            </a:pPr>
+            <a:r>
+              <a:rPr lang="en-US" baseline="0" dirty="0" smtClean="0">
+                <a:sym typeface="Wingdings" panose="05000000000000000000" pitchFamily="2" charset="2"/>
+              </a:rPr>
+              <a:t>Reasoning: analysis showed that only 3% of applications access the user’s location while running in the background</a:t>
+            </a:r>
+          </a:p>
+          <a:p>
+            <a:pPr marL="171450" lvl="0" indent="-171450">
+              <a:buFont typeface="Arial" panose="020B0604020202020204" pitchFamily="34" charset="0"/>
+              <a:buChar char="•"/>
+            </a:pPr>
+            <a:r>
+              <a:rPr lang="en-US" sz="1100" baseline="0" dirty="0" smtClean="0">
+                <a:sym typeface="Wingdings" panose="05000000000000000000" pitchFamily="2" charset="2"/>
+              </a:rPr>
+              <a:t>A&amp;A library requests can be identified (shown via stack trace) and are sent city-coarsened information</a:t>
+            </a:r>
+          </a:p>
+          <a:p>
+            <a:pPr marL="171450" lvl="0" indent="-171450">
+              <a:buFont typeface="Arial" panose="020B0604020202020204" pitchFamily="34" charset="0"/>
+              <a:buChar char="•"/>
+            </a:pPr>
+            <a:endParaRPr lang="en-US" sz="1100" baseline="0" dirty="0" smtClean="0">
+              <a:sym typeface="Wingdings" panose="05000000000000000000" pitchFamily="2" charset="2"/>
+            </a:endParaRPr>
+          </a:p>
+          <a:p>
+            <a:pPr marL="0" lvl="0" indent="0">
+              <a:buFont typeface="Arial" panose="020B0604020202020204" pitchFamily="34" charset="0"/>
+              <a:buNone/>
+            </a:pPr>
+            <a:r>
+              <a:rPr lang="en-US" sz="1100" b="1" baseline="0" dirty="0" smtClean="0">
+                <a:sym typeface="Wingdings" panose="05000000000000000000" pitchFamily="2" charset="2"/>
+              </a:rPr>
+              <a:t>Threat Model: the adversary has access to a mapping between a set of </a:t>
+            </a:r>
+            <a:r>
+              <a:rPr lang="en-US" sz="1100" b="1" baseline="0" dirty="0" smtClean="0">
+                <a:sym typeface="Wingdings" panose="05000000000000000000" pitchFamily="2" charset="2"/>
+              </a:rPr>
+              <a:t>individuals </a:t>
+            </a:r>
+            <a:r>
+              <a:rPr lang="en-US" sz="1100" b="1" baseline="0" dirty="0" smtClean="0">
+                <a:sym typeface="Wingdings" panose="05000000000000000000" pitchFamily="2" charset="2"/>
+              </a:rPr>
+              <a:t>and the probability distributions of visiting each block in the city  aims to match the anonymous mobility histogram to an individual in the database</a:t>
+            </a:r>
+          </a:p>
+          <a:p>
+            <a:endParaRPr lang="en-US" baseline="0" dirty="0" smtClean="0">
+              <a:sym typeface="Wingdings" panose="05000000000000000000" pitchFamily="2" charset="2"/>
+            </a:endParaRPr>
+          </a:p>
+          <a:p>
+            <a:r>
+              <a:rPr lang="en-US" baseline="0" dirty="0" smtClean="0">
+                <a:sym typeface="Wingdings" panose="05000000000000000000" pitchFamily="2" charset="2"/>
+              </a:rPr>
+              <a:t>Identification Protection Formula = Probability that the histogram belongs to a given individual (multinomial distribution)</a:t>
+            </a:r>
+          </a:p>
+          <a:p>
+            <a:r>
+              <a:rPr lang="en-US" i="1" baseline="0" dirty="0" smtClean="0">
+                <a:sym typeface="Wingdings" panose="05000000000000000000" pitchFamily="2" charset="2"/>
+              </a:rPr>
+              <a:t>N = # of user application sessions</a:t>
+            </a:r>
+          </a:p>
+          <a:p>
+            <a:r>
+              <a:rPr lang="en-US" i="1" baseline="0" dirty="0" smtClean="0">
+                <a:sym typeface="Wingdings" panose="05000000000000000000" pitchFamily="2" charset="2"/>
+              </a:rPr>
+              <a:t>Bl = set of city blocks in the 2D grid of the city = {bl</a:t>
+            </a:r>
+            <a:r>
+              <a:rPr lang="en-US" i="1" baseline="-25000" dirty="0" smtClean="0">
+                <a:sym typeface="Wingdings" panose="05000000000000000000" pitchFamily="2" charset="2"/>
+              </a:rPr>
+              <a:t>1</a:t>
+            </a:r>
+            <a:r>
+              <a:rPr lang="en-US" i="1" baseline="0" dirty="0" smtClean="0">
+                <a:sym typeface="Wingdings" panose="05000000000000000000" pitchFamily="2" charset="2"/>
+              </a:rPr>
+              <a:t>, bl</a:t>
+            </a:r>
+            <a:r>
+              <a:rPr lang="en-US" i="1" baseline="-25000" dirty="0" smtClean="0">
+                <a:sym typeface="Wingdings" panose="05000000000000000000" pitchFamily="2" charset="2"/>
+              </a:rPr>
+              <a:t>2</a:t>
+            </a:r>
+            <a:r>
+              <a:rPr lang="en-US" i="1" baseline="0" dirty="0" smtClean="0">
+                <a:sym typeface="Wingdings" panose="05000000000000000000" pitchFamily="2" charset="2"/>
+              </a:rPr>
+              <a:t>, …, }</a:t>
+            </a:r>
+          </a:p>
+          <a:p>
             <a:pPr marL="0" marR="0" indent="0" algn="l" defTabSz="914400" rtl="0" eaLnBrk="1" fontAlgn="auto" latinLnBrk="0" hangingPunct="1">
               <a:lnSpc>
                 <a:spcPct val="100000"/>
@@ -3657,9 +3606,260 @@
               <a:defRPr/>
             </a:pPr>
             <a:r>
-              <a:rPr lang="en-US" i="0" baseline="0" dirty="0" smtClean="0"/>
-              <a:t>Noise value for LP-Guardian is 200m range</a:t>
-            </a:r>
+              <a:rPr lang="en-US" i="1" baseline="0" dirty="0" smtClean="0">
+                <a:sym typeface="Wingdings" panose="05000000000000000000" pitchFamily="2" charset="2"/>
+              </a:rPr>
+              <a:t>c</a:t>
+            </a:r>
+            <a:r>
+              <a:rPr lang="en-US" i="1" baseline="-25000" dirty="0" smtClean="0">
+                <a:sym typeface="Wingdings" panose="05000000000000000000" pitchFamily="2" charset="2"/>
+              </a:rPr>
+              <a:t>bli</a:t>
+            </a:r>
+            <a:r>
+              <a:rPr lang="en-US" i="1" baseline="0" dirty="0" smtClean="0">
+                <a:sym typeface="Wingdings" panose="05000000000000000000" pitchFamily="2" charset="2"/>
+              </a:rPr>
+              <a:t> = the number of times that bl</a:t>
+            </a:r>
+            <a:r>
+              <a:rPr lang="en-US" i="1" baseline="-25000" dirty="0" smtClean="0">
+                <a:sym typeface="Wingdings" panose="05000000000000000000" pitchFamily="2" charset="2"/>
+              </a:rPr>
+              <a:t>i</a:t>
+            </a:r>
+            <a:r>
+              <a:rPr lang="en-US" i="1" baseline="0" dirty="0" smtClean="0">
+                <a:sym typeface="Wingdings" panose="05000000000000000000" pitchFamily="2" charset="2"/>
+              </a:rPr>
+              <a:t> is visited by the user out of the total N sessions</a:t>
+            </a:r>
+          </a:p>
+          <a:p>
+            <a:r>
+              <a:rPr lang="en-US" i="1" baseline="0" dirty="0" smtClean="0">
+                <a:sym typeface="Wingdings" panose="05000000000000000000" pitchFamily="2" charset="2"/>
+              </a:rPr>
+              <a:t>p</a:t>
+            </a:r>
+            <a:r>
+              <a:rPr lang="en-US" i="1" baseline="-25000" dirty="0" smtClean="0">
+                <a:sym typeface="Wingdings" panose="05000000000000000000" pitchFamily="2" charset="2"/>
+              </a:rPr>
+              <a:t>i</a:t>
+            </a:r>
+            <a:r>
+              <a:rPr lang="en-US" i="1" baseline="0" dirty="0" smtClean="0">
+                <a:sym typeface="Wingdings" panose="05000000000000000000" pitchFamily="2" charset="2"/>
+              </a:rPr>
+              <a:t> = P(bl</a:t>
+            </a:r>
+            <a:r>
+              <a:rPr lang="en-US" i="1" baseline="-25000" dirty="0" smtClean="0">
+                <a:sym typeface="Wingdings" panose="05000000000000000000" pitchFamily="2" charset="2"/>
+              </a:rPr>
+              <a:t>i</a:t>
+            </a:r>
+            <a:r>
+              <a:rPr lang="en-US" i="1" baseline="0" dirty="0" smtClean="0">
+                <a:sym typeface="Wingdings" panose="05000000000000000000" pitchFamily="2" charset="2"/>
+              </a:rPr>
+              <a:t>) = the probability of the user visiting block bl</a:t>
+            </a:r>
+            <a:r>
+              <a:rPr lang="en-US" i="1" baseline="-25000" dirty="0" smtClean="0">
+                <a:sym typeface="Wingdings" panose="05000000000000000000" pitchFamily="2" charset="2"/>
+              </a:rPr>
+              <a:t>i</a:t>
+            </a:r>
+          </a:p>
+          <a:p>
+            <a:endParaRPr lang="en-US" i="1" baseline="0" dirty="0" smtClean="0">
+              <a:sym typeface="Wingdings" panose="05000000000000000000" pitchFamily="2" charset="2"/>
+            </a:endParaRPr>
+          </a:p>
+          <a:p>
+            <a:r>
+              <a:rPr lang="en-US" i="0" baseline="0" dirty="0" smtClean="0">
+                <a:sym typeface="Wingdings" panose="05000000000000000000" pitchFamily="2" charset="2"/>
+              </a:rPr>
+              <a:t>“Reasonably close” estimation notes: *if the inequality is satisfied, a dummy location is released*</a:t>
+            </a:r>
+          </a:p>
+          <a:p>
+            <a:pPr marL="171450" indent="-171450">
+              <a:buFont typeface="Arial" panose="020B0604020202020204" pitchFamily="34" charset="0"/>
+              <a:buChar char="•"/>
+            </a:pPr>
+            <a:r>
+              <a:rPr lang="en-US" i="0" baseline="0" dirty="0" smtClean="0">
+                <a:sym typeface="Wingdings" panose="05000000000000000000" pitchFamily="2" charset="2"/>
+              </a:rPr>
+              <a:t>Assume that epsilon = 0.5</a:t>
+            </a:r>
+          </a:p>
+          <a:p>
+            <a:pPr marL="171450" indent="-171450">
+              <a:buFont typeface="Arial" panose="020B0604020202020204" pitchFamily="34" charset="0"/>
+              <a:buChar char="•"/>
+            </a:pPr>
+            <a:r>
+              <a:rPr lang="en-US" i="0" baseline="0" dirty="0" smtClean="0">
+                <a:sym typeface="Wingdings" panose="05000000000000000000" pitchFamily="2" charset="2"/>
+              </a:rPr>
+              <a:t>Between the two equations, </a:t>
+            </a:r>
+            <a:r>
+              <a:rPr lang="en-US" i="1" baseline="0" dirty="0" smtClean="0">
+                <a:sym typeface="Wingdings" panose="05000000000000000000" pitchFamily="2" charset="2"/>
+              </a:rPr>
+              <a:t>y</a:t>
+            </a:r>
+            <a:r>
+              <a:rPr lang="en-US" i="0" baseline="0" dirty="0" smtClean="0">
+                <a:sym typeface="Wingdings" panose="05000000000000000000" pitchFamily="2" charset="2"/>
+              </a:rPr>
+              <a:t> is replaced with </a:t>
+            </a:r>
+            <a:r>
+              <a:rPr lang="en-US" i="1" baseline="0" dirty="0" smtClean="0">
+                <a:sym typeface="Wingdings" panose="05000000000000000000" pitchFamily="2" charset="2"/>
+              </a:rPr>
+              <a:t>p</a:t>
+            </a:r>
+            <a:r>
+              <a:rPr lang="en-US" i="1" baseline="-25000" dirty="0" smtClean="0">
+                <a:sym typeface="Wingdings" panose="05000000000000000000" pitchFamily="2" charset="2"/>
+              </a:rPr>
+              <a:t>min </a:t>
+            </a:r>
+            <a:r>
+              <a:rPr lang="en-US" i="0" baseline="0" dirty="0" smtClean="0">
+                <a:sym typeface="Wingdings" panose="05000000000000000000" pitchFamily="2" charset="2"/>
+              </a:rPr>
+              <a:t>(min. probability) of visiting a block because LP-Guardian (client side) does not know other user’s histograms</a:t>
+            </a:r>
+          </a:p>
+          <a:p>
+            <a:pPr marL="628650" lvl="1" indent="-171450">
+              <a:buFont typeface="Arial" panose="020B0604020202020204" pitchFamily="34" charset="0"/>
+              <a:buChar char="•"/>
+            </a:pPr>
+            <a:r>
+              <a:rPr lang="en-US" i="0" baseline="0" dirty="0" smtClean="0">
+                <a:sym typeface="Wingdings" panose="05000000000000000000" pitchFamily="2" charset="2"/>
+              </a:rPr>
+              <a:t>Note: low </a:t>
+            </a:r>
+            <a:r>
+              <a:rPr lang="en-US" i="1" baseline="0" dirty="0" smtClean="0">
+                <a:sym typeface="Wingdings" panose="05000000000000000000" pitchFamily="2" charset="2"/>
+              </a:rPr>
+              <a:t>p</a:t>
+            </a:r>
+            <a:r>
+              <a:rPr lang="en-US" i="1" baseline="-25000" dirty="0" smtClean="0">
+                <a:sym typeface="Wingdings" panose="05000000000000000000" pitchFamily="2" charset="2"/>
+              </a:rPr>
+              <a:t>min</a:t>
+            </a:r>
+            <a:r>
+              <a:rPr lang="en-US" i="1" baseline="0" dirty="0" smtClean="0">
+                <a:sym typeface="Wingdings" panose="05000000000000000000" pitchFamily="2" charset="2"/>
+              </a:rPr>
+              <a:t> </a:t>
+            </a:r>
+            <a:r>
+              <a:rPr lang="en-US" i="0" baseline="0" dirty="0" smtClean="0">
+                <a:sym typeface="Wingdings" panose="05000000000000000000" pitchFamily="2" charset="2"/>
+              </a:rPr>
+              <a:t>= strict privacy, high </a:t>
+            </a:r>
+            <a:r>
+              <a:rPr lang="en-US" i="1" baseline="0" dirty="0" smtClean="0">
+                <a:sym typeface="Wingdings" panose="05000000000000000000" pitchFamily="2" charset="2"/>
+              </a:rPr>
+              <a:t>p</a:t>
+            </a:r>
+            <a:r>
+              <a:rPr lang="en-US" i="1" baseline="-25000" dirty="0" smtClean="0">
+                <a:sym typeface="Wingdings" panose="05000000000000000000" pitchFamily="2" charset="2"/>
+              </a:rPr>
+              <a:t>min</a:t>
+            </a:r>
+            <a:r>
+              <a:rPr lang="en-US" i="0" baseline="0" dirty="0" smtClean="0">
+                <a:sym typeface="Wingdings" panose="05000000000000000000" pitchFamily="2" charset="2"/>
+              </a:rPr>
+              <a:t> = more relaxed privacy</a:t>
+            </a:r>
+          </a:p>
+          <a:p>
+            <a:pPr marL="171450" indent="-171450">
+              <a:buFont typeface="Arial" panose="020B0604020202020204" pitchFamily="34" charset="0"/>
+              <a:buChar char="•"/>
+            </a:pPr>
+            <a:r>
+              <a:rPr lang="en-US" i="0" baseline="0" dirty="0" smtClean="0">
+                <a:sym typeface="Wingdings" panose="05000000000000000000" pitchFamily="2" charset="2"/>
+              </a:rPr>
+              <a:t>If LP-Guardian determines that the same privacy level can be determined with a higher value of </a:t>
+            </a:r>
+            <a:r>
+              <a:rPr lang="en-US" i="1" baseline="0" dirty="0" smtClean="0">
+                <a:sym typeface="Wingdings" panose="05000000000000000000" pitchFamily="2" charset="2"/>
+              </a:rPr>
+              <a:t>p</a:t>
+            </a:r>
+            <a:r>
+              <a:rPr lang="en-US" i="1" baseline="-25000" dirty="0" smtClean="0">
+                <a:sym typeface="Wingdings" panose="05000000000000000000" pitchFamily="2" charset="2"/>
+              </a:rPr>
+              <a:t>min </a:t>
+            </a:r>
+            <a:r>
+              <a:rPr lang="en-US" i="0" baseline="0" dirty="0" smtClean="0">
+                <a:sym typeface="Wingdings" panose="05000000000000000000" pitchFamily="2" charset="2"/>
+              </a:rPr>
+              <a:t>, value will be relaxed (relies </a:t>
+            </a:r>
+            <a:r>
+              <a:rPr lang="en-US" i="0" baseline="0" dirty="0" smtClean="0">
+                <a:sym typeface="Wingdings" panose="05000000000000000000" pitchFamily="2" charset="2"/>
+              </a:rPr>
+              <a:t>on </a:t>
+            </a:r>
+            <a:r>
+              <a:rPr lang="en-US" i="0" baseline="0" dirty="0" smtClean="0">
+                <a:sym typeface="Wingdings" panose="05000000000000000000" pitchFamily="2" charset="2"/>
+              </a:rPr>
+              <a:t>census data that specifies the population for every city block)</a:t>
+            </a:r>
+            <a:endParaRPr lang="en-US" i="0" baseline="-25000" dirty="0" smtClean="0">
+              <a:sym typeface="Wingdings" panose="05000000000000000000" pitchFamily="2" charset="2"/>
+            </a:endParaRPr>
+          </a:p>
+          <a:p>
+            <a:pPr marL="171450" indent="-171450">
+              <a:buFont typeface="Arial" panose="020B0604020202020204" pitchFamily="34" charset="0"/>
+              <a:buChar char="•"/>
+            </a:pPr>
+            <a:endParaRPr lang="en-US" i="0" baseline="0" dirty="0" smtClean="0">
+              <a:sym typeface="Wingdings" panose="05000000000000000000" pitchFamily="2" charset="2"/>
+            </a:endParaRPr>
+          </a:p>
+          <a:p>
+            <a:endParaRPr lang="en-US" i="1" baseline="0" dirty="0" smtClean="0">
+              <a:sym typeface="Wingdings" panose="05000000000000000000" pitchFamily="2" charset="2"/>
+            </a:endParaRPr>
+          </a:p>
+          <a:p>
+            <a:endParaRPr lang="en-US" baseline="0" dirty="0" smtClean="0">
+              <a:sym typeface="Wingdings" panose="05000000000000000000" pitchFamily="2" charset="2"/>
+            </a:endParaRPr>
+          </a:p>
+          <a:p>
             <a:endParaRPr lang="en-US" baseline="0" dirty="0" smtClean="0">
               <a:sym typeface="Wingdings" panose="05000000000000000000" pitchFamily="2" charset="2"/>
             </a:endParaRPr>
@@ -3691,7 +3891,7 @@
                 </a:solidFill>
               </a:rPr>
               <a:pPr/>
-              <a:t>8</a:t>
+              <a:t>7</a:t>
             </a:fld>
             <a:endParaRPr lang="en-US" dirty="0">
               <a:solidFill>
@@ -3704,7 +3904,7 @@
     </p:spTree>
     <p:extLst>
       <p:ext uri="{BB962C8B-B14F-4D97-AF65-F5344CB8AC3E}">
-        <p14:creationId xmlns:p14="http://schemas.microsoft.com/office/powerpoint/2010/main" val="3439409429"/>
+        <p14:creationId xmlns:p14="http://schemas.microsoft.com/office/powerpoint/2010/main" val="1796385184"/>
       </p:ext>
     </p:extLst>
   </p:cSld>
@@ -3758,61 +3958,33 @@
           <a:bodyPr/>
           <a:lstStyle/>
           <a:p>
-            <a:r>
-              <a:rPr lang="en-US" i="0" baseline="0" dirty="0" smtClean="0"/>
-              <a:t>Polar noise symbol explanation: </a:t>
-            </a:r>
-          </a:p>
-          <a:p>
-            <a:pPr marL="171450" indent="-171450">
-              <a:buFont typeface="Arial" panose="020B0604020202020204" pitchFamily="34" charset="0"/>
-              <a:buChar char="•"/>
-            </a:pPr>
-            <a:r>
-              <a:rPr lang="en-US" i="1" baseline="0" dirty="0" smtClean="0"/>
-              <a:t>W</a:t>
-            </a:r>
-            <a:r>
-              <a:rPr lang="en-US" i="1" baseline="-25000" dirty="0" smtClean="0"/>
-              <a:t>-1</a:t>
-            </a:r>
-            <a:r>
-              <a:rPr lang="en-US" i="1" baseline="0" dirty="0" smtClean="0"/>
-              <a:t> </a:t>
-            </a:r>
-            <a:r>
-              <a:rPr lang="en-US" i="0" baseline="0" dirty="0" smtClean="0"/>
-              <a:t>is the -1 branch of the Lambert </a:t>
-            </a:r>
-            <a:r>
-              <a:rPr lang="en-US" i="1" baseline="0" dirty="0" smtClean="0"/>
-              <a:t>W</a:t>
-            </a:r>
-            <a:r>
-              <a:rPr lang="en-US" i="0" baseline="0" dirty="0" smtClean="0"/>
-              <a:t> function and </a:t>
-            </a:r>
-            <a:r>
-              <a:rPr lang="en-US" i="1" baseline="0" dirty="0" smtClean="0"/>
-              <a:t>l </a:t>
-            </a:r>
-            <a:r>
-              <a:rPr lang="en-US" i="0" baseline="0" dirty="0" smtClean="0"/>
-              <a:t>is a privacy level (typically close to 1)</a:t>
-            </a:r>
-          </a:p>
-          <a:p>
-            <a:pPr marL="171450" indent="-171450">
-              <a:buFont typeface="Arial" panose="020B0604020202020204" pitchFamily="34" charset="0"/>
-              <a:buChar char="•"/>
+            <a:pPr marL="0" marR="0" indent="0" algn="l" defTabSz="914400" rtl="0" eaLnBrk="1" fontAlgn="auto" latinLnBrk="0" hangingPunct="1">
+              <a:lnSpc>
+                <a:spcPct val="100000"/>
+              </a:lnSpc>
+              <a:spcBef>
+                <a:spcPts val="0"/>
+              </a:spcBef>
+              <a:spcAft>
+                <a:spcPts val="0"/>
+              </a:spcAft>
+              <a:buClrTx/>
+              <a:buSzTx/>
+              <a:buFontTx/>
+              <a:buNone/>
+              <a:tabLst/>
+              <a:defRPr/>
             </a:pPr>
             <a:r>
               <a:rPr lang="en-US" i="0" baseline="0" dirty="0" smtClean="0"/>
               <a:t>Noise value for LP-Guardian is 200m range</a:t>
             </a:r>
-          </a:p>
-          <a:p>
-            <a:endParaRPr lang="en-US" i="1" baseline="0" dirty="0" smtClean="0"/>
+            <a:endParaRPr lang="en-US" baseline="0" dirty="0" smtClean="0">
+              <a:sym typeface="Wingdings" panose="05000000000000000000" pitchFamily="2" charset="2"/>
+            </a:endParaRPr>
+          </a:p>
+          <a:p>
+            <a:endParaRPr lang="en-US" baseline="0" dirty="0" smtClean="0"/>
           </a:p>
         </p:txBody>
       </p:sp>
@@ -3838,7 +4010,7 @@
                 </a:solidFill>
               </a:rPr>
               <a:pPr/>
-              <a:t>9</a:t>
+              <a:t>8</a:t>
             </a:fld>
             <a:endParaRPr lang="en-US" dirty="0">
               <a:solidFill>
@@ -3851,7 +4023,7 @@
     </p:spTree>
     <p:extLst>
       <p:ext uri="{BB962C8B-B14F-4D97-AF65-F5344CB8AC3E}">
-        <p14:creationId xmlns:p14="http://schemas.microsoft.com/office/powerpoint/2010/main" val="1073290682"/>
+        <p14:creationId xmlns:p14="http://schemas.microsoft.com/office/powerpoint/2010/main" val="3439409429"/>
       </p:ext>
     </p:extLst>
   </p:cSld>
@@ -3906,8 +4078,21 @@
           <a:lstStyle/>
           <a:p>
             <a:r>
-              <a:rPr lang="en-US" dirty="0" smtClean="0"/>
-              <a:t>Rule Manager: </a:t>
+              <a:rPr lang="en-US" b="1" i="0" baseline="0" dirty="0" smtClean="0"/>
+              <a:t>Note: this slide only to be shown if more information on the polar Laplacian distribution is requested</a:t>
+            </a:r>
+          </a:p>
+          <a:p>
+            <a:endParaRPr lang="en-US" i="0" baseline="0" dirty="0" smtClean="0"/>
+          </a:p>
+          <a:p>
+            <a:r>
+              <a:rPr lang="en-US" i="0" baseline="0" dirty="0" smtClean="0"/>
+              <a:t>Polar </a:t>
+            </a:r>
+            <a:r>
+              <a:rPr lang="en-US" i="0" baseline="0" dirty="0" smtClean="0"/>
+              <a:t>noise symbol explanation: </a:t>
             </a:r>
           </a:p>
           <a:p>
@@ -3916,12 +4101,36 @@
               <a:buChar char="•"/>
             </a:pPr>
             <a:r>
-              <a:rPr lang="en-US" dirty="0" smtClean="0"/>
-              <a:t>Input: the application, the state of the application (foreground or background), the location sample, whether</a:t>
-            </a:r>
-            <a:r>
-              <a:rPr lang="en-US" baseline="0" dirty="0" smtClean="0"/>
-              <a:t> the application session is new or an ongoing session, and the place/city/block</a:t>
+              <a:rPr lang="en-US" i="1" baseline="0" dirty="0" smtClean="0"/>
+              <a:t>W</a:t>
+            </a:r>
+            <a:r>
+              <a:rPr lang="en-US" i="1" baseline="-25000" dirty="0" smtClean="0"/>
+              <a:t>-1</a:t>
+            </a:r>
+            <a:r>
+              <a:rPr lang="en-US" i="1" baseline="0" dirty="0" smtClean="0"/>
+              <a:t> </a:t>
+            </a:r>
+            <a:r>
+              <a:rPr lang="en-US" i="0" baseline="0" dirty="0" smtClean="0"/>
+              <a:t>is the -1 branch of the Lambert </a:t>
+            </a:r>
+            <a:r>
+              <a:rPr lang="en-US" i="1" baseline="0" dirty="0" smtClean="0"/>
+              <a:t>W</a:t>
+            </a:r>
+            <a:r>
+              <a:rPr lang="en-US" i="0" baseline="0" dirty="0" smtClean="0"/>
+              <a:t> function and </a:t>
+            </a:r>
+            <a:r>
+              <a:rPr lang="en-US" i="1" baseline="0" dirty="0" smtClean="0"/>
+              <a:t>l </a:t>
+            </a:r>
+            <a:r>
+              <a:rPr lang="en-US" i="0" baseline="0" dirty="0" smtClean="0"/>
+              <a:t>is a privacy level (typically close to 1)</a:t>
             </a:r>
           </a:p>
           <a:p>
@@ -3930,57 +4139,12 @@
               <a:buChar char="•"/>
             </a:pPr>
             <a:r>
-              <a:rPr lang="en-US" baseline="0" dirty="0" smtClean="0"/>
-              <a:t>Global rules: one per application (applies to foreground and background states)</a:t>
-            </a:r>
-          </a:p>
-          <a:p>
-            <a:pPr marL="171450" indent="-171450">
-              <a:buFont typeface="Arial" panose="020B0604020202020204" pitchFamily="34" charset="0"/>
-              <a:buChar char="•"/>
-            </a:pPr>
-            <a:r>
-              <a:rPr lang="en-US" baseline="0" dirty="0" smtClean="0"/>
-              <a:t>Per-place rules: one per application-location combination</a:t>
-            </a:r>
-          </a:p>
-          <a:p>
-            <a:pPr marL="171450" indent="-171450">
-              <a:buFont typeface="Arial" panose="020B0604020202020204" pitchFamily="34" charset="0"/>
-              <a:buChar char="•"/>
-            </a:pPr>
-            <a:endParaRPr lang="en-US" baseline="0" dirty="0" smtClean="0"/>
-          </a:p>
-          <a:p>
-            <a:pPr marL="0" indent="0">
-              <a:buFont typeface="Arial" panose="020B0604020202020204" pitchFamily="34" charset="0"/>
-              <a:buNone/>
-            </a:pPr>
-            <a:r>
-              <a:rPr lang="en-US" baseline="0" dirty="0" smtClean="0"/>
-              <a:t>Place/City Detector:</a:t>
-            </a:r>
-          </a:p>
-          <a:p>
-            <a:pPr marL="171450" indent="-171450">
-              <a:buFont typeface="Arial" panose="020B0604020202020204" pitchFamily="34" charset="0"/>
-              <a:buChar char="•"/>
-            </a:pPr>
-            <a:r>
-              <a:rPr lang="en-US" baseline="0" dirty="0" smtClean="0"/>
-              <a:t>Place = a cluster of locations within a radius of 100m and over a minimum duration of 5 minutes</a:t>
-            </a:r>
-          </a:p>
-          <a:p>
-            <a:pPr marL="171450" indent="-171450">
-              <a:buFont typeface="Arial" panose="020B0604020202020204" pitchFamily="34" charset="0"/>
-              <a:buChar char="•"/>
-            </a:pPr>
-            <a:r>
-              <a:rPr lang="en-US" baseline="0" dirty="0" smtClean="0"/>
-              <a:t>Mobility Model = set of places the user has visited along with total visiting time of each place</a:t>
-            </a:r>
-            <a:endParaRPr lang="en-US" dirty="0"/>
+              <a:rPr lang="en-US" i="0" baseline="0" dirty="0" smtClean="0"/>
+              <a:t>Noise value for LP-Guardian is 200m range</a:t>
+            </a:r>
+          </a:p>
+          <a:p>
+            <a:endParaRPr lang="en-US" i="1" baseline="0" dirty="0" smtClean="0"/>
           </a:p>
         </p:txBody>
       </p:sp>
@@ -4006,7 +4170,7 @@
                 </a:solidFill>
               </a:rPr>
               <a:pPr/>
-              <a:t>10</a:t>
+              <a:t>9</a:t>
             </a:fld>
             <a:endParaRPr lang="en-US" dirty="0">
               <a:solidFill>
@@ -4019,7 +4183,7 @@
     </p:spTree>
     <p:extLst>
       <p:ext uri="{BB962C8B-B14F-4D97-AF65-F5344CB8AC3E}">
-        <p14:creationId xmlns:p14="http://schemas.microsoft.com/office/powerpoint/2010/main" val="2493574430"/>
+        <p14:creationId xmlns:p14="http://schemas.microsoft.com/office/powerpoint/2010/main" val="1073290682"/>
       </p:ext>
     </p:extLst>
   </p:cSld>
@@ -18276,6 +18440,13 @@
   <p:clrMapOvr>
     <a:masterClrMapping/>
   </p:clrMapOvr>
+  <p:timing>
+    <p:tnLst>
+      <p:par>
+        <p:cTn id="1" dur="indefinite" restart="never" nodeType="tmRoot"/>
+      </p:par>
+    </p:tnLst>
+  </p:timing>
 </p:sld>
 </file>
 
@@ -18728,7 +18899,7 @@
           <a:p>
             <a:r>
               <a:rPr lang="en-US" dirty="0" smtClean="0"/>
-              <a:t>Applications’ </a:t>
+              <a:t>Applications requesting </a:t>
             </a:r>
             <a:r>
               <a:rPr lang="en-US" dirty="0"/>
@@ -19439,12 +19610,12 @@
               <a:t>Messaging (</a:t>
             </a:r>
             <a:r>
-              <a:rPr lang="en-US" dirty="0" err="1" smtClean="0"/>
-              <a:t>WhatsAp</a:t>
-            </a:r>
-            <a:r>
               <a:rPr lang="en-US" dirty="0" smtClean="0"/>
-              <a:t>):  Do they share location at or near home/work?</a:t>
+              <a:t>WhatsApp):  </a:t>
+            </a:r>
+            <a:r>
+              <a:rPr lang="en-US" dirty="0" smtClean="0"/>
+              <a:t>Do they share location at or near home/work?</a:t>
             </a:r>
           </a:p>
           <a:p>
@@ -19614,8 +19785,8 @@
               <a:t>Gaming: Will the game experience change with location </a:t>
             </a:r>
             <a:r>
-              <a:rPr lang="en-US" dirty="0" err="1" smtClean="0"/>
-              <a:t>anonymization</a:t>
+              <a:rPr lang="en-US" dirty="0" smtClean="0"/>
+              <a:t>anonymization?</a:t>
             </a:r>
             <a:endParaRPr lang="en-US" dirty="0"/>
           </a:p>
@@ -20652,7 +20823,11 @@
             </a:r>
             <a:r>
               <a:rPr lang="en-US" dirty="0" smtClean="0"/>
-              <a:t> are for home </a:t>
+              <a:t>are </a:t>
+            </a:r>
+            <a:r>
+              <a:rPr lang="en-US" dirty="0" smtClean="0"/>
+              <a:t>for home </a:t>
             </a:r>
             <a:r>
               <a:rPr lang="en-US" dirty="0"/>
@@ -21082,12 +21257,12 @@
               <a:t>City-Level Location would work for an app such as weather, but would be limited if used by a location specific search app where a user might be looking for the closest gas station, restaurant, store, </a:t>
             </a:r>
             <a:r>
-              <a:rPr lang="en-US" dirty="0" err="1" smtClean="0"/>
-              <a:t>etc</a:t>
-            </a:r>
-            <a:r>
               <a:rPr lang="en-US" dirty="0" smtClean="0"/>
-              <a:t> to their location.</a:t>
+              <a:t>etc. </a:t>
+            </a:r>
+            <a:r>
+              <a:rPr lang="en-US" dirty="0" smtClean="0"/>
+              <a:t>to their location.</a:t>
             </a:r>
             <a:endParaRPr lang="en-US" dirty="0"/>
           </a:p>
@@ -21182,12 +21357,12 @@
               <a:t>Make a similar app for </a:t>
             </a:r>
             <a:r>
-              <a:rPr lang="en-US" dirty="0" err="1" smtClean="0"/>
-              <a:t>ios</a:t>
-            </a:r>
-            <a:r>
               <a:rPr lang="en-US" dirty="0" smtClean="0"/>
-              <a:t> devices</a:t>
+              <a:t>iOS </a:t>
+            </a:r>
+            <a:r>
+              <a:rPr lang="en-US" dirty="0" smtClean="0"/>
+              <a:t>devices</a:t>
             </a:r>
           </a:p>
           <a:p>
@@ -21754,15 +21929,7 @@
           <a:p>
             <a:r>
               <a:rPr lang="en-US" dirty="0" smtClean="0"/>
-              <a:t>Proposed Approach </a:t>
-            </a:r>
-            <a:r>
-              <a:rPr lang="en-US" dirty="0" smtClean="0"/>
-              <a:t>(1 </a:t>
-            </a:r>
-            <a:r>
-              <a:rPr lang="en-US" dirty="0" smtClean="0"/>
-              <a:t>of 2)</a:t>
+              <a:t>Proposed Approach (1 of 2)</a:t>
             </a:r>
             <a:endParaRPr lang="en-US" dirty="0"/>
           </a:p>
@@ -21893,15 +22060,7 @@
           <a:p>
             <a:r>
               <a:rPr lang="en-US" dirty="0" smtClean="0"/>
-              <a:t>Proposed Approach </a:t>
-            </a:r>
-            <a:r>
-              <a:rPr lang="en-US" dirty="0" smtClean="0"/>
-              <a:t>(2 </a:t>
-            </a:r>
-            <a:r>
-              <a:rPr lang="en-US" dirty="0" smtClean="0"/>
-              <a:t>of 2)</a:t>
+              <a:t>Proposed Approach (2 of 2)</a:t>
             </a:r>
             <a:endParaRPr lang="en-US" dirty="0"/>
           </a:p>
@@ -23087,7 +23246,7 @@
         </p:blipFill>
         <p:spPr>
           <a:xfrm>
-            <a:off x="179724" y="1958499"/>
+            <a:off x="179724" y="2286000"/>
             <a:ext cx="1953876" cy="2269017"/>
           </a:xfrm>
           <a:prstGeom prst="rect">

</xml_diff>